<commit_message>
Mid-term presentation: title slide
</commit_message>
<xml_diff>
--- a/project/mid-term-presentation.pptx
+++ b/project/mid-term-presentation.pptx
@@ -5,7 +5,7 @@
     <p:sldMasterId id="2147483845" r:id="rId1"/>
   </p:sldMasterIdLst>
   <p:sldIdLst>
-    <p:sldId id="256" r:id="rId2"/>
+    <p:sldId id="276" r:id="rId2"/>
     <p:sldId id="257" r:id="rId3"/>
     <p:sldId id="258" r:id="rId4"/>
     <p:sldId id="259" r:id="rId5"/>
@@ -123,6 +123,11 @@
       </a:defRPr>
     </a:lvl9pPr>
   </p:defaultTextStyle>
+  <p:extLst>
+    <p:ext uri="{EFAFB233-063F-42B5-8137-9DF3F51BA10A}">
+      <p15:sldGuideLst xmlns:p15="http://schemas.microsoft.com/office/powerpoint/2012/main"/>
+    </p:ext>
+  </p:extLst>
 </p:presentation>
 </file>
 
@@ -257,7 +262,7 @@
           <a:p>
             <a:fld id="{C40ACEE9-C2D0-4F50-A069-FD7DDEA3AAE9}" type="datetimeFigureOut">
               <a:rPr lang="en-US" smtClean="0"/>
-              <a:t>10/13/2017</a:t>
+              <a:t>10/22/2017</a:t>
             </a:fld>
             <a:endParaRPr lang="en-US"/>
           </a:p>
@@ -315,11 +320,11 @@
   <p:clrMapOvr>
     <a:masterClrMapping/>
   </p:clrMapOvr>
-  <mc:AlternateContent xmlns:mc="http://schemas.openxmlformats.org/markup-compatibility/2006">
-    <mc:Choice xmlns:p14="http://schemas.microsoft.com/office/powerpoint/2010/main" Requires="p14">
+  <mc:AlternateContent xmlns:mc="http://schemas.openxmlformats.org/markup-compatibility/2006" xmlns:p14="http://schemas.microsoft.com/office/powerpoint/2010/main">
+    <mc:Choice Requires="p14">
       <p:transition spd="slow" p14:dur="2000" advTm="15000"/>
     </mc:Choice>
-    <mc:Fallback>
+    <mc:Fallback xmlns="">
       <p:transition spd="slow" advTm="15000"/>
     </mc:Fallback>
   </mc:AlternateContent>
@@ -435,7 +440,7 @@
           <a:p>
             <a:fld id="{C40ACEE9-C2D0-4F50-A069-FD7DDEA3AAE9}" type="datetimeFigureOut">
               <a:rPr lang="en-US" smtClean="0"/>
-              <a:t>10/13/2017</a:t>
+              <a:t>10/22/2017</a:t>
             </a:fld>
             <a:endParaRPr lang="en-US"/>
           </a:p>
@@ -493,11 +498,11 @@
   <p:clrMapOvr>
     <a:masterClrMapping/>
   </p:clrMapOvr>
-  <mc:AlternateContent xmlns:mc="http://schemas.openxmlformats.org/markup-compatibility/2006">
-    <mc:Choice xmlns:p14="http://schemas.microsoft.com/office/powerpoint/2010/main" Requires="p14">
+  <mc:AlternateContent xmlns:mc="http://schemas.openxmlformats.org/markup-compatibility/2006" xmlns:p14="http://schemas.microsoft.com/office/powerpoint/2010/main">
+    <mc:Choice Requires="p14">
       <p:transition spd="slow" p14:dur="2000" advTm="15000"/>
     </mc:Choice>
-    <mc:Fallback>
+    <mc:Fallback xmlns="">
       <p:transition spd="slow" advTm="15000"/>
     </mc:Fallback>
   </mc:AlternateContent>
@@ -623,7 +628,7 @@
           <a:p>
             <a:fld id="{C40ACEE9-C2D0-4F50-A069-FD7DDEA3AAE9}" type="datetimeFigureOut">
               <a:rPr lang="en-US" smtClean="0"/>
-              <a:t>10/13/2017</a:t>
+              <a:t>10/22/2017</a:t>
             </a:fld>
             <a:endParaRPr lang="en-US"/>
           </a:p>
@@ -681,11 +686,11 @@
   <p:clrMapOvr>
     <a:masterClrMapping/>
   </p:clrMapOvr>
-  <mc:AlternateContent xmlns:mc="http://schemas.openxmlformats.org/markup-compatibility/2006">
-    <mc:Choice xmlns:p14="http://schemas.microsoft.com/office/powerpoint/2010/main" Requires="p14">
+  <mc:AlternateContent xmlns:mc="http://schemas.openxmlformats.org/markup-compatibility/2006" xmlns:p14="http://schemas.microsoft.com/office/powerpoint/2010/main">
+    <mc:Choice Requires="p14">
       <p:transition spd="slow" p14:dur="2000" advTm="15000"/>
     </mc:Choice>
-    <mc:Fallback>
+    <mc:Fallback xmlns="">
       <p:transition spd="slow" advTm="15000"/>
     </mc:Fallback>
   </mc:AlternateContent>
@@ -801,7 +806,7 @@
           <a:p>
             <a:fld id="{C40ACEE9-C2D0-4F50-A069-FD7DDEA3AAE9}" type="datetimeFigureOut">
               <a:rPr lang="en-US" smtClean="0"/>
-              <a:t>10/13/2017</a:t>
+              <a:t>10/22/2017</a:t>
             </a:fld>
             <a:endParaRPr lang="en-US"/>
           </a:p>
@@ -859,11 +864,11 @@
   <p:clrMapOvr>
     <a:masterClrMapping/>
   </p:clrMapOvr>
-  <mc:AlternateContent xmlns:mc="http://schemas.openxmlformats.org/markup-compatibility/2006">
-    <mc:Choice xmlns:p14="http://schemas.microsoft.com/office/powerpoint/2010/main" Requires="p14">
+  <mc:AlternateContent xmlns:mc="http://schemas.openxmlformats.org/markup-compatibility/2006" xmlns:p14="http://schemas.microsoft.com/office/powerpoint/2010/main">
+    <mc:Choice Requires="p14">
       <p:transition spd="slow" p14:dur="2000" advTm="15000"/>
     </mc:Choice>
-    <mc:Fallback>
+    <mc:Fallback xmlns="">
       <p:transition spd="slow" advTm="15000"/>
     </mc:Fallback>
   </mc:AlternateContent>
@@ -1055,7 +1060,7 @@
           <a:p>
             <a:fld id="{C40ACEE9-C2D0-4F50-A069-FD7DDEA3AAE9}" type="datetimeFigureOut">
               <a:rPr lang="en-US" smtClean="0"/>
-              <a:t>10/13/2017</a:t>
+              <a:t>10/22/2017</a:t>
             </a:fld>
             <a:endParaRPr lang="en-US"/>
           </a:p>
@@ -1113,11 +1118,11 @@
   <p:clrMapOvr>
     <a:masterClrMapping/>
   </p:clrMapOvr>
-  <mc:AlternateContent xmlns:mc="http://schemas.openxmlformats.org/markup-compatibility/2006">
-    <mc:Choice xmlns:p14="http://schemas.microsoft.com/office/powerpoint/2010/main" Requires="p14">
+  <mc:AlternateContent xmlns:mc="http://schemas.openxmlformats.org/markup-compatibility/2006" xmlns:p14="http://schemas.microsoft.com/office/powerpoint/2010/main">
+    <mc:Choice Requires="p14">
       <p:transition spd="slow" p14:dur="2000" advTm="15000"/>
     </mc:Choice>
-    <mc:Fallback>
+    <mc:Fallback xmlns="">
       <p:transition spd="slow" advTm="15000"/>
     </mc:Fallback>
   </mc:AlternateContent>
@@ -1295,7 +1300,7 @@
           <a:p>
             <a:fld id="{C40ACEE9-C2D0-4F50-A069-FD7DDEA3AAE9}" type="datetimeFigureOut">
               <a:rPr lang="en-US" smtClean="0"/>
-              <a:t>10/13/2017</a:t>
+              <a:t>10/22/2017</a:t>
             </a:fld>
             <a:endParaRPr lang="en-US"/>
           </a:p>
@@ -1353,11 +1358,11 @@
   <p:clrMapOvr>
     <a:masterClrMapping/>
   </p:clrMapOvr>
-  <mc:AlternateContent xmlns:mc="http://schemas.openxmlformats.org/markup-compatibility/2006">
-    <mc:Choice xmlns:p14="http://schemas.microsoft.com/office/powerpoint/2010/main" Requires="p14">
+  <mc:AlternateContent xmlns:mc="http://schemas.openxmlformats.org/markup-compatibility/2006" xmlns:p14="http://schemas.microsoft.com/office/powerpoint/2010/main">
+    <mc:Choice Requires="p14">
       <p:transition spd="slow" p14:dur="2000" advTm="15000"/>
     </mc:Choice>
-    <mc:Fallback>
+    <mc:Fallback xmlns="">
       <p:transition spd="slow" advTm="15000"/>
     </mc:Fallback>
   </mc:AlternateContent>
@@ -1675,7 +1680,7 @@
           <a:p>
             <a:fld id="{C40ACEE9-C2D0-4F50-A069-FD7DDEA3AAE9}" type="datetimeFigureOut">
               <a:rPr lang="en-US" smtClean="0"/>
-              <a:t>10/13/2017</a:t>
+              <a:t>10/22/2017</a:t>
             </a:fld>
             <a:endParaRPr lang="en-US"/>
           </a:p>
@@ -1733,11 +1738,11 @@
   <p:clrMapOvr>
     <a:masterClrMapping/>
   </p:clrMapOvr>
-  <mc:AlternateContent xmlns:mc="http://schemas.openxmlformats.org/markup-compatibility/2006">
-    <mc:Choice xmlns:p14="http://schemas.microsoft.com/office/powerpoint/2010/main" Requires="p14">
+  <mc:AlternateContent xmlns:mc="http://schemas.openxmlformats.org/markup-compatibility/2006" xmlns:p14="http://schemas.microsoft.com/office/powerpoint/2010/main">
+    <mc:Choice Requires="p14">
       <p:transition spd="slow" p14:dur="2000" advTm="15000"/>
     </mc:Choice>
-    <mc:Fallback>
+    <mc:Fallback xmlns="">
       <p:transition spd="slow" advTm="15000"/>
     </mc:Fallback>
   </mc:AlternateContent>
@@ -1806,7 +1811,7 @@
           <a:p>
             <a:fld id="{C40ACEE9-C2D0-4F50-A069-FD7DDEA3AAE9}" type="datetimeFigureOut">
               <a:rPr lang="en-US" smtClean="0"/>
-              <a:t>10/13/2017</a:t>
+              <a:t>10/22/2017</a:t>
             </a:fld>
             <a:endParaRPr lang="en-US"/>
           </a:p>
@@ -1864,11 +1869,11 @@
   <p:clrMapOvr>
     <a:masterClrMapping/>
   </p:clrMapOvr>
-  <mc:AlternateContent xmlns:mc="http://schemas.openxmlformats.org/markup-compatibility/2006">
-    <mc:Choice xmlns:p14="http://schemas.microsoft.com/office/powerpoint/2010/main" Requires="p14">
+  <mc:AlternateContent xmlns:mc="http://schemas.openxmlformats.org/markup-compatibility/2006" xmlns:p14="http://schemas.microsoft.com/office/powerpoint/2010/main">
+    <mc:Choice Requires="p14">
       <p:transition spd="slow" p14:dur="2000" advTm="15000"/>
     </mc:Choice>
-    <mc:Fallback>
+    <mc:Fallback xmlns="">
       <p:transition spd="slow" advTm="15000"/>
     </mc:Fallback>
   </mc:AlternateContent>
@@ -1909,7 +1914,7 @@
           <a:p>
             <a:fld id="{C40ACEE9-C2D0-4F50-A069-FD7DDEA3AAE9}" type="datetimeFigureOut">
               <a:rPr lang="en-US" smtClean="0"/>
-              <a:t>10/13/2017</a:t>
+              <a:t>10/22/2017</a:t>
             </a:fld>
             <a:endParaRPr lang="en-US"/>
           </a:p>
@@ -1967,11 +1972,11 @@
   <p:clrMapOvr>
     <a:masterClrMapping/>
   </p:clrMapOvr>
-  <mc:AlternateContent xmlns:mc="http://schemas.openxmlformats.org/markup-compatibility/2006">
-    <mc:Choice xmlns:p14="http://schemas.microsoft.com/office/powerpoint/2010/main" Requires="p14">
+  <mc:AlternateContent xmlns:mc="http://schemas.openxmlformats.org/markup-compatibility/2006" xmlns:p14="http://schemas.microsoft.com/office/powerpoint/2010/main">
+    <mc:Choice Requires="p14">
       <p:transition spd="slow" p14:dur="2000" advTm="15000"/>
     </mc:Choice>
-    <mc:Fallback>
+    <mc:Fallback xmlns="">
       <p:transition spd="slow" advTm="15000"/>
     </mc:Fallback>
   </mc:AlternateContent>
@@ -2194,7 +2199,7 @@
           <a:p>
             <a:fld id="{C40ACEE9-C2D0-4F50-A069-FD7DDEA3AAE9}" type="datetimeFigureOut">
               <a:rPr lang="en-US" smtClean="0"/>
-              <a:t>10/13/2017</a:t>
+              <a:t>10/22/2017</a:t>
             </a:fld>
             <a:endParaRPr lang="en-US"/>
           </a:p>
@@ -2252,11 +2257,11 @@
   <p:clrMapOvr>
     <a:masterClrMapping/>
   </p:clrMapOvr>
-  <mc:AlternateContent xmlns:mc="http://schemas.openxmlformats.org/markup-compatibility/2006">
-    <mc:Choice xmlns:p14="http://schemas.microsoft.com/office/powerpoint/2010/main" Requires="p14">
+  <mc:AlternateContent xmlns:mc="http://schemas.openxmlformats.org/markup-compatibility/2006" xmlns:p14="http://schemas.microsoft.com/office/powerpoint/2010/main">
+    <mc:Choice Requires="p14">
       <p:transition spd="slow" p14:dur="2000" advTm="15000"/>
     </mc:Choice>
-    <mc:Fallback>
+    <mc:Fallback xmlns="">
       <p:transition spd="slow" advTm="15000"/>
     </mc:Fallback>
   </mc:AlternateContent>
@@ -2460,7 +2465,7 @@
           <a:p>
             <a:fld id="{C40ACEE9-C2D0-4F50-A069-FD7DDEA3AAE9}" type="datetimeFigureOut">
               <a:rPr lang="en-US" smtClean="0"/>
-              <a:t>10/13/2017</a:t>
+              <a:t>10/22/2017</a:t>
             </a:fld>
             <a:endParaRPr lang="en-US"/>
           </a:p>
@@ -2518,11 +2523,11 @@
   <p:clrMapOvr>
     <a:masterClrMapping/>
   </p:clrMapOvr>
-  <mc:AlternateContent xmlns:mc="http://schemas.openxmlformats.org/markup-compatibility/2006">
-    <mc:Choice xmlns:p14="http://schemas.microsoft.com/office/powerpoint/2010/main" Requires="p14">
+  <mc:AlternateContent xmlns:mc="http://schemas.openxmlformats.org/markup-compatibility/2006" xmlns:p14="http://schemas.microsoft.com/office/powerpoint/2010/main">
+    <mc:Choice Requires="p14">
       <p:transition spd="slow" p14:dur="2000" advTm="15000"/>
     </mc:Choice>
-    <mc:Fallback>
+    <mc:Fallback xmlns="">
       <p:transition spd="slow" advTm="15000"/>
     </mc:Fallback>
   </mc:AlternateContent>
@@ -2681,7 +2686,7 @@
           <a:p>
             <a:fld id="{C40ACEE9-C2D0-4F50-A069-FD7DDEA3AAE9}" type="datetimeFigureOut">
               <a:rPr lang="en-US" smtClean="0"/>
-              <a:t>10/13/2017</a:t>
+              <a:t>10/22/2017</a:t>
             </a:fld>
             <a:endParaRPr lang="en-US"/>
           </a:p>
@@ -2786,11 +2791,11 @@
     <p:sldLayoutId id="2147483855" r:id="rId10"/>
     <p:sldLayoutId id="2147483856" r:id="rId11"/>
   </p:sldLayoutIdLst>
-  <mc:AlternateContent xmlns:mc="http://schemas.openxmlformats.org/markup-compatibility/2006">
-    <mc:Choice xmlns:p14="http://schemas.microsoft.com/office/powerpoint/2010/main" Requires="p14">
+  <mc:AlternateContent xmlns:mc="http://schemas.openxmlformats.org/markup-compatibility/2006" xmlns:p14="http://schemas.microsoft.com/office/powerpoint/2010/main">
+    <mc:Choice Requires="p14">
       <p:transition spd="slow" p14:dur="2000" advTm="15000"/>
     </mc:Choice>
-    <mc:Fallback>
+    <mc:Fallback xmlns="">
       <p:transition spd="slow" advTm="15000"/>
     </mc:Fallback>
   </mc:AlternateContent>
@@ -3101,6 +3106,858 @@
       </p:grpSpPr>
       <p:sp>
         <p:nvSpPr>
+          <p:cNvPr id="5" name="Rectangle 4"/>
+          <p:cNvSpPr/>
+          <p:nvPr/>
+        </p:nvSpPr>
+        <p:spPr>
+          <a:xfrm>
+            <a:off x="3110" y="0"/>
+            <a:ext cx="12188890" cy="6858000"/>
+          </a:xfrm>
+          <a:prstGeom prst="rect">
+            <a:avLst/>
+          </a:prstGeom>
+          <a:blipFill dpi="0" rotWithShape="1">
+            <a:blip r:embed="rId2">
+              <a:alphaModFix amt="30000"/>
+            </a:blip>
+            <a:srcRect/>
+            <a:stretch>
+              <a:fillRect/>
+            </a:stretch>
+          </a:blipFill>
+        </p:spPr>
+        <p:style>
+          <a:lnRef idx="2">
+            <a:schemeClr val="accent1">
+              <a:shade val="50000"/>
+            </a:schemeClr>
+          </a:lnRef>
+          <a:fillRef idx="1">
+            <a:schemeClr val="accent1"/>
+          </a:fillRef>
+          <a:effectRef idx="0">
+            <a:schemeClr val="accent1"/>
+          </a:effectRef>
+          <a:fontRef idx="minor">
+            <a:schemeClr val="lt1"/>
+          </a:fontRef>
+        </p:style>
+        <p:txBody>
+          <a:bodyPr rtlCol="0" anchor="ctr"/>
+          <a:lstStyle/>
+          <a:p>
+            <a:pPr algn="ctr"/>
+            <a:endParaRPr lang="en-US"/>
+          </a:p>
+        </p:txBody>
+      </p:sp>
+      <p:cxnSp>
+        <p:nvCxnSpPr>
+          <p:cNvPr id="7" name="Straight Connector 6"/>
+          <p:cNvCxnSpPr/>
+          <p:nvPr/>
+        </p:nvCxnSpPr>
+        <p:spPr>
+          <a:xfrm>
+            <a:off x="225495" y="111968"/>
+            <a:ext cx="10886" cy="5974702"/>
+          </a:xfrm>
+          <a:prstGeom prst="line">
+            <a:avLst/>
+          </a:prstGeom>
+          <a:ln w="38100">
+            <a:solidFill>
+              <a:schemeClr val="bg1">
+                <a:lumMod val="65000"/>
+              </a:schemeClr>
+            </a:solidFill>
+            <a:headEnd type="triangle"/>
+            <a:tailEnd type="triangle"/>
+          </a:ln>
+        </p:spPr>
+        <p:style>
+          <a:lnRef idx="1">
+            <a:schemeClr val="accent1"/>
+          </a:lnRef>
+          <a:fillRef idx="0">
+            <a:schemeClr val="accent1"/>
+          </a:fillRef>
+          <a:effectRef idx="0">
+            <a:schemeClr val="accent1"/>
+          </a:effectRef>
+          <a:fontRef idx="minor">
+            <a:schemeClr val="tx1"/>
+          </a:fontRef>
+        </p:style>
+      </p:cxnSp>
+      <p:cxnSp>
+        <p:nvCxnSpPr>
+          <p:cNvPr id="8" name="Straight Connector 7"/>
+          <p:cNvCxnSpPr/>
+          <p:nvPr/>
+        </p:nvCxnSpPr>
+        <p:spPr>
+          <a:xfrm flipH="1" flipV="1">
+            <a:off x="245706" y="4519113"/>
+            <a:ext cx="11852988" cy="108857"/>
+          </a:xfrm>
+          <a:prstGeom prst="line">
+            <a:avLst/>
+          </a:prstGeom>
+          <a:ln w="38100">
+            <a:solidFill>
+              <a:schemeClr val="bg1">
+                <a:lumMod val="65000"/>
+              </a:schemeClr>
+            </a:solidFill>
+            <a:headEnd type="triangle"/>
+            <a:tailEnd type="none"/>
+          </a:ln>
+        </p:spPr>
+        <p:style>
+          <a:lnRef idx="1">
+            <a:schemeClr val="accent1"/>
+          </a:lnRef>
+          <a:fillRef idx="0">
+            <a:schemeClr val="accent1"/>
+          </a:fillRef>
+          <a:effectRef idx="0">
+            <a:schemeClr val="accent1"/>
+          </a:effectRef>
+          <a:fontRef idx="minor">
+            <a:schemeClr val="tx1"/>
+          </a:fontRef>
+        </p:style>
+      </p:cxnSp>
+      <p:sp>
+        <p:nvSpPr>
+          <p:cNvPr id="14" name="Rectangle 13"/>
+          <p:cNvSpPr/>
+          <p:nvPr/>
+        </p:nvSpPr>
+        <p:spPr>
+          <a:xfrm>
+            <a:off x="531849" y="3324793"/>
+            <a:ext cx="466531" cy="1166327"/>
+          </a:xfrm>
+          <a:prstGeom prst="rect">
+            <a:avLst/>
+          </a:prstGeom>
+          <a:solidFill>
+            <a:schemeClr val="bg1">
+              <a:lumMod val="50000"/>
+              <a:alpha val="10000"/>
+            </a:schemeClr>
+          </a:solidFill>
+          <a:ln>
+            <a:solidFill>
+              <a:schemeClr val="tx1">
+                <a:lumMod val="65000"/>
+                <a:lumOff val="35000"/>
+              </a:schemeClr>
+            </a:solidFill>
+          </a:ln>
+        </p:spPr>
+        <p:style>
+          <a:lnRef idx="2">
+            <a:schemeClr val="accent1">
+              <a:shade val="50000"/>
+            </a:schemeClr>
+          </a:lnRef>
+          <a:fillRef idx="1">
+            <a:schemeClr val="accent1"/>
+          </a:fillRef>
+          <a:effectRef idx="0">
+            <a:schemeClr val="accent1"/>
+          </a:effectRef>
+          <a:fontRef idx="minor">
+            <a:schemeClr val="lt1"/>
+          </a:fontRef>
+        </p:style>
+        <p:txBody>
+          <a:bodyPr rtlCol="0" anchor="ctr"/>
+          <a:lstStyle/>
+          <a:p>
+            <a:pPr algn="ctr"/>
+            <a:endParaRPr lang="en-US"/>
+          </a:p>
+        </p:txBody>
+      </p:sp>
+      <p:sp>
+        <p:nvSpPr>
+          <p:cNvPr id="15" name="Rectangle 14"/>
+          <p:cNvSpPr/>
+          <p:nvPr/>
+        </p:nvSpPr>
+        <p:spPr>
+          <a:xfrm>
+            <a:off x="1293848" y="3324793"/>
+            <a:ext cx="466531" cy="1166327"/>
+          </a:xfrm>
+          <a:prstGeom prst="rect">
+            <a:avLst/>
+          </a:prstGeom>
+          <a:solidFill>
+            <a:schemeClr val="bg1">
+              <a:lumMod val="50000"/>
+              <a:alpha val="10000"/>
+            </a:schemeClr>
+          </a:solidFill>
+          <a:ln>
+            <a:solidFill>
+              <a:schemeClr val="tx1">
+                <a:lumMod val="65000"/>
+                <a:lumOff val="35000"/>
+              </a:schemeClr>
+            </a:solidFill>
+          </a:ln>
+        </p:spPr>
+        <p:style>
+          <a:lnRef idx="2">
+            <a:schemeClr val="accent1">
+              <a:shade val="50000"/>
+            </a:schemeClr>
+          </a:lnRef>
+          <a:fillRef idx="1">
+            <a:schemeClr val="accent1"/>
+          </a:fillRef>
+          <a:effectRef idx="0">
+            <a:schemeClr val="accent1"/>
+          </a:effectRef>
+          <a:fontRef idx="minor">
+            <a:schemeClr val="lt1"/>
+          </a:fontRef>
+        </p:style>
+        <p:txBody>
+          <a:bodyPr rtlCol="0" anchor="ctr"/>
+          <a:lstStyle/>
+          <a:p>
+            <a:pPr algn="ctr"/>
+            <a:endParaRPr lang="en-US"/>
+          </a:p>
+        </p:txBody>
+      </p:sp>
+      <p:sp>
+        <p:nvSpPr>
+          <p:cNvPr id="16" name="Rectangle 15"/>
+          <p:cNvSpPr/>
+          <p:nvPr/>
+        </p:nvSpPr>
+        <p:spPr>
+          <a:xfrm>
+            <a:off x="2055847" y="2183365"/>
+            <a:ext cx="466531" cy="2326418"/>
+          </a:xfrm>
+          <a:prstGeom prst="rect">
+            <a:avLst/>
+          </a:prstGeom>
+          <a:solidFill>
+            <a:schemeClr val="bg1">
+              <a:lumMod val="50000"/>
+              <a:alpha val="10000"/>
+            </a:schemeClr>
+          </a:solidFill>
+          <a:ln>
+            <a:solidFill>
+              <a:schemeClr val="tx1">
+                <a:lumMod val="65000"/>
+                <a:lumOff val="35000"/>
+              </a:schemeClr>
+            </a:solidFill>
+          </a:ln>
+        </p:spPr>
+        <p:style>
+          <a:lnRef idx="2">
+            <a:schemeClr val="accent1">
+              <a:shade val="50000"/>
+            </a:schemeClr>
+          </a:lnRef>
+          <a:fillRef idx="1">
+            <a:schemeClr val="accent1"/>
+          </a:fillRef>
+          <a:effectRef idx="0">
+            <a:schemeClr val="accent1"/>
+          </a:effectRef>
+          <a:fontRef idx="minor">
+            <a:schemeClr val="lt1"/>
+          </a:fontRef>
+        </p:style>
+        <p:txBody>
+          <a:bodyPr rtlCol="0" anchor="ctr"/>
+          <a:lstStyle/>
+          <a:p>
+            <a:pPr algn="ctr"/>
+            <a:endParaRPr lang="en-US"/>
+          </a:p>
+        </p:txBody>
+      </p:sp>
+      <p:sp>
+        <p:nvSpPr>
+          <p:cNvPr id="17" name="Rectangle 16"/>
+          <p:cNvSpPr/>
+          <p:nvPr/>
+        </p:nvSpPr>
+        <p:spPr>
+          <a:xfrm>
+            <a:off x="2802298" y="4556437"/>
+            <a:ext cx="466531" cy="1166327"/>
+          </a:xfrm>
+          <a:prstGeom prst="rect">
+            <a:avLst/>
+          </a:prstGeom>
+          <a:solidFill>
+            <a:schemeClr val="bg1">
+              <a:lumMod val="50000"/>
+              <a:alpha val="10000"/>
+            </a:schemeClr>
+          </a:solidFill>
+          <a:ln>
+            <a:solidFill>
+              <a:schemeClr val="tx1">
+                <a:lumMod val="65000"/>
+                <a:lumOff val="35000"/>
+              </a:schemeClr>
+            </a:solidFill>
+          </a:ln>
+        </p:spPr>
+        <p:style>
+          <a:lnRef idx="2">
+            <a:schemeClr val="accent1">
+              <a:shade val="50000"/>
+            </a:schemeClr>
+          </a:lnRef>
+          <a:fillRef idx="1">
+            <a:schemeClr val="accent1"/>
+          </a:fillRef>
+          <a:effectRef idx="0">
+            <a:schemeClr val="accent1"/>
+          </a:effectRef>
+          <a:fontRef idx="minor">
+            <a:schemeClr val="lt1"/>
+          </a:fontRef>
+        </p:style>
+        <p:txBody>
+          <a:bodyPr rtlCol="0" anchor="ctr"/>
+          <a:lstStyle/>
+          <a:p>
+            <a:pPr algn="ctr"/>
+            <a:endParaRPr lang="en-US"/>
+          </a:p>
+        </p:txBody>
+      </p:sp>
+      <p:sp>
+        <p:nvSpPr>
+          <p:cNvPr id="18" name="Rectangle 17"/>
+          <p:cNvSpPr/>
+          <p:nvPr/>
+        </p:nvSpPr>
+        <p:spPr>
+          <a:xfrm>
+            <a:off x="3581409" y="2188030"/>
+            <a:ext cx="466531" cy="2326418"/>
+          </a:xfrm>
+          <a:prstGeom prst="rect">
+            <a:avLst/>
+          </a:prstGeom>
+          <a:solidFill>
+            <a:schemeClr val="bg1">
+              <a:lumMod val="50000"/>
+              <a:alpha val="10000"/>
+            </a:schemeClr>
+          </a:solidFill>
+          <a:ln>
+            <a:solidFill>
+              <a:schemeClr val="tx1">
+                <a:lumMod val="65000"/>
+                <a:lumOff val="35000"/>
+              </a:schemeClr>
+            </a:solidFill>
+          </a:ln>
+        </p:spPr>
+        <p:style>
+          <a:lnRef idx="2">
+            <a:schemeClr val="accent1">
+              <a:shade val="50000"/>
+            </a:schemeClr>
+          </a:lnRef>
+          <a:fillRef idx="1">
+            <a:schemeClr val="accent1"/>
+          </a:fillRef>
+          <a:effectRef idx="0">
+            <a:schemeClr val="accent1"/>
+          </a:effectRef>
+          <a:fontRef idx="minor">
+            <a:schemeClr val="lt1"/>
+          </a:fontRef>
+        </p:style>
+        <p:txBody>
+          <a:bodyPr rtlCol="0" anchor="ctr"/>
+          <a:lstStyle/>
+          <a:p>
+            <a:pPr algn="ctr"/>
+            <a:endParaRPr lang="en-US"/>
+          </a:p>
+        </p:txBody>
+      </p:sp>
+      <p:sp>
+        <p:nvSpPr>
+          <p:cNvPr id="19" name="Rectangle 18"/>
+          <p:cNvSpPr/>
+          <p:nvPr/>
+        </p:nvSpPr>
+        <p:spPr>
+          <a:xfrm>
+            <a:off x="4398610" y="1343608"/>
+            <a:ext cx="466531" cy="3184836"/>
+          </a:xfrm>
+          <a:prstGeom prst="rect">
+            <a:avLst/>
+          </a:prstGeom>
+          <a:solidFill>
+            <a:schemeClr val="bg1">
+              <a:lumMod val="50000"/>
+              <a:alpha val="10000"/>
+            </a:schemeClr>
+          </a:solidFill>
+          <a:ln>
+            <a:solidFill>
+              <a:schemeClr val="tx1">
+                <a:lumMod val="65000"/>
+                <a:lumOff val="35000"/>
+              </a:schemeClr>
+            </a:solidFill>
+          </a:ln>
+        </p:spPr>
+        <p:style>
+          <a:lnRef idx="2">
+            <a:schemeClr val="accent1">
+              <a:shade val="50000"/>
+            </a:schemeClr>
+          </a:lnRef>
+          <a:fillRef idx="1">
+            <a:schemeClr val="accent1"/>
+          </a:fillRef>
+          <a:effectRef idx="0">
+            <a:schemeClr val="accent1"/>
+          </a:effectRef>
+          <a:fontRef idx="minor">
+            <a:schemeClr val="lt1"/>
+          </a:fontRef>
+        </p:style>
+        <p:txBody>
+          <a:bodyPr rtlCol="0" anchor="ctr"/>
+          <a:lstStyle/>
+          <a:p>
+            <a:pPr algn="ctr"/>
+            <a:endParaRPr lang="en-US"/>
+          </a:p>
+        </p:txBody>
+      </p:sp>
+      <p:sp>
+        <p:nvSpPr>
+          <p:cNvPr id="20" name="Rectangle 19"/>
+          <p:cNvSpPr/>
+          <p:nvPr/>
+        </p:nvSpPr>
+        <p:spPr>
+          <a:xfrm>
+            <a:off x="5147392" y="4585988"/>
+            <a:ext cx="466531" cy="1166327"/>
+          </a:xfrm>
+          <a:prstGeom prst="rect">
+            <a:avLst/>
+          </a:prstGeom>
+          <a:solidFill>
+            <a:schemeClr val="bg1">
+              <a:lumMod val="50000"/>
+              <a:alpha val="10000"/>
+            </a:schemeClr>
+          </a:solidFill>
+          <a:ln>
+            <a:solidFill>
+              <a:schemeClr val="tx1">
+                <a:lumMod val="65000"/>
+                <a:lumOff val="35000"/>
+              </a:schemeClr>
+            </a:solidFill>
+          </a:ln>
+        </p:spPr>
+        <p:style>
+          <a:lnRef idx="2">
+            <a:schemeClr val="accent1">
+              <a:shade val="50000"/>
+            </a:schemeClr>
+          </a:lnRef>
+          <a:fillRef idx="1">
+            <a:schemeClr val="accent1"/>
+          </a:fillRef>
+          <a:effectRef idx="0">
+            <a:schemeClr val="accent1"/>
+          </a:effectRef>
+          <a:fontRef idx="minor">
+            <a:schemeClr val="lt1"/>
+          </a:fontRef>
+        </p:style>
+        <p:txBody>
+          <a:bodyPr rtlCol="0" anchor="ctr"/>
+          <a:lstStyle/>
+          <a:p>
+            <a:pPr algn="ctr"/>
+            <a:endParaRPr lang="en-US"/>
+          </a:p>
+        </p:txBody>
+      </p:sp>
+      <p:sp>
+        <p:nvSpPr>
+          <p:cNvPr id="21" name="Rectangle 20"/>
+          <p:cNvSpPr/>
+          <p:nvPr/>
+        </p:nvSpPr>
+        <p:spPr>
+          <a:xfrm>
+            <a:off x="5936993" y="2230019"/>
+            <a:ext cx="466531" cy="2326418"/>
+          </a:xfrm>
+          <a:prstGeom prst="rect">
+            <a:avLst/>
+          </a:prstGeom>
+          <a:solidFill>
+            <a:schemeClr val="bg1">
+              <a:lumMod val="50000"/>
+              <a:alpha val="10000"/>
+            </a:schemeClr>
+          </a:solidFill>
+          <a:ln>
+            <a:solidFill>
+              <a:schemeClr val="tx1">
+                <a:lumMod val="65000"/>
+                <a:lumOff val="35000"/>
+              </a:schemeClr>
+            </a:solidFill>
+          </a:ln>
+        </p:spPr>
+        <p:style>
+          <a:lnRef idx="2">
+            <a:schemeClr val="accent1">
+              <a:shade val="50000"/>
+            </a:schemeClr>
+          </a:lnRef>
+          <a:fillRef idx="1">
+            <a:schemeClr val="accent1"/>
+          </a:fillRef>
+          <a:effectRef idx="0">
+            <a:schemeClr val="accent1"/>
+          </a:effectRef>
+          <a:fontRef idx="minor">
+            <a:schemeClr val="lt1"/>
+          </a:fontRef>
+        </p:style>
+        <p:txBody>
+          <a:bodyPr rtlCol="0" anchor="ctr"/>
+          <a:lstStyle/>
+          <a:p>
+            <a:pPr algn="ctr"/>
+            <a:endParaRPr lang="en-US"/>
+          </a:p>
+        </p:txBody>
+      </p:sp>
+      <p:sp>
+        <p:nvSpPr>
+          <p:cNvPr id="22" name="Rectangle 21"/>
+          <p:cNvSpPr/>
+          <p:nvPr/>
+        </p:nvSpPr>
+        <p:spPr>
+          <a:xfrm>
+            <a:off x="6727577" y="2687215"/>
+            <a:ext cx="466531" cy="1869221"/>
+          </a:xfrm>
+          <a:prstGeom prst="rect">
+            <a:avLst/>
+          </a:prstGeom>
+          <a:solidFill>
+            <a:schemeClr val="bg1">
+              <a:lumMod val="50000"/>
+              <a:alpha val="10000"/>
+            </a:schemeClr>
+          </a:solidFill>
+          <a:ln>
+            <a:solidFill>
+              <a:schemeClr val="tx1">
+                <a:lumMod val="65000"/>
+                <a:lumOff val="35000"/>
+              </a:schemeClr>
+            </a:solidFill>
+          </a:ln>
+        </p:spPr>
+        <p:style>
+          <a:lnRef idx="2">
+            <a:schemeClr val="accent1">
+              <a:shade val="50000"/>
+            </a:schemeClr>
+          </a:lnRef>
+          <a:fillRef idx="1">
+            <a:schemeClr val="accent1"/>
+          </a:fillRef>
+          <a:effectRef idx="0">
+            <a:schemeClr val="accent1"/>
+          </a:effectRef>
+          <a:fontRef idx="minor">
+            <a:schemeClr val="lt1"/>
+          </a:fontRef>
+        </p:style>
+        <p:txBody>
+          <a:bodyPr rtlCol="0" anchor="ctr"/>
+          <a:lstStyle/>
+          <a:p>
+            <a:pPr algn="ctr"/>
+            <a:endParaRPr lang="en-US"/>
+          </a:p>
+        </p:txBody>
+      </p:sp>
+      <p:sp>
+        <p:nvSpPr>
+          <p:cNvPr id="23" name="Rectangle 22"/>
+          <p:cNvSpPr/>
+          <p:nvPr/>
+        </p:nvSpPr>
+        <p:spPr>
+          <a:xfrm>
+            <a:off x="7533305" y="3219061"/>
+            <a:ext cx="466531" cy="1346721"/>
+          </a:xfrm>
+          <a:prstGeom prst="rect">
+            <a:avLst/>
+          </a:prstGeom>
+          <a:solidFill>
+            <a:schemeClr val="bg1">
+              <a:lumMod val="50000"/>
+              <a:alpha val="10000"/>
+            </a:schemeClr>
+          </a:solidFill>
+          <a:ln>
+            <a:solidFill>
+              <a:schemeClr val="tx1">
+                <a:lumMod val="65000"/>
+                <a:lumOff val="35000"/>
+              </a:schemeClr>
+            </a:solidFill>
+          </a:ln>
+        </p:spPr>
+        <p:style>
+          <a:lnRef idx="2">
+            <a:schemeClr val="accent1">
+              <a:shade val="50000"/>
+            </a:schemeClr>
+          </a:lnRef>
+          <a:fillRef idx="1">
+            <a:schemeClr val="accent1"/>
+          </a:fillRef>
+          <a:effectRef idx="0">
+            <a:schemeClr val="accent1"/>
+          </a:effectRef>
+          <a:fontRef idx="minor">
+            <a:schemeClr val="lt1"/>
+          </a:fontRef>
+        </p:style>
+        <p:txBody>
+          <a:bodyPr rtlCol="0" anchor="ctr"/>
+          <a:lstStyle/>
+          <a:p>
+            <a:pPr algn="ctr"/>
+            <a:endParaRPr lang="en-US"/>
+          </a:p>
+        </p:txBody>
+      </p:sp>
+      <p:sp>
+        <p:nvSpPr>
+          <p:cNvPr id="24" name="Rectangle 23"/>
+          <p:cNvSpPr/>
+          <p:nvPr/>
+        </p:nvSpPr>
+        <p:spPr>
+          <a:xfrm>
+            <a:off x="8323889" y="3234595"/>
+            <a:ext cx="466531" cy="1346721"/>
+          </a:xfrm>
+          <a:prstGeom prst="rect">
+            <a:avLst/>
+          </a:prstGeom>
+          <a:solidFill>
+            <a:schemeClr val="bg1">
+              <a:lumMod val="50000"/>
+              <a:alpha val="10000"/>
+            </a:schemeClr>
+          </a:solidFill>
+          <a:ln>
+            <a:solidFill>
+              <a:schemeClr val="tx1">
+                <a:lumMod val="65000"/>
+                <a:lumOff val="35000"/>
+              </a:schemeClr>
+            </a:solidFill>
+          </a:ln>
+        </p:spPr>
+        <p:style>
+          <a:lnRef idx="2">
+            <a:schemeClr val="accent1">
+              <a:shade val="50000"/>
+            </a:schemeClr>
+          </a:lnRef>
+          <a:fillRef idx="1">
+            <a:schemeClr val="accent1"/>
+          </a:fillRef>
+          <a:effectRef idx="0">
+            <a:schemeClr val="accent1"/>
+          </a:effectRef>
+          <a:fontRef idx="minor">
+            <a:schemeClr val="lt1"/>
+          </a:fontRef>
+        </p:style>
+        <p:txBody>
+          <a:bodyPr rtlCol="0" anchor="ctr"/>
+          <a:lstStyle/>
+          <a:p>
+            <a:pPr algn="ctr"/>
+            <a:endParaRPr lang="en-US"/>
+          </a:p>
+        </p:txBody>
+      </p:sp>
+      <p:sp>
+        <p:nvSpPr>
+          <p:cNvPr id="25" name="Rectangle 24"/>
+          <p:cNvSpPr/>
+          <p:nvPr/>
+        </p:nvSpPr>
+        <p:spPr>
+          <a:xfrm>
+            <a:off x="9139931" y="3509963"/>
+            <a:ext cx="466531" cy="1071353"/>
+          </a:xfrm>
+          <a:prstGeom prst="rect">
+            <a:avLst/>
+          </a:prstGeom>
+          <a:solidFill>
+            <a:schemeClr val="bg1">
+              <a:lumMod val="50000"/>
+              <a:alpha val="10000"/>
+            </a:schemeClr>
+          </a:solidFill>
+          <a:ln>
+            <a:solidFill>
+              <a:schemeClr val="tx1">
+                <a:lumMod val="65000"/>
+                <a:lumOff val="35000"/>
+              </a:schemeClr>
+            </a:solidFill>
+          </a:ln>
+        </p:spPr>
+        <p:style>
+          <a:lnRef idx="2">
+            <a:schemeClr val="accent1">
+              <a:shade val="50000"/>
+            </a:schemeClr>
+          </a:lnRef>
+          <a:fillRef idx="1">
+            <a:schemeClr val="accent1"/>
+          </a:fillRef>
+          <a:effectRef idx="0">
+            <a:schemeClr val="accent1"/>
+          </a:effectRef>
+          <a:fontRef idx="minor">
+            <a:schemeClr val="lt1"/>
+          </a:fontRef>
+        </p:style>
+        <p:txBody>
+          <a:bodyPr rtlCol="0" anchor="ctr"/>
+          <a:lstStyle/>
+          <a:p>
+            <a:pPr algn="ctr"/>
+            <a:endParaRPr lang="en-US"/>
+          </a:p>
+        </p:txBody>
+      </p:sp>
+      <p:sp>
+        <p:nvSpPr>
+          <p:cNvPr id="52" name="Rectangle 51"/>
+          <p:cNvSpPr/>
+          <p:nvPr/>
+        </p:nvSpPr>
+        <p:spPr>
+          <a:xfrm>
+            <a:off x="9898816" y="3803779"/>
+            <a:ext cx="466531" cy="768206"/>
+          </a:xfrm>
+          <a:prstGeom prst="rect">
+            <a:avLst/>
+          </a:prstGeom>
+          <a:solidFill>
+            <a:schemeClr val="bg1">
+              <a:lumMod val="50000"/>
+              <a:alpha val="10000"/>
+            </a:schemeClr>
+          </a:solidFill>
+          <a:ln>
+            <a:solidFill>
+              <a:schemeClr val="tx1">
+                <a:lumMod val="65000"/>
+                <a:lumOff val="35000"/>
+              </a:schemeClr>
+            </a:solidFill>
+          </a:ln>
+        </p:spPr>
+        <p:style>
+          <a:lnRef idx="2">
+            <a:schemeClr val="accent1">
+              <a:shade val="50000"/>
+            </a:schemeClr>
+          </a:lnRef>
+          <a:fillRef idx="1">
+            <a:schemeClr val="accent1"/>
+          </a:fillRef>
+          <a:effectRef idx="0">
+            <a:schemeClr val="accent1"/>
+          </a:effectRef>
+          <a:fontRef idx="minor">
+            <a:schemeClr val="lt1"/>
+          </a:fontRef>
+        </p:style>
+        <p:txBody>
+          <a:bodyPr rtlCol="0" anchor="ctr"/>
+          <a:lstStyle/>
+          <a:p>
+            <a:pPr algn="ctr"/>
+            <a:endParaRPr lang="en-US"/>
+          </a:p>
+        </p:txBody>
+      </p:sp>
+      <p:sp>
+        <p:nvSpPr>
+          <p:cNvPr id="3" name="Subtitle 2"/>
+          <p:cNvSpPr>
+            <a:spLocks noGrp="1"/>
+          </p:cNvSpPr>
+          <p:nvPr>
+            <p:ph type="subTitle" idx="1"/>
+          </p:nvPr>
+        </p:nvSpPr>
+        <p:spPr/>
+        <p:txBody>
+          <a:bodyPr/>
+          <a:lstStyle/>
+          <a:p>
+            <a:r>
+              <a:rPr lang="en-US" dirty="0" smtClean="0"/>
+              <a:t>Mid-term Status Report</a:t>
+            </a:r>
+            <a:endParaRPr lang="en-US" dirty="0"/>
+          </a:p>
+        </p:txBody>
+      </p:sp>
+      <p:sp>
+        <p:nvSpPr>
           <p:cNvPr id="2" name="Title 1"/>
           <p:cNvSpPr>
             <a:spLocks noGrp="1"/>
@@ -3116,7 +3973,14 @@
           <a:p>
             <a:r>
               <a:rPr lang="en-US" dirty="0" smtClean="0"/>
-              <a:t>Title of this show</a:t>
+              <a:t>Philadelphia… </a:t>
+            </a:r>
+            <a:br>
+              <a:rPr lang="en-US" dirty="0" smtClean="0"/>
+            </a:br>
+            <a:r>
+              <a:rPr lang="en-US" dirty="0" smtClean="0"/>
+              <a:t>a city about to boom?</a:t>
             </a:r>
             <a:endParaRPr lang="en-US" dirty="0"/>
           </a:p>
@@ -3124,40 +3988,66 @@
       </p:sp>
       <p:sp>
         <p:nvSpPr>
-          <p:cNvPr id="3" name="Subtitle 2"/>
-          <p:cNvSpPr>
-            <a:spLocks noGrp="1"/>
-          </p:cNvSpPr>
-          <p:nvPr>
-            <p:ph type="subTitle" idx="1"/>
-          </p:nvPr>
-        </p:nvSpPr>
-        <p:spPr/>
-        <p:txBody>
-          <a:bodyPr/>
-          <a:lstStyle/>
-          <a:p>
-            <a:endParaRPr lang="en-US"/>
+          <p:cNvPr id="53" name="TextBox 52"/>
+          <p:cNvSpPr txBox="1"/>
+          <p:nvPr/>
+        </p:nvSpPr>
+        <p:spPr>
+          <a:xfrm>
+            <a:off x="0" y="6611302"/>
+            <a:ext cx="12192000" cy="246221"/>
+          </a:xfrm>
+          <a:prstGeom prst="rect">
+            <a:avLst/>
+          </a:prstGeom>
+          <a:noFill/>
+        </p:spPr>
+        <p:txBody>
+          <a:bodyPr wrap="square" rtlCol="0">
+            <a:spAutoFit/>
+          </a:bodyPr>
+          <a:lstStyle/>
+          <a:p>
+            <a:r>
+              <a:rPr lang="en-US" sz="1000" dirty="0" smtClean="0">
+                <a:solidFill>
+                  <a:schemeClr val="bg1">
+                    <a:lumMod val="50000"/>
+                  </a:schemeClr>
+                </a:solidFill>
+              </a:rPr>
+              <a:t>Image credit: World Cities, (YouTube </a:t>
+            </a:r>
+            <a:r>
+              <a:rPr lang="en-US" sz="1000" dirty="0">
+                <a:solidFill>
+                  <a:schemeClr val="bg1">
+                    <a:lumMod val="50000"/>
+                  </a:schemeClr>
+                </a:solidFill>
+              </a:rPr>
+              <a:t>license) https://www.youtube.com/watch?v=GnKJ-_DspMI</a:t>
+            </a:r>
           </a:p>
         </p:txBody>
       </p:sp>
     </p:spTree>
     <p:extLst>
       <p:ext uri="{BB962C8B-B14F-4D97-AF65-F5344CB8AC3E}">
-        <p14:creationId xmlns:p14="http://schemas.microsoft.com/office/powerpoint/2010/main" val="1826487103"/>
+        <p14:creationId xmlns:p14="http://schemas.microsoft.com/office/powerpoint/2010/main" val="1216868535"/>
       </p:ext>
     </p:extLst>
   </p:cSld>
   <p:clrMapOvr>
     <a:masterClrMapping/>
   </p:clrMapOvr>
-  <mc:AlternateContent xmlns:mc="http://schemas.openxmlformats.org/markup-compatibility/2006">
-    <mc:Choice xmlns:p14="http://schemas.microsoft.com/office/powerpoint/2010/main" Requires="p14">
+  <mc:AlternateContent xmlns:mc="http://schemas.openxmlformats.org/markup-compatibility/2006" xmlns:p14="http://schemas.microsoft.com/office/powerpoint/2010/main">
+    <mc:Choice Requires="p14">
       <p:transition spd="slow" p14:dur="1200" advTm="15000">
         <p:dissolve/>
       </p:transition>
     </mc:Choice>
-    <mc:Fallback>
+    <mc:Fallback xmlns="">
       <p:transition spd="slow" advTm="15000">
         <p:dissolve/>
       </p:transition>
@@ -3242,11 +4132,11 @@
   <p:clrMapOvr>
     <a:masterClrMapping/>
   </p:clrMapOvr>
-  <mc:AlternateContent xmlns:mc="http://schemas.openxmlformats.org/markup-compatibility/2006">
-    <mc:Choice xmlns:p14="http://schemas.microsoft.com/office/powerpoint/2010/main" Requires="p14">
+  <mc:AlternateContent xmlns:mc="http://schemas.openxmlformats.org/markup-compatibility/2006" xmlns:p14="http://schemas.microsoft.com/office/powerpoint/2010/main">
+    <mc:Choice Requires="p14">
       <p:transition spd="slow" p14:dur="2000" advTm="15000"/>
     </mc:Choice>
-    <mc:Fallback>
+    <mc:Fallback xmlns="">
       <p:transition spd="slow" advTm="15000"/>
     </mc:Fallback>
   </mc:AlternateContent>
@@ -3322,11 +4212,11 @@
   <p:clrMapOvr>
     <a:masterClrMapping/>
   </p:clrMapOvr>
-  <mc:AlternateContent xmlns:mc="http://schemas.openxmlformats.org/markup-compatibility/2006">
-    <mc:Choice xmlns:p14="http://schemas.microsoft.com/office/powerpoint/2010/main" Requires="p14">
+  <mc:AlternateContent xmlns:mc="http://schemas.openxmlformats.org/markup-compatibility/2006" xmlns:p14="http://schemas.microsoft.com/office/powerpoint/2010/main">
+    <mc:Choice Requires="p14">
       <p:transition spd="slow" p14:dur="2000" advTm="15000"/>
     </mc:Choice>
-    <mc:Fallback>
+    <mc:Fallback xmlns="">
       <p:transition spd="slow" advTm="15000"/>
     </mc:Fallback>
   </mc:AlternateContent>
@@ -3402,11 +4292,11 @@
   <p:clrMapOvr>
     <a:masterClrMapping/>
   </p:clrMapOvr>
-  <mc:AlternateContent xmlns:mc="http://schemas.openxmlformats.org/markup-compatibility/2006">
-    <mc:Choice xmlns:p14="http://schemas.microsoft.com/office/powerpoint/2010/main" Requires="p14">
+  <mc:AlternateContent xmlns:mc="http://schemas.openxmlformats.org/markup-compatibility/2006" xmlns:p14="http://schemas.microsoft.com/office/powerpoint/2010/main">
+    <mc:Choice Requires="p14">
       <p:transition spd="slow" p14:dur="2000" advTm="15000"/>
     </mc:Choice>
-    <mc:Fallback>
+    <mc:Fallback xmlns="">
       <p:transition spd="slow" advTm="15000"/>
     </mc:Fallback>
   </mc:AlternateContent>
@@ -3482,11 +4372,11 @@
   <p:clrMapOvr>
     <a:masterClrMapping/>
   </p:clrMapOvr>
-  <mc:AlternateContent xmlns:mc="http://schemas.openxmlformats.org/markup-compatibility/2006">
-    <mc:Choice xmlns:p14="http://schemas.microsoft.com/office/powerpoint/2010/main" Requires="p14">
+  <mc:AlternateContent xmlns:mc="http://schemas.openxmlformats.org/markup-compatibility/2006" xmlns:p14="http://schemas.microsoft.com/office/powerpoint/2010/main">
+    <mc:Choice Requires="p14">
       <p:transition spd="slow" p14:dur="2000" advTm="15000"/>
     </mc:Choice>
-    <mc:Fallback>
+    <mc:Fallback xmlns="">
       <p:transition spd="slow" advTm="15000"/>
     </mc:Fallback>
   </mc:AlternateContent>
@@ -3562,11 +4452,11 @@
   <p:clrMapOvr>
     <a:masterClrMapping/>
   </p:clrMapOvr>
-  <mc:AlternateContent xmlns:mc="http://schemas.openxmlformats.org/markup-compatibility/2006">
-    <mc:Choice xmlns:p14="http://schemas.microsoft.com/office/powerpoint/2010/main" Requires="p14">
+  <mc:AlternateContent xmlns:mc="http://schemas.openxmlformats.org/markup-compatibility/2006" xmlns:p14="http://schemas.microsoft.com/office/powerpoint/2010/main">
+    <mc:Choice Requires="p14">
       <p:transition spd="slow" p14:dur="2000" advTm="15000"/>
     </mc:Choice>
-    <mc:Fallback>
+    <mc:Fallback xmlns="">
       <p:transition spd="slow" advTm="15000"/>
     </mc:Fallback>
   </mc:AlternateContent>
@@ -3642,11 +4532,11 @@
   <p:clrMapOvr>
     <a:masterClrMapping/>
   </p:clrMapOvr>
-  <mc:AlternateContent xmlns:mc="http://schemas.openxmlformats.org/markup-compatibility/2006">
-    <mc:Choice xmlns:p14="http://schemas.microsoft.com/office/powerpoint/2010/main" Requires="p14">
+  <mc:AlternateContent xmlns:mc="http://schemas.openxmlformats.org/markup-compatibility/2006" xmlns:p14="http://schemas.microsoft.com/office/powerpoint/2010/main">
+    <mc:Choice Requires="p14">
       <p:transition spd="slow" p14:dur="2000" advTm="15000"/>
     </mc:Choice>
-    <mc:Fallback>
+    <mc:Fallback xmlns="">
       <p:transition spd="slow" advTm="15000"/>
     </mc:Fallback>
   </mc:AlternateContent>
@@ -3722,11 +4612,11 @@
   <p:clrMapOvr>
     <a:masterClrMapping/>
   </p:clrMapOvr>
-  <mc:AlternateContent xmlns:mc="http://schemas.openxmlformats.org/markup-compatibility/2006">
-    <mc:Choice xmlns:p14="http://schemas.microsoft.com/office/powerpoint/2010/main" Requires="p14">
+  <mc:AlternateContent xmlns:mc="http://schemas.openxmlformats.org/markup-compatibility/2006" xmlns:p14="http://schemas.microsoft.com/office/powerpoint/2010/main">
+    <mc:Choice Requires="p14">
       <p:transition spd="slow" p14:dur="2000" advTm="15000"/>
     </mc:Choice>
-    <mc:Fallback>
+    <mc:Fallback xmlns="">
       <p:transition spd="slow" advTm="15000"/>
     </mc:Fallback>
   </mc:AlternateContent>
@@ -3802,11 +4692,11 @@
   <p:clrMapOvr>
     <a:masterClrMapping/>
   </p:clrMapOvr>
-  <mc:AlternateContent xmlns:mc="http://schemas.openxmlformats.org/markup-compatibility/2006">
-    <mc:Choice xmlns:p14="http://schemas.microsoft.com/office/powerpoint/2010/main" Requires="p14">
+  <mc:AlternateContent xmlns:mc="http://schemas.openxmlformats.org/markup-compatibility/2006" xmlns:p14="http://schemas.microsoft.com/office/powerpoint/2010/main">
+    <mc:Choice Requires="p14">
       <p:transition spd="slow" p14:dur="2000" advTm="15000"/>
     </mc:Choice>
-    <mc:Fallback>
+    <mc:Fallback xmlns="">
       <p:transition spd="slow" advTm="15000"/>
     </mc:Fallback>
   </mc:AlternateContent>
@@ -3882,11 +4772,11 @@
   <p:clrMapOvr>
     <a:masterClrMapping/>
   </p:clrMapOvr>
-  <mc:AlternateContent xmlns:mc="http://schemas.openxmlformats.org/markup-compatibility/2006">
-    <mc:Choice xmlns:p14="http://schemas.microsoft.com/office/powerpoint/2010/main" Requires="p14">
+  <mc:AlternateContent xmlns:mc="http://schemas.openxmlformats.org/markup-compatibility/2006" xmlns:p14="http://schemas.microsoft.com/office/powerpoint/2010/main">
+    <mc:Choice Requires="p14">
       <p:transition spd="slow" p14:dur="2000" advTm="15000"/>
     </mc:Choice>
-    <mc:Fallback>
+    <mc:Fallback xmlns="">
       <p:transition spd="slow" advTm="15000"/>
     </mc:Fallback>
   </mc:AlternateContent>
@@ -3962,11 +4852,11 @@
   <p:clrMapOvr>
     <a:masterClrMapping/>
   </p:clrMapOvr>
-  <mc:AlternateContent xmlns:mc="http://schemas.openxmlformats.org/markup-compatibility/2006">
-    <mc:Choice xmlns:p14="http://schemas.microsoft.com/office/powerpoint/2010/main" Requires="p14">
+  <mc:AlternateContent xmlns:mc="http://schemas.openxmlformats.org/markup-compatibility/2006" xmlns:p14="http://schemas.microsoft.com/office/powerpoint/2010/main">
+    <mc:Choice Requires="p14">
       <p:transition spd="slow" p14:dur="2000" advTm="15000"/>
     </mc:Choice>
-    <mc:Fallback>
+    <mc:Fallback xmlns="">
       <p:transition spd="slow" advTm="15000"/>
     </mc:Fallback>
   </mc:AlternateContent>
@@ -4028,7 +4918,7 @@
           <a:bodyPr/>
           <a:lstStyle/>
           <a:p>
-            <a:endParaRPr lang="en-US"/>
+            <a:endParaRPr lang="en-US" dirty="0"/>
           </a:p>
         </p:txBody>
       </p:sp>
@@ -4042,11 +4932,11 @@
   <p:clrMapOvr>
     <a:masterClrMapping/>
   </p:clrMapOvr>
-  <mc:AlternateContent xmlns:mc="http://schemas.openxmlformats.org/markup-compatibility/2006">
-    <mc:Choice xmlns:p14="http://schemas.microsoft.com/office/powerpoint/2010/main" Requires="p14">
+  <mc:AlternateContent xmlns:mc="http://schemas.openxmlformats.org/markup-compatibility/2006" xmlns:p14="http://schemas.microsoft.com/office/powerpoint/2010/main">
+    <mc:Choice Requires="p14">
       <p:transition spd="slow" p14:dur="2000" advTm="15000"/>
     </mc:Choice>
-    <mc:Fallback>
+    <mc:Fallback xmlns="">
       <p:transition spd="slow" advTm="15000"/>
     </mc:Fallback>
   </mc:AlternateContent>
@@ -4129,11 +5019,11 @@
   <p:clrMapOvr>
     <a:masterClrMapping/>
   </p:clrMapOvr>
-  <mc:AlternateContent xmlns:mc="http://schemas.openxmlformats.org/markup-compatibility/2006">
-    <mc:Choice xmlns:p14="http://schemas.microsoft.com/office/powerpoint/2010/main" Requires="p14">
+  <mc:AlternateContent xmlns:mc="http://schemas.openxmlformats.org/markup-compatibility/2006" xmlns:p14="http://schemas.microsoft.com/office/powerpoint/2010/main">
+    <mc:Choice Requires="p14">
       <p:transition spd="slow" p14:dur="2000" advTm="15000"/>
     </mc:Choice>
-    <mc:Fallback>
+    <mc:Fallback xmlns="">
       <p:transition spd="slow" advTm="15000"/>
     </mc:Fallback>
   </mc:AlternateContent>
@@ -4209,11 +5099,11 @@
   <p:clrMapOvr>
     <a:masterClrMapping/>
   </p:clrMapOvr>
-  <mc:AlternateContent xmlns:mc="http://schemas.openxmlformats.org/markup-compatibility/2006">
-    <mc:Choice xmlns:p14="http://schemas.microsoft.com/office/powerpoint/2010/main" Requires="p14">
+  <mc:AlternateContent xmlns:mc="http://schemas.openxmlformats.org/markup-compatibility/2006" xmlns:p14="http://schemas.microsoft.com/office/powerpoint/2010/main">
+    <mc:Choice Requires="p14">
       <p:transition spd="slow" p14:dur="2000" advTm="15000"/>
     </mc:Choice>
-    <mc:Fallback>
+    <mc:Fallback xmlns="">
       <p:transition spd="slow" advTm="15000"/>
     </mc:Fallback>
   </mc:AlternateContent>
@@ -4296,11 +5186,11 @@
   <p:clrMapOvr>
     <a:masterClrMapping/>
   </p:clrMapOvr>
-  <mc:AlternateContent xmlns:mc="http://schemas.openxmlformats.org/markup-compatibility/2006">
-    <mc:Choice xmlns:p14="http://schemas.microsoft.com/office/powerpoint/2010/main" Requires="p14">
+  <mc:AlternateContent xmlns:mc="http://schemas.openxmlformats.org/markup-compatibility/2006" xmlns:p14="http://schemas.microsoft.com/office/powerpoint/2010/main">
+    <mc:Choice Requires="p14">
       <p:transition spd="slow" p14:dur="2000" advTm="15000"/>
     </mc:Choice>
-    <mc:Fallback>
+    <mc:Fallback xmlns="">
       <p:transition spd="slow" advTm="15000"/>
     </mc:Fallback>
   </mc:AlternateContent>
@@ -4383,11 +5273,11 @@
   <p:clrMapOvr>
     <a:masterClrMapping/>
   </p:clrMapOvr>
-  <mc:AlternateContent xmlns:mc="http://schemas.openxmlformats.org/markup-compatibility/2006">
-    <mc:Choice xmlns:p14="http://schemas.microsoft.com/office/powerpoint/2010/main" Requires="p14">
+  <mc:AlternateContent xmlns:mc="http://schemas.openxmlformats.org/markup-compatibility/2006" xmlns:p14="http://schemas.microsoft.com/office/powerpoint/2010/main">
+    <mc:Choice Requires="p14">
       <p:transition spd="slow" p14:dur="2000" advTm="15000"/>
     </mc:Choice>
-    <mc:Fallback>
+    <mc:Fallback xmlns="">
       <p:transition spd="slow" advTm="15000"/>
     </mc:Fallback>
   </mc:AlternateContent>
@@ -4463,11 +5353,11 @@
   <p:clrMapOvr>
     <a:masterClrMapping/>
   </p:clrMapOvr>
-  <mc:AlternateContent xmlns:mc="http://schemas.openxmlformats.org/markup-compatibility/2006">
-    <mc:Choice xmlns:p14="http://schemas.microsoft.com/office/powerpoint/2010/main" Requires="p14">
+  <mc:AlternateContent xmlns:mc="http://schemas.openxmlformats.org/markup-compatibility/2006" xmlns:p14="http://schemas.microsoft.com/office/powerpoint/2010/main">
+    <mc:Choice Requires="p14">
       <p:transition spd="slow" p14:dur="2000" advTm="15000"/>
     </mc:Choice>
-    <mc:Fallback>
+    <mc:Fallback xmlns="">
       <p:transition spd="slow" advTm="15000"/>
     </mc:Fallback>
   </mc:AlternateContent>
@@ -4543,11 +5433,11 @@
   <p:clrMapOvr>
     <a:masterClrMapping/>
   </p:clrMapOvr>
-  <mc:AlternateContent xmlns:mc="http://schemas.openxmlformats.org/markup-compatibility/2006">
-    <mc:Choice xmlns:p14="http://schemas.microsoft.com/office/powerpoint/2010/main" Requires="p14">
+  <mc:AlternateContent xmlns:mc="http://schemas.openxmlformats.org/markup-compatibility/2006" xmlns:p14="http://schemas.microsoft.com/office/powerpoint/2010/main">
+    <mc:Choice Requires="p14">
       <p:transition spd="slow" p14:dur="2000" advTm="15000"/>
     </mc:Choice>
-    <mc:Fallback>
+    <mc:Fallback xmlns="">
       <p:transition spd="slow" advTm="15000"/>
     </mc:Fallback>
   </mc:AlternateContent>
@@ -4623,11 +5513,11 @@
   <p:clrMapOvr>
     <a:masterClrMapping/>
   </p:clrMapOvr>
-  <mc:AlternateContent xmlns:mc="http://schemas.openxmlformats.org/markup-compatibility/2006">
-    <mc:Choice xmlns:p14="http://schemas.microsoft.com/office/powerpoint/2010/main" Requires="p14">
+  <mc:AlternateContent xmlns:mc="http://schemas.openxmlformats.org/markup-compatibility/2006" xmlns:p14="http://schemas.microsoft.com/office/powerpoint/2010/main">
+    <mc:Choice Requires="p14">
       <p:transition spd="slow" p14:dur="2000" advTm="15000"/>
     </mc:Choice>
-    <mc:Fallback>
+    <mc:Fallback xmlns="">
       <p:transition spd="slow" advTm="15000"/>
     </mc:Fallback>
   </mc:AlternateContent>
@@ -4703,11 +5593,11 @@
   <p:clrMapOvr>
     <a:masterClrMapping/>
   </p:clrMapOvr>
-  <mc:AlternateContent xmlns:mc="http://schemas.openxmlformats.org/markup-compatibility/2006">
-    <mc:Choice xmlns:p14="http://schemas.microsoft.com/office/powerpoint/2010/main" Requires="p14">
+  <mc:AlternateContent xmlns:mc="http://schemas.openxmlformats.org/markup-compatibility/2006" xmlns:p14="http://schemas.microsoft.com/office/powerpoint/2010/main">
+    <mc:Choice Requires="p14">
       <p:transition spd="slow" p14:dur="2000" advTm="15000"/>
     </mc:Choice>
-    <mc:Fallback>
+    <mc:Fallback xmlns="">
       <p:transition spd="slow" advTm="15000"/>
     </mc:Fallback>
   </mc:AlternateContent>

</xml_diff>

<commit_message>
Mid-term presentation: history slide
</commit_message>
<xml_diff>
--- a/project/mid-term-presentation.pptx
+++ b/project/mid-term-presentation.pptx
@@ -4897,7 +4897,7 @@
           <a:p>
             <a:r>
               <a:rPr lang="en-US" dirty="0" smtClean="0"/>
-              <a:t>Slide 1</a:t>
+              <a:t>Introduction</a:t>
             </a:r>
             <a:endParaRPr lang="en-US" dirty="0"/>
           </a:p>
@@ -4915,17 +4915,628 @@
         </p:nvSpPr>
         <p:spPr/>
         <p:txBody>
-          <a:bodyPr/>
-          <a:lstStyle/>
-          <a:p>
+          <a:bodyPr>
+            <a:normAutofit fontScale="92500" lnSpcReduction="20000"/>
+          </a:bodyPr>
+          <a:lstStyle/>
+          <a:p>
+            <a:r>
+              <a:rPr lang="en-US" dirty="0" smtClean="0"/>
+              <a:t>Examine economic growth using standard indicators</a:t>
+            </a:r>
+          </a:p>
+          <a:p>
+            <a:pPr lvl="1"/>
+            <a:r>
+              <a:rPr lang="en-US" dirty="0" smtClean="0"/>
+              <a:t>Employment</a:t>
+            </a:r>
+          </a:p>
+          <a:p>
+            <a:pPr lvl="1"/>
+            <a:r>
+              <a:rPr lang="en-US" dirty="0" smtClean="0"/>
+              <a:t>Population</a:t>
+            </a:r>
+          </a:p>
+          <a:p>
+            <a:r>
+              <a:rPr lang="en-US" dirty="0" smtClean="0"/>
+              <a:t>Explore other dimensions</a:t>
+            </a:r>
+          </a:p>
+          <a:p>
+            <a:pPr lvl="1"/>
+            <a:r>
+              <a:rPr lang="en-US" dirty="0" smtClean="0"/>
+              <a:t>Socioeconomic categories</a:t>
+            </a:r>
+          </a:p>
+          <a:p>
+            <a:pPr lvl="1"/>
+            <a:r>
+              <a:rPr lang="en-US" dirty="0" smtClean="0"/>
+              <a:t>Labor Industries</a:t>
+            </a:r>
+          </a:p>
+          <a:p>
+            <a:r>
+              <a:rPr lang="en-US" dirty="0" smtClean="0"/>
+              <a:t>???</a:t>
+            </a:r>
+          </a:p>
+          <a:p>
+            <a:r>
+              <a:rPr lang="en-US" dirty="0" smtClean="0"/>
+              <a:t>Compare</a:t>
+            </a:r>
+          </a:p>
+          <a:p>
+            <a:pPr lvl="1"/>
+            <a:r>
+              <a:rPr lang="en-US" dirty="0" smtClean="0"/>
+              <a:t>With cities in the same geographic region</a:t>
+            </a:r>
+          </a:p>
+          <a:p>
+            <a:pPr lvl="1"/>
+            <a:r>
+              <a:rPr lang="en-US" dirty="0" smtClean="0"/>
+              <a:t>With cities of the same population size</a:t>
+            </a:r>
+          </a:p>
+          <a:p>
+            <a:r>
+              <a:rPr lang="en-US" dirty="0" smtClean="0"/>
+              <a:t>Conclude…</a:t>
+            </a:r>
+          </a:p>
+          <a:p>
+            <a:pPr lvl="1"/>
+            <a:r>
+              <a:rPr lang="en-US" dirty="0" smtClean="0"/>
+              <a:t>… is Philadelphia on the verge of an economic boom?</a:t>
+            </a:r>
             <a:endParaRPr lang="en-US" dirty="0"/>
           </a:p>
         </p:txBody>
       </p:sp>
+      <p:sp>
+        <p:nvSpPr>
+          <p:cNvPr id="4" name="TextBox 3"/>
+          <p:cNvSpPr txBox="1"/>
+          <p:nvPr/>
+        </p:nvSpPr>
+        <p:spPr>
+          <a:xfrm>
+            <a:off x="9341646" y="1825625"/>
+            <a:ext cx="2012154" cy="2308324"/>
+          </a:xfrm>
+          <a:prstGeom prst="rect">
+            <a:avLst/>
+          </a:prstGeom>
+          <a:noFill/>
+        </p:spPr>
+        <p:txBody>
+          <a:bodyPr wrap="none" rtlCol="0">
+            <a:spAutoFit/>
+          </a:bodyPr>
+          <a:lstStyle/>
+          <a:p>
+            <a:r>
+              <a:rPr lang="en-US" dirty="0" smtClean="0"/>
+              <a:t>Part 1 – mid-term</a:t>
+            </a:r>
+          </a:p>
+          <a:p>
+            <a:endParaRPr lang="en-US" dirty="0" smtClean="0"/>
+          </a:p>
+          <a:p>
+            <a:endParaRPr lang="en-US" dirty="0"/>
+          </a:p>
+          <a:p>
+            <a:endParaRPr lang="en-US" dirty="0" smtClean="0"/>
+          </a:p>
+          <a:p>
+            <a:endParaRPr lang="en-US" dirty="0"/>
+          </a:p>
+          <a:p>
+            <a:endParaRPr lang="en-US" dirty="0" smtClean="0"/>
+          </a:p>
+          <a:p>
+            <a:endParaRPr lang="en-US" dirty="0"/>
+          </a:p>
+          <a:p>
+            <a:r>
+              <a:rPr lang="en-US" dirty="0" smtClean="0"/>
+              <a:t>Part 2 – final report</a:t>
+            </a:r>
+            <a:endParaRPr lang="en-US" dirty="0"/>
+          </a:p>
+        </p:txBody>
+      </p:sp>
+      <p:cxnSp>
+        <p:nvCxnSpPr>
+          <p:cNvPr id="6" name="Straight Arrow Connector 5"/>
+          <p:cNvCxnSpPr/>
+          <p:nvPr/>
+        </p:nvCxnSpPr>
+        <p:spPr>
+          <a:xfrm flipH="1">
+            <a:off x="8483230" y="2043404"/>
+            <a:ext cx="858416" cy="0"/>
+          </a:xfrm>
+          <a:prstGeom prst="straightConnector1">
+            <a:avLst/>
+          </a:prstGeom>
+          <a:ln>
+            <a:solidFill>
+              <a:schemeClr val="tx1"/>
+            </a:solidFill>
+            <a:tailEnd type="triangle"/>
+          </a:ln>
+        </p:spPr>
+        <p:style>
+          <a:lnRef idx="1">
+            <a:schemeClr val="accent1"/>
+          </a:lnRef>
+          <a:fillRef idx="0">
+            <a:schemeClr val="accent1"/>
+          </a:fillRef>
+          <a:effectRef idx="0">
+            <a:schemeClr val="accent1"/>
+          </a:effectRef>
+          <a:fontRef idx="minor">
+            <a:schemeClr val="tx1"/>
+          </a:fontRef>
+        </p:style>
+      </p:cxnSp>
+      <p:cxnSp>
+        <p:nvCxnSpPr>
+          <p:cNvPr id="8" name="Straight Arrow Connector 7"/>
+          <p:cNvCxnSpPr/>
+          <p:nvPr/>
+        </p:nvCxnSpPr>
+        <p:spPr>
+          <a:xfrm flipH="1">
+            <a:off x="6514470" y="2043404"/>
+            <a:ext cx="2827176" cy="2575249"/>
+          </a:xfrm>
+          <a:prstGeom prst="straightConnector1">
+            <a:avLst/>
+          </a:prstGeom>
+          <a:ln>
+            <a:solidFill>
+              <a:schemeClr val="tx1"/>
+            </a:solidFill>
+            <a:tailEnd type="triangle"/>
+          </a:ln>
+        </p:spPr>
+        <p:style>
+          <a:lnRef idx="1">
+            <a:schemeClr val="accent1"/>
+          </a:lnRef>
+          <a:fillRef idx="0">
+            <a:schemeClr val="accent1"/>
+          </a:fillRef>
+          <a:effectRef idx="0">
+            <a:schemeClr val="accent1"/>
+          </a:effectRef>
+          <a:fontRef idx="minor">
+            <a:schemeClr val="tx1"/>
+          </a:fontRef>
+        </p:style>
+      </p:cxnSp>
+      <p:cxnSp>
+        <p:nvCxnSpPr>
+          <p:cNvPr id="10" name="Straight Arrow Connector 9"/>
+          <p:cNvCxnSpPr/>
+          <p:nvPr/>
+        </p:nvCxnSpPr>
+        <p:spPr>
+          <a:xfrm flipH="1" flipV="1">
+            <a:off x="4946927" y="2979787"/>
+            <a:ext cx="4394719" cy="1021507"/>
+          </a:xfrm>
+          <a:prstGeom prst="straightConnector1">
+            <a:avLst/>
+          </a:prstGeom>
+          <a:ln>
+            <a:solidFill>
+              <a:schemeClr val="tx1"/>
+            </a:solidFill>
+            <a:tailEnd type="triangle"/>
+          </a:ln>
+        </p:spPr>
+        <p:style>
+          <a:lnRef idx="1">
+            <a:schemeClr val="accent1"/>
+          </a:lnRef>
+          <a:fillRef idx="0">
+            <a:schemeClr val="accent1"/>
+          </a:fillRef>
+          <a:effectRef idx="0">
+            <a:schemeClr val="accent1"/>
+          </a:effectRef>
+          <a:fontRef idx="minor">
+            <a:schemeClr val="tx1"/>
+          </a:fontRef>
+        </p:style>
+      </p:cxnSp>
+      <p:cxnSp>
+        <p:nvCxnSpPr>
+          <p:cNvPr id="12" name="Straight Arrow Connector 11"/>
+          <p:cNvCxnSpPr/>
+          <p:nvPr/>
+        </p:nvCxnSpPr>
+        <p:spPr>
+          <a:xfrm flipH="1">
+            <a:off x="7772400" y="4001294"/>
+            <a:ext cx="1569246" cy="1653057"/>
+          </a:xfrm>
+          <a:prstGeom prst="straightConnector1">
+            <a:avLst/>
+          </a:prstGeom>
+          <a:ln>
+            <a:solidFill>
+              <a:schemeClr val="tx1"/>
+            </a:solidFill>
+            <a:tailEnd type="triangle"/>
+          </a:ln>
+        </p:spPr>
+        <p:style>
+          <a:lnRef idx="1">
+            <a:schemeClr val="accent1"/>
+          </a:lnRef>
+          <a:fillRef idx="0">
+            <a:schemeClr val="accent1"/>
+          </a:fillRef>
+          <a:effectRef idx="0">
+            <a:schemeClr val="accent1"/>
+          </a:effectRef>
+          <a:fontRef idx="minor">
+            <a:schemeClr val="tx1"/>
+          </a:fontRef>
+        </p:style>
+      </p:cxnSp>
     </p:spTree>
     <p:extLst>
       <p:ext uri="{BB962C8B-B14F-4D97-AF65-F5344CB8AC3E}">
         <p14:creationId xmlns:p14="http://schemas.microsoft.com/office/powerpoint/2010/main" val="967712188"/>
+      </p:ext>
+    </p:extLst>
+  </p:cSld>
+  <p:clrMapOvr>
+    <a:masterClrMapping/>
+  </p:clrMapOvr>
+  <mc:AlternateContent xmlns:mc="http://schemas.openxmlformats.org/markup-compatibility/2006" xmlns:p14="http://schemas.microsoft.com/office/powerpoint/2010/main">
+    <mc:Choice Requires="p14">
+      <p:transition spd="slow" p14:dur="2000" advTm="15000"/>
+    </mc:Choice>
+    <mc:Fallback xmlns="">
+      <p:transition spd="slow" advTm="15000"/>
+    </mc:Fallback>
+  </mc:AlternateContent>
+  <p:timing>
+    <p:tnLst>
+      <p:par>
+        <p:cTn id="1" dur="indefinite" restart="never" nodeType="tmRoot">
+          <p:childTnLst>
+            <p:seq concurrent="1" nextAc="seek">
+              <p:cTn id="2" dur="indefinite" nodeType="mainSeq">
+                <p:childTnLst>
+                  <p:par>
+                    <p:cTn id="3" fill="hold">
+                      <p:stCondLst>
+                        <p:cond delay="indefinite"/>
+                      </p:stCondLst>
+                      <p:childTnLst>
+                        <p:par>
+                          <p:cTn id="4" fill="hold">
+                            <p:stCondLst>
+                              <p:cond delay="0"/>
+                            </p:stCondLst>
+                            <p:childTnLst>
+                              <p:par>
+                                <p:cTn id="5" presetID="1" presetClass="entr" presetSubtype="0" fill="hold" grpId="0" nodeType="clickEffect">
+                                  <p:stCondLst>
+                                    <p:cond delay="10000"/>
+                                  </p:stCondLst>
+                                  <p:childTnLst>
+                                    <p:set>
+                                      <p:cBhvr>
+                                        <p:cTn id="6" dur="1" fill="hold">
+                                          <p:stCondLst>
+                                            <p:cond delay="0"/>
+                                          </p:stCondLst>
+                                        </p:cTn>
+                                        <p:tgtEl>
+                                          <p:spTgt spid="4"/>
+                                        </p:tgtEl>
+                                        <p:attrNameLst>
+                                          <p:attrName>style.visibility</p:attrName>
+                                        </p:attrNameLst>
+                                      </p:cBhvr>
+                                      <p:to>
+                                        <p:strVal val="visible"/>
+                                      </p:to>
+                                    </p:set>
+                                  </p:childTnLst>
+                                </p:cTn>
+                              </p:par>
+                            </p:childTnLst>
+                          </p:cTn>
+                        </p:par>
+                      </p:childTnLst>
+                    </p:cTn>
+                  </p:par>
+                  <p:par>
+                    <p:cTn id="7" fill="hold">
+                      <p:stCondLst>
+                        <p:cond delay="indefinite"/>
+                      </p:stCondLst>
+                      <p:childTnLst>
+                        <p:par>
+                          <p:cTn id="8" fill="hold">
+                            <p:stCondLst>
+                              <p:cond delay="0"/>
+                            </p:stCondLst>
+                            <p:childTnLst>
+                              <p:par>
+                                <p:cTn id="9" presetID="10" presetClass="entr" presetSubtype="0" fill="hold" nodeType="clickEffect">
+                                  <p:stCondLst>
+                                    <p:cond delay="1000"/>
+                                  </p:stCondLst>
+                                  <p:childTnLst>
+                                    <p:set>
+                                      <p:cBhvr>
+                                        <p:cTn id="10" dur="1" fill="hold">
+                                          <p:stCondLst>
+                                            <p:cond delay="0"/>
+                                          </p:stCondLst>
+                                        </p:cTn>
+                                        <p:tgtEl>
+                                          <p:spTgt spid="6"/>
+                                        </p:tgtEl>
+                                        <p:attrNameLst>
+                                          <p:attrName>style.visibility</p:attrName>
+                                        </p:attrNameLst>
+                                      </p:cBhvr>
+                                      <p:to>
+                                        <p:strVal val="visible"/>
+                                      </p:to>
+                                    </p:set>
+                                    <p:animEffect transition="in" filter="fade">
+                                      <p:cBhvr>
+                                        <p:cTn id="11" dur="500"/>
+                                        <p:tgtEl>
+                                          <p:spTgt spid="6"/>
+                                        </p:tgtEl>
+                                      </p:cBhvr>
+                                    </p:animEffect>
+                                  </p:childTnLst>
+                                </p:cTn>
+                              </p:par>
+                              <p:par>
+                                <p:cTn id="12" presetID="10" presetClass="entr" presetSubtype="0" fill="hold" nodeType="withEffect">
+                                  <p:stCondLst>
+                                    <p:cond delay="1000"/>
+                                  </p:stCondLst>
+                                  <p:childTnLst>
+                                    <p:set>
+                                      <p:cBhvr>
+                                        <p:cTn id="13" dur="1" fill="hold">
+                                          <p:stCondLst>
+                                            <p:cond delay="0"/>
+                                          </p:stCondLst>
+                                        </p:cTn>
+                                        <p:tgtEl>
+                                          <p:spTgt spid="8"/>
+                                        </p:tgtEl>
+                                        <p:attrNameLst>
+                                          <p:attrName>style.visibility</p:attrName>
+                                        </p:attrNameLst>
+                                      </p:cBhvr>
+                                      <p:to>
+                                        <p:strVal val="visible"/>
+                                      </p:to>
+                                    </p:set>
+                                    <p:animEffect transition="in" filter="fade">
+                                      <p:cBhvr>
+                                        <p:cTn id="14" dur="500"/>
+                                        <p:tgtEl>
+                                          <p:spTgt spid="8"/>
+                                        </p:tgtEl>
+                                      </p:cBhvr>
+                                    </p:animEffect>
+                                  </p:childTnLst>
+                                </p:cTn>
+                              </p:par>
+                            </p:childTnLst>
+                          </p:cTn>
+                        </p:par>
+                      </p:childTnLst>
+                    </p:cTn>
+                  </p:par>
+                  <p:par>
+                    <p:cTn id="15" fill="hold">
+                      <p:stCondLst>
+                        <p:cond delay="indefinite"/>
+                      </p:stCondLst>
+                      <p:childTnLst>
+                        <p:par>
+                          <p:cTn id="16" fill="hold">
+                            <p:stCondLst>
+                              <p:cond delay="0"/>
+                            </p:stCondLst>
+                            <p:childTnLst>
+                              <p:par>
+                                <p:cTn id="17" presetID="10" presetClass="entr" presetSubtype="0" fill="hold" nodeType="clickEffect">
+                                  <p:stCondLst>
+                                    <p:cond delay="1000"/>
+                                  </p:stCondLst>
+                                  <p:childTnLst>
+                                    <p:set>
+                                      <p:cBhvr>
+                                        <p:cTn id="18" dur="1" fill="hold">
+                                          <p:stCondLst>
+                                            <p:cond delay="0"/>
+                                          </p:stCondLst>
+                                        </p:cTn>
+                                        <p:tgtEl>
+                                          <p:spTgt spid="10"/>
+                                        </p:tgtEl>
+                                        <p:attrNameLst>
+                                          <p:attrName>style.visibility</p:attrName>
+                                        </p:attrNameLst>
+                                      </p:cBhvr>
+                                      <p:to>
+                                        <p:strVal val="visible"/>
+                                      </p:to>
+                                    </p:set>
+                                    <p:animEffect transition="in" filter="fade">
+                                      <p:cBhvr>
+                                        <p:cTn id="19" dur="500"/>
+                                        <p:tgtEl>
+                                          <p:spTgt spid="10"/>
+                                        </p:tgtEl>
+                                      </p:cBhvr>
+                                    </p:animEffect>
+                                  </p:childTnLst>
+                                </p:cTn>
+                              </p:par>
+                              <p:par>
+                                <p:cTn id="20" presetID="10" presetClass="entr" presetSubtype="0" fill="hold" nodeType="withEffect">
+                                  <p:stCondLst>
+                                    <p:cond delay="1000"/>
+                                  </p:stCondLst>
+                                  <p:childTnLst>
+                                    <p:set>
+                                      <p:cBhvr>
+                                        <p:cTn id="21" dur="1" fill="hold">
+                                          <p:stCondLst>
+                                            <p:cond delay="0"/>
+                                          </p:stCondLst>
+                                        </p:cTn>
+                                        <p:tgtEl>
+                                          <p:spTgt spid="12"/>
+                                        </p:tgtEl>
+                                        <p:attrNameLst>
+                                          <p:attrName>style.visibility</p:attrName>
+                                        </p:attrNameLst>
+                                      </p:cBhvr>
+                                      <p:to>
+                                        <p:strVal val="visible"/>
+                                      </p:to>
+                                    </p:set>
+                                    <p:animEffect transition="in" filter="fade">
+                                      <p:cBhvr>
+                                        <p:cTn id="22" dur="500"/>
+                                        <p:tgtEl>
+                                          <p:spTgt spid="12"/>
+                                        </p:tgtEl>
+                                      </p:cBhvr>
+                                    </p:animEffect>
+                                  </p:childTnLst>
+                                </p:cTn>
+                              </p:par>
+                            </p:childTnLst>
+                          </p:cTn>
+                        </p:par>
+                      </p:childTnLst>
+                    </p:cTn>
+                  </p:par>
+                </p:childTnLst>
+              </p:cTn>
+              <p:prevCondLst>
+                <p:cond evt="onPrev" delay="0">
+                  <p:tgtEl>
+                    <p:sldTgt/>
+                  </p:tgtEl>
+                </p:cond>
+              </p:prevCondLst>
+              <p:nextCondLst>
+                <p:cond evt="onNext" delay="0">
+                  <p:tgtEl>
+                    <p:sldTgt/>
+                  </p:tgtEl>
+                </p:cond>
+              </p:nextCondLst>
+            </p:seq>
+          </p:childTnLst>
+        </p:cTn>
+      </p:par>
+    </p:tnLst>
+    <p:bldLst>
+      <p:bldP spid="4" grpId="0"/>
+    </p:bldLst>
+  </p:timing>
+</p:sld>
+</file>
+
+<file path=ppt/slides/slide20.xml><?xml version="1.0" encoding="utf-8"?>
+<p:sld xmlns:a="http://schemas.openxmlformats.org/drawingml/2006/main" xmlns:r="http://schemas.openxmlformats.org/officeDocument/2006/relationships" xmlns:p="http://schemas.openxmlformats.org/presentationml/2006/main">
+  <p:cSld>
+    <p:spTree>
+      <p:nvGrpSpPr>
+        <p:cNvPr id="1" name=""/>
+        <p:cNvGrpSpPr/>
+        <p:nvPr/>
+      </p:nvGrpSpPr>
+      <p:grpSpPr>
+        <a:xfrm>
+          <a:off x="0" y="0"/>
+          <a:ext cx="0" cy="0"/>
+          <a:chOff x="0" y="0"/>
+          <a:chExt cx="0" cy="0"/>
+        </a:xfrm>
+      </p:grpSpPr>
+      <p:sp>
+        <p:nvSpPr>
+          <p:cNvPr id="2" name="Title 1"/>
+          <p:cNvSpPr>
+            <a:spLocks noGrp="1"/>
+          </p:cNvSpPr>
+          <p:nvPr>
+            <p:ph type="title"/>
+          </p:nvPr>
+        </p:nvSpPr>
+        <p:spPr/>
+        <p:txBody>
+          <a:bodyPr/>
+          <a:lstStyle/>
+          <a:p>
+            <a:r>
+              <a:rPr lang="en-US" dirty="0" smtClean="0"/>
+              <a:t>Thank you!</a:t>
+            </a:r>
+            <a:endParaRPr lang="en-US" dirty="0"/>
+          </a:p>
+        </p:txBody>
+      </p:sp>
+      <p:sp>
+        <p:nvSpPr>
+          <p:cNvPr id="3" name="Content Placeholder 2"/>
+          <p:cNvSpPr>
+            <a:spLocks noGrp="1"/>
+          </p:cNvSpPr>
+          <p:nvPr>
+            <p:ph idx="1"/>
+          </p:nvPr>
+        </p:nvSpPr>
+        <p:spPr/>
+        <p:txBody>
+          <a:bodyPr/>
+          <a:lstStyle/>
+          <a:p>
+            <a:endParaRPr lang="en-US"/>
+          </a:p>
+        </p:txBody>
+      </p:sp>
+    </p:spTree>
+    <p:extLst>
+      <p:ext uri="{BB962C8B-B14F-4D97-AF65-F5344CB8AC3E}">
+        <p14:creationId xmlns:p14="http://schemas.microsoft.com/office/powerpoint/2010/main" val="268461575"/>
       </p:ext>
     </p:extLst>
   </p:cSld>
@@ -4950,86 +5561,6 @@
 </p:sld>
 </file>
 
-<file path=ppt/slides/slide20.xml><?xml version="1.0" encoding="utf-8"?>
-<p:sld xmlns:a="http://schemas.openxmlformats.org/drawingml/2006/main" xmlns:r="http://schemas.openxmlformats.org/officeDocument/2006/relationships" xmlns:p="http://schemas.openxmlformats.org/presentationml/2006/main">
-  <p:cSld>
-    <p:spTree>
-      <p:nvGrpSpPr>
-        <p:cNvPr id="1" name=""/>
-        <p:cNvGrpSpPr/>
-        <p:nvPr/>
-      </p:nvGrpSpPr>
-      <p:grpSpPr>
-        <a:xfrm>
-          <a:off x="0" y="0"/>
-          <a:ext cx="0" cy="0"/>
-          <a:chOff x="0" y="0"/>
-          <a:chExt cx="0" cy="0"/>
-        </a:xfrm>
-      </p:grpSpPr>
-      <p:sp>
-        <p:nvSpPr>
-          <p:cNvPr id="2" name="Title 1"/>
-          <p:cNvSpPr>
-            <a:spLocks noGrp="1"/>
-          </p:cNvSpPr>
-          <p:nvPr>
-            <p:ph type="title"/>
-          </p:nvPr>
-        </p:nvSpPr>
-        <p:spPr/>
-        <p:txBody>
-          <a:bodyPr/>
-          <a:lstStyle/>
-          <a:p>
-            <a:r>
-              <a:rPr lang="en-US" dirty="0" smtClean="0"/>
-              <a:t>Thank you!</a:t>
-            </a:r>
-            <a:endParaRPr lang="en-US" dirty="0"/>
-          </a:p>
-        </p:txBody>
-      </p:sp>
-      <p:sp>
-        <p:nvSpPr>
-          <p:cNvPr id="3" name="Content Placeholder 2"/>
-          <p:cNvSpPr>
-            <a:spLocks noGrp="1"/>
-          </p:cNvSpPr>
-          <p:nvPr>
-            <p:ph idx="1"/>
-          </p:nvPr>
-        </p:nvSpPr>
-        <p:spPr/>
-        <p:txBody>
-          <a:bodyPr/>
-          <a:lstStyle/>
-          <a:p>
-            <a:endParaRPr lang="en-US"/>
-          </a:p>
-        </p:txBody>
-      </p:sp>
-    </p:spTree>
-    <p:extLst>
-      <p:ext uri="{BB962C8B-B14F-4D97-AF65-F5344CB8AC3E}">
-        <p14:creationId xmlns:p14="http://schemas.microsoft.com/office/powerpoint/2010/main" val="268461575"/>
-      </p:ext>
-    </p:extLst>
-  </p:cSld>
-  <p:clrMapOvr>
-    <a:masterClrMapping/>
-  </p:clrMapOvr>
-  <mc:AlternateContent xmlns:mc="http://schemas.openxmlformats.org/markup-compatibility/2006" xmlns:p14="http://schemas.microsoft.com/office/powerpoint/2010/main">
-    <mc:Choice Requires="p14">
-      <p:transition spd="slow" p14:dur="2000" advTm="15000"/>
-    </mc:Choice>
-    <mc:Fallback xmlns="">
-      <p:transition spd="slow" advTm="15000"/>
-    </mc:Fallback>
-  </mc:AlternateContent>
-</p:sld>
-</file>
-
 <file path=ppt/slides/slide3.xml><?xml version="1.0" encoding="utf-8"?>
 <p:sld xmlns:a="http://schemas.openxmlformats.org/drawingml/2006/main" xmlns:r="http://schemas.openxmlformats.org/officeDocument/2006/relationships" xmlns:p="http://schemas.openxmlformats.org/presentationml/2006/main">
   <p:cSld>
@@ -5047,6 +5578,36 @@
           <a:chExt cx="0" cy="0"/>
         </a:xfrm>
       </p:grpSpPr>
+      <p:pic>
+        <p:nvPicPr>
+          <p:cNvPr id="8" name="Picture 7"/>
+          <p:cNvPicPr>
+            <a:picLocks noChangeAspect="1"/>
+          </p:cNvPicPr>
+          <p:nvPr/>
+        </p:nvPicPr>
+        <p:blipFill>
+          <a:blip r:embed="rId2">
+            <a:extLst>
+              <a:ext uri="{28A0092B-C50C-407E-A947-70E740481C1C}">
+                <a14:useLocalDpi xmlns:a14="http://schemas.microsoft.com/office/drawing/2010/main" val="0"/>
+              </a:ext>
+            </a:extLst>
+          </a:blip>
+          <a:stretch>
+            <a:fillRect/>
+          </a:stretch>
+        </p:blipFill>
+        <p:spPr>
+          <a:xfrm>
+            <a:off x="0" y="3060903"/>
+            <a:ext cx="12192000" cy="3772489"/>
+          </a:xfrm>
+          <a:prstGeom prst="rect">
+            <a:avLst/>
+          </a:prstGeom>
+        </p:spPr>
+      </p:pic>
       <p:sp>
         <p:nvSpPr>
           <p:cNvPr id="2" name="Title 1"/>
@@ -5064,31 +5625,341 @@
           <a:p>
             <a:r>
               <a:rPr lang="en-US" dirty="0" smtClean="0"/>
-              <a:t>Slide 2</a:t>
+              <a:t>History</a:t>
             </a:r>
             <a:endParaRPr lang="en-US" dirty="0"/>
           </a:p>
         </p:txBody>
       </p:sp>
-      <p:sp>
-        <p:nvSpPr>
-          <p:cNvPr id="3" name="Content Placeholder 2"/>
-          <p:cNvSpPr>
-            <a:spLocks noGrp="1"/>
-          </p:cNvSpPr>
+      <p:pic>
+        <p:nvPicPr>
+          <p:cNvPr id="6" name="Picture 5"/>
+          <p:cNvPicPr>
+            <a:picLocks noChangeAspect="1"/>
+          </p:cNvPicPr>
+          <p:nvPr/>
+        </p:nvPicPr>
+        <p:blipFill>
+          <a:blip r:embed="rId3">
+            <a:extLst>
+              <a:ext uri="{28A0092B-C50C-407E-A947-70E740481C1C}">
+                <a14:useLocalDpi xmlns:a14="http://schemas.microsoft.com/office/drawing/2010/main" val="0"/>
+              </a:ext>
+            </a:extLst>
+          </a:blip>
+          <a:stretch>
+            <a:fillRect/>
+          </a:stretch>
+        </p:blipFill>
+        <p:spPr>
+          <a:xfrm>
+            <a:off x="3987611" y="1327514"/>
+            <a:ext cx="5476136" cy="2957790"/>
+          </a:xfrm>
+          <a:prstGeom prst="rect">
+            <a:avLst/>
+          </a:prstGeom>
+        </p:spPr>
+      </p:pic>
+      <p:pic>
+        <p:nvPicPr>
+          <p:cNvPr id="7" name="Picture 6"/>
+          <p:cNvPicPr>
+            <a:picLocks noChangeAspect="1"/>
+          </p:cNvPicPr>
+          <p:nvPr/>
+        </p:nvPicPr>
+        <p:blipFill>
+          <a:blip r:embed="rId4" cstate="print">
+            <a:extLst>
+              <a:ext uri="{28A0092B-C50C-407E-A947-70E740481C1C}">
+                <a14:useLocalDpi xmlns:a14="http://schemas.microsoft.com/office/drawing/2010/main" val="0"/>
+              </a:ext>
+            </a:extLst>
+          </a:blip>
+          <a:stretch>
+            <a:fillRect/>
+          </a:stretch>
+        </p:blipFill>
+        <p:spPr>
+          <a:xfrm>
+            <a:off x="9634094" y="1315288"/>
+            <a:ext cx="2362977" cy="2921517"/>
+          </a:xfrm>
+          <a:prstGeom prst="rect">
+            <a:avLst/>
+          </a:prstGeom>
+        </p:spPr>
+      </p:pic>
+      <p:pic>
+        <p:nvPicPr>
+          <p:cNvPr id="5" name="Picture 4"/>
+          <p:cNvPicPr>
+            <a:picLocks noChangeAspect="1"/>
+          </p:cNvPicPr>
+          <p:nvPr/>
+        </p:nvPicPr>
+        <p:blipFill>
+          <a:blip r:embed="rId5" cstate="print">
+            <a:extLst>
+              <a:ext uri="{28A0092B-C50C-407E-A947-70E740481C1C}">
+                <a14:useLocalDpi xmlns:a14="http://schemas.microsoft.com/office/drawing/2010/main" val="0"/>
+              </a:ext>
+            </a:extLst>
+          </a:blip>
+          <a:stretch>
+            <a:fillRect/>
+          </a:stretch>
+        </p:blipFill>
+        <p:spPr>
+          <a:xfrm>
+            <a:off x="7447313" y="2900473"/>
+            <a:ext cx="3133344" cy="2084832"/>
+          </a:xfrm>
+          <a:prstGeom prst="rect">
+            <a:avLst/>
+          </a:prstGeom>
+        </p:spPr>
+      </p:pic>
+      <p:pic>
+        <p:nvPicPr>
+          <p:cNvPr id="4" name="Content Placeholder 3"/>
+          <p:cNvPicPr>
+            <a:picLocks noGrp="1" noChangeAspect="1"/>
+          </p:cNvPicPr>
           <p:nvPr>
             <p:ph idx="1"/>
           </p:nvPr>
-        </p:nvSpPr>
-        <p:spPr/>
-        <p:txBody>
-          <a:bodyPr/>
-          <a:lstStyle/>
-          <a:p>
-            <a:endParaRPr lang="en-US"/>
-          </a:p>
-        </p:txBody>
-      </p:sp>
+        </p:nvPicPr>
+        <p:blipFill>
+          <a:blip r:embed="rId6" cstate="print">
+            <a:extLst>
+              <a:ext uri="{28A0092B-C50C-407E-A947-70E740481C1C}">
+                <a14:useLocalDpi xmlns:a14="http://schemas.microsoft.com/office/drawing/2010/main" val="0"/>
+              </a:ext>
+            </a:extLst>
+          </a:blip>
+          <a:stretch>
+            <a:fillRect/>
+          </a:stretch>
+        </p:blipFill>
+        <p:spPr>
+          <a:xfrm>
+            <a:off x="1455953" y="2551915"/>
+            <a:ext cx="4380017" cy="2803211"/>
+          </a:xfrm>
+        </p:spPr>
+      </p:pic>
+      <p:pic>
+        <p:nvPicPr>
+          <p:cNvPr id="9" name="Picture 8"/>
+          <p:cNvPicPr>
+            <a:picLocks noChangeAspect="1"/>
+          </p:cNvPicPr>
+          <p:nvPr/>
+        </p:nvPicPr>
+        <p:blipFill>
+          <a:blip r:embed="rId7">
+            <a:extLst>
+              <a:ext uri="{28A0092B-C50C-407E-A947-70E740481C1C}">
+                <a14:useLocalDpi xmlns:a14="http://schemas.microsoft.com/office/drawing/2010/main" val="0"/>
+              </a:ext>
+            </a:extLst>
+          </a:blip>
+          <a:stretch>
+            <a:fillRect/>
+          </a:stretch>
+        </p:blipFill>
+        <p:spPr>
+          <a:xfrm>
+            <a:off x="106232" y="1315288"/>
+            <a:ext cx="3775147" cy="1768775"/>
+          </a:xfrm>
+          <a:prstGeom prst="rect">
+            <a:avLst/>
+          </a:prstGeom>
+        </p:spPr>
+      </p:pic>
+      <p:pic>
+        <p:nvPicPr>
+          <p:cNvPr id="10" name="Picture 9"/>
+          <p:cNvPicPr>
+            <a:picLocks noChangeAspect="1"/>
+          </p:cNvPicPr>
+          <p:nvPr/>
+        </p:nvPicPr>
+        <p:blipFill>
+          <a:blip r:embed="rId8" cstate="print">
+            <a:extLst>
+              <a:ext uri="{28A0092B-C50C-407E-A947-70E740481C1C}">
+                <a14:useLocalDpi xmlns:a14="http://schemas.microsoft.com/office/drawing/2010/main" val="0"/>
+              </a:ext>
+            </a:extLst>
+          </a:blip>
+          <a:stretch>
+            <a:fillRect/>
+          </a:stretch>
+        </p:blipFill>
+        <p:spPr>
+          <a:xfrm>
+            <a:off x="306355" y="5899291"/>
+            <a:ext cx="1580957" cy="826050"/>
+          </a:xfrm>
+          <a:prstGeom prst="rect">
+            <a:avLst/>
+          </a:prstGeom>
+        </p:spPr>
+      </p:pic>
+      <p:pic>
+        <p:nvPicPr>
+          <p:cNvPr id="11" name="Picture 10"/>
+          <p:cNvPicPr>
+            <a:picLocks noChangeAspect="1"/>
+          </p:cNvPicPr>
+          <p:nvPr/>
+        </p:nvPicPr>
+        <p:blipFill>
+          <a:blip r:embed="rId9">
+            <a:extLst>
+              <a:ext uri="{28A0092B-C50C-407E-A947-70E740481C1C}">
+                <a14:useLocalDpi xmlns:a14="http://schemas.microsoft.com/office/drawing/2010/main" val="0"/>
+              </a:ext>
+            </a:extLst>
+          </a:blip>
+          <a:stretch>
+            <a:fillRect/>
+          </a:stretch>
+        </p:blipFill>
+        <p:spPr>
+          <a:xfrm>
+            <a:off x="2207686" y="6107528"/>
+            <a:ext cx="1438275" cy="409575"/>
+          </a:xfrm>
+          <a:prstGeom prst="rect">
+            <a:avLst/>
+          </a:prstGeom>
+        </p:spPr>
+      </p:pic>
+      <p:pic>
+        <p:nvPicPr>
+          <p:cNvPr id="12" name="Picture 11"/>
+          <p:cNvPicPr>
+            <a:picLocks noChangeAspect="1"/>
+          </p:cNvPicPr>
+          <p:nvPr/>
+        </p:nvPicPr>
+        <p:blipFill>
+          <a:blip r:embed="rId10">
+            <a:extLst>
+              <a:ext uri="{28A0092B-C50C-407E-A947-70E740481C1C}">
+                <a14:useLocalDpi xmlns:a14="http://schemas.microsoft.com/office/drawing/2010/main" val="0"/>
+              </a:ext>
+            </a:extLst>
+          </a:blip>
+          <a:stretch>
+            <a:fillRect/>
+          </a:stretch>
+        </p:blipFill>
+        <p:spPr>
+          <a:xfrm>
+            <a:off x="3943287" y="5899291"/>
+            <a:ext cx="2190750" cy="800100"/>
+          </a:xfrm>
+          <a:prstGeom prst="rect">
+            <a:avLst/>
+          </a:prstGeom>
+        </p:spPr>
+      </p:pic>
+      <p:pic>
+        <p:nvPicPr>
+          <p:cNvPr id="13" name="Picture 12"/>
+          <p:cNvPicPr>
+            <a:picLocks noChangeAspect="1"/>
+          </p:cNvPicPr>
+          <p:nvPr/>
+        </p:nvPicPr>
+        <p:blipFill>
+          <a:blip r:embed="rId11">
+            <a:extLst>
+              <a:ext uri="{28A0092B-C50C-407E-A947-70E740481C1C}">
+                <a14:useLocalDpi xmlns:a14="http://schemas.microsoft.com/office/drawing/2010/main" val="0"/>
+              </a:ext>
+            </a:extLst>
+          </a:blip>
+          <a:stretch>
+            <a:fillRect/>
+          </a:stretch>
+        </p:blipFill>
+        <p:spPr>
+          <a:xfrm>
+            <a:off x="6398015" y="6070879"/>
+            <a:ext cx="2098595" cy="582191"/>
+          </a:xfrm>
+          <a:prstGeom prst="rect">
+            <a:avLst/>
+          </a:prstGeom>
+        </p:spPr>
+      </p:pic>
+      <p:pic>
+        <p:nvPicPr>
+          <p:cNvPr id="14" name="Picture 13"/>
+          <p:cNvPicPr>
+            <a:picLocks noChangeAspect="1"/>
+          </p:cNvPicPr>
+          <p:nvPr/>
+        </p:nvPicPr>
+        <p:blipFill>
+          <a:blip r:embed="rId12" cstate="print">
+            <a:extLst>
+              <a:ext uri="{28A0092B-C50C-407E-A947-70E740481C1C}">
+                <a14:useLocalDpi xmlns:a14="http://schemas.microsoft.com/office/drawing/2010/main" val="0"/>
+              </a:ext>
+            </a:extLst>
+          </a:blip>
+          <a:stretch>
+            <a:fillRect/>
+          </a:stretch>
+        </p:blipFill>
+        <p:spPr>
+          <a:xfrm>
+            <a:off x="9004864" y="5807576"/>
+            <a:ext cx="917765" cy="917765"/>
+          </a:xfrm>
+          <a:prstGeom prst="rect">
+            <a:avLst/>
+          </a:prstGeom>
+        </p:spPr>
+      </p:pic>
+      <p:pic>
+        <p:nvPicPr>
+          <p:cNvPr id="15" name="Picture 14"/>
+          <p:cNvPicPr>
+            <a:picLocks noChangeAspect="1"/>
+          </p:cNvPicPr>
+          <p:nvPr/>
+        </p:nvPicPr>
+        <p:blipFill>
+          <a:blip r:embed="rId13" cstate="print">
+            <a:extLst>
+              <a:ext uri="{28A0092B-C50C-407E-A947-70E740481C1C}">
+                <a14:useLocalDpi xmlns:a14="http://schemas.microsoft.com/office/drawing/2010/main" val="0"/>
+              </a:ext>
+            </a:extLst>
+          </a:blip>
+          <a:stretch>
+            <a:fillRect/>
+          </a:stretch>
+        </p:blipFill>
+        <p:spPr>
+          <a:xfrm>
+            <a:off x="10642598" y="5652799"/>
+            <a:ext cx="1077200" cy="1077200"/>
+          </a:xfrm>
+          <a:prstGeom prst="rect">
+            <a:avLst/>
+          </a:prstGeom>
+        </p:spPr>
+      </p:pic>
     </p:spTree>
     <p:extLst>
       <p:ext uri="{BB962C8B-B14F-4D97-AF65-F5344CB8AC3E}">
@@ -5110,7 +5981,570 @@
   <p:timing>
     <p:tnLst>
       <p:par>
-        <p:cTn id="1" dur="indefinite" restart="never" nodeType="tmRoot"/>
+        <p:cTn id="1" dur="indefinite" restart="never" nodeType="tmRoot">
+          <p:childTnLst>
+            <p:seq concurrent="1" nextAc="seek">
+              <p:cTn id="2" dur="indefinite" nodeType="mainSeq">
+                <p:childTnLst>
+                  <p:par>
+                    <p:cTn id="3" fill="hold">
+                      <p:stCondLst>
+                        <p:cond delay="indefinite"/>
+                      </p:stCondLst>
+                      <p:childTnLst>
+                        <p:par>
+                          <p:cTn id="4" fill="hold">
+                            <p:stCondLst>
+                              <p:cond delay="0"/>
+                            </p:stCondLst>
+                            <p:childTnLst>
+                              <p:par>
+                                <p:cTn id="5" presetID="1" presetClass="entr" presetSubtype="0" fill="hold" nodeType="clickEffect">
+                                  <p:stCondLst>
+                                    <p:cond delay="1000"/>
+                                  </p:stCondLst>
+                                  <p:childTnLst>
+                                    <p:set>
+                                      <p:cBhvr>
+                                        <p:cTn id="6" dur="1" fill="hold">
+                                          <p:stCondLst>
+                                            <p:cond delay="0"/>
+                                          </p:stCondLst>
+                                        </p:cTn>
+                                        <p:tgtEl>
+                                          <p:spTgt spid="9"/>
+                                        </p:tgtEl>
+                                        <p:attrNameLst>
+                                          <p:attrName>style.visibility</p:attrName>
+                                        </p:attrNameLst>
+                                      </p:cBhvr>
+                                      <p:to>
+                                        <p:strVal val="visible"/>
+                                      </p:to>
+                                    </p:set>
+                                  </p:childTnLst>
+                                </p:cTn>
+                              </p:par>
+                            </p:childTnLst>
+                          </p:cTn>
+                        </p:par>
+                      </p:childTnLst>
+                    </p:cTn>
+                  </p:par>
+                  <p:par>
+                    <p:cTn id="7" fill="hold">
+                      <p:stCondLst>
+                        <p:cond delay="indefinite"/>
+                      </p:stCondLst>
+                      <p:childTnLst>
+                        <p:par>
+                          <p:cTn id="8" fill="hold">
+                            <p:stCondLst>
+                              <p:cond delay="0"/>
+                            </p:stCondLst>
+                            <p:childTnLst>
+                              <p:par>
+                                <p:cTn id="9" presetID="1" presetClass="entr" presetSubtype="0" fill="hold" nodeType="clickEffect">
+                                  <p:stCondLst>
+                                    <p:cond delay="1000"/>
+                                  </p:stCondLst>
+                                  <p:childTnLst>
+                                    <p:set>
+                                      <p:cBhvr>
+                                        <p:cTn id="10" dur="1" fill="hold">
+                                          <p:stCondLst>
+                                            <p:cond delay="0"/>
+                                          </p:stCondLst>
+                                        </p:cTn>
+                                        <p:tgtEl>
+                                          <p:spTgt spid="8"/>
+                                        </p:tgtEl>
+                                        <p:attrNameLst>
+                                          <p:attrName>style.visibility</p:attrName>
+                                        </p:attrNameLst>
+                                      </p:cBhvr>
+                                      <p:to>
+                                        <p:strVal val="visible"/>
+                                      </p:to>
+                                    </p:set>
+                                  </p:childTnLst>
+                                </p:cTn>
+                              </p:par>
+                            </p:childTnLst>
+                          </p:cTn>
+                        </p:par>
+                      </p:childTnLst>
+                    </p:cTn>
+                  </p:par>
+                  <p:par>
+                    <p:cTn id="11" fill="hold">
+                      <p:stCondLst>
+                        <p:cond delay="indefinite"/>
+                      </p:stCondLst>
+                      <p:childTnLst>
+                        <p:par>
+                          <p:cTn id="12" fill="hold">
+                            <p:stCondLst>
+                              <p:cond delay="0"/>
+                            </p:stCondLst>
+                            <p:childTnLst>
+                              <p:par>
+                                <p:cTn id="13" presetID="1" presetClass="entr" presetSubtype="0" fill="hold" nodeType="clickEffect">
+                                  <p:stCondLst>
+                                    <p:cond delay="1000"/>
+                                  </p:stCondLst>
+                                  <p:childTnLst>
+                                    <p:set>
+                                      <p:cBhvr>
+                                        <p:cTn id="14" dur="1" fill="hold">
+                                          <p:stCondLst>
+                                            <p:cond delay="0"/>
+                                          </p:stCondLst>
+                                        </p:cTn>
+                                        <p:tgtEl>
+                                          <p:spTgt spid="6"/>
+                                        </p:tgtEl>
+                                        <p:attrNameLst>
+                                          <p:attrName>style.visibility</p:attrName>
+                                        </p:attrNameLst>
+                                      </p:cBhvr>
+                                      <p:to>
+                                        <p:strVal val="visible"/>
+                                      </p:to>
+                                    </p:set>
+                                  </p:childTnLst>
+                                </p:cTn>
+                              </p:par>
+                            </p:childTnLst>
+                          </p:cTn>
+                        </p:par>
+                      </p:childTnLst>
+                    </p:cTn>
+                  </p:par>
+                  <p:par>
+                    <p:cTn id="15" fill="hold">
+                      <p:stCondLst>
+                        <p:cond delay="indefinite"/>
+                      </p:stCondLst>
+                      <p:childTnLst>
+                        <p:par>
+                          <p:cTn id="16" fill="hold">
+                            <p:stCondLst>
+                              <p:cond delay="0"/>
+                            </p:stCondLst>
+                            <p:childTnLst>
+                              <p:par>
+                                <p:cTn id="17" presetID="1" presetClass="entr" presetSubtype="0" fill="hold" nodeType="clickEffect">
+                                  <p:stCondLst>
+                                    <p:cond delay="1000"/>
+                                  </p:stCondLst>
+                                  <p:childTnLst>
+                                    <p:set>
+                                      <p:cBhvr>
+                                        <p:cTn id="18" dur="1" fill="hold">
+                                          <p:stCondLst>
+                                            <p:cond delay="0"/>
+                                          </p:stCondLst>
+                                        </p:cTn>
+                                        <p:tgtEl>
+                                          <p:spTgt spid="7"/>
+                                        </p:tgtEl>
+                                        <p:attrNameLst>
+                                          <p:attrName>style.visibility</p:attrName>
+                                        </p:attrNameLst>
+                                      </p:cBhvr>
+                                      <p:to>
+                                        <p:strVal val="visible"/>
+                                      </p:to>
+                                    </p:set>
+                                  </p:childTnLst>
+                                </p:cTn>
+                              </p:par>
+                            </p:childTnLst>
+                          </p:cTn>
+                        </p:par>
+                      </p:childTnLst>
+                    </p:cTn>
+                  </p:par>
+                  <p:par>
+                    <p:cTn id="19" fill="hold">
+                      <p:stCondLst>
+                        <p:cond delay="indefinite"/>
+                      </p:stCondLst>
+                      <p:childTnLst>
+                        <p:par>
+                          <p:cTn id="20" fill="hold">
+                            <p:stCondLst>
+                              <p:cond delay="0"/>
+                            </p:stCondLst>
+                            <p:childTnLst>
+                              <p:par>
+                                <p:cTn id="21" presetID="1" presetClass="entr" presetSubtype="0" fill="hold" nodeType="clickEffect">
+                                  <p:stCondLst>
+                                    <p:cond delay="1000"/>
+                                  </p:stCondLst>
+                                  <p:childTnLst>
+                                    <p:set>
+                                      <p:cBhvr>
+                                        <p:cTn id="22" dur="1" fill="hold">
+                                          <p:stCondLst>
+                                            <p:cond delay="0"/>
+                                          </p:stCondLst>
+                                        </p:cTn>
+                                        <p:tgtEl>
+                                          <p:spTgt spid="4"/>
+                                        </p:tgtEl>
+                                        <p:attrNameLst>
+                                          <p:attrName>style.visibility</p:attrName>
+                                        </p:attrNameLst>
+                                      </p:cBhvr>
+                                      <p:to>
+                                        <p:strVal val="visible"/>
+                                      </p:to>
+                                    </p:set>
+                                  </p:childTnLst>
+                                </p:cTn>
+                              </p:par>
+                            </p:childTnLst>
+                          </p:cTn>
+                        </p:par>
+                      </p:childTnLst>
+                    </p:cTn>
+                  </p:par>
+                  <p:par>
+                    <p:cTn id="23" fill="hold">
+                      <p:stCondLst>
+                        <p:cond delay="indefinite"/>
+                      </p:stCondLst>
+                      <p:childTnLst>
+                        <p:par>
+                          <p:cTn id="24" fill="hold">
+                            <p:stCondLst>
+                              <p:cond delay="0"/>
+                            </p:stCondLst>
+                            <p:childTnLst>
+                              <p:par>
+                                <p:cTn id="25" presetID="1" presetClass="entr" presetSubtype="0" fill="hold" nodeType="clickEffect">
+                                  <p:stCondLst>
+                                    <p:cond delay="1000"/>
+                                  </p:stCondLst>
+                                  <p:childTnLst>
+                                    <p:set>
+                                      <p:cBhvr>
+                                        <p:cTn id="26" dur="1" fill="hold">
+                                          <p:stCondLst>
+                                            <p:cond delay="0"/>
+                                          </p:stCondLst>
+                                        </p:cTn>
+                                        <p:tgtEl>
+                                          <p:spTgt spid="5"/>
+                                        </p:tgtEl>
+                                        <p:attrNameLst>
+                                          <p:attrName>style.visibility</p:attrName>
+                                        </p:attrNameLst>
+                                      </p:cBhvr>
+                                      <p:to>
+                                        <p:strVal val="visible"/>
+                                      </p:to>
+                                    </p:set>
+                                  </p:childTnLst>
+                                </p:cTn>
+                              </p:par>
+                            </p:childTnLst>
+                          </p:cTn>
+                        </p:par>
+                      </p:childTnLst>
+                    </p:cTn>
+                  </p:par>
+                  <p:par>
+                    <p:cTn id="27" fill="hold">
+                      <p:stCondLst>
+                        <p:cond delay="indefinite"/>
+                      </p:stCondLst>
+                      <p:childTnLst>
+                        <p:par>
+                          <p:cTn id="28" fill="hold">
+                            <p:stCondLst>
+                              <p:cond delay="0"/>
+                            </p:stCondLst>
+                            <p:childTnLst>
+                              <p:par>
+                                <p:cTn id="29" presetID="1" presetClass="entr" presetSubtype="0" fill="hold" nodeType="clickEffect">
+                                  <p:stCondLst>
+                                    <p:cond delay="1000"/>
+                                  </p:stCondLst>
+                                  <p:childTnLst>
+                                    <p:set>
+                                      <p:cBhvr>
+                                        <p:cTn id="30" dur="1" fill="hold">
+                                          <p:stCondLst>
+                                            <p:cond delay="0"/>
+                                          </p:stCondLst>
+                                        </p:cTn>
+                                        <p:tgtEl>
+                                          <p:spTgt spid="10"/>
+                                        </p:tgtEl>
+                                        <p:attrNameLst>
+                                          <p:attrName>style.visibility</p:attrName>
+                                        </p:attrNameLst>
+                                      </p:cBhvr>
+                                      <p:to>
+                                        <p:strVal val="visible"/>
+                                      </p:to>
+                                    </p:set>
+                                  </p:childTnLst>
+                                </p:cTn>
+                              </p:par>
+                            </p:childTnLst>
+                          </p:cTn>
+                        </p:par>
+                      </p:childTnLst>
+                    </p:cTn>
+                  </p:par>
+                  <p:par>
+                    <p:cTn id="31" fill="hold">
+                      <p:stCondLst>
+                        <p:cond delay="indefinite"/>
+                      </p:stCondLst>
+                      <p:childTnLst>
+                        <p:par>
+                          <p:cTn id="32" fill="hold">
+                            <p:stCondLst>
+                              <p:cond delay="0"/>
+                            </p:stCondLst>
+                            <p:childTnLst>
+                              <p:par>
+                                <p:cTn id="33" presetID="1" presetClass="entr" presetSubtype="0" fill="hold" nodeType="clickEffect">
+                                  <p:stCondLst>
+                                    <p:cond delay="1000"/>
+                                  </p:stCondLst>
+                                  <p:childTnLst>
+                                    <p:set>
+                                      <p:cBhvr>
+                                        <p:cTn id="34" dur="1" fill="hold">
+                                          <p:stCondLst>
+                                            <p:cond delay="0"/>
+                                          </p:stCondLst>
+                                        </p:cTn>
+                                        <p:tgtEl>
+                                          <p:spTgt spid="11"/>
+                                        </p:tgtEl>
+                                        <p:attrNameLst>
+                                          <p:attrName>style.visibility</p:attrName>
+                                        </p:attrNameLst>
+                                      </p:cBhvr>
+                                      <p:to>
+                                        <p:strVal val="visible"/>
+                                      </p:to>
+                                    </p:set>
+                                  </p:childTnLst>
+                                </p:cTn>
+                              </p:par>
+                            </p:childTnLst>
+                          </p:cTn>
+                        </p:par>
+                      </p:childTnLst>
+                    </p:cTn>
+                  </p:par>
+                  <p:par>
+                    <p:cTn id="35" fill="hold">
+                      <p:stCondLst>
+                        <p:cond delay="indefinite"/>
+                      </p:stCondLst>
+                      <p:childTnLst>
+                        <p:par>
+                          <p:cTn id="36" fill="hold">
+                            <p:stCondLst>
+                              <p:cond delay="0"/>
+                            </p:stCondLst>
+                            <p:childTnLst>
+                              <p:par>
+                                <p:cTn id="37" presetID="1" presetClass="entr" presetSubtype="0" fill="hold" nodeType="clickEffect">
+                                  <p:stCondLst>
+                                    <p:cond delay="1000"/>
+                                  </p:stCondLst>
+                                  <p:childTnLst>
+                                    <p:set>
+                                      <p:cBhvr>
+                                        <p:cTn id="38" dur="1" fill="hold">
+                                          <p:stCondLst>
+                                            <p:cond delay="0"/>
+                                          </p:stCondLst>
+                                        </p:cTn>
+                                        <p:tgtEl>
+                                          <p:spTgt spid="12"/>
+                                        </p:tgtEl>
+                                        <p:attrNameLst>
+                                          <p:attrName>style.visibility</p:attrName>
+                                        </p:attrNameLst>
+                                      </p:cBhvr>
+                                      <p:to>
+                                        <p:strVal val="visible"/>
+                                      </p:to>
+                                    </p:set>
+                                  </p:childTnLst>
+                                </p:cTn>
+                              </p:par>
+                            </p:childTnLst>
+                          </p:cTn>
+                        </p:par>
+                      </p:childTnLst>
+                    </p:cTn>
+                  </p:par>
+                  <p:par>
+                    <p:cTn id="39" fill="hold">
+                      <p:stCondLst>
+                        <p:cond delay="indefinite"/>
+                      </p:stCondLst>
+                      <p:childTnLst>
+                        <p:par>
+                          <p:cTn id="40" fill="hold">
+                            <p:stCondLst>
+                              <p:cond delay="0"/>
+                            </p:stCondLst>
+                            <p:childTnLst>
+                              <p:par>
+                                <p:cTn id="41" presetID="1" presetClass="entr" presetSubtype="0" fill="hold" nodeType="clickEffect">
+                                  <p:stCondLst>
+                                    <p:cond delay="1000"/>
+                                  </p:stCondLst>
+                                  <p:childTnLst>
+                                    <p:set>
+                                      <p:cBhvr>
+                                        <p:cTn id="42" dur="1" fill="hold">
+                                          <p:stCondLst>
+                                            <p:cond delay="0"/>
+                                          </p:stCondLst>
+                                        </p:cTn>
+                                        <p:tgtEl>
+                                          <p:spTgt spid="13"/>
+                                        </p:tgtEl>
+                                        <p:attrNameLst>
+                                          <p:attrName>style.visibility</p:attrName>
+                                        </p:attrNameLst>
+                                      </p:cBhvr>
+                                      <p:to>
+                                        <p:strVal val="visible"/>
+                                      </p:to>
+                                    </p:set>
+                                  </p:childTnLst>
+                                </p:cTn>
+                              </p:par>
+                            </p:childTnLst>
+                          </p:cTn>
+                        </p:par>
+                      </p:childTnLst>
+                    </p:cTn>
+                  </p:par>
+                  <p:par>
+                    <p:cTn id="43" fill="hold">
+                      <p:stCondLst>
+                        <p:cond delay="indefinite"/>
+                      </p:stCondLst>
+                      <p:childTnLst>
+                        <p:par>
+                          <p:cTn id="44" fill="hold">
+                            <p:stCondLst>
+                              <p:cond delay="0"/>
+                            </p:stCondLst>
+                            <p:childTnLst>
+                              <p:par>
+                                <p:cTn id="45" presetID="1" presetClass="entr" presetSubtype="0" fill="hold" nodeType="clickEffect">
+                                  <p:stCondLst>
+                                    <p:cond delay="1000"/>
+                                  </p:stCondLst>
+                                  <p:childTnLst>
+                                    <p:set>
+                                      <p:cBhvr>
+                                        <p:cTn id="46" dur="1" fill="hold">
+                                          <p:stCondLst>
+                                            <p:cond delay="0"/>
+                                          </p:stCondLst>
+                                        </p:cTn>
+                                        <p:tgtEl>
+                                          <p:spTgt spid="14"/>
+                                        </p:tgtEl>
+                                        <p:attrNameLst>
+                                          <p:attrName>style.visibility</p:attrName>
+                                        </p:attrNameLst>
+                                      </p:cBhvr>
+                                      <p:to>
+                                        <p:strVal val="visible"/>
+                                      </p:to>
+                                    </p:set>
+                                  </p:childTnLst>
+                                </p:cTn>
+                              </p:par>
+                            </p:childTnLst>
+                          </p:cTn>
+                        </p:par>
+                      </p:childTnLst>
+                    </p:cTn>
+                  </p:par>
+                  <p:par>
+                    <p:cTn id="47" fill="hold">
+                      <p:stCondLst>
+                        <p:cond delay="indefinite"/>
+                      </p:stCondLst>
+                      <p:childTnLst>
+                        <p:par>
+                          <p:cTn id="48" fill="hold">
+                            <p:stCondLst>
+                              <p:cond delay="0"/>
+                            </p:stCondLst>
+                            <p:childTnLst>
+                              <p:par>
+                                <p:cTn id="49" presetID="1" presetClass="entr" presetSubtype="0" fill="hold" nodeType="clickEffect">
+                                  <p:stCondLst>
+                                    <p:cond delay="1000"/>
+                                  </p:stCondLst>
+                                  <p:childTnLst>
+                                    <p:set>
+                                      <p:cBhvr>
+                                        <p:cTn id="50" dur="1" fill="hold">
+                                          <p:stCondLst>
+                                            <p:cond delay="0"/>
+                                          </p:stCondLst>
+                                        </p:cTn>
+                                        <p:tgtEl>
+                                          <p:spTgt spid="15"/>
+                                        </p:tgtEl>
+                                        <p:attrNameLst>
+                                          <p:attrName>style.visibility</p:attrName>
+                                        </p:attrNameLst>
+                                      </p:cBhvr>
+                                      <p:to>
+                                        <p:strVal val="visible"/>
+                                      </p:to>
+                                    </p:set>
+                                  </p:childTnLst>
+                                </p:cTn>
+                              </p:par>
+                            </p:childTnLst>
+                          </p:cTn>
+                        </p:par>
+                      </p:childTnLst>
+                    </p:cTn>
+                  </p:par>
+                </p:childTnLst>
+              </p:cTn>
+              <p:prevCondLst>
+                <p:cond evt="onPrev" delay="0">
+                  <p:tgtEl>
+                    <p:sldTgt/>
+                  </p:tgtEl>
+                </p:cond>
+              </p:prevCondLst>
+              <p:nextCondLst>
+                <p:cond evt="onNext" delay="0">
+                  <p:tgtEl>
+                    <p:sldTgt/>
+                  </p:tgtEl>
+                </p:cond>
+              </p:nextCondLst>
+            </p:seq>
+          </p:childTnLst>
+        </p:cTn>
       </p:par>
     </p:tnLst>
   </p:timing>
@@ -5281,6 +6715,13 @@
       <p:transition spd="slow" advTm="15000"/>
     </mc:Fallback>
   </mc:AlternateContent>
+  <p:timing>
+    <p:tnLst>
+      <p:par>
+        <p:cTn id="1" dur="indefinite" restart="never" nodeType="tmRoot"/>
+      </p:par>
+    </p:tnLst>
+  </p:timing>
 </p:sld>
 </file>
 

</xml_diff>

<commit_message>
Mid-term presentation: added demographics, existing material (CCD, Brookings)
</commit_message>
<xml_diff>
--- a/project/mid-term-presentation.pptx
+++ b/project/mid-term-presentation.pptx
@@ -3950,7 +3950,7 @@
           <a:p>
             <a:r>
               <a:rPr lang="en-US" dirty="0" smtClean="0"/>
-              <a:t>Mid-term Status Report</a:t>
+              <a:t>Mid-term Report</a:t>
             </a:r>
             <a:endParaRPr lang="en-US" dirty="0"/>
           </a:p>
@@ -4008,6 +4008,7 @@
           </a:bodyPr>
           <a:lstStyle/>
           <a:p>
+            <a:pPr algn="ctr"/>
             <a:r>
               <a:rPr lang="en-US" sz="1000" dirty="0" smtClean="0">
                 <a:solidFill>
@@ -4700,6 +4701,13 @@
       <p:transition spd="slow" advTm="15000"/>
     </mc:Fallback>
   </mc:AlternateContent>
+  <p:timing>
+    <p:tnLst>
+      <p:par>
+        <p:cTn id="1" dur="indefinite" restart="never" nodeType="tmRoot"/>
+      </p:par>
+    </p:tnLst>
+  </p:timing>
 </p:sld>
 </file>
 
@@ -4817,7 +4825,7 @@
           <a:p>
             <a:r>
               <a:rPr lang="en-US" dirty="0" smtClean="0"/>
-              <a:t>Conclusions…</a:t>
+              <a:t>What’s next?</a:t>
             </a:r>
             <a:endParaRPr lang="en-US" dirty="0"/>
           </a:p>
@@ -4860,6 +4868,13 @@
       <p:transition spd="slow" advTm="15000"/>
     </mc:Fallback>
   </mc:AlternateContent>
+  <p:timing>
+    <p:tnLst>
+      <p:par>
+        <p:cTn id="1" dur="indefinite" restart="never" nodeType="tmRoot"/>
+      </p:par>
+    </p:tnLst>
+  </p:timing>
 </p:sld>
 </file>
 
@@ -5009,8 +5024,8 @@
         </p:nvSpPr>
         <p:spPr>
           <a:xfrm>
-            <a:off x="9341646" y="1825625"/>
-            <a:ext cx="2012154" cy="2308324"/>
+            <a:off x="9341646" y="1331096"/>
+            <a:ext cx="2450799" cy="2862322"/>
           </a:xfrm>
           <a:prstGeom prst="rect">
             <a:avLst/>
@@ -5024,34 +5039,87 @@
           <a:lstStyle/>
           <a:p>
             <a:r>
-              <a:rPr lang="en-US" dirty="0" smtClean="0"/>
+              <a:rPr lang="en-US" dirty="0" smtClean="0">
+                <a:solidFill>
+                  <a:srgbClr val="0070C0"/>
+                </a:solidFill>
+              </a:rPr>
+              <a:t>A two-part submission…</a:t>
+            </a:r>
+          </a:p>
+          <a:p>
+            <a:endParaRPr lang="en-US" dirty="0" smtClean="0">
+              <a:solidFill>
+                <a:srgbClr val="0070C0"/>
+              </a:solidFill>
+            </a:endParaRPr>
+          </a:p>
+          <a:p>
+            <a:r>
+              <a:rPr lang="en-US" dirty="0" smtClean="0">
+                <a:solidFill>
+                  <a:srgbClr val="0070C0"/>
+                </a:solidFill>
+              </a:rPr>
               <a:t>Part 1 – mid-term</a:t>
             </a:r>
           </a:p>
           <a:p>
-            <a:endParaRPr lang="en-US" dirty="0" smtClean="0"/>
-          </a:p>
-          <a:p>
-            <a:endParaRPr lang="en-US" dirty="0"/>
-          </a:p>
-          <a:p>
-            <a:endParaRPr lang="en-US" dirty="0" smtClean="0"/>
-          </a:p>
-          <a:p>
-            <a:endParaRPr lang="en-US" dirty="0"/>
-          </a:p>
-          <a:p>
-            <a:endParaRPr lang="en-US" dirty="0" smtClean="0"/>
-          </a:p>
-          <a:p>
-            <a:endParaRPr lang="en-US" dirty="0"/>
-          </a:p>
-          <a:p>
-            <a:r>
-              <a:rPr lang="en-US" dirty="0" smtClean="0"/>
+            <a:endParaRPr lang="en-US" dirty="0" smtClean="0">
+              <a:solidFill>
+                <a:srgbClr val="0070C0"/>
+              </a:solidFill>
+            </a:endParaRPr>
+          </a:p>
+          <a:p>
+            <a:endParaRPr lang="en-US" dirty="0">
+              <a:solidFill>
+                <a:srgbClr val="0070C0"/>
+              </a:solidFill>
+            </a:endParaRPr>
+          </a:p>
+          <a:p>
+            <a:endParaRPr lang="en-US" dirty="0" smtClean="0">
+              <a:solidFill>
+                <a:srgbClr val="0070C0"/>
+              </a:solidFill>
+            </a:endParaRPr>
+          </a:p>
+          <a:p>
+            <a:endParaRPr lang="en-US" dirty="0">
+              <a:solidFill>
+                <a:srgbClr val="0070C0"/>
+              </a:solidFill>
+            </a:endParaRPr>
+          </a:p>
+          <a:p>
+            <a:endParaRPr lang="en-US" dirty="0" smtClean="0">
+              <a:solidFill>
+                <a:srgbClr val="0070C0"/>
+              </a:solidFill>
+            </a:endParaRPr>
+          </a:p>
+          <a:p>
+            <a:endParaRPr lang="en-US" dirty="0">
+              <a:solidFill>
+                <a:srgbClr val="0070C0"/>
+              </a:solidFill>
+            </a:endParaRPr>
+          </a:p>
+          <a:p>
+            <a:r>
+              <a:rPr lang="en-US" dirty="0" smtClean="0">
+                <a:solidFill>
+                  <a:srgbClr val="0070C0"/>
+                </a:solidFill>
+              </a:rPr>
               <a:t>Part 2 – final report</a:t>
             </a:r>
-            <a:endParaRPr lang="en-US" dirty="0"/>
+            <a:endParaRPr lang="en-US" dirty="0">
+              <a:solidFill>
+                <a:srgbClr val="0070C0"/>
+              </a:solidFill>
+            </a:endParaRPr>
           </a:p>
         </p:txBody>
       </p:sp>
@@ -6568,6 +6636,36 @@
           <a:chExt cx="0" cy="0"/>
         </a:xfrm>
       </p:grpSpPr>
+      <p:pic>
+        <p:nvPicPr>
+          <p:cNvPr id="7" name="Picture 6"/>
+          <p:cNvPicPr>
+            <a:picLocks noChangeAspect="1"/>
+          </p:cNvPicPr>
+          <p:nvPr/>
+        </p:nvPicPr>
+        <p:blipFill>
+          <a:blip r:embed="rId2">
+            <a:extLst>
+              <a:ext uri="{28A0092B-C50C-407E-A947-70E740481C1C}">
+                <a14:useLocalDpi xmlns:a14="http://schemas.microsoft.com/office/drawing/2010/main" val="0"/>
+              </a:ext>
+            </a:extLst>
+          </a:blip>
+          <a:stretch>
+            <a:fillRect/>
+          </a:stretch>
+        </p:blipFill>
+        <p:spPr>
+          <a:xfrm>
+            <a:off x="8236290" y="1825625"/>
+            <a:ext cx="3839221" cy="2258008"/>
+          </a:xfrm>
+          <a:prstGeom prst="rect">
+            <a:avLst/>
+          </a:prstGeom>
+        </p:spPr>
+      </p:pic>
       <p:sp>
         <p:nvSpPr>
           <p:cNvPr id="2" name="Title 1"/>
@@ -6585,7 +6683,7 @@
           <a:p>
             <a:r>
               <a:rPr lang="en-US" dirty="0" smtClean="0"/>
-              <a:t>Slide 3</a:t>
+              <a:t>The Demographic Landscape</a:t>
             </a:r>
             <a:endParaRPr lang="en-US" dirty="0"/>
           </a:p>
@@ -6603,10 +6701,141 @@
         </p:nvSpPr>
         <p:spPr/>
         <p:txBody>
-          <a:bodyPr/>
-          <a:lstStyle/>
-          <a:p>
-            <a:endParaRPr lang="en-US"/>
+          <a:bodyPr>
+            <a:normAutofit fontScale="92500" lnSpcReduction="20000"/>
+          </a:bodyPr>
+          <a:lstStyle/>
+          <a:p>
+            <a:r>
+              <a:rPr lang="en-US" dirty="0" smtClean="0"/>
+              <a:t>Philadelphia is…</a:t>
+            </a:r>
+          </a:p>
+          <a:p>
+            <a:pPr lvl="1"/>
+            <a:r>
+              <a:rPr lang="en-US" dirty="0" smtClean="0"/>
+              <a:t>A city of 1.568 million people (2016 estimate)</a:t>
+            </a:r>
+          </a:p>
+          <a:p>
+            <a:pPr lvl="1"/>
+            <a:r>
+              <a:rPr lang="en-US" dirty="0" smtClean="0"/>
+              <a:t>The 6th most populous city in the United States</a:t>
+            </a:r>
+          </a:p>
+          <a:p>
+            <a:pPr lvl="1"/>
+            <a:r>
+              <a:rPr lang="en-US" dirty="0" smtClean="0"/>
+              <a:t>Centrally located on the Mid-Atlantic coast</a:t>
+            </a:r>
+          </a:p>
+          <a:p>
+            <a:pPr lvl="1"/>
+            <a:r>
+              <a:rPr lang="en-US" dirty="0" smtClean="0"/>
+              <a:t>The 5th busiest port on the Atlantic (25th busiest total)</a:t>
+            </a:r>
+          </a:p>
+          <a:p>
+            <a:pPr lvl="1"/>
+            <a:endParaRPr lang="en-US" dirty="0"/>
+          </a:p>
+          <a:p>
+            <a:r>
+              <a:rPr lang="en-US" dirty="0" smtClean="0"/>
+              <a:t>Philadelphia has…</a:t>
+            </a:r>
+          </a:p>
+          <a:p>
+            <a:pPr lvl="1"/>
+            <a:r>
+              <a:rPr lang="en-US" dirty="0" smtClean="0"/>
+              <a:t>500,000 fewer inhabitants than its peak in the 1950s-1960s</a:t>
+            </a:r>
+          </a:p>
+          <a:p>
+            <a:pPr lvl="1"/>
+            <a:r>
+              <a:rPr lang="en-US" dirty="0" smtClean="0"/>
+              <a:t>One of the lowest job growth rates at 1.1%*</a:t>
+            </a:r>
+          </a:p>
+          <a:p>
+            <a:pPr lvl="1"/>
+            <a:r>
+              <a:rPr lang="en-US" dirty="0" smtClean="0"/>
+              <a:t>A higher unemployment rate (5.9%) than the national average (4.3%)</a:t>
+            </a:r>
+          </a:p>
+          <a:p>
+            <a:pPr lvl="1"/>
+            <a:r>
+              <a:rPr lang="en-US" dirty="0" smtClean="0"/>
+              <a:t>The highest adult poverty rate (25%), and child poverty rate (38%)*</a:t>
+            </a:r>
+          </a:p>
+          <a:p>
+            <a:pPr lvl="1"/>
+            <a:r>
+              <a:rPr lang="en-US" dirty="0" smtClean="0"/>
+              <a:t>The lowest median income at $41,201*</a:t>
+            </a:r>
+          </a:p>
+          <a:p>
+            <a:pPr lvl="1"/>
+            <a:r>
+              <a:rPr lang="en-US" dirty="0" smtClean="0"/>
+              <a:t>… a bright future! </a:t>
+            </a:r>
+            <a:r>
+              <a:rPr lang="en-US" dirty="0" smtClean="0">
+                <a:sym typeface="Wingdings" panose="05000000000000000000" pitchFamily="2" charset="2"/>
+              </a:rPr>
+              <a:t></a:t>
+            </a:r>
+            <a:endParaRPr lang="en-US" dirty="0"/>
+          </a:p>
+        </p:txBody>
+      </p:sp>
+      <p:sp>
+        <p:nvSpPr>
+          <p:cNvPr id="4" name="TextBox 3"/>
+          <p:cNvSpPr txBox="1"/>
+          <p:nvPr/>
+        </p:nvSpPr>
+        <p:spPr>
+          <a:xfrm>
+            <a:off x="0" y="6601157"/>
+            <a:ext cx="12192000" cy="246221"/>
+          </a:xfrm>
+          <a:prstGeom prst="rect">
+            <a:avLst/>
+          </a:prstGeom>
+          <a:noFill/>
+        </p:spPr>
+        <p:txBody>
+          <a:bodyPr wrap="square" rtlCol="0">
+            <a:spAutoFit/>
+          </a:bodyPr>
+          <a:lstStyle/>
+          <a:p>
+            <a:pPr algn="ctr"/>
+            <a:r>
+              <a:rPr lang="en-US" sz="1000" dirty="0" smtClean="0"/>
+              <a:t>* = of the 25 largest, most populous American cities [source: </a:t>
+            </a:r>
+            <a:r>
+              <a:rPr lang="en-US" sz="1000" dirty="0" err="1" smtClean="0"/>
+              <a:t>ccd</a:t>
+            </a:r>
+            <a:r>
+              <a:rPr lang="en-US" sz="1000" dirty="0" smtClean="0"/>
+              <a:t>]</a:t>
+            </a:r>
+            <a:endParaRPr lang="en-US" sz="1000" dirty="0"/>
           </a:p>
         </p:txBody>
       </p:sp>
@@ -6672,35 +6901,797 @@
           <a:p>
             <a:r>
               <a:rPr lang="en-US" dirty="0" smtClean="0"/>
-              <a:t>Slide 4</a:t>
+              <a:t>Center City </a:t>
+            </a:r>
+            <a:r>
+              <a:rPr lang="en-US" dirty="0" smtClean="0"/>
+              <a:t>Reports</a:t>
             </a:r>
             <a:endParaRPr lang="en-US" dirty="0"/>
           </a:p>
         </p:txBody>
       </p:sp>
-      <p:sp>
-        <p:nvSpPr>
-          <p:cNvPr id="3" name="Content Placeholder 2"/>
-          <p:cNvSpPr>
-            <a:spLocks noGrp="1"/>
-          </p:cNvSpPr>
+      <p:pic>
+        <p:nvPicPr>
+          <p:cNvPr id="10" name="Content Placeholder 9"/>
+          <p:cNvPicPr>
+            <a:picLocks noGrp="1" noChangeAspect="1"/>
+          </p:cNvPicPr>
           <p:nvPr>
             <p:ph idx="1"/>
           </p:nvPr>
-        </p:nvSpPr>
-        <p:spPr/>
-        <p:txBody>
-          <a:bodyPr/>
-          <a:lstStyle/>
-          <a:p>
-            <a:endParaRPr lang="en-US"/>
-          </a:p>
-        </p:txBody>
-      </p:sp>
+        </p:nvPicPr>
+        <p:blipFill>
+          <a:blip r:embed="rId2">
+            <a:extLst>
+              <a:ext uri="{28A0092B-C50C-407E-A947-70E740481C1C}">
+                <a14:useLocalDpi xmlns:a14="http://schemas.microsoft.com/office/drawing/2010/main" val="0"/>
+              </a:ext>
+            </a:extLst>
+          </a:blip>
+          <a:stretch>
+            <a:fillRect/>
+          </a:stretch>
+        </p:blipFill>
+        <p:spPr>
+          <a:xfrm>
+            <a:off x="1794175" y="1825625"/>
+            <a:ext cx="8603649" cy="4351338"/>
+          </a:xfrm>
+          <a:ln>
+            <a:solidFill>
+              <a:schemeClr val="tx1"/>
+            </a:solidFill>
+          </a:ln>
+        </p:spPr>
+      </p:pic>
+      <p:sp>
+        <p:nvSpPr>
+          <p:cNvPr id="4" name="TextBox 3"/>
+          <p:cNvSpPr txBox="1"/>
+          <p:nvPr/>
+        </p:nvSpPr>
+        <p:spPr>
+          <a:xfrm>
+            <a:off x="5467738" y="735518"/>
+            <a:ext cx="6251007" cy="584775"/>
+          </a:xfrm>
+          <a:prstGeom prst="rect">
+            <a:avLst/>
+          </a:prstGeom>
+          <a:noFill/>
+        </p:spPr>
+        <p:txBody>
+          <a:bodyPr wrap="none" rtlCol="0">
+            <a:spAutoFit/>
+          </a:bodyPr>
+          <a:lstStyle/>
+          <a:p>
+            <a:r>
+              <a:rPr lang="en-US" sz="3200" i="1" dirty="0" smtClean="0">
+                <a:latin typeface="Times New Roman" panose="02020603050405020304" pitchFamily="18" charset="0"/>
+                <a:cs typeface="Times New Roman" panose="02020603050405020304" pitchFamily="18" charset="0"/>
+              </a:rPr>
+              <a:t>Philadelphia: An Incomplete Revival</a:t>
+            </a:r>
+            <a:endParaRPr lang="en-US" sz="3200" i="1" dirty="0">
+              <a:latin typeface="Times New Roman" panose="02020603050405020304" pitchFamily="18" charset="0"/>
+              <a:cs typeface="Times New Roman" panose="02020603050405020304" pitchFamily="18" charset="0"/>
+            </a:endParaRPr>
+          </a:p>
+        </p:txBody>
+      </p:sp>
+      <p:pic>
+        <p:nvPicPr>
+          <p:cNvPr id="11" name="Picture 10"/>
+          <p:cNvPicPr>
+            <a:picLocks noChangeAspect="1"/>
+          </p:cNvPicPr>
+          <p:nvPr/>
+        </p:nvPicPr>
+        <p:blipFill>
+          <a:blip r:embed="rId3">
+            <a:extLst>
+              <a:ext uri="{28A0092B-C50C-407E-A947-70E740481C1C}">
+                <a14:useLocalDpi xmlns:a14="http://schemas.microsoft.com/office/drawing/2010/main" val="0"/>
+              </a:ext>
+            </a:extLst>
+          </a:blip>
+          <a:stretch>
+            <a:fillRect/>
+          </a:stretch>
+        </p:blipFill>
+        <p:spPr>
+          <a:xfrm>
+            <a:off x="1163336" y="1788351"/>
+            <a:ext cx="10190464" cy="4425885"/>
+          </a:xfrm>
+          <a:prstGeom prst="rect">
+            <a:avLst/>
+          </a:prstGeom>
+          <a:ln>
+            <a:solidFill>
+              <a:schemeClr val="tx1"/>
+            </a:solidFill>
+          </a:ln>
+        </p:spPr>
+      </p:pic>
+      <p:pic>
+        <p:nvPicPr>
+          <p:cNvPr id="12" name="Picture 11"/>
+          <p:cNvPicPr>
+            <a:picLocks noChangeAspect="1"/>
+          </p:cNvPicPr>
+          <p:nvPr/>
+        </p:nvPicPr>
+        <p:blipFill>
+          <a:blip r:embed="rId4">
+            <a:extLst>
+              <a:ext uri="{28A0092B-C50C-407E-A947-70E740481C1C}">
+                <a14:useLocalDpi xmlns:a14="http://schemas.microsoft.com/office/drawing/2010/main" val="0"/>
+              </a:ext>
+            </a:extLst>
+          </a:blip>
+          <a:stretch>
+            <a:fillRect/>
+          </a:stretch>
+        </p:blipFill>
+        <p:spPr>
+          <a:xfrm>
+            <a:off x="1150555" y="1570318"/>
+            <a:ext cx="10203245" cy="4861949"/>
+          </a:xfrm>
+          <a:prstGeom prst="rect">
+            <a:avLst/>
+          </a:prstGeom>
+          <a:ln>
+            <a:solidFill>
+              <a:schemeClr val="tx1"/>
+            </a:solidFill>
+          </a:ln>
+        </p:spPr>
+      </p:pic>
     </p:spTree>
     <p:extLst>
       <p:ext uri="{BB962C8B-B14F-4D97-AF65-F5344CB8AC3E}">
         <p14:creationId xmlns:p14="http://schemas.microsoft.com/office/powerpoint/2010/main" val="3541835792"/>
+      </p:ext>
+    </p:extLst>
+  </p:cSld>
+  <p:clrMapOvr>
+    <a:masterClrMapping/>
+  </p:clrMapOvr>
+  <mc:AlternateContent xmlns:mc="http://schemas.openxmlformats.org/markup-compatibility/2006" xmlns:p14="http://schemas.microsoft.com/office/powerpoint/2010/main">
+    <mc:Choice Requires="p14">
+      <p:transition spd="slow" p14:dur="2000" advTm="15000"/>
+    </mc:Choice>
+    <mc:Fallback xmlns="">
+      <p:transition spd="slow" advTm="15000"/>
+    </mc:Fallback>
+  </mc:AlternateContent>
+  <p:timing>
+    <p:tnLst>
+      <p:par>
+        <p:cTn id="1" dur="indefinite" restart="never" nodeType="tmRoot">
+          <p:childTnLst>
+            <p:seq concurrent="1" nextAc="seek">
+              <p:cTn id="2" dur="indefinite" nodeType="mainSeq">
+                <p:childTnLst>
+                  <p:par>
+                    <p:cTn id="3" fill="hold">
+                      <p:stCondLst>
+                        <p:cond delay="indefinite"/>
+                      </p:stCondLst>
+                      <p:childTnLst>
+                        <p:par>
+                          <p:cTn id="4" fill="hold">
+                            <p:stCondLst>
+                              <p:cond delay="0"/>
+                            </p:stCondLst>
+                            <p:childTnLst>
+                              <p:par>
+                                <p:cTn id="5" presetID="1" presetClass="entr" presetSubtype="0" fill="hold" nodeType="clickEffect">
+                                  <p:stCondLst>
+                                    <p:cond delay="0"/>
+                                  </p:stCondLst>
+                                  <p:childTnLst>
+                                    <p:set>
+                                      <p:cBhvr>
+                                        <p:cTn id="6" dur="1" fill="hold">
+                                          <p:stCondLst>
+                                            <p:cond delay="0"/>
+                                          </p:stCondLst>
+                                        </p:cTn>
+                                        <p:tgtEl>
+                                          <p:spTgt spid="10"/>
+                                        </p:tgtEl>
+                                        <p:attrNameLst>
+                                          <p:attrName>style.visibility</p:attrName>
+                                        </p:attrNameLst>
+                                      </p:cBhvr>
+                                      <p:to>
+                                        <p:strVal val="visible"/>
+                                      </p:to>
+                                    </p:set>
+                                  </p:childTnLst>
+                                </p:cTn>
+                              </p:par>
+                            </p:childTnLst>
+                          </p:cTn>
+                        </p:par>
+                      </p:childTnLst>
+                    </p:cTn>
+                  </p:par>
+                  <p:par>
+                    <p:cTn id="7" fill="hold">
+                      <p:stCondLst>
+                        <p:cond delay="indefinite"/>
+                      </p:stCondLst>
+                      <p:childTnLst>
+                        <p:par>
+                          <p:cTn id="8" fill="hold">
+                            <p:stCondLst>
+                              <p:cond delay="0"/>
+                            </p:stCondLst>
+                            <p:childTnLst>
+                              <p:par>
+                                <p:cTn id="9" presetID="1" presetClass="entr" presetSubtype="0" fill="hold" nodeType="clickEffect">
+                                  <p:stCondLst>
+                                    <p:cond delay="5000"/>
+                                  </p:stCondLst>
+                                  <p:childTnLst>
+                                    <p:set>
+                                      <p:cBhvr>
+                                        <p:cTn id="10" dur="1" fill="hold">
+                                          <p:stCondLst>
+                                            <p:cond delay="0"/>
+                                          </p:stCondLst>
+                                        </p:cTn>
+                                        <p:tgtEl>
+                                          <p:spTgt spid="11"/>
+                                        </p:tgtEl>
+                                        <p:attrNameLst>
+                                          <p:attrName>style.visibility</p:attrName>
+                                        </p:attrNameLst>
+                                      </p:cBhvr>
+                                      <p:to>
+                                        <p:strVal val="visible"/>
+                                      </p:to>
+                                    </p:set>
+                                  </p:childTnLst>
+                                </p:cTn>
+                              </p:par>
+                            </p:childTnLst>
+                          </p:cTn>
+                        </p:par>
+                      </p:childTnLst>
+                    </p:cTn>
+                  </p:par>
+                  <p:par>
+                    <p:cTn id="11" fill="hold">
+                      <p:stCondLst>
+                        <p:cond delay="indefinite"/>
+                      </p:stCondLst>
+                      <p:childTnLst>
+                        <p:par>
+                          <p:cTn id="12" fill="hold">
+                            <p:stCondLst>
+                              <p:cond delay="0"/>
+                            </p:stCondLst>
+                            <p:childTnLst>
+                              <p:par>
+                                <p:cTn id="13" presetID="1" presetClass="entr" presetSubtype="0" fill="hold" nodeType="clickEffect">
+                                  <p:stCondLst>
+                                    <p:cond delay="5000"/>
+                                  </p:stCondLst>
+                                  <p:childTnLst>
+                                    <p:set>
+                                      <p:cBhvr>
+                                        <p:cTn id="14" dur="1" fill="hold">
+                                          <p:stCondLst>
+                                            <p:cond delay="0"/>
+                                          </p:stCondLst>
+                                        </p:cTn>
+                                        <p:tgtEl>
+                                          <p:spTgt spid="12"/>
+                                        </p:tgtEl>
+                                        <p:attrNameLst>
+                                          <p:attrName>style.visibility</p:attrName>
+                                        </p:attrNameLst>
+                                      </p:cBhvr>
+                                      <p:to>
+                                        <p:strVal val="visible"/>
+                                      </p:to>
+                                    </p:set>
+                                  </p:childTnLst>
+                                </p:cTn>
+                              </p:par>
+                            </p:childTnLst>
+                          </p:cTn>
+                        </p:par>
+                      </p:childTnLst>
+                    </p:cTn>
+                  </p:par>
+                </p:childTnLst>
+              </p:cTn>
+              <p:prevCondLst>
+                <p:cond evt="onPrev" delay="0">
+                  <p:tgtEl>
+                    <p:sldTgt/>
+                  </p:tgtEl>
+                </p:cond>
+              </p:prevCondLst>
+              <p:nextCondLst>
+                <p:cond evt="onNext" delay="0">
+                  <p:tgtEl>
+                    <p:sldTgt/>
+                  </p:tgtEl>
+                </p:cond>
+              </p:nextCondLst>
+            </p:seq>
+          </p:childTnLst>
+        </p:cTn>
+      </p:par>
+    </p:tnLst>
+  </p:timing>
+</p:sld>
+</file>
+
+<file path=ppt/slides/slide6.xml><?xml version="1.0" encoding="utf-8"?>
+<p:sld xmlns:a="http://schemas.openxmlformats.org/drawingml/2006/main" xmlns:r="http://schemas.openxmlformats.org/officeDocument/2006/relationships" xmlns:p="http://schemas.openxmlformats.org/presentationml/2006/main">
+  <p:cSld>
+    <p:spTree>
+      <p:nvGrpSpPr>
+        <p:cNvPr id="1" name=""/>
+        <p:cNvGrpSpPr/>
+        <p:nvPr/>
+      </p:nvGrpSpPr>
+      <p:grpSpPr>
+        <a:xfrm>
+          <a:off x="0" y="0"/>
+          <a:ext cx="0" cy="0"/>
+          <a:chOff x="0" y="0"/>
+          <a:chExt cx="0" cy="0"/>
+        </a:xfrm>
+      </p:grpSpPr>
+      <p:sp>
+        <p:nvSpPr>
+          <p:cNvPr id="2" name="Title 1"/>
+          <p:cNvSpPr>
+            <a:spLocks noGrp="1"/>
+          </p:cNvSpPr>
+          <p:nvPr>
+            <p:ph type="title"/>
+          </p:nvPr>
+        </p:nvSpPr>
+        <p:spPr/>
+        <p:txBody>
+          <a:bodyPr/>
+          <a:lstStyle/>
+          <a:p>
+            <a:r>
+              <a:rPr lang="en-US" dirty="0" smtClean="0"/>
+              <a:t>Brookings</a:t>
+            </a:r>
+            <a:endParaRPr lang="en-US" dirty="0"/>
+          </a:p>
+        </p:txBody>
+      </p:sp>
+      <p:pic>
+        <p:nvPicPr>
+          <p:cNvPr id="5" name="Content Placeholder 4"/>
+          <p:cNvPicPr>
+            <a:picLocks noGrp="1" noChangeAspect="1"/>
+          </p:cNvPicPr>
+          <p:nvPr>
+            <p:ph idx="1"/>
+          </p:nvPr>
+        </p:nvPicPr>
+        <p:blipFill>
+          <a:blip r:embed="rId2">
+            <a:extLst>
+              <a:ext uri="{28A0092B-C50C-407E-A947-70E740481C1C}">
+                <a14:useLocalDpi xmlns:a14="http://schemas.microsoft.com/office/drawing/2010/main" val="0"/>
+              </a:ext>
+            </a:extLst>
+          </a:blip>
+          <a:stretch>
+            <a:fillRect/>
+          </a:stretch>
+        </p:blipFill>
+        <p:spPr>
+          <a:xfrm>
+            <a:off x="1257760" y="1690686"/>
+            <a:ext cx="8977922" cy="5050081"/>
+          </a:xfrm>
+        </p:spPr>
+      </p:pic>
+      <p:sp>
+        <p:nvSpPr>
+          <p:cNvPr id="4" name="TextBox 3"/>
+          <p:cNvSpPr txBox="1"/>
+          <p:nvPr/>
+        </p:nvSpPr>
+        <p:spPr>
+          <a:xfrm>
+            <a:off x="3489648" y="735518"/>
+            <a:ext cx="6038000" cy="584775"/>
+          </a:xfrm>
+          <a:prstGeom prst="rect">
+            <a:avLst/>
+          </a:prstGeom>
+          <a:noFill/>
+        </p:spPr>
+        <p:txBody>
+          <a:bodyPr wrap="none" rtlCol="0">
+            <a:spAutoFit/>
+          </a:bodyPr>
+          <a:lstStyle/>
+          <a:p>
+            <a:r>
+              <a:rPr lang="en-US" sz="3200" i="1" dirty="0" smtClean="0">
+                <a:latin typeface="Times New Roman" panose="02020603050405020304" pitchFamily="18" charset="0"/>
+                <a:cs typeface="Times New Roman" panose="02020603050405020304" pitchFamily="18" charset="0"/>
+              </a:rPr>
+              <a:t>Metro Monitor 2017 (Philadelphia)</a:t>
+            </a:r>
+            <a:endParaRPr lang="en-US" sz="3200" i="1" dirty="0">
+              <a:latin typeface="Times New Roman" panose="02020603050405020304" pitchFamily="18" charset="0"/>
+              <a:cs typeface="Times New Roman" panose="02020603050405020304" pitchFamily="18" charset="0"/>
+            </a:endParaRPr>
+          </a:p>
+        </p:txBody>
+      </p:sp>
+      <p:pic>
+        <p:nvPicPr>
+          <p:cNvPr id="7" name="Picture 6"/>
+          <p:cNvPicPr>
+            <a:picLocks noChangeAspect="1"/>
+          </p:cNvPicPr>
+          <p:nvPr/>
+        </p:nvPicPr>
+        <p:blipFill>
+          <a:blip r:embed="rId3">
+            <a:extLst>
+              <a:ext uri="{28A0092B-C50C-407E-A947-70E740481C1C}">
+                <a14:useLocalDpi xmlns:a14="http://schemas.microsoft.com/office/drawing/2010/main" val="0"/>
+              </a:ext>
+            </a:extLst>
+          </a:blip>
+          <a:stretch>
+            <a:fillRect/>
+          </a:stretch>
+        </p:blipFill>
+        <p:spPr>
+          <a:xfrm>
+            <a:off x="1370664" y="1390195"/>
+            <a:ext cx="8752113" cy="5350572"/>
+          </a:xfrm>
+          <a:prstGeom prst="rect">
+            <a:avLst/>
+          </a:prstGeom>
+        </p:spPr>
+      </p:pic>
+      <p:pic>
+        <p:nvPicPr>
+          <p:cNvPr id="8" name="Picture 7"/>
+          <p:cNvPicPr>
+            <a:picLocks noChangeAspect="1"/>
+          </p:cNvPicPr>
+          <p:nvPr/>
+        </p:nvPicPr>
+        <p:blipFill>
+          <a:blip r:embed="rId4">
+            <a:extLst>
+              <a:ext uri="{28A0092B-C50C-407E-A947-70E740481C1C}">
+                <a14:useLocalDpi xmlns:a14="http://schemas.microsoft.com/office/drawing/2010/main" val="0"/>
+              </a:ext>
+            </a:extLst>
+          </a:blip>
+          <a:stretch>
+            <a:fillRect/>
+          </a:stretch>
+        </p:blipFill>
+        <p:spPr>
+          <a:xfrm>
+            <a:off x="770618" y="1390195"/>
+            <a:ext cx="10167755" cy="5467805"/>
+          </a:xfrm>
+          <a:prstGeom prst="rect">
+            <a:avLst/>
+          </a:prstGeom>
+        </p:spPr>
+      </p:pic>
+    </p:spTree>
+    <p:extLst>
+      <p:ext uri="{BB962C8B-B14F-4D97-AF65-F5344CB8AC3E}">
+        <p14:creationId xmlns:p14="http://schemas.microsoft.com/office/powerpoint/2010/main" val="3692450057"/>
+      </p:ext>
+    </p:extLst>
+  </p:cSld>
+  <p:clrMapOvr>
+    <a:masterClrMapping/>
+  </p:clrMapOvr>
+  <mc:AlternateContent xmlns:mc="http://schemas.openxmlformats.org/markup-compatibility/2006" xmlns:p14="http://schemas.microsoft.com/office/powerpoint/2010/main">
+    <mc:Choice Requires="p14">
+      <p:transition spd="slow" p14:dur="2000" advTm="15000"/>
+    </mc:Choice>
+    <mc:Fallback xmlns="">
+      <p:transition spd="slow" advTm="15000"/>
+    </mc:Fallback>
+  </mc:AlternateContent>
+  <p:timing>
+    <p:tnLst>
+      <p:par>
+        <p:cTn id="1" dur="indefinite" restart="never" nodeType="tmRoot">
+          <p:childTnLst>
+            <p:seq concurrent="1" nextAc="seek">
+              <p:cTn id="2" dur="indefinite" nodeType="mainSeq">
+                <p:childTnLst>
+                  <p:par>
+                    <p:cTn id="3" fill="hold">
+                      <p:stCondLst>
+                        <p:cond delay="indefinite"/>
+                      </p:stCondLst>
+                      <p:childTnLst>
+                        <p:par>
+                          <p:cTn id="4" fill="hold">
+                            <p:stCondLst>
+                              <p:cond delay="0"/>
+                            </p:stCondLst>
+                            <p:childTnLst>
+                              <p:par>
+                                <p:cTn id="5" presetID="1" presetClass="entr" presetSubtype="0" fill="hold" nodeType="clickEffect">
+                                  <p:stCondLst>
+                                    <p:cond delay="0"/>
+                                  </p:stCondLst>
+                                  <p:childTnLst>
+                                    <p:set>
+                                      <p:cBhvr>
+                                        <p:cTn id="6" dur="1" fill="hold">
+                                          <p:stCondLst>
+                                            <p:cond delay="0"/>
+                                          </p:stCondLst>
+                                        </p:cTn>
+                                        <p:tgtEl>
+                                          <p:spTgt spid="5"/>
+                                        </p:tgtEl>
+                                        <p:attrNameLst>
+                                          <p:attrName>style.visibility</p:attrName>
+                                        </p:attrNameLst>
+                                      </p:cBhvr>
+                                      <p:to>
+                                        <p:strVal val="visible"/>
+                                      </p:to>
+                                    </p:set>
+                                  </p:childTnLst>
+                                </p:cTn>
+                              </p:par>
+                            </p:childTnLst>
+                          </p:cTn>
+                        </p:par>
+                      </p:childTnLst>
+                    </p:cTn>
+                  </p:par>
+                  <p:par>
+                    <p:cTn id="7" fill="hold">
+                      <p:stCondLst>
+                        <p:cond delay="indefinite"/>
+                      </p:stCondLst>
+                      <p:childTnLst>
+                        <p:par>
+                          <p:cTn id="8" fill="hold">
+                            <p:stCondLst>
+                              <p:cond delay="0"/>
+                            </p:stCondLst>
+                            <p:childTnLst>
+                              <p:par>
+                                <p:cTn id="9" presetID="1" presetClass="entr" presetSubtype="0" fill="hold" nodeType="clickEffect">
+                                  <p:stCondLst>
+                                    <p:cond delay="5000"/>
+                                  </p:stCondLst>
+                                  <p:childTnLst>
+                                    <p:set>
+                                      <p:cBhvr>
+                                        <p:cTn id="10" dur="1" fill="hold">
+                                          <p:stCondLst>
+                                            <p:cond delay="0"/>
+                                          </p:stCondLst>
+                                        </p:cTn>
+                                        <p:tgtEl>
+                                          <p:spTgt spid="7"/>
+                                        </p:tgtEl>
+                                        <p:attrNameLst>
+                                          <p:attrName>style.visibility</p:attrName>
+                                        </p:attrNameLst>
+                                      </p:cBhvr>
+                                      <p:to>
+                                        <p:strVal val="visible"/>
+                                      </p:to>
+                                    </p:set>
+                                  </p:childTnLst>
+                                </p:cTn>
+                              </p:par>
+                            </p:childTnLst>
+                          </p:cTn>
+                        </p:par>
+                      </p:childTnLst>
+                    </p:cTn>
+                  </p:par>
+                  <p:par>
+                    <p:cTn id="11" fill="hold">
+                      <p:stCondLst>
+                        <p:cond delay="indefinite"/>
+                      </p:stCondLst>
+                      <p:childTnLst>
+                        <p:par>
+                          <p:cTn id="12" fill="hold">
+                            <p:stCondLst>
+                              <p:cond delay="0"/>
+                            </p:stCondLst>
+                            <p:childTnLst>
+                              <p:par>
+                                <p:cTn id="13" presetID="1" presetClass="entr" presetSubtype="0" fill="hold" nodeType="clickEffect">
+                                  <p:stCondLst>
+                                    <p:cond delay="5000"/>
+                                  </p:stCondLst>
+                                  <p:childTnLst>
+                                    <p:set>
+                                      <p:cBhvr>
+                                        <p:cTn id="14" dur="1" fill="hold">
+                                          <p:stCondLst>
+                                            <p:cond delay="0"/>
+                                          </p:stCondLst>
+                                        </p:cTn>
+                                        <p:tgtEl>
+                                          <p:spTgt spid="8"/>
+                                        </p:tgtEl>
+                                        <p:attrNameLst>
+                                          <p:attrName>style.visibility</p:attrName>
+                                        </p:attrNameLst>
+                                      </p:cBhvr>
+                                      <p:to>
+                                        <p:strVal val="visible"/>
+                                      </p:to>
+                                    </p:set>
+                                  </p:childTnLst>
+                                </p:cTn>
+                              </p:par>
+                            </p:childTnLst>
+                          </p:cTn>
+                        </p:par>
+                      </p:childTnLst>
+                    </p:cTn>
+                  </p:par>
+                </p:childTnLst>
+              </p:cTn>
+              <p:prevCondLst>
+                <p:cond evt="onPrev" delay="0">
+                  <p:tgtEl>
+                    <p:sldTgt/>
+                  </p:tgtEl>
+                </p:cond>
+              </p:prevCondLst>
+              <p:nextCondLst>
+                <p:cond evt="onNext" delay="0">
+                  <p:tgtEl>
+                    <p:sldTgt/>
+                  </p:tgtEl>
+                </p:cond>
+              </p:nextCondLst>
+            </p:seq>
+          </p:childTnLst>
+        </p:cTn>
+      </p:par>
+    </p:tnLst>
+  </p:timing>
+</p:sld>
+</file>
+
+<file path=ppt/slides/slide7.xml><?xml version="1.0" encoding="utf-8"?>
+<p:sld xmlns:a="http://schemas.openxmlformats.org/drawingml/2006/main" xmlns:r="http://schemas.openxmlformats.org/officeDocument/2006/relationships" xmlns:p="http://schemas.openxmlformats.org/presentationml/2006/main">
+  <p:cSld>
+    <p:spTree>
+      <p:nvGrpSpPr>
+        <p:cNvPr id="1" name=""/>
+        <p:cNvGrpSpPr/>
+        <p:nvPr/>
+      </p:nvGrpSpPr>
+      <p:grpSpPr>
+        <a:xfrm>
+          <a:off x="0" y="0"/>
+          <a:ext cx="0" cy="0"/>
+          <a:chOff x="0" y="0"/>
+          <a:chExt cx="0" cy="0"/>
+        </a:xfrm>
+      </p:grpSpPr>
+      <p:sp>
+        <p:nvSpPr>
+          <p:cNvPr id="2" name="Title 1"/>
+          <p:cNvSpPr>
+            <a:spLocks noGrp="1"/>
+          </p:cNvSpPr>
+          <p:nvPr>
+            <p:ph type="title"/>
+          </p:nvPr>
+        </p:nvSpPr>
+        <p:spPr/>
+        <p:txBody>
+          <a:bodyPr/>
+          <a:lstStyle/>
+          <a:p>
+            <a:r>
+              <a:rPr lang="en-US" dirty="0" smtClean="0"/>
+              <a:t>Acquiring some data</a:t>
+            </a:r>
+            <a:endParaRPr lang="en-US" dirty="0"/>
+          </a:p>
+        </p:txBody>
+      </p:sp>
+      <p:sp>
+        <p:nvSpPr>
+          <p:cNvPr id="3" name="Content Placeholder 2"/>
+          <p:cNvSpPr>
+            <a:spLocks noGrp="1"/>
+          </p:cNvSpPr>
+          <p:nvPr>
+            <p:ph idx="1"/>
+          </p:nvPr>
+        </p:nvSpPr>
+        <p:spPr/>
+        <p:txBody>
+          <a:bodyPr/>
+          <a:lstStyle/>
+          <a:p>
+            <a:r>
+              <a:rPr lang="en-US" dirty="0"/>
+              <a:t>Data Sources</a:t>
+            </a:r>
+          </a:p>
+          <a:p>
+            <a:pPr lvl="1"/>
+            <a:r>
+              <a:rPr lang="en-US" dirty="0"/>
+              <a:t>Population: U.S. Census</a:t>
+            </a:r>
+          </a:p>
+          <a:p>
+            <a:pPr lvl="1"/>
+            <a:r>
+              <a:rPr lang="en-US" dirty="0"/>
+              <a:t>Employment: U.S. Bureau of Labor Statistics</a:t>
+            </a:r>
+          </a:p>
+          <a:p>
+            <a:r>
+              <a:rPr lang="en-US" dirty="0"/>
+              <a:t>Methods:</a:t>
+            </a:r>
+          </a:p>
+          <a:p>
+            <a:pPr lvl="1"/>
+            <a:r>
+              <a:rPr lang="en-US" dirty="0" smtClean="0"/>
+              <a:t>Direct Download</a:t>
+            </a:r>
+            <a:endParaRPr lang="en-US" dirty="0"/>
+          </a:p>
+          <a:p>
+            <a:pPr lvl="1"/>
+            <a:r>
+              <a:rPr lang="en-US" dirty="0"/>
+              <a:t>API</a:t>
+            </a:r>
+          </a:p>
+          <a:p>
+            <a:endParaRPr lang="en-US" dirty="0"/>
+          </a:p>
+        </p:txBody>
+      </p:sp>
+    </p:spTree>
+    <p:extLst>
+      <p:ext uri="{BB962C8B-B14F-4D97-AF65-F5344CB8AC3E}">
+        <p14:creationId xmlns:p14="http://schemas.microsoft.com/office/powerpoint/2010/main" val="2808308527"/>
       </p:ext>
     </p:extLst>
   </p:cSld>
@@ -6725,166 +7716,6 @@
 </p:sld>
 </file>
 
-<file path=ppt/slides/slide6.xml><?xml version="1.0" encoding="utf-8"?>
-<p:sld xmlns:a="http://schemas.openxmlformats.org/drawingml/2006/main" xmlns:r="http://schemas.openxmlformats.org/officeDocument/2006/relationships" xmlns:p="http://schemas.openxmlformats.org/presentationml/2006/main">
-  <p:cSld>
-    <p:spTree>
-      <p:nvGrpSpPr>
-        <p:cNvPr id="1" name=""/>
-        <p:cNvGrpSpPr/>
-        <p:nvPr/>
-      </p:nvGrpSpPr>
-      <p:grpSpPr>
-        <a:xfrm>
-          <a:off x="0" y="0"/>
-          <a:ext cx="0" cy="0"/>
-          <a:chOff x="0" y="0"/>
-          <a:chExt cx="0" cy="0"/>
-        </a:xfrm>
-      </p:grpSpPr>
-      <p:sp>
-        <p:nvSpPr>
-          <p:cNvPr id="2" name="Title 1"/>
-          <p:cNvSpPr>
-            <a:spLocks noGrp="1"/>
-          </p:cNvSpPr>
-          <p:nvPr>
-            <p:ph type="title"/>
-          </p:nvPr>
-        </p:nvSpPr>
-        <p:spPr/>
-        <p:txBody>
-          <a:bodyPr/>
-          <a:lstStyle/>
-          <a:p>
-            <a:r>
-              <a:rPr lang="en-US" dirty="0" smtClean="0"/>
-              <a:t>Slide 5</a:t>
-            </a:r>
-            <a:endParaRPr lang="en-US" dirty="0"/>
-          </a:p>
-        </p:txBody>
-      </p:sp>
-      <p:sp>
-        <p:nvSpPr>
-          <p:cNvPr id="3" name="Content Placeholder 2"/>
-          <p:cNvSpPr>
-            <a:spLocks noGrp="1"/>
-          </p:cNvSpPr>
-          <p:nvPr>
-            <p:ph idx="1"/>
-          </p:nvPr>
-        </p:nvSpPr>
-        <p:spPr/>
-        <p:txBody>
-          <a:bodyPr/>
-          <a:lstStyle/>
-          <a:p>
-            <a:endParaRPr lang="en-US"/>
-          </a:p>
-        </p:txBody>
-      </p:sp>
-    </p:spTree>
-    <p:extLst>
-      <p:ext uri="{BB962C8B-B14F-4D97-AF65-F5344CB8AC3E}">
-        <p14:creationId xmlns:p14="http://schemas.microsoft.com/office/powerpoint/2010/main" val="3692450057"/>
-      </p:ext>
-    </p:extLst>
-  </p:cSld>
-  <p:clrMapOvr>
-    <a:masterClrMapping/>
-  </p:clrMapOvr>
-  <mc:AlternateContent xmlns:mc="http://schemas.openxmlformats.org/markup-compatibility/2006" xmlns:p14="http://schemas.microsoft.com/office/powerpoint/2010/main">
-    <mc:Choice Requires="p14">
-      <p:transition spd="slow" p14:dur="2000" advTm="15000"/>
-    </mc:Choice>
-    <mc:Fallback xmlns="">
-      <p:transition spd="slow" advTm="15000"/>
-    </mc:Fallback>
-  </mc:AlternateContent>
-</p:sld>
-</file>
-
-<file path=ppt/slides/slide7.xml><?xml version="1.0" encoding="utf-8"?>
-<p:sld xmlns:a="http://schemas.openxmlformats.org/drawingml/2006/main" xmlns:r="http://schemas.openxmlformats.org/officeDocument/2006/relationships" xmlns:p="http://schemas.openxmlformats.org/presentationml/2006/main">
-  <p:cSld>
-    <p:spTree>
-      <p:nvGrpSpPr>
-        <p:cNvPr id="1" name=""/>
-        <p:cNvGrpSpPr/>
-        <p:nvPr/>
-      </p:nvGrpSpPr>
-      <p:grpSpPr>
-        <a:xfrm>
-          <a:off x="0" y="0"/>
-          <a:ext cx="0" cy="0"/>
-          <a:chOff x="0" y="0"/>
-          <a:chExt cx="0" cy="0"/>
-        </a:xfrm>
-      </p:grpSpPr>
-      <p:sp>
-        <p:nvSpPr>
-          <p:cNvPr id="2" name="Title 1"/>
-          <p:cNvSpPr>
-            <a:spLocks noGrp="1"/>
-          </p:cNvSpPr>
-          <p:nvPr>
-            <p:ph type="title"/>
-          </p:nvPr>
-        </p:nvSpPr>
-        <p:spPr/>
-        <p:txBody>
-          <a:bodyPr/>
-          <a:lstStyle/>
-          <a:p>
-            <a:r>
-              <a:rPr lang="en-US" dirty="0" smtClean="0"/>
-              <a:t>Slide 6</a:t>
-            </a:r>
-            <a:endParaRPr lang="en-US" dirty="0"/>
-          </a:p>
-        </p:txBody>
-      </p:sp>
-      <p:sp>
-        <p:nvSpPr>
-          <p:cNvPr id="3" name="Content Placeholder 2"/>
-          <p:cNvSpPr>
-            <a:spLocks noGrp="1"/>
-          </p:cNvSpPr>
-          <p:nvPr>
-            <p:ph idx="1"/>
-          </p:nvPr>
-        </p:nvSpPr>
-        <p:spPr/>
-        <p:txBody>
-          <a:bodyPr/>
-          <a:lstStyle/>
-          <a:p>
-            <a:endParaRPr lang="en-US"/>
-          </a:p>
-        </p:txBody>
-      </p:sp>
-    </p:spTree>
-    <p:extLst>
-      <p:ext uri="{BB962C8B-B14F-4D97-AF65-F5344CB8AC3E}">
-        <p14:creationId xmlns:p14="http://schemas.microsoft.com/office/powerpoint/2010/main" val="2808308527"/>
-      </p:ext>
-    </p:extLst>
-  </p:cSld>
-  <p:clrMapOvr>
-    <a:masterClrMapping/>
-  </p:clrMapOvr>
-  <mc:AlternateContent xmlns:mc="http://schemas.openxmlformats.org/markup-compatibility/2006" xmlns:p14="http://schemas.microsoft.com/office/powerpoint/2010/main">
-    <mc:Choice Requires="p14">
-      <p:transition spd="slow" p14:dur="2000" advTm="15000"/>
-    </mc:Choice>
-    <mc:Fallback xmlns="">
-      <p:transition spd="slow" advTm="15000"/>
-    </mc:Fallback>
-  </mc:AlternateContent>
-</p:sld>
-</file>
-
 <file path=ppt/slides/slide8.xml><?xml version="1.0" encoding="utf-8"?>
 <p:sld xmlns:a="http://schemas.openxmlformats.org/drawingml/2006/main" xmlns:r="http://schemas.openxmlformats.org/officeDocument/2006/relationships" xmlns:p="http://schemas.openxmlformats.org/presentationml/2006/main">
   <p:cSld>
@@ -6919,7 +7750,7 @@
           <a:p>
             <a:r>
               <a:rPr lang="en-US" dirty="0" smtClean="0"/>
-              <a:t>Slide 7</a:t>
+              <a:t>Making the data useful (for this project)</a:t>
             </a:r>
             <a:endParaRPr lang="en-US" dirty="0"/>
           </a:p>
@@ -6962,6 +7793,13 @@
       <p:transition spd="slow" advTm="15000"/>
     </mc:Fallback>
   </mc:AlternateContent>
+  <p:timing>
+    <p:tnLst>
+      <p:par>
+        <p:cTn id="1" dur="indefinite" restart="never" nodeType="tmRoot"/>
+      </p:par>
+    </p:tnLst>
+  </p:timing>
 </p:sld>
 </file>
 
@@ -6998,8 +7836,8 @@
           <a:lstStyle/>
           <a:p>
             <a:r>
-              <a:rPr lang="en-US" dirty="0" smtClean="0"/>
-              <a:t>Slide 8</a:t>
+              <a:rPr lang="en-US" dirty="0"/>
+              <a:t>Examining the economic indicators</a:t>
             </a:r>
             <a:endParaRPr lang="en-US" dirty="0"/>
           </a:p>
@@ -7042,6 +7880,13 @@
       <p:transition spd="slow" advTm="15000"/>
     </mc:Fallback>
   </mc:AlternateContent>
+  <p:timing>
+    <p:tnLst>
+      <p:par>
+        <p:cTn id="1" dur="indefinite" restart="never" nodeType="tmRoot"/>
+      </p:par>
+    </p:tnLst>
+  </p:timing>
 </p:sld>
 </file>
 

</xml_diff>

<commit_message>
Mid-term presentation: BLS data format examples
</commit_message>
<xml_diff>
--- a/project/mid-term-presentation.pptx
+++ b/project/mid-term-presentation.pptx
@@ -4097,8 +4097,8 @@
           <a:lstStyle/>
           <a:p>
             <a:r>
-              <a:rPr lang="en-US" dirty="0" smtClean="0"/>
-              <a:t>Slide 9</a:t>
+              <a:rPr lang="en-US" dirty="0"/>
+              <a:t>Examining the economic indicators</a:t>
             </a:r>
             <a:endParaRPr lang="en-US" dirty="0"/>
           </a:p>
@@ -4119,7 +4119,93 @@
           <a:bodyPr/>
           <a:lstStyle/>
           <a:p>
-            <a:endParaRPr lang="en-US"/>
+            <a:r>
+              <a:rPr lang="en-US" dirty="0"/>
+              <a:t>Objective:</a:t>
+            </a:r>
+          </a:p>
+          <a:p>
+            <a:pPr lvl="1"/>
+            <a:r>
+              <a:rPr lang="en-US" dirty="0"/>
+              <a:t>To show population and employment across a span of time: 2007-2017</a:t>
+            </a:r>
+          </a:p>
+          <a:p>
+            <a:pPr lvl="1"/>
+            <a:r>
+              <a:rPr lang="en-US" dirty="0"/>
+              <a:t>For Philadelphia</a:t>
+            </a:r>
+          </a:p>
+          <a:p>
+            <a:pPr lvl="1"/>
+            <a:r>
+              <a:rPr lang="en-US" dirty="0"/>
+              <a:t>And some other cities</a:t>
+            </a:r>
+          </a:p>
+          <a:p>
+            <a:pPr lvl="1"/>
+            <a:r>
+              <a:rPr lang="en-US" dirty="0"/>
+              <a:t>… in the same geographic region</a:t>
+            </a:r>
+          </a:p>
+          <a:p>
+            <a:pPr lvl="1"/>
+            <a:r>
+              <a:rPr lang="en-US" dirty="0"/>
+              <a:t>… of about the same size (</a:t>
+            </a:r>
+            <a:r>
+              <a:rPr lang="en-US" dirty="0" err="1"/>
+              <a:t>wrt</a:t>
+            </a:r>
+            <a:r>
+              <a:rPr lang="en-US" dirty="0"/>
+              <a:t> population)</a:t>
+            </a:r>
+          </a:p>
+          <a:p>
+            <a:pPr lvl="1"/>
+            <a:r>
+              <a:rPr lang="en-US" dirty="0"/>
+              <a:t>Why?</a:t>
+            </a:r>
+          </a:p>
+          <a:p>
+            <a:pPr lvl="1"/>
+            <a:r>
+              <a:rPr lang="en-US" dirty="0"/>
+              <a:t>To see </a:t>
+            </a:r>
+          </a:p>
+          <a:p>
+            <a:pPr lvl="2"/>
+            <a:r>
+              <a:rPr lang="en-US" dirty="0"/>
+              <a:t>(1) how is Philadelphia doing? </a:t>
+            </a:r>
+          </a:p>
+          <a:p>
+            <a:pPr lvl="2"/>
+            <a:r>
+              <a:rPr lang="en-US" dirty="0"/>
+              <a:t>(2) compared to national figures?</a:t>
+            </a:r>
+          </a:p>
+          <a:p>
+            <a:pPr lvl="2"/>
+            <a:r>
+              <a:rPr lang="en-US" dirty="0"/>
+              <a:t>(3) compared to “similar” cities</a:t>
+            </a:r>
+            <a:r>
+              <a:rPr lang="en-US" dirty="0" smtClean="0"/>
+              <a:t>?</a:t>
+            </a:r>
+            <a:endParaRPr lang="en-US" dirty="0"/>
           </a:p>
         </p:txBody>
       </p:sp>
@@ -4141,6 +4227,13 @@
       <p:transition spd="slow" advTm="15000"/>
     </mc:Fallback>
   </mc:AlternateContent>
+  <p:timing>
+    <p:tnLst>
+      <p:par>
+        <p:cTn id="1" dur="indefinite" restart="never" nodeType="tmRoot"/>
+      </p:par>
+    </p:tnLst>
+  </p:timing>
 </p:sld>
 </file>
 
@@ -4178,7 +4271,7 @@
           <a:p>
             <a:r>
               <a:rPr lang="en-US" dirty="0" smtClean="0"/>
-              <a:t>Slide 10</a:t>
+              <a:t>About the data sets</a:t>
             </a:r>
             <a:endParaRPr lang="en-US" dirty="0"/>
           </a:p>
@@ -4199,7 +4292,55 @@
           <a:bodyPr/>
           <a:lstStyle/>
           <a:p>
-            <a:endParaRPr lang="en-US"/>
+            <a:r>
+              <a:rPr lang="en-US" dirty="0" smtClean="0"/>
+              <a:t>Most of the data sets are time-series</a:t>
+            </a:r>
+          </a:p>
+          <a:p>
+            <a:pPr lvl="1"/>
+            <a:r>
+              <a:rPr lang="en-US" dirty="0" smtClean="0"/>
+              <a:t>The metadata are “lookup tables”</a:t>
+            </a:r>
+            <a:endParaRPr lang="en-US" dirty="0" smtClean="0"/>
+          </a:p>
+          <a:p>
+            <a:r>
+              <a:rPr lang="en-US" dirty="0" smtClean="0"/>
+              <a:t>They represent a measured observation at a particular time</a:t>
+            </a:r>
+          </a:p>
+          <a:p>
+            <a:r>
+              <a:rPr lang="en-US" dirty="0" smtClean="0"/>
+              <a:t>The best visual representation is usually line chart</a:t>
+            </a:r>
+          </a:p>
+          <a:p>
+            <a:pPr lvl="1"/>
+            <a:r>
+              <a:rPr lang="en-US" dirty="0" smtClean="0"/>
+              <a:t>Show the change in value over time</a:t>
+            </a:r>
+          </a:p>
+          <a:p>
+            <a:r>
+              <a:rPr lang="en-US" dirty="0" smtClean="0"/>
+              <a:t>We also use bar charts to compare the same measure across a spatial dimension</a:t>
+            </a:r>
+          </a:p>
+          <a:p>
+            <a:pPr lvl="1"/>
+            <a:r>
+              <a:rPr lang="en-US" dirty="0"/>
+              <a:t>C</a:t>
+            </a:r>
+            <a:r>
+              <a:rPr lang="en-US" dirty="0" smtClean="0"/>
+              <a:t>ity and National values for a specific measure, for a specific time period</a:t>
+            </a:r>
+            <a:endParaRPr lang="en-US" dirty="0"/>
           </a:p>
         </p:txBody>
       </p:sp>
@@ -4221,6 +4362,13 @@
       <p:transition spd="slow" advTm="15000"/>
     </mc:Fallback>
   </mc:AlternateContent>
+  <p:timing>
+    <p:tnLst>
+      <p:par>
+        <p:cTn id="1" dur="indefinite" restart="never" nodeType="tmRoot"/>
+      </p:par>
+    </p:tnLst>
+  </p:timing>
 </p:sld>
 </file>
 
@@ -4258,7 +4406,7 @@
           <a:p>
             <a:r>
               <a:rPr lang="en-US" dirty="0" smtClean="0"/>
-              <a:t>Slide 11</a:t>
+              <a:t>Unemployment % time-series</a:t>
             </a:r>
             <a:endParaRPr lang="en-US" dirty="0"/>
           </a:p>
@@ -4279,7 +4427,11 @@
           <a:bodyPr/>
           <a:lstStyle/>
           <a:p>
-            <a:endParaRPr lang="en-US"/>
+            <a:r>
+              <a:rPr lang="en-US" dirty="0" smtClean="0"/>
+              <a:t>We can plot unemployment percentage over time to get some perspective on how the nation and cities are doing…</a:t>
+            </a:r>
+            <a:endParaRPr lang="en-US" dirty="0"/>
           </a:p>
         </p:txBody>
       </p:sp>
@@ -4301,6 +4453,13 @@
       <p:transition spd="slow" advTm="15000"/>
     </mc:Fallback>
   </mc:AlternateContent>
+  <p:timing>
+    <p:tnLst>
+      <p:par>
+        <p:cTn id="1" dur="indefinite" restart="never" nodeType="tmRoot"/>
+      </p:par>
+    </p:tnLst>
+  </p:timing>
 </p:sld>
 </file>
 
@@ -4788,6 +4947,13 @@
       <p:transition spd="slow" advTm="15000"/>
     </mc:Fallback>
   </mc:AlternateContent>
+  <p:timing>
+    <p:tnLst>
+      <p:par>
+        <p:cTn id="1" dur="indefinite" restart="never" nodeType="tmRoot"/>
+      </p:par>
+    </p:tnLst>
+  </p:timing>
 </p:sld>
 </file>
 
@@ -4825,7 +4991,7 @@
           <a:p>
             <a:r>
               <a:rPr lang="en-US" dirty="0" smtClean="0"/>
-              <a:t>What’s next?</a:t>
+              <a:t>What’s next? (in Part 2)</a:t>
             </a:r>
             <a:endParaRPr lang="en-US" dirty="0"/>
           </a:p>
@@ -4846,7 +5012,60 @@
           <a:bodyPr/>
           <a:lstStyle/>
           <a:p>
-            <a:endParaRPr lang="en-US"/>
+            <a:r>
+              <a:rPr lang="en-US" dirty="0" smtClean="0"/>
+              <a:t>Add in additional data dimensions</a:t>
+            </a:r>
+          </a:p>
+          <a:p>
+            <a:pPr lvl="1"/>
+            <a:r>
+              <a:rPr lang="en-US" dirty="0" smtClean="0"/>
+              <a:t>Race, Ethnicity</a:t>
+            </a:r>
+          </a:p>
+          <a:p>
+            <a:pPr lvl="1"/>
+            <a:r>
+              <a:rPr lang="en-US" dirty="0" smtClean="0"/>
+              <a:t>Labor force characteristics: industries, sub-industries</a:t>
+            </a:r>
+          </a:p>
+          <a:p>
+            <a:r>
+              <a:rPr lang="en-US" dirty="0" smtClean="0"/>
+              <a:t>Provide an application like Brookings Metro Monitor</a:t>
+            </a:r>
+          </a:p>
+          <a:p>
+            <a:r>
+              <a:rPr lang="en-US" dirty="0" smtClean="0"/>
+              <a:t>Allow selection of “base” city</a:t>
+            </a:r>
+          </a:p>
+          <a:p>
+            <a:pPr lvl="1"/>
+            <a:r>
+              <a:rPr lang="en-US" dirty="0" smtClean="0"/>
+              <a:t>Choose “nearest neighbors”</a:t>
+            </a:r>
+          </a:p>
+          <a:p>
+            <a:pPr lvl="1"/>
+            <a:r>
+              <a:rPr lang="en-US" dirty="0" smtClean="0"/>
+              <a:t>Choose “closest in size”</a:t>
+            </a:r>
+          </a:p>
+          <a:p>
+            <a:pPr lvl="1"/>
+            <a:r>
+              <a:rPr lang="en-US" dirty="0" smtClean="0"/>
+              <a:t>Present visualizations</a:t>
+            </a:r>
+          </a:p>
+          <a:p>
+            <a:endParaRPr lang="en-US" dirty="0"/>
           </a:p>
         </p:txBody>
       </p:sp>
@@ -5594,10 +5813,135 @@
         </p:nvSpPr>
         <p:spPr/>
         <p:txBody>
-          <a:bodyPr/>
-          <a:lstStyle/>
-          <a:p>
-            <a:endParaRPr lang="en-US"/>
+          <a:bodyPr>
+            <a:normAutofit fontScale="92500" lnSpcReduction="10000"/>
+          </a:bodyPr>
+          <a:lstStyle/>
+          <a:p>
+            <a:r>
+              <a:rPr lang="en-US" dirty="0" smtClean="0"/>
+              <a:t>References:</a:t>
+            </a:r>
+          </a:p>
+          <a:p>
+            <a:pPr lvl="1"/>
+            <a:r>
+              <a:rPr lang="en-US" dirty="0" smtClean="0"/>
+              <a:t>[</a:t>
+            </a:r>
+            <a:r>
+              <a:rPr lang="en-US" dirty="0" err="1" smtClean="0"/>
+              <a:t>ccd</a:t>
+            </a:r>
+            <a:r>
+              <a:rPr lang="en-US" dirty="0" smtClean="0"/>
+              <a:t>] </a:t>
+            </a:r>
+          </a:p>
+          <a:p>
+            <a:pPr lvl="1"/>
+            <a:r>
+              <a:rPr lang="en-US" dirty="0" smtClean="0"/>
+              <a:t>[</a:t>
+            </a:r>
+            <a:r>
+              <a:rPr lang="en-US" dirty="0" err="1" smtClean="0"/>
+              <a:t>shrm</a:t>
+            </a:r>
+            <a:r>
+              <a:rPr lang="en-US" dirty="0" smtClean="0"/>
+              <a:t>] </a:t>
+            </a:r>
+          </a:p>
+          <a:p>
+            <a:pPr lvl="1"/>
+            <a:r>
+              <a:rPr lang="en-US" dirty="0" smtClean="0"/>
+              <a:t>[</a:t>
+            </a:r>
+            <a:r>
+              <a:rPr lang="en-US" dirty="0" err="1" smtClean="0"/>
+              <a:t>brookings</a:t>
+            </a:r>
+            <a:r>
+              <a:rPr lang="en-US" dirty="0"/>
+              <a:t>] Metro </a:t>
+            </a:r>
+            <a:r>
+              <a:rPr lang="en-US" dirty="0" smtClean="0"/>
+              <a:t>Monitor, 2017 https</a:t>
+            </a:r>
+            <a:r>
+              <a:rPr lang="en-US" dirty="0"/>
+              <a:t>://www.brookings.edu/research/metro-monitor-2017/</a:t>
+            </a:r>
+            <a:endParaRPr lang="en-US" dirty="0" smtClean="0"/>
+          </a:p>
+          <a:p>
+            <a:pPr lvl="1"/>
+            <a:r>
+              <a:rPr lang="en-US" dirty="0" smtClean="0"/>
+              <a:t>[</a:t>
+            </a:r>
+            <a:r>
+              <a:rPr lang="en-US" dirty="0" err="1" smtClean="0"/>
+              <a:t>bls</a:t>
+            </a:r>
+            <a:r>
+              <a:rPr lang="en-US" dirty="0" smtClean="0"/>
+              <a:t>] </a:t>
+            </a:r>
+          </a:p>
+          <a:p>
+            <a:pPr lvl="1"/>
+            <a:r>
+              <a:rPr lang="en-US" dirty="0" smtClean="0"/>
+              <a:t>[census] </a:t>
+            </a:r>
+          </a:p>
+          <a:p>
+            <a:pPr lvl="1"/>
+            <a:r>
+              <a:rPr lang="en-US" dirty="0" smtClean="0"/>
+              <a:t>[</a:t>
+            </a:r>
+            <a:r>
+              <a:rPr lang="en-US" dirty="0" err="1" smtClean="0"/>
+              <a:t>wickham</a:t>
+            </a:r>
+            <a:r>
+              <a:rPr lang="en-US" dirty="0" smtClean="0"/>
+              <a:t>] </a:t>
+            </a:r>
+          </a:p>
+          <a:p>
+            <a:r>
+              <a:rPr lang="en-US" dirty="0" smtClean="0"/>
+              <a:t>Photo/Image Credits, all copyright or property of the following:</a:t>
+            </a:r>
+          </a:p>
+          <a:p>
+            <a:pPr lvl="1"/>
+            <a:r>
+              <a:rPr lang="en-US" dirty="0" smtClean="0"/>
+              <a:t>Wikimedia Foundation (Creative Commons), ushistory.org, </a:t>
+            </a:r>
+            <a:r>
+              <a:rPr lang="en-US" dirty="0" err="1" smtClean="0"/>
+              <a:t>Fodors</a:t>
+            </a:r>
+            <a:r>
+              <a:rPr lang="en-US" dirty="0" smtClean="0"/>
+              <a:t> Travel, Joseph </a:t>
+            </a:r>
+            <a:r>
+              <a:rPr lang="en-US" dirty="0" err="1" smtClean="0"/>
+              <a:t>Duplessis</a:t>
+            </a:r>
+            <a:r>
+              <a:rPr lang="en-US" dirty="0" smtClean="0"/>
+              <a:t>, U.S. Constitution Center, John Trumbull, Comcast Corporation, Aramark Companies, Tasty Baking Company, University of Pennsylvania, Temple University, Drexel University</a:t>
+            </a:r>
           </a:p>
         </p:txBody>
       </p:sp>
@@ -7640,7 +7984,9 @@
         </p:nvSpPr>
         <p:spPr/>
         <p:txBody>
-          <a:bodyPr/>
+          <a:bodyPr>
+            <a:normAutofit fontScale="92500" lnSpcReduction="10000"/>
+          </a:bodyPr>
           <a:lstStyle/>
           <a:p>
             <a:r>
@@ -7659,29 +8005,77 @@
             <a:pPr lvl="1"/>
             <a:r>
               <a:rPr lang="en-US" dirty="0"/>
-              <a:t>Employment: U.S. Bureau of Labor Statistics</a:t>
-            </a:r>
-          </a:p>
-          <a:p>
-            <a:r>
-              <a:rPr lang="en-US" dirty="0"/>
-              <a:t>Methods:</a:t>
+              <a:t>Employment: U.S. Bureau of Labor </a:t>
+            </a:r>
+            <a:r>
+              <a:rPr lang="en-US" dirty="0" smtClean="0"/>
+              <a:t>Statistics</a:t>
             </a:r>
           </a:p>
           <a:p>
             <a:pPr lvl="1"/>
             <a:r>
               <a:rPr lang="en-US" dirty="0" smtClean="0"/>
-              <a:t>Direct Download</a:t>
+              <a:t>Cities by Size: Wikipedia</a:t>
             </a:r>
             <a:endParaRPr lang="en-US" dirty="0"/>
           </a:p>
           <a:p>
+            <a:r>
+              <a:rPr lang="en-US" dirty="0" smtClean="0"/>
+              <a:t>Methods</a:t>
+            </a:r>
+            <a:endParaRPr lang="en-US" dirty="0"/>
+          </a:p>
+          <a:p>
             <a:pPr lvl="1"/>
             <a:r>
-              <a:rPr lang="en-US" dirty="0"/>
+              <a:rPr lang="en-US" dirty="0" smtClean="0"/>
+              <a:t>Download</a:t>
+            </a:r>
+            <a:endParaRPr lang="en-US" dirty="0"/>
+          </a:p>
+          <a:p>
+            <a:pPr lvl="1"/>
+            <a:r>
+              <a:rPr lang="en-US" dirty="0" smtClean="0"/>
               <a:t>API</a:t>
             </a:r>
+          </a:p>
+          <a:p>
+            <a:pPr lvl="1"/>
+            <a:r>
+              <a:rPr lang="en-US" dirty="0" smtClean="0"/>
+              <a:t>External tools</a:t>
+            </a:r>
+          </a:p>
+          <a:p>
+            <a:pPr lvl="1"/>
+            <a:r>
+              <a:rPr lang="en-US" dirty="0" smtClean="0"/>
+              <a:t>Extract from HTML forms</a:t>
+            </a:r>
+          </a:p>
+          <a:p>
+            <a:r>
+              <a:rPr lang="en-US" dirty="0" smtClean="0"/>
+              <a:t>Data formats</a:t>
+            </a:r>
+          </a:p>
+          <a:p>
+            <a:pPr lvl="1"/>
+            <a:r>
+              <a:rPr lang="en-US" dirty="0" smtClean="0"/>
+              <a:t>Comma Separated Values (CSV)</a:t>
+            </a:r>
+          </a:p>
+          <a:p>
+            <a:pPr lvl="1"/>
+            <a:r>
+              <a:rPr lang="en-US" dirty="0" smtClean="0"/>
+              <a:t>JavaScript Object Notation (JSON)</a:t>
+            </a:r>
+            <a:endParaRPr lang="en-US" dirty="0"/>
           </a:p>
           <a:p>
             <a:endParaRPr lang="en-US" dirty="0"/>
@@ -7771,7 +8165,153 @@
           <a:bodyPr/>
           <a:lstStyle/>
           <a:p>
-            <a:endParaRPr lang="en-US"/>
+            <a:r>
+              <a:rPr lang="en-US" dirty="0" smtClean="0"/>
+              <a:t>Objective: </a:t>
+            </a:r>
+            <a:r>
+              <a:rPr lang="en-US" i="1" dirty="0" smtClean="0">
+                <a:latin typeface="Times New Roman" panose="02020603050405020304" pitchFamily="18" charset="0"/>
+                <a:cs typeface="Times New Roman" panose="02020603050405020304" pitchFamily="18" charset="0"/>
+              </a:rPr>
+              <a:t>Make the data (mostly) Tidy*</a:t>
+            </a:r>
+          </a:p>
+          <a:p>
+            <a:r>
+              <a:rPr lang="en-US" dirty="0" smtClean="0"/>
+              <a:t>Principles:</a:t>
+            </a:r>
+          </a:p>
+          <a:p>
+            <a:pPr marL="971550" lvl="1" indent="-514350">
+              <a:buFont typeface="+mj-lt"/>
+              <a:buAutoNum type="arabicPeriod"/>
+            </a:pPr>
+            <a:r>
+              <a:rPr lang="en-US" dirty="0" smtClean="0"/>
+              <a:t>Each </a:t>
+            </a:r>
+            <a:r>
+              <a:rPr lang="en-US" dirty="0"/>
+              <a:t>variable forms a column.</a:t>
+            </a:r>
+          </a:p>
+          <a:p>
+            <a:pPr marL="971550" lvl="1" indent="-514350">
+              <a:buFont typeface="+mj-lt"/>
+              <a:buAutoNum type="arabicPeriod"/>
+            </a:pPr>
+            <a:r>
+              <a:rPr lang="en-US" dirty="0" smtClean="0"/>
+              <a:t>Each </a:t>
+            </a:r>
+            <a:r>
+              <a:rPr lang="en-US" dirty="0"/>
+              <a:t>observation forms a row.</a:t>
+            </a:r>
+          </a:p>
+          <a:p>
+            <a:pPr marL="971550" lvl="1" indent="-514350">
+              <a:buFont typeface="+mj-lt"/>
+              <a:buAutoNum type="arabicPeriod"/>
+            </a:pPr>
+            <a:r>
+              <a:rPr lang="en-US" dirty="0" smtClean="0"/>
+              <a:t>Each </a:t>
+            </a:r>
+            <a:r>
+              <a:rPr lang="en-US" dirty="0"/>
+              <a:t>type of observational unit forms a table</a:t>
+            </a:r>
+            <a:r>
+              <a:rPr lang="en-US" dirty="0" smtClean="0"/>
+              <a:t>.</a:t>
+            </a:r>
+          </a:p>
+          <a:p>
+            <a:r>
+              <a:rPr lang="en-US" dirty="0" smtClean="0"/>
+              <a:t>Problems faced:</a:t>
+            </a:r>
+          </a:p>
+          <a:p>
+            <a:pPr lvl="1"/>
+            <a:r>
+              <a:rPr lang="en-US" dirty="0"/>
+              <a:t>Column headers are values, not variable names.</a:t>
+            </a:r>
+            <a:endParaRPr lang="en-US" dirty="0" smtClean="0"/>
+          </a:p>
+          <a:p>
+            <a:pPr lvl="1"/>
+            <a:r>
+              <a:rPr lang="en-US" dirty="0" smtClean="0"/>
+              <a:t>Multiple </a:t>
+            </a:r>
+            <a:r>
+              <a:rPr lang="en-US" dirty="0"/>
+              <a:t>variables are stored in one column</a:t>
+            </a:r>
+            <a:r>
+              <a:rPr lang="en-US" dirty="0" smtClean="0"/>
+              <a:t>.</a:t>
+            </a:r>
+          </a:p>
+          <a:p>
+            <a:pPr lvl="1"/>
+            <a:r>
+              <a:rPr lang="en-US" dirty="0"/>
+              <a:t>Variables are stored in both rows and columns.</a:t>
+            </a:r>
+            <a:endParaRPr lang="en-US" dirty="0" smtClean="0"/>
+          </a:p>
+          <a:p>
+            <a:pPr lvl="1"/>
+            <a:endParaRPr lang="en-US" dirty="0" smtClean="0"/>
+          </a:p>
+          <a:p>
+            <a:pPr lvl="1"/>
+            <a:endParaRPr lang="en-US" dirty="0"/>
+          </a:p>
+        </p:txBody>
+      </p:sp>
+      <p:sp>
+        <p:nvSpPr>
+          <p:cNvPr id="4" name="TextBox 3"/>
+          <p:cNvSpPr txBox="1"/>
+          <p:nvPr/>
+        </p:nvSpPr>
+        <p:spPr>
+          <a:xfrm>
+            <a:off x="0" y="6601157"/>
+            <a:ext cx="12192000" cy="246221"/>
+          </a:xfrm>
+          <a:prstGeom prst="rect">
+            <a:avLst/>
+          </a:prstGeom>
+          <a:noFill/>
+        </p:spPr>
+        <p:txBody>
+          <a:bodyPr wrap="square" rtlCol="0">
+            <a:spAutoFit/>
+          </a:bodyPr>
+          <a:lstStyle/>
+          <a:p>
+            <a:pPr algn="ctr"/>
+            <a:r>
+              <a:rPr lang="en-US" sz="1000" dirty="0" smtClean="0"/>
+              <a:t>* [</a:t>
+            </a:r>
+            <a:r>
+              <a:rPr lang="en-US" sz="1000" dirty="0" err="1" smtClean="0"/>
+              <a:t>wickham</a:t>
+            </a:r>
+            <a:r>
+              <a:rPr lang="en-US" sz="1000" dirty="0" smtClean="0"/>
+              <a:t>] Tidy Data, Hadley Wickham, Journal of Statistical Software</a:t>
+            </a:r>
+            <a:endParaRPr lang="en-US" sz="1000" dirty="0"/>
           </a:p>
         </p:txBody>
       </p:sp>
@@ -7822,6 +8362,597 @@
       </p:grpSpPr>
       <p:sp>
         <p:nvSpPr>
+          <p:cNvPr id="5" name="Rectangle 1"/>
+          <p:cNvSpPr>
+            <a:spLocks noChangeArrowheads="1"/>
+          </p:cNvSpPr>
+          <p:nvPr/>
+        </p:nvSpPr>
+        <p:spPr bwMode="auto">
+          <a:xfrm>
+            <a:off x="8136296" y="1254809"/>
+            <a:ext cx="2349432" cy="2154436"/>
+          </a:xfrm>
+          <a:prstGeom prst="rect">
+            <a:avLst/>
+          </a:prstGeom>
+          <a:solidFill>
+            <a:srgbClr val="FFFFFF"/>
+          </a:solidFill>
+          <a:ln>
+            <a:noFill/>
+          </a:ln>
+          <a:effectLst/>
+          <a:extLst>
+            <a:ext uri="{91240B29-F687-4F45-9708-019B960494DF}">
+              <a14:hiddenLine xmlns:a14="http://schemas.microsoft.com/office/drawing/2010/main" w="9525">
+                <a:solidFill>
+                  <a:schemeClr val="tx1"/>
+                </a:solidFill>
+                <a:miter lim="800000"/>
+                <a:headEnd/>
+                <a:tailEnd/>
+              </a14:hiddenLine>
+            </a:ext>
+            <a:ext uri="{AF507438-7753-43E0-B8FC-AC1667EBCBE1}">
+              <a14:hiddenEffects xmlns:a14="http://schemas.microsoft.com/office/drawing/2010/main">
+                <a:effectLst>
+                  <a:outerShdw dist="35921" dir="2700000" algn="ctr" rotWithShape="0">
+                    <a:schemeClr val="bg2"/>
+                  </a:outerShdw>
+                </a:effectLst>
+              </a14:hiddenEffects>
+            </a:ext>
+          </a:extLst>
+        </p:spPr>
+        <p:txBody>
+          <a:bodyPr vert="horz" wrap="square" lIns="0" tIns="0" rIns="0" bIns="0" numCol="1" anchor="ctr" anchorCtr="0" compatLnSpc="1">
+            <a:prstTxWarp prst="textNoShape">
+              <a:avLst/>
+            </a:prstTxWarp>
+            <a:spAutoFit/>
+          </a:bodyPr>
+          <a:lstStyle/>
+          <a:p>
+            <a:pPr marL="0" marR="0" lvl="0" indent="0" algn="l" defTabSz="914400" rtl="0" eaLnBrk="0" fontAlgn="base" latinLnBrk="0" hangingPunct="0">
+              <a:lnSpc>
+                <a:spcPct val="100000"/>
+              </a:lnSpc>
+              <a:spcBef>
+                <a:spcPct val="0"/>
+              </a:spcBef>
+              <a:spcAft>
+                <a:spcPct val="0"/>
+              </a:spcAft>
+              <a:buClrTx/>
+              <a:buSzTx/>
+              <a:buFontTx/>
+              <a:buNone/>
+              <a:tabLst/>
+            </a:pPr>
+            <a:r>
+              <a:rPr kumimoji="0" lang="en-US" altLang="en-US" sz="1000" b="0" i="0" u="none" strike="noStrike" cap="none" normalizeH="0" baseline="0" dirty="0" smtClean="0">
+                <a:ln>
+                  <a:noFill/>
+                </a:ln>
+                <a:solidFill>
+                  <a:srgbClr val="000000"/>
+                </a:solidFill>
+                <a:effectLst/>
+                <a:latin typeface="Courier New" panose="02070309020205020404" pitchFamily="49" charset="0"/>
+              </a:rPr>
+              <a:t>{'Results': </a:t>
+            </a:r>
+          </a:p>
+          <a:p>
+            <a:pPr lvl="0" eaLnBrk="0" fontAlgn="base" hangingPunct="0">
+              <a:spcBef>
+                <a:spcPct val="0"/>
+              </a:spcBef>
+              <a:spcAft>
+                <a:spcPct val="0"/>
+              </a:spcAft>
+            </a:pPr>
+            <a:r>
+              <a:rPr kumimoji="0" lang="en-US" altLang="en-US" sz="1000" b="0" i="0" u="none" strike="noStrike" cap="none" normalizeH="0" baseline="0" dirty="0" smtClean="0">
+                <a:ln>
+                  <a:noFill/>
+                </a:ln>
+                <a:solidFill>
+                  <a:srgbClr val="000000"/>
+                </a:solidFill>
+                <a:effectLst/>
+                <a:latin typeface="Courier New" panose="02070309020205020404" pitchFamily="49" charset="0"/>
+              </a:rPr>
+              <a:t>{'series': [</a:t>
+            </a:r>
+          </a:p>
+          <a:p>
+            <a:pPr lvl="0" eaLnBrk="0" fontAlgn="base" hangingPunct="0">
+              <a:spcBef>
+                <a:spcPct val="0"/>
+              </a:spcBef>
+              <a:spcAft>
+                <a:spcPct val="0"/>
+              </a:spcAft>
+            </a:pPr>
+            <a:r>
+              <a:rPr lang="en-US" altLang="en-US" sz="1000" dirty="0" smtClean="0">
+                <a:solidFill>
+                  <a:srgbClr val="000000"/>
+                </a:solidFill>
+                <a:latin typeface="Courier New" panose="02070309020205020404" pitchFamily="49" charset="0"/>
+                <a:cs typeface="Courier New" panose="02070309020205020404" pitchFamily="49" charset="0"/>
+              </a:rPr>
+              <a:t>  '</a:t>
+            </a:r>
+            <a:r>
+              <a:rPr lang="en-US" altLang="en-US" sz="1000" dirty="0" err="1" smtClean="0">
+                <a:solidFill>
+                  <a:srgbClr val="000000"/>
+                </a:solidFill>
+                <a:latin typeface="Courier New" panose="02070309020205020404" pitchFamily="49" charset="0"/>
+                <a:cs typeface="Courier New" panose="02070309020205020404" pitchFamily="49" charset="0"/>
+              </a:rPr>
+              <a:t>seriesID</a:t>
+            </a:r>
+            <a:r>
+              <a:rPr lang="en-US" altLang="en-US" sz="1000" dirty="0">
+                <a:solidFill>
+                  <a:srgbClr val="000000"/>
+                </a:solidFill>
+                <a:latin typeface="Courier New" panose="02070309020205020404" pitchFamily="49" charset="0"/>
+                <a:cs typeface="Courier New" panose="02070309020205020404" pitchFamily="49" charset="0"/>
+              </a:rPr>
+              <a:t>': 'SUUR0000SA0</a:t>
+            </a:r>
+            <a:r>
+              <a:rPr lang="en-US" altLang="en-US" sz="1000" dirty="0" smtClean="0">
+                <a:solidFill>
+                  <a:srgbClr val="000000"/>
+                </a:solidFill>
+                <a:latin typeface="Courier New" panose="02070309020205020404" pitchFamily="49" charset="0"/>
+                <a:cs typeface="Courier New" panose="02070309020205020404" pitchFamily="49" charset="0"/>
+              </a:rPr>
+              <a:t>',  </a:t>
+            </a:r>
+          </a:p>
+          <a:p>
+            <a:pPr lvl="0" eaLnBrk="0" fontAlgn="base" hangingPunct="0">
+              <a:spcBef>
+                <a:spcPct val="0"/>
+              </a:spcBef>
+              <a:spcAft>
+                <a:spcPct val="0"/>
+              </a:spcAft>
+            </a:pPr>
+            <a:r>
+              <a:rPr kumimoji="0" lang="en-US" altLang="en-US" sz="1000" b="0" i="0" u="none" strike="noStrike" cap="none" normalizeH="0" dirty="0">
+                <a:ln>
+                  <a:noFill/>
+                </a:ln>
+                <a:solidFill>
+                  <a:srgbClr val="000000"/>
+                </a:solidFill>
+                <a:effectLst/>
+                <a:latin typeface="Courier New" panose="02070309020205020404" pitchFamily="49" charset="0"/>
+                <a:cs typeface="Courier New" panose="02070309020205020404" pitchFamily="49" charset="0"/>
+              </a:rPr>
+              <a:t> </a:t>
+            </a:r>
+            <a:r>
+              <a:rPr kumimoji="0" lang="en-US" altLang="en-US" sz="1000" b="0" i="0" u="none" strike="noStrike" cap="none" normalizeH="0" baseline="0" dirty="0" smtClean="0">
+                <a:ln>
+                  <a:noFill/>
+                </a:ln>
+                <a:solidFill>
+                  <a:srgbClr val="000000"/>
+                </a:solidFill>
+                <a:effectLst/>
+                <a:latin typeface="Courier New" panose="02070309020205020404" pitchFamily="49" charset="0"/>
+              </a:rPr>
+              <a:t>{'data': [</a:t>
+            </a:r>
+          </a:p>
+          <a:p>
+            <a:pPr lvl="0" eaLnBrk="0" fontAlgn="base" hangingPunct="0">
+              <a:spcBef>
+                <a:spcPct val="0"/>
+              </a:spcBef>
+              <a:spcAft>
+                <a:spcPct val="0"/>
+              </a:spcAft>
+            </a:pPr>
+            <a:r>
+              <a:rPr kumimoji="0" lang="en-US" altLang="en-US" sz="1000" b="0" i="0" u="none" strike="noStrike" cap="none" normalizeH="0" baseline="0" dirty="0" smtClean="0">
+                <a:ln>
+                  <a:noFill/>
+                </a:ln>
+                <a:solidFill>
+                  <a:srgbClr val="000000"/>
+                </a:solidFill>
+                <a:effectLst/>
+                <a:latin typeface="Courier New" panose="02070309020205020404" pitchFamily="49" charset="0"/>
+              </a:rPr>
+              <a:t>   {'footnotes': [{}], </a:t>
+            </a:r>
+          </a:p>
+          <a:p>
+            <a:pPr lvl="0" eaLnBrk="0" fontAlgn="base" hangingPunct="0">
+              <a:spcBef>
+                <a:spcPct val="0"/>
+              </a:spcBef>
+              <a:spcAft>
+                <a:spcPct val="0"/>
+              </a:spcAft>
+            </a:pPr>
+            <a:r>
+              <a:rPr kumimoji="0" lang="en-US" altLang="en-US" sz="1000" b="0" i="0" u="none" strike="noStrike" cap="none" normalizeH="0" baseline="0" dirty="0" smtClean="0">
+                <a:ln>
+                  <a:noFill/>
+                </a:ln>
+                <a:solidFill>
+                  <a:srgbClr val="000000"/>
+                </a:solidFill>
+                <a:effectLst/>
+                <a:latin typeface="Courier New" panose="02070309020205020404" pitchFamily="49" charset="0"/>
+              </a:rPr>
+              <a:t>    'period': 'M12', </a:t>
+            </a:r>
+          </a:p>
+          <a:p>
+            <a:pPr lvl="0" eaLnBrk="0" fontAlgn="base" hangingPunct="0">
+              <a:spcBef>
+                <a:spcPct val="0"/>
+              </a:spcBef>
+              <a:spcAft>
+                <a:spcPct val="0"/>
+              </a:spcAft>
+            </a:pPr>
+            <a:r>
+              <a:rPr kumimoji="0" lang="en-US" altLang="en-US" sz="1000" b="0" i="0" u="none" strike="noStrike" cap="none" normalizeH="0" baseline="0" dirty="0" smtClean="0">
+                <a:ln>
+                  <a:noFill/>
+                </a:ln>
+                <a:solidFill>
+                  <a:srgbClr val="000000"/>
+                </a:solidFill>
+                <a:effectLst/>
+                <a:latin typeface="Courier New" panose="02070309020205020404" pitchFamily="49" charset="0"/>
+              </a:rPr>
+              <a:t>    '</a:t>
+            </a:r>
+            <a:r>
+              <a:rPr kumimoji="0" lang="en-US" altLang="en-US" sz="1000" b="0" i="0" u="none" strike="noStrike" cap="none" normalizeH="0" baseline="0" dirty="0" err="1" smtClean="0">
+                <a:ln>
+                  <a:noFill/>
+                </a:ln>
+                <a:solidFill>
+                  <a:srgbClr val="000000"/>
+                </a:solidFill>
+                <a:effectLst/>
+                <a:latin typeface="Courier New" panose="02070309020205020404" pitchFamily="49" charset="0"/>
+              </a:rPr>
+              <a:t>periodName</a:t>
+            </a:r>
+            <a:r>
+              <a:rPr kumimoji="0" lang="en-US" altLang="en-US" sz="1000" b="0" i="0" u="none" strike="noStrike" cap="none" normalizeH="0" baseline="0" dirty="0" smtClean="0">
+                <a:ln>
+                  <a:noFill/>
+                </a:ln>
+                <a:solidFill>
+                  <a:srgbClr val="000000"/>
+                </a:solidFill>
+                <a:effectLst/>
+                <a:latin typeface="Courier New" panose="02070309020205020404" pitchFamily="49" charset="0"/>
+              </a:rPr>
+              <a:t>': 'December',</a:t>
+            </a:r>
+          </a:p>
+          <a:p>
+            <a:pPr lvl="0" eaLnBrk="0" fontAlgn="base" hangingPunct="0">
+              <a:spcBef>
+                <a:spcPct val="0"/>
+              </a:spcBef>
+              <a:spcAft>
+                <a:spcPct val="0"/>
+              </a:spcAft>
+            </a:pPr>
+            <a:r>
+              <a:rPr lang="en-US" altLang="en-US" sz="1000" dirty="0">
+                <a:solidFill>
+                  <a:srgbClr val="000000"/>
+                </a:solidFill>
+                <a:latin typeface="Courier New" panose="02070309020205020404" pitchFamily="49" charset="0"/>
+              </a:rPr>
+              <a:t> </a:t>
+            </a:r>
+            <a:r>
+              <a:rPr lang="en-US" altLang="en-US" sz="1000" dirty="0" smtClean="0">
+                <a:solidFill>
+                  <a:srgbClr val="000000"/>
+                </a:solidFill>
+                <a:latin typeface="Courier New" panose="02070309020205020404" pitchFamily="49" charset="0"/>
+              </a:rPr>
+              <a:t>  </a:t>
+            </a:r>
+            <a:r>
+              <a:rPr kumimoji="0" lang="en-US" altLang="en-US" sz="1000" b="0" i="0" u="none" strike="noStrike" cap="none" normalizeH="0" dirty="0" smtClean="0">
+                <a:ln>
+                  <a:noFill/>
+                </a:ln>
+                <a:solidFill>
+                  <a:srgbClr val="000000"/>
+                </a:solidFill>
+                <a:effectLst/>
+                <a:latin typeface="Courier New" panose="02070309020205020404" pitchFamily="49" charset="0"/>
+              </a:rPr>
+              <a:t> </a:t>
+            </a:r>
+            <a:r>
+              <a:rPr kumimoji="0" lang="en-US" altLang="en-US" sz="1000" b="0" i="0" u="none" strike="noStrike" cap="none" normalizeH="0" baseline="0" dirty="0" smtClean="0">
+                <a:ln>
+                  <a:noFill/>
+                </a:ln>
+                <a:solidFill>
+                  <a:srgbClr val="000000"/>
+                </a:solidFill>
+                <a:effectLst/>
+                <a:latin typeface="Courier New" panose="02070309020205020404" pitchFamily="49" charset="0"/>
+              </a:rPr>
+              <a:t>'value': '134.207', </a:t>
+            </a:r>
+          </a:p>
+          <a:p>
+            <a:pPr lvl="0" eaLnBrk="0" fontAlgn="base" hangingPunct="0">
+              <a:spcBef>
+                <a:spcPct val="0"/>
+              </a:spcBef>
+              <a:spcAft>
+                <a:spcPct val="0"/>
+              </a:spcAft>
+            </a:pPr>
+            <a:r>
+              <a:rPr kumimoji="0" lang="en-US" altLang="en-US" sz="1000" b="0" i="0" u="none" strike="noStrike" cap="none" normalizeH="0" baseline="0" dirty="0" smtClean="0">
+                <a:ln>
+                  <a:noFill/>
+                </a:ln>
+                <a:solidFill>
+                  <a:srgbClr val="000000"/>
+                </a:solidFill>
+                <a:effectLst/>
+                <a:latin typeface="Courier New" panose="02070309020205020404" pitchFamily="49" charset="0"/>
+              </a:rPr>
+              <a:t>    'year': '2014'}, </a:t>
+            </a:r>
+          </a:p>
+          <a:p>
+            <a:pPr lvl="0" eaLnBrk="0" fontAlgn="base" hangingPunct="0">
+              <a:spcBef>
+                <a:spcPct val="0"/>
+              </a:spcBef>
+              <a:spcAft>
+                <a:spcPct val="0"/>
+              </a:spcAft>
+            </a:pPr>
+            <a:r>
+              <a:rPr kumimoji="0" lang="en-US" altLang="en-US" sz="1000" b="0" i="0" u="none" strike="noStrike" cap="none" normalizeH="0" baseline="0" dirty="0" smtClean="0">
+                <a:ln>
+                  <a:noFill/>
+                </a:ln>
+                <a:solidFill>
+                  <a:srgbClr val="000000"/>
+                </a:solidFill>
+                <a:effectLst/>
+                <a:latin typeface="Courier New" panose="02070309020205020404" pitchFamily="49" charset="0"/>
+              </a:rPr>
+              <a:t>   {'footnotes': [{}], </a:t>
+            </a:r>
+          </a:p>
+          <a:p>
+            <a:pPr lvl="0" eaLnBrk="0" fontAlgn="base" hangingPunct="0">
+              <a:spcBef>
+                <a:spcPct val="0"/>
+              </a:spcBef>
+              <a:spcAft>
+                <a:spcPct val="0"/>
+              </a:spcAft>
+            </a:pPr>
+            <a:r>
+              <a:rPr kumimoji="0" lang="en-US" altLang="en-US" sz="1000" b="0" i="0" u="none" strike="noStrike" cap="none" normalizeH="0" baseline="0" dirty="0" smtClean="0">
+                <a:ln>
+                  <a:noFill/>
+                </a:ln>
+                <a:solidFill>
+                  <a:srgbClr val="000000"/>
+                </a:solidFill>
+                <a:effectLst/>
+                <a:latin typeface="Courier New" panose="02070309020205020404" pitchFamily="49" charset="0"/>
+              </a:rPr>
+              <a:t>    'period': 'M11', </a:t>
+            </a:r>
+          </a:p>
+          <a:p>
+            <a:pPr lvl="0" eaLnBrk="0" fontAlgn="base" hangingPunct="0">
+              <a:spcBef>
+                <a:spcPct val="0"/>
+              </a:spcBef>
+              <a:spcAft>
+                <a:spcPct val="0"/>
+              </a:spcAft>
+            </a:pPr>
+            <a:r>
+              <a:rPr kumimoji="0" lang="en-US" altLang="en-US" sz="1000" b="0" i="0" u="none" strike="noStrike" cap="none" normalizeH="0" baseline="0" dirty="0" smtClean="0">
+                <a:ln>
+                  <a:noFill/>
+                </a:ln>
+                <a:solidFill>
+                  <a:srgbClr val="000000"/>
+                </a:solidFill>
+                <a:effectLst/>
+                <a:latin typeface="Courier New" panose="02070309020205020404" pitchFamily="49" charset="0"/>
+              </a:rPr>
+              <a:t>    '</a:t>
+            </a:r>
+            <a:r>
+              <a:rPr kumimoji="0" lang="en-US" altLang="en-US" sz="1000" b="0" i="0" u="none" strike="noStrike" cap="none" normalizeH="0" baseline="0" dirty="0" err="1" smtClean="0">
+                <a:ln>
+                  <a:noFill/>
+                </a:ln>
+                <a:solidFill>
+                  <a:srgbClr val="000000"/>
+                </a:solidFill>
+                <a:effectLst/>
+                <a:latin typeface="Courier New" panose="02070309020205020404" pitchFamily="49" charset="0"/>
+              </a:rPr>
+              <a:t>periodName</a:t>
+            </a:r>
+            <a:r>
+              <a:rPr kumimoji="0" lang="en-US" altLang="en-US" sz="1000" b="0" i="0" u="none" strike="noStrike" cap="none" normalizeH="0" baseline="0" dirty="0" smtClean="0">
+                <a:ln>
+                  <a:noFill/>
+                </a:ln>
+                <a:solidFill>
+                  <a:srgbClr val="000000"/>
+                </a:solidFill>
+                <a:effectLst/>
+                <a:latin typeface="Courier New" panose="02070309020205020404" pitchFamily="49" charset="0"/>
+              </a:rPr>
+              <a:t>': 'November',</a:t>
+            </a:r>
+          </a:p>
+          <a:p>
+            <a:pPr lvl="0" eaLnBrk="0" fontAlgn="base" hangingPunct="0">
+              <a:spcBef>
+                <a:spcPct val="0"/>
+              </a:spcBef>
+              <a:spcAft>
+                <a:spcPct val="0"/>
+              </a:spcAft>
+            </a:pPr>
+            <a:r>
+              <a:rPr kumimoji="0" lang="en-US" altLang="en-US" sz="1000" b="0" i="0" u="none" strike="noStrike" cap="none" normalizeH="0" baseline="0" dirty="0" smtClean="0">
+                <a:ln>
+                  <a:noFill/>
+                </a:ln>
+                <a:solidFill>
+                  <a:srgbClr val="000000"/>
+                </a:solidFill>
+                <a:effectLst/>
+                <a:latin typeface="Courier New" panose="02070309020205020404" pitchFamily="49" charset="0"/>
+              </a:rPr>
+              <a:t>    'value': '135.107', </a:t>
+            </a:r>
+          </a:p>
+          <a:p>
+            <a:pPr lvl="0" eaLnBrk="0" fontAlgn="base" hangingPunct="0">
+              <a:spcBef>
+                <a:spcPct val="0"/>
+              </a:spcBef>
+              <a:spcAft>
+                <a:spcPct val="0"/>
+              </a:spcAft>
+            </a:pPr>
+            <a:r>
+              <a:rPr kumimoji="0" lang="en-US" altLang="en-US" sz="1000" b="0" i="0" u="none" strike="noStrike" cap="none" normalizeH="0" baseline="0" dirty="0" smtClean="0">
+                <a:ln>
+                  <a:noFill/>
+                </a:ln>
+                <a:solidFill>
+                  <a:srgbClr val="000000"/>
+                </a:solidFill>
+                <a:effectLst/>
+                <a:latin typeface="Courier New" panose="02070309020205020404" pitchFamily="49" charset="0"/>
+              </a:rPr>
+              <a:t>    'year': '2014'},</a:t>
+            </a:r>
+            <a:r>
+              <a:rPr kumimoji="0" lang="en-US" altLang="en-US" sz="800" b="0" i="0" u="none" strike="noStrike" cap="none" normalizeH="0" baseline="0" dirty="0" smtClean="0">
+                <a:ln>
+                  <a:noFill/>
+                </a:ln>
+                <a:solidFill>
+                  <a:schemeClr val="tx1"/>
+                </a:solidFill>
+                <a:effectLst/>
+              </a:rPr>
+              <a:t> </a:t>
+            </a:r>
+            <a:endParaRPr kumimoji="0" lang="en-US" altLang="en-US" sz="1800" b="0" i="0" u="none" strike="noStrike" cap="none" normalizeH="0" baseline="0" dirty="0" smtClean="0">
+              <a:ln>
+                <a:noFill/>
+              </a:ln>
+              <a:solidFill>
+                <a:schemeClr val="tx1"/>
+              </a:solidFill>
+              <a:effectLst/>
+              <a:latin typeface="Arial" panose="020B0604020202020204" pitchFamily="34" charset="0"/>
+            </a:endParaRPr>
+          </a:p>
+        </p:txBody>
+      </p:sp>
+      <p:pic>
+        <p:nvPicPr>
+          <p:cNvPr id="8" name="Picture 7"/>
+          <p:cNvPicPr>
+            <a:picLocks noChangeAspect="1"/>
+          </p:cNvPicPr>
+          <p:nvPr/>
+        </p:nvPicPr>
+        <p:blipFill>
+          <a:blip r:embed="rId2">
+            <a:extLst>
+              <a:ext uri="{28A0092B-C50C-407E-A947-70E740481C1C}">
+                <a14:useLocalDpi xmlns:a14="http://schemas.microsoft.com/office/drawing/2010/main" val="0"/>
+              </a:ext>
+            </a:extLst>
+          </a:blip>
+          <a:stretch>
+            <a:fillRect/>
+          </a:stretch>
+        </p:blipFill>
+        <p:spPr>
+          <a:xfrm>
+            <a:off x="7167887" y="3583185"/>
+            <a:ext cx="4286250" cy="762000"/>
+          </a:xfrm>
+          <a:prstGeom prst="rect">
+            <a:avLst/>
+          </a:prstGeom>
+        </p:spPr>
+      </p:pic>
+      <p:pic>
+        <p:nvPicPr>
+          <p:cNvPr id="9" name="Picture 8"/>
+          <p:cNvPicPr>
+            <a:picLocks noChangeAspect="1"/>
+          </p:cNvPicPr>
+          <p:nvPr/>
+        </p:nvPicPr>
+        <p:blipFill>
+          <a:blip r:embed="rId3">
+            <a:extLst>
+              <a:ext uri="{28A0092B-C50C-407E-A947-70E740481C1C}">
+                <a14:useLocalDpi xmlns:a14="http://schemas.microsoft.com/office/drawing/2010/main" val="0"/>
+              </a:ext>
+            </a:extLst>
+          </a:blip>
+          <a:stretch>
+            <a:fillRect/>
+          </a:stretch>
+        </p:blipFill>
+        <p:spPr>
+          <a:xfrm>
+            <a:off x="6608061" y="4519125"/>
+            <a:ext cx="5405902" cy="2114744"/>
+          </a:xfrm>
+          <a:prstGeom prst="rect">
+            <a:avLst/>
+          </a:prstGeom>
+        </p:spPr>
+      </p:pic>
+      <p:sp>
+        <p:nvSpPr>
           <p:cNvPr id="2" name="Title 1"/>
           <p:cNvSpPr>
             <a:spLocks noGrp="1"/>
@@ -7836,29 +8967,123 @@
           <a:lstStyle/>
           <a:p>
             <a:r>
+              <a:rPr lang="en-US" dirty="0" smtClean="0"/>
+              <a:t>A Tidy Data exercise</a:t>
+            </a:r>
+            <a:endParaRPr lang="en-US" dirty="0"/>
+          </a:p>
+        </p:txBody>
+      </p:sp>
+      <p:sp>
+        <p:nvSpPr>
+          <p:cNvPr id="3" name="Content Placeholder 2"/>
+          <p:cNvSpPr>
+            <a:spLocks noGrp="1"/>
+          </p:cNvSpPr>
+          <p:nvPr>
+            <p:ph idx="1"/>
+          </p:nvPr>
+        </p:nvSpPr>
+        <p:spPr/>
+        <p:txBody>
+          <a:bodyPr>
+            <a:normAutofit fontScale="92500" lnSpcReduction="20000"/>
+          </a:bodyPr>
+          <a:lstStyle/>
+          <a:p>
+            <a:r>
+              <a:rPr lang="en-US" dirty="0" smtClean="0"/>
+              <a:t>Bureau of Labor Statistics (BLS) dat</a:t>
+            </a:r>
+            <a:r>
+              <a:rPr lang="en-US" dirty="0" smtClean="0"/>
+              <a:t>a</a:t>
+            </a:r>
+          </a:p>
+          <a:p>
+            <a:r>
+              <a:rPr lang="en-US" dirty="0" smtClean="0"/>
+              <a:t>Obtained by API, provided in JSON format</a:t>
+            </a:r>
+          </a:p>
+          <a:p>
+            <a:r>
+              <a:rPr lang="en-US" dirty="0" smtClean="0"/>
+              <a:t>Problems:</a:t>
+            </a:r>
+          </a:p>
+          <a:p>
+            <a:pPr lvl="1"/>
+            <a:r>
               <a:rPr lang="en-US" dirty="0"/>
-              <a:t>Examining the economic indicators</a:t>
-            </a:r>
-            <a:endParaRPr lang="en-US" dirty="0"/>
-          </a:p>
-        </p:txBody>
-      </p:sp>
-      <p:sp>
-        <p:nvSpPr>
-          <p:cNvPr id="3" name="Content Placeholder 2"/>
-          <p:cNvSpPr>
-            <a:spLocks noGrp="1"/>
-          </p:cNvSpPr>
-          <p:nvPr>
-            <p:ph idx="1"/>
-          </p:nvPr>
-        </p:nvSpPr>
-        <p:spPr/>
-        <p:txBody>
-          <a:bodyPr/>
-          <a:lstStyle/>
-          <a:p>
-            <a:endParaRPr lang="en-US"/>
+              <a:t>Multiple variables are stored in one column.</a:t>
+            </a:r>
+          </a:p>
+          <a:p>
+            <a:pPr lvl="1"/>
+            <a:r>
+              <a:rPr lang="en-US" i="1" dirty="0" smtClean="0"/>
+              <a:t>Single variable is stored in multiple columns.</a:t>
+            </a:r>
+          </a:p>
+          <a:p>
+            <a:r>
+              <a:rPr lang="en-US" dirty="0" smtClean="0"/>
+              <a:t>The BLS </a:t>
+            </a:r>
+            <a:r>
+              <a:rPr lang="en-US" dirty="0" err="1" smtClean="0"/>
+              <a:t>SeriesID</a:t>
+            </a:r>
+            <a:r>
+              <a:rPr lang="en-US" dirty="0" smtClean="0"/>
+              <a:t> encodes many data items</a:t>
+            </a:r>
+          </a:p>
+          <a:p>
+            <a:pPr lvl="1"/>
+            <a:r>
+              <a:rPr lang="en-US" dirty="0" smtClean="0"/>
+              <a:t>The data set type/name</a:t>
+            </a:r>
+          </a:p>
+          <a:p>
+            <a:pPr lvl="1"/>
+            <a:r>
+              <a:rPr lang="en-US" dirty="0" smtClean="0"/>
+              <a:t>Some data attributes</a:t>
+            </a:r>
+          </a:p>
+          <a:p>
+            <a:pPr lvl="1"/>
+            <a:r>
+              <a:rPr lang="en-US" dirty="0" smtClean="0"/>
+              <a:t>The location (for geo based data)</a:t>
+            </a:r>
+          </a:p>
+          <a:p>
+            <a:pPr lvl="1"/>
+            <a:r>
+              <a:rPr lang="en-US" dirty="0" smtClean="0"/>
+              <a:t>The Measured value (metric name)</a:t>
+            </a:r>
+          </a:p>
+          <a:p>
+            <a:r>
+              <a:rPr lang="en-US" dirty="0" smtClean="0"/>
+              <a:t>Created lookup tables to map encoded</a:t>
+            </a:r>
+            <a:br>
+              <a:rPr lang="en-US" dirty="0" smtClean="0"/>
+            </a:br>
+            <a:r>
+              <a:rPr lang="en-US" dirty="0" smtClean="0"/>
+              <a:t>values</a:t>
+            </a:r>
+          </a:p>
+          <a:p>
+            <a:pPr lvl="1"/>
+            <a:endParaRPr lang="en-US" dirty="0" smtClean="0"/>
           </a:p>
         </p:txBody>
       </p:sp>
@@ -7883,9 +9108,170 @@
   <p:timing>
     <p:tnLst>
       <p:par>
-        <p:cTn id="1" dur="indefinite" restart="never" nodeType="tmRoot"/>
+        <p:cTn id="1" dur="indefinite" restart="never" nodeType="tmRoot">
+          <p:childTnLst>
+            <p:seq concurrent="1" nextAc="seek">
+              <p:cTn id="2" dur="indefinite" nodeType="mainSeq">
+                <p:childTnLst>
+                  <p:par>
+                    <p:cTn id="3" fill="hold">
+                      <p:stCondLst>
+                        <p:cond delay="indefinite"/>
+                      </p:stCondLst>
+                      <p:childTnLst>
+                        <p:par>
+                          <p:cTn id="4" fill="hold">
+                            <p:stCondLst>
+                              <p:cond delay="0"/>
+                            </p:stCondLst>
+                            <p:childTnLst>
+                              <p:par>
+                                <p:cTn id="5" presetID="1" presetClass="entr" presetSubtype="0" fill="hold" grpId="0" nodeType="clickEffect">
+                                  <p:stCondLst>
+                                    <p:cond delay="1000"/>
+                                  </p:stCondLst>
+                                  <p:childTnLst>
+                                    <p:set>
+                                      <p:cBhvr>
+                                        <p:cTn id="6" dur="1" fill="hold">
+                                          <p:stCondLst>
+                                            <p:cond delay="0"/>
+                                          </p:stCondLst>
+                                        </p:cTn>
+                                        <p:tgtEl>
+                                          <p:spTgt spid="5"/>
+                                        </p:tgtEl>
+                                        <p:attrNameLst>
+                                          <p:attrName>style.visibility</p:attrName>
+                                        </p:attrNameLst>
+                                      </p:cBhvr>
+                                      <p:to>
+                                        <p:strVal val="visible"/>
+                                      </p:to>
+                                    </p:set>
+                                  </p:childTnLst>
+                                </p:cTn>
+                              </p:par>
+                            </p:childTnLst>
+                          </p:cTn>
+                        </p:par>
+                      </p:childTnLst>
+                    </p:cTn>
+                  </p:par>
+                  <p:par>
+                    <p:cTn id="7" fill="hold">
+                      <p:stCondLst>
+                        <p:cond delay="indefinite"/>
+                      </p:stCondLst>
+                      <p:childTnLst>
+                        <p:par>
+                          <p:cTn id="8" fill="hold">
+                            <p:stCondLst>
+                              <p:cond delay="0"/>
+                            </p:stCondLst>
+                            <p:childTnLst>
+                              <p:par>
+                                <p:cTn id="9" presetID="1" presetClass="entr" presetSubtype="0" fill="hold" nodeType="clickEffect">
+                                  <p:stCondLst>
+                                    <p:cond delay="2000"/>
+                                  </p:stCondLst>
+                                  <p:childTnLst>
+                                    <p:set>
+                                      <p:cBhvr>
+                                        <p:cTn id="10" dur="1" fill="hold">
+                                          <p:stCondLst>
+                                            <p:cond delay="0"/>
+                                          </p:stCondLst>
+                                        </p:cTn>
+                                        <p:tgtEl>
+                                          <p:spTgt spid="8"/>
+                                        </p:tgtEl>
+                                        <p:attrNameLst>
+                                          <p:attrName>style.visibility</p:attrName>
+                                        </p:attrNameLst>
+                                      </p:cBhvr>
+                                      <p:to>
+                                        <p:strVal val="visible"/>
+                                      </p:to>
+                                    </p:set>
+                                  </p:childTnLst>
+                                </p:cTn>
+                              </p:par>
+                            </p:childTnLst>
+                          </p:cTn>
+                        </p:par>
+                      </p:childTnLst>
+                    </p:cTn>
+                  </p:par>
+                  <p:par>
+                    <p:cTn id="11" fill="hold">
+                      <p:stCondLst>
+                        <p:cond delay="indefinite"/>
+                      </p:stCondLst>
+                      <p:childTnLst>
+                        <p:par>
+                          <p:cTn id="12" fill="hold">
+                            <p:stCondLst>
+                              <p:cond delay="0"/>
+                            </p:stCondLst>
+                            <p:childTnLst>
+                              <p:par>
+                                <p:cTn id="13" presetID="1" presetClass="entr" presetSubtype="0" fill="hold" nodeType="clickEffect">
+                                  <p:stCondLst>
+                                    <p:cond delay="2000"/>
+                                  </p:stCondLst>
+                                  <p:childTnLst>
+                                    <p:set>
+                                      <p:cBhvr>
+                                        <p:cTn id="14" dur="1" fill="hold">
+                                          <p:stCondLst>
+                                            <p:cond delay="0"/>
+                                          </p:stCondLst>
+                                        </p:cTn>
+                                        <p:tgtEl>
+                                          <p:spTgt spid="9"/>
+                                        </p:tgtEl>
+                                        <p:attrNameLst>
+                                          <p:attrName>style.visibility</p:attrName>
+                                        </p:attrNameLst>
+                                      </p:cBhvr>
+                                      <p:to>
+                                        <p:strVal val="visible"/>
+                                      </p:to>
+                                    </p:set>
+                                  </p:childTnLst>
+                                </p:cTn>
+                              </p:par>
+                            </p:childTnLst>
+                          </p:cTn>
+                        </p:par>
+                      </p:childTnLst>
+                    </p:cTn>
+                  </p:par>
+                </p:childTnLst>
+              </p:cTn>
+              <p:prevCondLst>
+                <p:cond evt="onPrev" delay="0">
+                  <p:tgtEl>
+                    <p:sldTgt/>
+                  </p:tgtEl>
+                </p:cond>
+              </p:prevCondLst>
+              <p:nextCondLst>
+                <p:cond evt="onNext" delay="0">
+                  <p:tgtEl>
+                    <p:sldTgt/>
+                  </p:tgtEl>
+                </p:cond>
+              </p:nextCondLst>
+            </p:seq>
+          </p:childTnLst>
+        </p:cTn>
       </p:par>
     </p:tnLst>
+    <p:bldLst>
+      <p:bldP spid="5" grpId="0" animBg="1"/>
+    </p:bldLst>
   </p:timing>
 </p:sld>
 </file>

</xml_diff>

<commit_message>
Mid-term project: more population analysis, some with labor force
</commit_message>
<xml_diff>
--- a/project/mid-term-presentation.pptx
+++ b/project/mid-term-presentation.pptx
@@ -14,9 +14,9 @@
     <p:sldId id="260" r:id="rId8"/>
     <p:sldId id="261" r:id="rId9"/>
     <p:sldId id="262" r:id="rId10"/>
-    <p:sldId id="263" r:id="rId11"/>
-    <p:sldId id="264" r:id="rId12"/>
-    <p:sldId id="266" r:id="rId13"/>
+    <p:sldId id="266" r:id="rId11"/>
+    <p:sldId id="263" r:id="rId12"/>
+    <p:sldId id="264" r:id="rId13"/>
     <p:sldId id="267" r:id="rId14"/>
     <p:sldId id="268" r:id="rId15"/>
     <p:sldId id="269" r:id="rId16"/>
@@ -4032,6 +4032,59 @@
           </a:p>
         </p:txBody>
       </p:sp>
+      <p:sp>
+        <p:nvSpPr>
+          <p:cNvPr id="54" name="TextBox 53"/>
+          <p:cNvSpPr txBox="1"/>
+          <p:nvPr/>
+        </p:nvSpPr>
+        <p:spPr>
+          <a:xfrm>
+            <a:off x="9474243" y="5267130"/>
+            <a:ext cx="2387513" cy="1200329"/>
+          </a:xfrm>
+          <a:prstGeom prst="rect">
+            <a:avLst/>
+          </a:prstGeom>
+          <a:noFill/>
+        </p:spPr>
+        <p:txBody>
+          <a:bodyPr wrap="none" rtlCol="0">
+            <a:spAutoFit/>
+          </a:bodyPr>
+          <a:lstStyle/>
+          <a:p>
+            <a:r>
+              <a:rPr lang="en-US" dirty="0" smtClean="0"/>
+              <a:t>Michael </a:t>
+            </a:r>
+            <a:r>
+              <a:rPr lang="en-US" dirty="0" err="1" smtClean="0"/>
+              <a:t>Uftring</a:t>
+            </a:r>
+            <a:endParaRPr lang="en-US" dirty="0" smtClean="0"/>
+          </a:p>
+          <a:p>
+            <a:r>
+              <a:rPr lang="en-US" dirty="0" smtClean="0"/>
+              <a:t>Indiana University</a:t>
+            </a:r>
+          </a:p>
+          <a:p>
+            <a:r>
+              <a:rPr lang="en-US" dirty="0" smtClean="0"/>
+              <a:t>I-590 Data Visualization</a:t>
+            </a:r>
+          </a:p>
+          <a:p>
+            <a:r>
+              <a:rPr lang="en-US" dirty="0" smtClean="0"/>
+              <a:t>Fall, 2017</a:t>
+            </a:r>
+            <a:endParaRPr lang="en-US" dirty="0"/>
+          </a:p>
+        </p:txBody>
+      </p:sp>
     </p:spTree>
     <p:extLst>
       <p:ext uri="{BB962C8B-B14F-4D97-AF65-F5344CB8AC3E}">
@@ -4098,6 +4151,853 @@
           <a:p>
             <a:r>
               <a:rPr lang="en-US" dirty="0" smtClean="0"/>
+              <a:t>About the data sets</a:t>
+            </a:r>
+            <a:endParaRPr lang="en-US" dirty="0"/>
+          </a:p>
+        </p:txBody>
+      </p:sp>
+      <p:sp>
+        <p:nvSpPr>
+          <p:cNvPr id="3" name="Content Placeholder 2"/>
+          <p:cNvSpPr>
+            <a:spLocks noGrp="1"/>
+          </p:cNvSpPr>
+          <p:nvPr>
+            <p:ph sz="half" idx="1"/>
+          </p:nvPr>
+        </p:nvSpPr>
+        <p:spPr>
+          <a:xfrm>
+            <a:off x="838200" y="1825625"/>
+            <a:ext cx="5181600" cy="1580049"/>
+          </a:xfrm>
+        </p:spPr>
+        <p:txBody>
+          <a:bodyPr>
+            <a:normAutofit fontScale="92500"/>
+          </a:bodyPr>
+          <a:lstStyle/>
+          <a:p>
+            <a:r>
+              <a:rPr lang="en-US" dirty="0" smtClean="0"/>
+              <a:t>The data sets are time-series data</a:t>
+            </a:r>
+          </a:p>
+          <a:p>
+            <a:r>
+              <a:rPr lang="en-US" dirty="0" smtClean="0"/>
+              <a:t>They represent a measured observation at particular times</a:t>
+            </a:r>
+          </a:p>
+        </p:txBody>
+      </p:sp>
+      <p:sp>
+        <p:nvSpPr>
+          <p:cNvPr id="4" name="Content Placeholder 3"/>
+          <p:cNvSpPr>
+            <a:spLocks noGrp="1"/>
+          </p:cNvSpPr>
+          <p:nvPr>
+            <p:ph sz="half" idx="2"/>
+          </p:nvPr>
+        </p:nvSpPr>
+        <p:spPr/>
+        <p:txBody>
+          <a:bodyPr>
+            <a:normAutofit fontScale="92500"/>
+          </a:bodyPr>
+          <a:lstStyle/>
+          <a:p>
+            <a:r>
+              <a:rPr lang="en-US" dirty="0" smtClean="0"/>
+              <a:t>Bureau of Labor Statistics (BLS) provides:</a:t>
+            </a:r>
+          </a:p>
+          <a:p>
+            <a:pPr lvl="1"/>
+            <a:r>
+              <a:rPr lang="en-US" dirty="0" smtClean="0"/>
+              <a:t>Unemployment Rate (as a %)</a:t>
+            </a:r>
+          </a:p>
+          <a:p>
+            <a:pPr lvl="1"/>
+            <a:r>
+              <a:rPr lang="en-US" dirty="0" smtClean="0"/>
+              <a:t>Unemployment (number)</a:t>
+            </a:r>
+          </a:p>
+          <a:p>
+            <a:pPr lvl="1"/>
+            <a:r>
+              <a:rPr lang="en-US" dirty="0" smtClean="0"/>
+              <a:t>Employment (number)</a:t>
+            </a:r>
+          </a:p>
+          <a:p>
+            <a:pPr lvl="1"/>
+            <a:r>
+              <a:rPr lang="en-US" dirty="0" smtClean="0"/>
+              <a:t>Labor Force (number)</a:t>
+            </a:r>
+          </a:p>
+          <a:p>
+            <a:r>
+              <a:rPr lang="en-US" dirty="0" smtClean="0"/>
+              <a:t>Census Bureau provides:</a:t>
+            </a:r>
+          </a:p>
+          <a:p>
+            <a:pPr lvl="1"/>
+            <a:r>
+              <a:rPr lang="en-US" dirty="0" smtClean="0"/>
+              <a:t>Population (number)</a:t>
+            </a:r>
+          </a:p>
+          <a:p>
+            <a:pPr lvl="1"/>
+            <a:r>
+              <a:rPr lang="en-US" dirty="0" smtClean="0"/>
+              <a:t>… nationally</a:t>
+            </a:r>
+          </a:p>
+          <a:p>
+            <a:pPr lvl="1"/>
+            <a:r>
+              <a:rPr lang="en-US" dirty="0" smtClean="0"/>
+              <a:t>… by location (city, state)</a:t>
+            </a:r>
+            <a:endParaRPr lang="en-US" dirty="0"/>
+          </a:p>
+        </p:txBody>
+      </p:sp>
+      <p:sp>
+        <p:nvSpPr>
+          <p:cNvPr id="5" name="Content Placeholder 2"/>
+          <p:cNvSpPr txBox="1">
+            <a:spLocks/>
+          </p:cNvSpPr>
+          <p:nvPr/>
+        </p:nvSpPr>
+        <p:spPr>
+          <a:xfrm>
+            <a:off x="838200" y="3135086"/>
+            <a:ext cx="5181600" cy="3452326"/>
+          </a:xfrm>
+          <a:prstGeom prst="rect">
+            <a:avLst/>
+          </a:prstGeom>
+        </p:spPr>
+        <p:txBody>
+          <a:bodyPr vert="horz" lIns="91440" tIns="45720" rIns="91440" bIns="45720" rtlCol="0">
+            <a:normAutofit fontScale="92500"/>
+          </a:bodyPr>
+          <a:lstStyle>
+            <a:lvl1pPr marL="228600" indent="-228600" algn="l" defTabSz="914400" rtl="0" eaLnBrk="1" latinLnBrk="0" hangingPunct="1">
+              <a:lnSpc>
+                <a:spcPct val="90000"/>
+              </a:lnSpc>
+              <a:spcBef>
+                <a:spcPts val="1000"/>
+              </a:spcBef>
+              <a:buFont typeface="Arial" panose="020B0604020202020204" pitchFamily="34" charset="0"/>
+              <a:buChar char="•"/>
+              <a:defRPr sz="2800" kern="1200">
+                <a:solidFill>
+                  <a:schemeClr val="tx1"/>
+                </a:solidFill>
+                <a:latin typeface="+mn-lt"/>
+                <a:ea typeface="+mn-ea"/>
+                <a:cs typeface="+mn-cs"/>
+              </a:defRPr>
+            </a:lvl1pPr>
+            <a:lvl2pPr marL="685800" indent="-228600" algn="l" defTabSz="914400" rtl="0" eaLnBrk="1" latinLnBrk="0" hangingPunct="1">
+              <a:lnSpc>
+                <a:spcPct val="90000"/>
+              </a:lnSpc>
+              <a:spcBef>
+                <a:spcPts val="500"/>
+              </a:spcBef>
+              <a:buFont typeface="Arial" panose="020B0604020202020204" pitchFamily="34" charset="0"/>
+              <a:buChar char="•"/>
+              <a:defRPr sz="2400" kern="1200">
+                <a:solidFill>
+                  <a:schemeClr val="tx1"/>
+                </a:solidFill>
+                <a:latin typeface="+mn-lt"/>
+                <a:ea typeface="+mn-ea"/>
+                <a:cs typeface="+mn-cs"/>
+              </a:defRPr>
+            </a:lvl2pPr>
+            <a:lvl3pPr marL="1143000" indent="-228600" algn="l" defTabSz="914400" rtl="0" eaLnBrk="1" latinLnBrk="0" hangingPunct="1">
+              <a:lnSpc>
+                <a:spcPct val="90000"/>
+              </a:lnSpc>
+              <a:spcBef>
+                <a:spcPts val="500"/>
+              </a:spcBef>
+              <a:buFont typeface="Arial" panose="020B0604020202020204" pitchFamily="34" charset="0"/>
+              <a:buChar char="•"/>
+              <a:defRPr sz="2000" kern="1200">
+                <a:solidFill>
+                  <a:schemeClr val="tx1"/>
+                </a:solidFill>
+                <a:latin typeface="+mn-lt"/>
+                <a:ea typeface="+mn-ea"/>
+                <a:cs typeface="+mn-cs"/>
+              </a:defRPr>
+            </a:lvl3pPr>
+            <a:lvl4pPr marL="1600200" indent="-228600" algn="l" defTabSz="914400" rtl="0" eaLnBrk="1" latinLnBrk="0" hangingPunct="1">
+              <a:lnSpc>
+                <a:spcPct val="90000"/>
+              </a:lnSpc>
+              <a:spcBef>
+                <a:spcPts val="500"/>
+              </a:spcBef>
+              <a:buFont typeface="Arial" panose="020B0604020202020204" pitchFamily="34" charset="0"/>
+              <a:buChar char="•"/>
+              <a:defRPr sz="1800" kern="1200">
+                <a:solidFill>
+                  <a:schemeClr val="tx1"/>
+                </a:solidFill>
+                <a:latin typeface="+mn-lt"/>
+                <a:ea typeface="+mn-ea"/>
+                <a:cs typeface="+mn-cs"/>
+              </a:defRPr>
+            </a:lvl4pPr>
+            <a:lvl5pPr marL="2057400" indent="-228600" algn="l" defTabSz="914400" rtl="0" eaLnBrk="1" latinLnBrk="0" hangingPunct="1">
+              <a:lnSpc>
+                <a:spcPct val="90000"/>
+              </a:lnSpc>
+              <a:spcBef>
+                <a:spcPts val="500"/>
+              </a:spcBef>
+              <a:buFont typeface="Arial" panose="020B0604020202020204" pitchFamily="34" charset="0"/>
+              <a:buChar char="•"/>
+              <a:defRPr sz="1800" kern="1200">
+                <a:solidFill>
+                  <a:schemeClr val="tx1"/>
+                </a:solidFill>
+                <a:latin typeface="+mn-lt"/>
+                <a:ea typeface="+mn-ea"/>
+                <a:cs typeface="+mn-cs"/>
+              </a:defRPr>
+            </a:lvl5pPr>
+            <a:lvl6pPr marL="2514600" indent="-228600" algn="l" defTabSz="914400" rtl="0" eaLnBrk="1" latinLnBrk="0" hangingPunct="1">
+              <a:lnSpc>
+                <a:spcPct val="90000"/>
+              </a:lnSpc>
+              <a:spcBef>
+                <a:spcPts val="500"/>
+              </a:spcBef>
+              <a:buFont typeface="Arial" panose="020B0604020202020204" pitchFamily="34" charset="0"/>
+              <a:buChar char="•"/>
+              <a:defRPr sz="1800" kern="1200">
+                <a:solidFill>
+                  <a:schemeClr val="tx1"/>
+                </a:solidFill>
+                <a:latin typeface="+mn-lt"/>
+                <a:ea typeface="+mn-ea"/>
+                <a:cs typeface="+mn-cs"/>
+              </a:defRPr>
+            </a:lvl6pPr>
+            <a:lvl7pPr marL="2971800" indent="-228600" algn="l" defTabSz="914400" rtl="0" eaLnBrk="1" latinLnBrk="0" hangingPunct="1">
+              <a:lnSpc>
+                <a:spcPct val="90000"/>
+              </a:lnSpc>
+              <a:spcBef>
+                <a:spcPts val="500"/>
+              </a:spcBef>
+              <a:buFont typeface="Arial" panose="020B0604020202020204" pitchFamily="34" charset="0"/>
+              <a:buChar char="•"/>
+              <a:defRPr sz="1800" kern="1200">
+                <a:solidFill>
+                  <a:schemeClr val="tx1"/>
+                </a:solidFill>
+                <a:latin typeface="+mn-lt"/>
+                <a:ea typeface="+mn-ea"/>
+                <a:cs typeface="+mn-cs"/>
+              </a:defRPr>
+            </a:lvl7pPr>
+            <a:lvl8pPr marL="3429000" indent="-228600" algn="l" defTabSz="914400" rtl="0" eaLnBrk="1" latinLnBrk="0" hangingPunct="1">
+              <a:lnSpc>
+                <a:spcPct val="90000"/>
+              </a:lnSpc>
+              <a:spcBef>
+                <a:spcPts val="500"/>
+              </a:spcBef>
+              <a:buFont typeface="Arial" panose="020B0604020202020204" pitchFamily="34" charset="0"/>
+              <a:buChar char="•"/>
+              <a:defRPr sz="1800" kern="1200">
+                <a:solidFill>
+                  <a:schemeClr val="tx1"/>
+                </a:solidFill>
+                <a:latin typeface="+mn-lt"/>
+                <a:ea typeface="+mn-ea"/>
+                <a:cs typeface="+mn-cs"/>
+              </a:defRPr>
+            </a:lvl8pPr>
+            <a:lvl9pPr marL="3886200" indent="-228600" algn="l" defTabSz="914400" rtl="0" eaLnBrk="1" latinLnBrk="0" hangingPunct="1">
+              <a:lnSpc>
+                <a:spcPct val="90000"/>
+              </a:lnSpc>
+              <a:spcBef>
+                <a:spcPts val="500"/>
+              </a:spcBef>
+              <a:buFont typeface="Arial" panose="020B0604020202020204" pitchFamily="34" charset="0"/>
+              <a:buChar char="•"/>
+              <a:defRPr sz="1800" kern="1200">
+                <a:solidFill>
+                  <a:schemeClr val="tx1"/>
+                </a:solidFill>
+                <a:latin typeface="+mn-lt"/>
+                <a:ea typeface="+mn-ea"/>
+                <a:cs typeface="+mn-cs"/>
+              </a:defRPr>
+            </a:lvl9pPr>
+          </a:lstStyle>
+          <a:p>
+            <a:r>
+              <a:rPr lang="en-US" dirty="0" smtClean="0"/>
+              <a:t>The best visual representation is usually line chart</a:t>
+            </a:r>
+          </a:p>
+          <a:p>
+            <a:pPr lvl="1"/>
+            <a:r>
+              <a:rPr lang="en-US" dirty="0" smtClean="0"/>
+              <a:t>Show the change in value over time</a:t>
+            </a:r>
+          </a:p>
+          <a:p>
+            <a:r>
+              <a:rPr lang="en-US" dirty="0" smtClean="0"/>
+              <a:t>We also use bar charts to compare the same measure across a spatial dimension</a:t>
+            </a:r>
+          </a:p>
+          <a:p>
+            <a:pPr lvl="1"/>
+            <a:r>
+              <a:rPr lang="en-US" dirty="0" smtClean="0"/>
+              <a:t>City and National values for a specific measure, for a specific time period</a:t>
+            </a:r>
+            <a:endParaRPr lang="en-US" dirty="0"/>
+          </a:p>
+        </p:txBody>
+      </p:sp>
+    </p:spTree>
+    <p:extLst>
+      <p:ext uri="{BB962C8B-B14F-4D97-AF65-F5344CB8AC3E}">
+        <p14:creationId xmlns:p14="http://schemas.microsoft.com/office/powerpoint/2010/main" val="2795230163"/>
+      </p:ext>
+    </p:extLst>
+  </p:cSld>
+  <p:clrMapOvr>
+    <a:masterClrMapping/>
+  </p:clrMapOvr>
+  <mc:AlternateContent xmlns:mc="http://schemas.openxmlformats.org/markup-compatibility/2006" xmlns:p14="http://schemas.microsoft.com/office/powerpoint/2010/main">
+    <mc:Choice Requires="p14">
+      <p:transition spd="slow" p14:dur="2000" advTm="15000"/>
+    </mc:Choice>
+    <mc:Fallback xmlns="">
+      <p:transition spd="slow" advTm="15000"/>
+    </mc:Fallback>
+  </mc:AlternateContent>
+  <p:timing>
+    <p:tnLst>
+      <p:par>
+        <p:cTn id="1" dur="indefinite" restart="never" nodeType="tmRoot">
+          <p:childTnLst>
+            <p:seq concurrent="1" nextAc="seek">
+              <p:cTn id="2" dur="indefinite" nodeType="mainSeq">
+                <p:childTnLst>
+                  <p:par>
+                    <p:cTn id="3" fill="hold">
+                      <p:stCondLst>
+                        <p:cond delay="indefinite"/>
+                      </p:stCondLst>
+                      <p:childTnLst>
+                        <p:par>
+                          <p:cTn id="4" fill="hold">
+                            <p:stCondLst>
+                              <p:cond delay="0"/>
+                            </p:stCondLst>
+                            <p:childTnLst>
+                              <p:par>
+                                <p:cTn id="5" presetID="1" presetClass="entr" presetSubtype="0" fill="hold" grpId="0" nodeType="clickEffect">
+                                  <p:stCondLst>
+                                    <p:cond delay="0"/>
+                                  </p:stCondLst>
+                                  <p:childTnLst>
+                                    <p:set>
+                                      <p:cBhvr>
+                                        <p:cTn id="6" dur="1" fill="hold">
+                                          <p:stCondLst>
+                                            <p:cond delay="0"/>
+                                          </p:stCondLst>
+                                        </p:cTn>
+                                        <p:tgtEl>
+                                          <p:spTgt spid="3">
+                                            <p:txEl>
+                                              <p:pRg st="0" end="0"/>
+                                            </p:txEl>
+                                          </p:spTgt>
+                                        </p:tgtEl>
+                                        <p:attrNameLst>
+                                          <p:attrName>style.visibility</p:attrName>
+                                        </p:attrNameLst>
+                                      </p:cBhvr>
+                                      <p:to>
+                                        <p:strVal val="visible"/>
+                                      </p:to>
+                                    </p:set>
+                                  </p:childTnLst>
+                                </p:cTn>
+                              </p:par>
+                              <p:par>
+                                <p:cTn id="7" presetID="1" presetClass="entr" presetSubtype="0" fill="hold" grpId="0" nodeType="withEffect">
+                                  <p:stCondLst>
+                                    <p:cond delay="0"/>
+                                  </p:stCondLst>
+                                  <p:childTnLst>
+                                    <p:set>
+                                      <p:cBhvr>
+                                        <p:cTn id="8" dur="1" fill="hold">
+                                          <p:stCondLst>
+                                            <p:cond delay="0"/>
+                                          </p:stCondLst>
+                                        </p:cTn>
+                                        <p:tgtEl>
+                                          <p:spTgt spid="3">
+                                            <p:txEl>
+                                              <p:pRg st="1" end="1"/>
+                                            </p:txEl>
+                                          </p:spTgt>
+                                        </p:tgtEl>
+                                        <p:attrNameLst>
+                                          <p:attrName>style.visibility</p:attrName>
+                                        </p:attrNameLst>
+                                      </p:cBhvr>
+                                      <p:to>
+                                        <p:strVal val="visible"/>
+                                      </p:to>
+                                    </p:set>
+                                  </p:childTnLst>
+                                </p:cTn>
+                              </p:par>
+                            </p:childTnLst>
+                          </p:cTn>
+                        </p:par>
+                      </p:childTnLst>
+                    </p:cTn>
+                  </p:par>
+                  <p:par>
+                    <p:cTn id="9" fill="hold">
+                      <p:stCondLst>
+                        <p:cond delay="indefinite"/>
+                      </p:stCondLst>
+                      <p:childTnLst>
+                        <p:par>
+                          <p:cTn id="10" fill="hold">
+                            <p:stCondLst>
+                              <p:cond delay="0"/>
+                            </p:stCondLst>
+                            <p:childTnLst>
+                              <p:par>
+                                <p:cTn id="11" presetID="1" presetClass="entr" presetSubtype="0" fill="hold" grpId="0" nodeType="clickEffect">
+                                  <p:stCondLst>
+                                    <p:cond delay="2000"/>
+                                  </p:stCondLst>
+                                  <p:childTnLst>
+                                    <p:set>
+                                      <p:cBhvr>
+                                        <p:cTn id="12" dur="1" fill="hold">
+                                          <p:stCondLst>
+                                            <p:cond delay="0"/>
+                                          </p:stCondLst>
+                                        </p:cTn>
+                                        <p:tgtEl>
+                                          <p:spTgt spid="4">
+                                            <p:txEl>
+                                              <p:pRg st="0" end="0"/>
+                                            </p:txEl>
+                                          </p:spTgt>
+                                        </p:tgtEl>
+                                        <p:attrNameLst>
+                                          <p:attrName>style.visibility</p:attrName>
+                                        </p:attrNameLst>
+                                      </p:cBhvr>
+                                      <p:to>
+                                        <p:strVal val="visible"/>
+                                      </p:to>
+                                    </p:set>
+                                  </p:childTnLst>
+                                </p:cTn>
+                              </p:par>
+                              <p:par>
+                                <p:cTn id="13" presetID="1" presetClass="entr" presetSubtype="0" fill="hold" grpId="0" nodeType="withEffect">
+                                  <p:stCondLst>
+                                    <p:cond delay="3000"/>
+                                  </p:stCondLst>
+                                  <p:childTnLst>
+                                    <p:set>
+                                      <p:cBhvr>
+                                        <p:cTn id="14" dur="1" fill="hold">
+                                          <p:stCondLst>
+                                            <p:cond delay="0"/>
+                                          </p:stCondLst>
+                                        </p:cTn>
+                                        <p:tgtEl>
+                                          <p:spTgt spid="4">
+                                            <p:txEl>
+                                              <p:pRg st="1" end="1"/>
+                                            </p:txEl>
+                                          </p:spTgt>
+                                        </p:tgtEl>
+                                        <p:attrNameLst>
+                                          <p:attrName>style.visibility</p:attrName>
+                                        </p:attrNameLst>
+                                      </p:cBhvr>
+                                      <p:to>
+                                        <p:strVal val="visible"/>
+                                      </p:to>
+                                    </p:set>
+                                  </p:childTnLst>
+                                </p:cTn>
+                              </p:par>
+                              <p:par>
+                                <p:cTn id="15" presetID="1" presetClass="entr" presetSubtype="0" fill="hold" grpId="0" nodeType="withEffect">
+                                  <p:stCondLst>
+                                    <p:cond delay="3000"/>
+                                  </p:stCondLst>
+                                  <p:childTnLst>
+                                    <p:set>
+                                      <p:cBhvr>
+                                        <p:cTn id="16" dur="1" fill="hold">
+                                          <p:stCondLst>
+                                            <p:cond delay="0"/>
+                                          </p:stCondLst>
+                                        </p:cTn>
+                                        <p:tgtEl>
+                                          <p:spTgt spid="4">
+                                            <p:txEl>
+                                              <p:pRg st="2" end="2"/>
+                                            </p:txEl>
+                                          </p:spTgt>
+                                        </p:tgtEl>
+                                        <p:attrNameLst>
+                                          <p:attrName>style.visibility</p:attrName>
+                                        </p:attrNameLst>
+                                      </p:cBhvr>
+                                      <p:to>
+                                        <p:strVal val="visible"/>
+                                      </p:to>
+                                    </p:set>
+                                  </p:childTnLst>
+                                </p:cTn>
+                              </p:par>
+                              <p:par>
+                                <p:cTn id="17" presetID="1" presetClass="entr" presetSubtype="0" fill="hold" grpId="0" nodeType="withEffect">
+                                  <p:stCondLst>
+                                    <p:cond delay="3000"/>
+                                  </p:stCondLst>
+                                  <p:childTnLst>
+                                    <p:set>
+                                      <p:cBhvr>
+                                        <p:cTn id="18" dur="1" fill="hold">
+                                          <p:stCondLst>
+                                            <p:cond delay="0"/>
+                                          </p:stCondLst>
+                                        </p:cTn>
+                                        <p:tgtEl>
+                                          <p:spTgt spid="4">
+                                            <p:txEl>
+                                              <p:pRg st="3" end="3"/>
+                                            </p:txEl>
+                                          </p:spTgt>
+                                        </p:tgtEl>
+                                        <p:attrNameLst>
+                                          <p:attrName>style.visibility</p:attrName>
+                                        </p:attrNameLst>
+                                      </p:cBhvr>
+                                      <p:to>
+                                        <p:strVal val="visible"/>
+                                      </p:to>
+                                    </p:set>
+                                  </p:childTnLst>
+                                </p:cTn>
+                              </p:par>
+                              <p:par>
+                                <p:cTn id="19" presetID="1" presetClass="entr" presetSubtype="0" fill="hold" grpId="0" nodeType="withEffect">
+                                  <p:stCondLst>
+                                    <p:cond delay="3000"/>
+                                  </p:stCondLst>
+                                  <p:childTnLst>
+                                    <p:set>
+                                      <p:cBhvr>
+                                        <p:cTn id="20" dur="1" fill="hold">
+                                          <p:stCondLst>
+                                            <p:cond delay="0"/>
+                                          </p:stCondLst>
+                                        </p:cTn>
+                                        <p:tgtEl>
+                                          <p:spTgt spid="4">
+                                            <p:txEl>
+                                              <p:pRg st="4" end="4"/>
+                                            </p:txEl>
+                                          </p:spTgt>
+                                        </p:tgtEl>
+                                        <p:attrNameLst>
+                                          <p:attrName>style.visibility</p:attrName>
+                                        </p:attrNameLst>
+                                      </p:cBhvr>
+                                      <p:to>
+                                        <p:strVal val="visible"/>
+                                      </p:to>
+                                    </p:set>
+                                  </p:childTnLst>
+                                </p:cTn>
+                              </p:par>
+                              <p:par>
+                                <p:cTn id="21" presetID="1" presetClass="entr" presetSubtype="0" fill="hold" grpId="0" nodeType="withEffect">
+                                  <p:stCondLst>
+                                    <p:cond delay="2000"/>
+                                  </p:stCondLst>
+                                  <p:childTnLst>
+                                    <p:set>
+                                      <p:cBhvr>
+                                        <p:cTn id="22" dur="1" fill="hold">
+                                          <p:stCondLst>
+                                            <p:cond delay="0"/>
+                                          </p:stCondLst>
+                                        </p:cTn>
+                                        <p:tgtEl>
+                                          <p:spTgt spid="4">
+                                            <p:txEl>
+                                              <p:pRg st="5" end="5"/>
+                                            </p:txEl>
+                                          </p:spTgt>
+                                        </p:tgtEl>
+                                        <p:attrNameLst>
+                                          <p:attrName>style.visibility</p:attrName>
+                                        </p:attrNameLst>
+                                      </p:cBhvr>
+                                      <p:to>
+                                        <p:strVal val="visible"/>
+                                      </p:to>
+                                    </p:set>
+                                  </p:childTnLst>
+                                </p:cTn>
+                              </p:par>
+                              <p:par>
+                                <p:cTn id="23" presetID="1" presetClass="entr" presetSubtype="0" fill="hold" grpId="0" nodeType="withEffect">
+                                  <p:stCondLst>
+                                    <p:cond delay="3000"/>
+                                  </p:stCondLst>
+                                  <p:childTnLst>
+                                    <p:set>
+                                      <p:cBhvr>
+                                        <p:cTn id="24" dur="1" fill="hold">
+                                          <p:stCondLst>
+                                            <p:cond delay="0"/>
+                                          </p:stCondLst>
+                                        </p:cTn>
+                                        <p:tgtEl>
+                                          <p:spTgt spid="4">
+                                            <p:txEl>
+                                              <p:pRg st="6" end="6"/>
+                                            </p:txEl>
+                                          </p:spTgt>
+                                        </p:tgtEl>
+                                        <p:attrNameLst>
+                                          <p:attrName>style.visibility</p:attrName>
+                                        </p:attrNameLst>
+                                      </p:cBhvr>
+                                      <p:to>
+                                        <p:strVal val="visible"/>
+                                      </p:to>
+                                    </p:set>
+                                  </p:childTnLst>
+                                </p:cTn>
+                              </p:par>
+                              <p:par>
+                                <p:cTn id="25" presetID="1" presetClass="entr" presetSubtype="0" fill="hold" grpId="0" nodeType="withEffect">
+                                  <p:stCondLst>
+                                    <p:cond delay="3000"/>
+                                  </p:stCondLst>
+                                  <p:childTnLst>
+                                    <p:set>
+                                      <p:cBhvr>
+                                        <p:cTn id="26" dur="1" fill="hold">
+                                          <p:stCondLst>
+                                            <p:cond delay="0"/>
+                                          </p:stCondLst>
+                                        </p:cTn>
+                                        <p:tgtEl>
+                                          <p:spTgt spid="4">
+                                            <p:txEl>
+                                              <p:pRg st="7" end="7"/>
+                                            </p:txEl>
+                                          </p:spTgt>
+                                        </p:tgtEl>
+                                        <p:attrNameLst>
+                                          <p:attrName>style.visibility</p:attrName>
+                                        </p:attrNameLst>
+                                      </p:cBhvr>
+                                      <p:to>
+                                        <p:strVal val="visible"/>
+                                      </p:to>
+                                    </p:set>
+                                  </p:childTnLst>
+                                </p:cTn>
+                              </p:par>
+                              <p:par>
+                                <p:cTn id="27" presetID="1" presetClass="entr" presetSubtype="0" fill="hold" grpId="0" nodeType="withEffect">
+                                  <p:stCondLst>
+                                    <p:cond delay="3000"/>
+                                  </p:stCondLst>
+                                  <p:childTnLst>
+                                    <p:set>
+                                      <p:cBhvr>
+                                        <p:cTn id="28" dur="1" fill="hold">
+                                          <p:stCondLst>
+                                            <p:cond delay="0"/>
+                                          </p:stCondLst>
+                                        </p:cTn>
+                                        <p:tgtEl>
+                                          <p:spTgt spid="4">
+                                            <p:txEl>
+                                              <p:pRg st="8" end="8"/>
+                                            </p:txEl>
+                                          </p:spTgt>
+                                        </p:tgtEl>
+                                        <p:attrNameLst>
+                                          <p:attrName>style.visibility</p:attrName>
+                                        </p:attrNameLst>
+                                      </p:cBhvr>
+                                      <p:to>
+                                        <p:strVal val="visible"/>
+                                      </p:to>
+                                    </p:set>
+                                  </p:childTnLst>
+                                </p:cTn>
+                              </p:par>
+                            </p:childTnLst>
+                          </p:cTn>
+                        </p:par>
+                      </p:childTnLst>
+                    </p:cTn>
+                  </p:par>
+                  <p:par>
+                    <p:cTn id="29" fill="hold">
+                      <p:stCondLst>
+                        <p:cond delay="indefinite"/>
+                      </p:stCondLst>
+                      <p:childTnLst>
+                        <p:par>
+                          <p:cTn id="30" fill="hold">
+                            <p:stCondLst>
+                              <p:cond delay="0"/>
+                            </p:stCondLst>
+                            <p:childTnLst>
+                              <p:par>
+                                <p:cTn id="31" presetID="1" presetClass="entr" presetSubtype="0" fill="hold" grpId="0" nodeType="clickEffect">
+                                  <p:stCondLst>
+                                    <p:cond delay="2000"/>
+                                  </p:stCondLst>
+                                  <p:childTnLst>
+                                    <p:set>
+                                      <p:cBhvr>
+                                        <p:cTn id="32" dur="1" fill="hold">
+                                          <p:stCondLst>
+                                            <p:cond delay="0"/>
+                                          </p:stCondLst>
+                                        </p:cTn>
+                                        <p:tgtEl>
+                                          <p:spTgt spid="5"/>
+                                        </p:tgtEl>
+                                        <p:attrNameLst>
+                                          <p:attrName>style.visibility</p:attrName>
+                                        </p:attrNameLst>
+                                      </p:cBhvr>
+                                      <p:to>
+                                        <p:strVal val="visible"/>
+                                      </p:to>
+                                    </p:set>
+                                  </p:childTnLst>
+                                </p:cTn>
+                              </p:par>
+                            </p:childTnLst>
+                          </p:cTn>
+                        </p:par>
+                      </p:childTnLst>
+                    </p:cTn>
+                  </p:par>
+                </p:childTnLst>
+              </p:cTn>
+              <p:prevCondLst>
+                <p:cond evt="onPrev" delay="0">
+                  <p:tgtEl>
+                    <p:sldTgt/>
+                  </p:tgtEl>
+                </p:cond>
+              </p:prevCondLst>
+              <p:nextCondLst>
+                <p:cond evt="onNext" delay="0">
+                  <p:tgtEl>
+                    <p:sldTgt/>
+                  </p:tgtEl>
+                </p:cond>
+              </p:nextCondLst>
+            </p:seq>
+          </p:childTnLst>
+        </p:cTn>
+      </p:par>
+    </p:tnLst>
+    <p:bldLst>
+      <p:bldP spid="3" grpId="0" uiExpand="1" build="allAtOnce"/>
+      <p:bldP spid="4" grpId="0" uiExpand="1" build="allAtOnce"/>
+      <p:bldP spid="5" grpId="0"/>
+    </p:bldLst>
+  </p:timing>
+</p:sld>
+</file>
+
+<file path=ppt/slides/slide11.xml><?xml version="1.0" encoding="utf-8"?>
+<p:sld xmlns:a="http://schemas.openxmlformats.org/drawingml/2006/main" xmlns:r="http://schemas.openxmlformats.org/officeDocument/2006/relationships" xmlns:p="http://schemas.openxmlformats.org/presentationml/2006/main">
+  <p:cSld>
+    <p:spTree>
+      <p:nvGrpSpPr>
+        <p:cNvPr id="1" name=""/>
+        <p:cNvGrpSpPr/>
+        <p:nvPr/>
+      </p:nvGrpSpPr>
+      <p:grpSpPr>
+        <a:xfrm>
+          <a:off x="0" y="0"/>
+          <a:ext cx="0" cy="0"/>
+          <a:chOff x="0" y="0"/>
+          <a:chExt cx="0" cy="0"/>
+        </a:xfrm>
+      </p:grpSpPr>
+      <p:sp>
+        <p:nvSpPr>
+          <p:cNvPr id="2" name="Title 1"/>
+          <p:cNvSpPr>
+            <a:spLocks noGrp="1"/>
+          </p:cNvSpPr>
+          <p:nvPr>
+            <p:ph type="title"/>
+          </p:nvPr>
+        </p:nvSpPr>
+        <p:spPr/>
+        <p:txBody>
+          <a:bodyPr/>
+          <a:lstStyle/>
+          <a:p>
+            <a:r>
+              <a:rPr lang="en-US" dirty="0" smtClean="0"/>
               <a:t>Making the data useful (for this project)</a:t>
             </a:r>
             <a:endParaRPr lang="en-US" dirty="0"/>
@@ -4297,7 +5197,7 @@
 </p:sld>
 </file>
 
-<file path=ppt/slides/slide11.xml><?xml version="1.0" encoding="utf-8"?>
+<file path=ppt/slides/slide12.xml><?xml version="1.0" encoding="utf-8"?>
 <p:sld xmlns:a="http://schemas.openxmlformats.org/drawingml/2006/main" xmlns:r="http://schemas.openxmlformats.org/officeDocument/2006/relationships" xmlns:p="http://schemas.openxmlformats.org/presentationml/2006/main">
   <p:cSld>
     <p:spTree>
@@ -4324,7 +5224,7 @@
         </p:nvSpPr>
         <p:spPr bwMode="auto">
           <a:xfrm>
-            <a:off x="8136296" y="1254809"/>
+            <a:off x="7716748" y="2169204"/>
             <a:ext cx="2349432" cy="2154436"/>
           </a:xfrm>
           <a:prstGeom prst="rect">
@@ -4867,7 +5767,7 @@
         </p:blipFill>
         <p:spPr>
           <a:xfrm>
-            <a:off x="7167887" y="3583185"/>
+            <a:off x="6643972" y="2865422"/>
             <a:ext cx="4286250" cy="762000"/>
           </a:xfrm>
           <a:prstGeom prst="rect">
@@ -4897,8 +5797,8 @@
         </p:blipFill>
         <p:spPr>
           <a:xfrm>
-            <a:off x="6608061" y="4519125"/>
-            <a:ext cx="5405902" cy="2114744"/>
+            <a:off x="6268537" y="2220354"/>
+            <a:ext cx="5245854" cy="2052135"/>
           </a:xfrm>
           <a:prstGeom prst="rect">
             <a:avLst/>
@@ -4935,13 +5835,13 @@
             <a:spLocks noGrp="1"/>
           </p:cNvSpPr>
           <p:nvPr>
-            <p:ph idx="1"/>
+            <p:ph sz="half" idx="1"/>
           </p:nvPr>
         </p:nvSpPr>
         <p:spPr/>
         <p:txBody>
           <a:bodyPr>
-            <a:normAutofit fontScale="92500" lnSpcReduction="20000"/>
+            <a:normAutofit fontScale="77500" lnSpcReduction="20000"/>
           </a:bodyPr>
           <a:lstStyle/>
           <a:p>
@@ -5035,12 +5935,38 @@
               <a:t>values</a:t>
             </a:r>
           </a:p>
-          <a:p>
-            <a:pPr lvl="1"/>
-            <a:endParaRPr lang="en-US" dirty="0" smtClean="0"/>
-          </a:p>
         </p:txBody>
       </p:sp>
+      <p:pic>
+        <p:nvPicPr>
+          <p:cNvPr id="12" name="Picture 11"/>
+          <p:cNvPicPr>
+            <a:picLocks noChangeAspect="1"/>
+          </p:cNvPicPr>
+          <p:nvPr/>
+        </p:nvPicPr>
+        <p:blipFill>
+          <a:blip r:embed="rId4">
+            <a:extLst>
+              <a:ext uri="{28A0092B-C50C-407E-A947-70E740481C1C}">
+                <a14:useLocalDpi xmlns:a14="http://schemas.microsoft.com/office/drawing/2010/main" val="0"/>
+              </a:ext>
+            </a:extLst>
+          </a:blip>
+          <a:stretch>
+            <a:fillRect/>
+          </a:stretch>
+        </p:blipFill>
+        <p:spPr>
+          <a:xfrm>
+            <a:off x="5505554" y="2201479"/>
+            <a:ext cx="6686445" cy="2154436"/>
+          </a:xfrm>
+          <a:prstGeom prst="rect">
+            <a:avLst/>
+          </a:prstGeom>
+        </p:spPr>
+      </p:pic>
     </p:spTree>
     <p:extLst>
       <p:ext uri="{BB962C8B-B14F-4D97-AF65-F5344CB8AC3E}">
@@ -5127,7 +6053,7 @@
                               <p:par>
                                 <p:cTn id="9" presetID="1" presetClass="entr" presetSubtype="0" fill="hold" nodeType="clickEffect">
                                   <p:stCondLst>
-                                    <p:cond delay="2000"/>
+                                    <p:cond delay="1000"/>
                                   </p:stCondLst>
                                   <p:childTnLst>
                                     <p:set>
@@ -5172,7 +6098,7 @@
                               <p:par>
                                 <p:cTn id="13" presetID="1" presetClass="entr" presetSubtype="0" fill="hold" nodeType="clickEffect">
                                   <p:stCondLst>
-                                    <p:cond delay="2000"/>
+                                    <p:cond delay="1000"/>
                                   </p:stCondLst>
                                   <p:childTnLst>
                                     <p:set>
@@ -5184,6 +6110,51 @@
                                         </p:cTn>
                                         <p:tgtEl>
                                           <p:spTgt spid="9"/>
+                                        </p:tgtEl>
+                                        <p:attrNameLst>
+                                          <p:attrName>style.visibility</p:attrName>
+                                        </p:attrNameLst>
+                                      </p:cBhvr>
+                                      <p:to>
+                                        <p:strVal val="visible"/>
+                                      </p:to>
+                                    </p:set>
+                                  </p:childTnLst>
+                                </p:cTn>
+                              </p:par>
+                            </p:childTnLst>
+                          </p:cTn>
+                        </p:par>
+                      </p:childTnLst>
+                    </p:cTn>
+                  </p:par>
+                  <p:par>
+                    <p:cTn id="15" fill="hold">
+                      <p:stCondLst>
+                        <p:cond delay="indefinite"/>
+                      </p:stCondLst>
+                      <p:childTnLst>
+                        <p:par>
+                          <p:cTn id="16" fill="hold">
+                            <p:stCondLst>
+                              <p:cond delay="0"/>
+                            </p:stCondLst>
+                            <p:childTnLst>
+                              <p:par>
+                                <p:cTn id="17" presetID="1" presetClass="entr" presetSubtype="0" fill="hold" nodeType="clickEffect">
+                                  <p:stCondLst>
+                                    <p:cond delay="1000"/>
+                                  </p:stCondLst>
+                                  <p:childTnLst>
+                                    <p:set>
+                                      <p:cBhvr>
+                                        <p:cTn id="18" dur="1" fill="hold">
+                                          <p:stCondLst>
+                                            <p:cond delay="0"/>
+                                          </p:stCondLst>
+                                        </p:cTn>
+                                        <p:tgtEl>
+                                          <p:spTgt spid="12"/>
                                         </p:tgtEl>
                                         <p:attrNameLst>
                                           <p:attrName>style.visibility</p:attrName>
@@ -5226,133 +6197,6 @@
     <p:bldLst>
       <p:bldP spid="5" grpId="0" animBg="1"/>
     </p:bldLst>
-  </p:timing>
-</p:sld>
-</file>
-
-<file path=ppt/slides/slide12.xml><?xml version="1.0" encoding="utf-8"?>
-<p:sld xmlns:a="http://schemas.openxmlformats.org/drawingml/2006/main" xmlns:r="http://schemas.openxmlformats.org/officeDocument/2006/relationships" xmlns:p="http://schemas.openxmlformats.org/presentationml/2006/main">
-  <p:cSld>
-    <p:spTree>
-      <p:nvGrpSpPr>
-        <p:cNvPr id="1" name=""/>
-        <p:cNvGrpSpPr/>
-        <p:nvPr/>
-      </p:nvGrpSpPr>
-      <p:grpSpPr>
-        <a:xfrm>
-          <a:off x="0" y="0"/>
-          <a:ext cx="0" cy="0"/>
-          <a:chOff x="0" y="0"/>
-          <a:chExt cx="0" cy="0"/>
-        </a:xfrm>
-      </p:grpSpPr>
-      <p:sp>
-        <p:nvSpPr>
-          <p:cNvPr id="2" name="Title 1"/>
-          <p:cNvSpPr>
-            <a:spLocks noGrp="1"/>
-          </p:cNvSpPr>
-          <p:nvPr>
-            <p:ph type="title"/>
-          </p:nvPr>
-        </p:nvSpPr>
-        <p:spPr/>
-        <p:txBody>
-          <a:bodyPr/>
-          <a:lstStyle/>
-          <a:p>
-            <a:r>
-              <a:rPr lang="en-US" dirty="0" smtClean="0"/>
-              <a:t>About the data sets</a:t>
-            </a:r>
-            <a:endParaRPr lang="en-US" dirty="0"/>
-          </a:p>
-        </p:txBody>
-      </p:sp>
-      <p:sp>
-        <p:nvSpPr>
-          <p:cNvPr id="3" name="Content Placeholder 2"/>
-          <p:cNvSpPr>
-            <a:spLocks noGrp="1"/>
-          </p:cNvSpPr>
-          <p:nvPr>
-            <p:ph idx="1"/>
-          </p:nvPr>
-        </p:nvSpPr>
-        <p:spPr/>
-        <p:txBody>
-          <a:bodyPr/>
-          <a:lstStyle/>
-          <a:p>
-            <a:r>
-              <a:rPr lang="en-US" dirty="0" smtClean="0"/>
-              <a:t>Most of the data sets are time-series</a:t>
-            </a:r>
-          </a:p>
-          <a:p>
-            <a:r>
-              <a:rPr lang="en-US" dirty="0" smtClean="0"/>
-              <a:t>They represent a measured observation at particular times</a:t>
-            </a:r>
-          </a:p>
-          <a:p>
-            <a:r>
-              <a:rPr lang="en-US" dirty="0" smtClean="0"/>
-              <a:t>The best visual representation is usually line chart</a:t>
-            </a:r>
-          </a:p>
-          <a:p>
-            <a:pPr lvl="1"/>
-            <a:r>
-              <a:rPr lang="en-US" dirty="0" smtClean="0"/>
-              <a:t>Show the change in value over time</a:t>
-            </a:r>
-          </a:p>
-          <a:p>
-            <a:r>
-              <a:rPr lang="en-US" dirty="0" smtClean="0"/>
-              <a:t>We also use bar charts to compare the same measure across a spatial dimension</a:t>
-            </a:r>
-          </a:p>
-          <a:p>
-            <a:pPr lvl="1"/>
-            <a:r>
-              <a:rPr lang="en-US" dirty="0"/>
-              <a:t>C</a:t>
-            </a:r>
-            <a:r>
-              <a:rPr lang="en-US" dirty="0" smtClean="0"/>
-              <a:t>ity and National values for a specific measure, for a specific time period</a:t>
-            </a:r>
-            <a:endParaRPr lang="en-US" dirty="0"/>
-          </a:p>
-        </p:txBody>
-      </p:sp>
-    </p:spTree>
-    <p:extLst>
-      <p:ext uri="{BB962C8B-B14F-4D97-AF65-F5344CB8AC3E}">
-        <p14:creationId xmlns:p14="http://schemas.microsoft.com/office/powerpoint/2010/main" val="2795230163"/>
-      </p:ext>
-    </p:extLst>
-  </p:cSld>
-  <p:clrMapOvr>
-    <a:masterClrMapping/>
-  </p:clrMapOvr>
-  <mc:AlternateContent xmlns:mc="http://schemas.openxmlformats.org/markup-compatibility/2006" xmlns:p14="http://schemas.microsoft.com/office/powerpoint/2010/main">
-    <mc:Choice Requires="p14">
-      <p:transition spd="slow" p14:dur="2000" advTm="15000"/>
-    </mc:Choice>
-    <mc:Fallback xmlns="">
-      <p:transition spd="slow" advTm="15000"/>
-    </mc:Fallback>
-  </mc:AlternateContent>
-  <p:timing>
-    <p:tnLst>
-      <p:par>
-        <p:cTn id="1" dur="indefinite" restart="never" nodeType="tmRoot"/>
-      </p:par>
-    </p:tnLst>
   </p:timing>
 </p:sld>
 </file>
@@ -5543,7 +6387,7 @@
           <a:p>
             <a:r>
               <a:rPr lang="en-US" dirty="0" smtClean="0"/>
-              <a:t>Unemployment % time-series</a:t>
+              <a:t>Unemployment Rate % time-series</a:t>
             </a:r>
             <a:endParaRPr lang="en-US" dirty="0"/>
           </a:p>
@@ -5969,7 +6813,7 @@
                               <p:par>
                                 <p:cTn id="23" presetID="1" presetClass="entr" presetSubtype="0" fill="hold" grpId="0" nodeType="clickEffect">
                                   <p:stCondLst>
-                                    <p:cond delay="4000"/>
+                                    <p:cond delay="2000"/>
                                   </p:stCondLst>
                                   <p:childTnLst>
                                     <p:set>
@@ -5996,7 +6840,7 @@
                               <p:par>
                                 <p:cTn id="25" presetID="1" presetClass="entr" presetSubtype="0" fill="hold" nodeType="withEffect">
                                   <p:stCondLst>
-                                    <p:cond delay="4000"/>
+                                    <p:cond delay="2000"/>
                                   </p:stCondLst>
                                   <p:childTnLst>
                                     <p:set>
@@ -6584,6 +7428,54 @@
           </a:xfrm>
         </p:spPr>
       </p:pic>
+      <p:sp>
+        <p:nvSpPr>
+          <p:cNvPr id="8" name="TextBox 7"/>
+          <p:cNvSpPr txBox="1"/>
+          <p:nvPr/>
+        </p:nvSpPr>
+        <p:spPr>
+          <a:xfrm>
+            <a:off x="7453186" y="6167730"/>
+            <a:ext cx="2619628" cy="600164"/>
+          </a:xfrm>
+          <a:prstGeom prst="rect">
+            <a:avLst/>
+          </a:prstGeom>
+          <a:noFill/>
+        </p:spPr>
+        <p:txBody>
+          <a:bodyPr wrap="none" rtlCol="0">
+            <a:spAutoFit/>
+          </a:bodyPr>
+          <a:lstStyle/>
+          <a:p>
+            <a:r>
+              <a:rPr lang="en-US" sz="1100" dirty="0"/>
+              <a:t>Time-series legend:</a:t>
+            </a:r>
+          </a:p>
+          <a:p>
+            <a:pPr lvl="1"/>
+            <a:r>
+              <a:rPr lang="en-US" sz="1100" dirty="0"/>
+              <a:t>Blue line: National Unemployment</a:t>
+            </a:r>
+          </a:p>
+          <a:p>
+            <a:pPr lvl="1"/>
+            <a:r>
+              <a:rPr lang="en-US" sz="1100" dirty="0"/>
+              <a:t>Orange line: City’s </a:t>
+            </a:r>
+            <a:r>
+              <a:rPr lang="en-US" sz="1100" dirty="0" smtClean="0"/>
+              <a:t>Unemployment</a:t>
+            </a:r>
+            <a:endParaRPr lang="en-US" sz="1100" dirty="0"/>
+          </a:p>
+        </p:txBody>
+      </p:sp>
     </p:spTree>
     <p:extLst>
       <p:ext uri="{BB962C8B-B14F-4D97-AF65-F5344CB8AC3E}">
@@ -6629,6 +7521,38 @@
           <a:chExt cx="0" cy="0"/>
         </a:xfrm>
       </p:grpSpPr>
+      <p:pic>
+        <p:nvPicPr>
+          <p:cNvPr id="6" name="Content Placeholder 5"/>
+          <p:cNvPicPr>
+            <a:picLocks noGrp="1" noChangeAspect="1"/>
+          </p:cNvPicPr>
+          <p:nvPr>
+            <p:ph sz="half" idx="2"/>
+          </p:nvPr>
+        </p:nvPicPr>
+        <p:blipFill>
+          <a:blip r:embed="rId2">
+            <a:extLst>
+              <a:ext uri="{28A0092B-C50C-407E-A947-70E740481C1C}">
+                <a14:useLocalDpi xmlns:a14="http://schemas.microsoft.com/office/drawing/2010/main" val="0"/>
+              </a:ext>
+            </a:extLst>
+          </a:blip>
+          <a:stretch>
+            <a:fillRect/>
+          </a:stretch>
+        </p:blipFill>
+        <p:spPr>
+          <a:xfrm>
+            <a:off x="5321451" y="2299106"/>
+            <a:ext cx="4979534" cy="3404376"/>
+          </a:xfrm>
+          <a:solidFill>
+            <a:schemeClr val="bg1"/>
+          </a:solidFill>
+        </p:spPr>
+      </p:pic>
       <p:sp>
         <p:nvSpPr>
           <p:cNvPr id="2" name="Title 1"/>
@@ -6646,7 +7570,14 @@
           <a:p>
             <a:r>
               <a:rPr lang="en-US" dirty="0" smtClean="0"/>
-              <a:t>Slide 16</a:t>
+              <a:t>Are City Populations </a:t>
+            </a:r>
+            <a:br>
+              <a:rPr lang="en-US" dirty="0" smtClean="0"/>
+            </a:br>
+            <a:r>
+              <a:rPr lang="en-US" dirty="0" smtClean="0"/>
+              <a:t>on the Rise or Decline?</a:t>
             </a:r>
             <a:endParaRPr lang="en-US" dirty="0"/>
           </a:p>
@@ -6654,23 +7585,215 @@
       </p:sp>
       <p:sp>
         <p:nvSpPr>
-          <p:cNvPr id="3" name="Content Placeholder 2"/>
+          <p:cNvPr id="4" name="Content Placeholder 3"/>
           <p:cNvSpPr>
             <a:spLocks noGrp="1"/>
           </p:cNvSpPr>
           <p:nvPr>
-            <p:ph idx="1"/>
+            <p:ph sz="half" idx="1"/>
           </p:nvPr>
         </p:nvSpPr>
-        <p:spPr/>
+        <p:spPr>
+          <a:xfrm>
+            <a:off x="838200" y="1825625"/>
+            <a:ext cx="3580410" cy="4351338"/>
+          </a:xfrm>
+        </p:spPr>
         <p:txBody>
           <a:bodyPr/>
           <a:lstStyle/>
           <a:p>
-            <a:endParaRPr lang="en-US"/>
+            <a:r>
+              <a:rPr lang="en-US" dirty="0" smtClean="0"/>
+              <a:t>CCD notes on Philadelphia population changes</a:t>
+            </a:r>
+          </a:p>
+          <a:p>
+            <a:r>
+              <a:rPr lang="en-US" dirty="0" smtClean="0"/>
+              <a:t>National Population, 2000-2016</a:t>
+            </a:r>
+          </a:p>
+          <a:p>
+            <a:r>
+              <a:rPr lang="en-US" dirty="0" smtClean="0"/>
+              <a:t>City populations, 2000-2016</a:t>
+            </a:r>
+          </a:p>
+          <a:p>
+            <a:pPr lvl="1"/>
+            <a:r>
+              <a:rPr lang="en-US" dirty="0" smtClean="0"/>
+              <a:t>Geo-regional View</a:t>
+            </a:r>
+          </a:p>
+          <a:p>
+            <a:pPr lvl="1"/>
+            <a:r>
+              <a:rPr lang="en-US" dirty="0" smtClean="0"/>
+              <a:t>Population Size View</a:t>
+            </a:r>
+          </a:p>
+          <a:p>
+            <a:endParaRPr lang="en-US" dirty="0"/>
           </a:p>
         </p:txBody>
       </p:sp>
+      <p:sp>
+        <p:nvSpPr>
+          <p:cNvPr id="10" name="Rectangle 9"/>
+          <p:cNvSpPr/>
+          <p:nvPr/>
+        </p:nvSpPr>
+        <p:spPr>
+          <a:xfrm>
+            <a:off x="4819529" y="2299106"/>
+            <a:ext cx="6845450" cy="3404376"/>
+          </a:xfrm>
+          <a:prstGeom prst="rect">
+            <a:avLst/>
+          </a:prstGeom>
+          <a:solidFill>
+            <a:schemeClr val="bg1"/>
+          </a:solidFill>
+          <a:ln>
+            <a:noFill/>
+          </a:ln>
+        </p:spPr>
+        <p:style>
+          <a:lnRef idx="2">
+            <a:schemeClr val="accent1">
+              <a:shade val="50000"/>
+            </a:schemeClr>
+          </a:lnRef>
+          <a:fillRef idx="1">
+            <a:schemeClr val="accent1"/>
+          </a:fillRef>
+          <a:effectRef idx="0">
+            <a:schemeClr val="accent1"/>
+          </a:effectRef>
+          <a:fontRef idx="minor">
+            <a:schemeClr val="lt1"/>
+          </a:fontRef>
+        </p:style>
+        <p:txBody>
+          <a:bodyPr rtlCol="0" anchor="ctr"/>
+          <a:lstStyle/>
+          <a:p>
+            <a:pPr algn="ctr"/>
+            <a:endParaRPr lang="en-US"/>
+          </a:p>
+        </p:txBody>
+      </p:sp>
+      <p:pic>
+        <p:nvPicPr>
+          <p:cNvPr id="9" name="Picture 8"/>
+          <p:cNvPicPr>
+            <a:picLocks noChangeAspect="1"/>
+          </p:cNvPicPr>
+          <p:nvPr/>
+        </p:nvPicPr>
+        <p:blipFill>
+          <a:blip r:embed="rId3">
+            <a:extLst>
+              <a:ext uri="{28A0092B-C50C-407E-A947-70E740481C1C}">
+                <a14:useLocalDpi xmlns:a14="http://schemas.microsoft.com/office/drawing/2010/main" val="0"/>
+              </a:ext>
+            </a:extLst>
+          </a:blip>
+          <a:stretch>
+            <a:fillRect/>
+          </a:stretch>
+        </p:blipFill>
+        <p:spPr>
+          <a:xfrm>
+            <a:off x="6408326" y="982320"/>
+            <a:ext cx="4293578" cy="5690897"/>
+          </a:xfrm>
+          <a:prstGeom prst="rect">
+            <a:avLst/>
+          </a:prstGeom>
+          <a:solidFill>
+            <a:schemeClr val="bg1"/>
+          </a:solidFill>
+        </p:spPr>
+      </p:pic>
+      <p:sp>
+        <p:nvSpPr>
+          <p:cNvPr id="12" name="Rectangle 11"/>
+          <p:cNvSpPr/>
+          <p:nvPr/>
+        </p:nvSpPr>
+        <p:spPr>
+          <a:xfrm>
+            <a:off x="6509329" y="982319"/>
+            <a:ext cx="4293578" cy="5690897"/>
+          </a:xfrm>
+          <a:prstGeom prst="rect">
+            <a:avLst/>
+          </a:prstGeom>
+          <a:solidFill>
+            <a:schemeClr val="bg1"/>
+          </a:solidFill>
+          <a:ln>
+            <a:noFill/>
+          </a:ln>
+        </p:spPr>
+        <p:style>
+          <a:lnRef idx="2">
+            <a:schemeClr val="accent1">
+              <a:shade val="50000"/>
+            </a:schemeClr>
+          </a:lnRef>
+          <a:fillRef idx="1">
+            <a:schemeClr val="accent1"/>
+          </a:fillRef>
+          <a:effectRef idx="0">
+            <a:schemeClr val="accent1"/>
+          </a:effectRef>
+          <a:fontRef idx="minor">
+            <a:schemeClr val="lt1"/>
+          </a:fontRef>
+        </p:style>
+        <p:txBody>
+          <a:bodyPr rtlCol="0" anchor="ctr"/>
+          <a:lstStyle/>
+          <a:p>
+            <a:pPr algn="ctr"/>
+            <a:endParaRPr lang="en-US"/>
+          </a:p>
+        </p:txBody>
+      </p:sp>
+      <p:pic>
+        <p:nvPicPr>
+          <p:cNvPr id="13" name="Picture 12"/>
+          <p:cNvPicPr>
+            <a:picLocks noChangeAspect="1"/>
+          </p:cNvPicPr>
+          <p:nvPr/>
+        </p:nvPicPr>
+        <p:blipFill>
+          <a:blip r:embed="rId4">
+            <a:extLst>
+              <a:ext uri="{28A0092B-C50C-407E-A947-70E740481C1C}">
+                <a14:useLocalDpi xmlns:a14="http://schemas.microsoft.com/office/drawing/2010/main" val="0"/>
+              </a:ext>
+            </a:extLst>
+          </a:blip>
+          <a:stretch>
+            <a:fillRect/>
+          </a:stretch>
+        </p:blipFill>
+        <p:spPr>
+          <a:xfrm>
+            <a:off x="5357843" y="2125579"/>
+            <a:ext cx="6834157" cy="3404376"/>
+          </a:xfrm>
+          <a:prstGeom prst="rect">
+            <a:avLst/>
+          </a:prstGeom>
+        </p:spPr>
+      </p:pic>
     </p:spTree>
     <p:extLst>
       <p:ext uri="{BB962C8B-B14F-4D97-AF65-F5344CB8AC3E}">
@@ -6692,9 +7815,261 @@
   <p:timing>
     <p:tnLst>
       <p:par>
-        <p:cTn id="1" dur="indefinite" restart="never" nodeType="tmRoot"/>
+        <p:cTn id="1" dur="indefinite" restart="never" nodeType="tmRoot">
+          <p:childTnLst>
+            <p:seq concurrent="1" nextAc="seek">
+              <p:cTn id="2" dur="indefinite" nodeType="mainSeq">
+                <p:childTnLst>
+                  <p:par>
+                    <p:cTn id="3" fill="hold">
+                      <p:stCondLst>
+                        <p:cond delay="indefinite"/>
+                      </p:stCondLst>
+                      <p:childTnLst>
+                        <p:par>
+                          <p:cTn id="4" fill="hold">
+                            <p:stCondLst>
+                              <p:cond delay="0"/>
+                            </p:stCondLst>
+                            <p:childTnLst>
+                              <p:par>
+                                <p:cTn id="5" presetID="1" presetClass="entr" presetSubtype="0" fill="hold" nodeType="clickEffect">
+                                  <p:stCondLst>
+                                    <p:cond delay="0"/>
+                                  </p:stCondLst>
+                                  <p:childTnLst>
+                                    <p:set>
+                                      <p:cBhvr>
+                                        <p:cTn id="6" dur="1" fill="hold">
+                                          <p:stCondLst>
+                                            <p:cond delay="0"/>
+                                          </p:stCondLst>
+                                        </p:cTn>
+                                        <p:tgtEl>
+                                          <p:spTgt spid="6"/>
+                                        </p:tgtEl>
+                                        <p:attrNameLst>
+                                          <p:attrName>style.visibility</p:attrName>
+                                        </p:attrNameLst>
+                                      </p:cBhvr>
+                                      <p:to>
+                                        <p:strVal val="visible"/>
+                                      </p:to>
+                                    </p:set>
+                                  </p:childTnLst>
+                                </p:cTn>
+                              </p:par>
+                            </p:childTnLst>
+                          </p:cTn>
+                        </p:par>
+                      </p:childTnLst>
+                    </p:cTn>
+                  </p:par>
+                  <p:par>
+                    <p:cTn id="7" fill="hold">
+                      <p:stCondLst>
+                        <p:cond delay="indefinite"/>
+                      </p:stCondLst>
+                      <p:childTnLst>
+                        <p:par>
+                          <p:cTn id="8" fill="hold">
+                            <p:stCondLst>
+                              <p:cond delay="0"/>
+                            </p:stCondLst>
+                            <p:childTnLst>
+                              <p:par>
+                                <p:cTn id="9" presetID="1" presetClass="entr" presetSubtype="0" fill="hold" grpId="0" nodeType="clickEffect">
+                                  <p:stCondLst>
+                                    <p:cond delay="1000"/>
+                                  </p:stCondLst>
+                                  <p:childTnLst>
+                                    <p:set>
+                                      <p:cBhvr>
+                                        <p:cTn id="10" dur="1" fill="hold">
+                                          <p:stCondLst>
+                                            <p:cond delay="0"/>
+                                          </p:stCondLst>
+                                        </p:cTn>
+                                        <p:tgtEl>
+                                          <p:spTgt spid="10"/>
+                                        </p:tgtEl>
+                                        <p:attrNameLst>
+                                          <p:attrName>style.visibility</p:attrName>
+                                        </p:attrNameLst>
+                                      </p:cBhvr>
+                                      <p:to>
+                                        <p:strVal val="visible"/>
+                                      </p:to>
+                                    </p:set>
+                                  </p:childTnLst>
+                                </p:cTn>
+                              </p:par>
+                            </p:childTnLst>
+                          </p:cTn>
+                        </p:par>
+                      </p:childTnLst>
+                    </p:cTn>
+                  </p:par>
+                  <p:par>
+                    <p:cTn id="11" fill="hold">
+                      <p:stCondLst>
+                        <p:cond delay="indefinite"/>
+                      </p:stCondLst>
+                      <p:childTnLst>
+                        <p:par>
+                          <p:cTn id="12" fill="hold">
+                            <p:stCondLst>
+                              <p:cond delay="0"/>
+                            </p:stCondLst>
+                            <p:childTnLst>
+                              <p:par>
+                                <p:cTn id="13" presetID="1" presetClass="entr" presetSubtype="0" fill="hold" nodeType="clickEffect">
+                                  <p:stCondLst>
+                                    <p:cond delay="10"/>
+                                  </p:stCondLst>
+                                  <p:childTnLst>
+                                    <p:set>
+                                      <p:cBhvr>
+                                        <p:cTn id="14" dur="1" fill="hold">
+                                          <p:stCondLst>
+                                            <p:cond delay="0"/>
+                                          </p:stCondLst>
+                                        </p:cTn>
+                                        <p:tgtEl>
+                                          <p:spTgt spid="9"/>
+                                        </p:tgtEl>
+                                        <p:attrNameLst>
+                                          <p:attrName>style.visibility</p:attrName>
+                                        </p:attrNameLst>
+                                      </p:cBhvr>
+                                      <p:to>
+                                        <p:strVal val="visible"/>
+                                      </p:to>
+                                    </p:set>
+                                  </p:childTnLst>
+                                </p:cTn>
+                              </p:par>
+                            </p:childTnLst>
+                          </p:cTn>
+                        </p:par>
+                      </p:childTnLst>
+                    </p:cTn>
+                  </p:par>
+                  <p:par>
+                    <p:cTn id="15" fill="hold">
+                      <p:stCondLst>
+                        <p:cond delay="indefinite"/>
+                      </p:stCondLst>
+                      <p:childTnLst>
+                        <p:par>
+                          <p:cTn id="16" fill="hold">
+                            <p:stCondLst>
+                              <p:cond delay="0"/>
+                            </p:stCondLst>
+                            <p:childTnLst>
+                              <p:par>
+                                <p:cTn id="17" presetID="1" presetClass="entr" presetSubtype="0" fill="hold" grpId="0" nodeType="clickEffect">
+                                  <p:stCondLst>
+                                    <p:cond delay="1000"/>
+                                  </p:stCondLst>
+                                  <p:childTnLst>
+                                    <p:set>
+                                      <p:cBhvr>
+                                        <p:cTn id="18" dur="1" fill="hold">
+                                          <p:stCondLst>
+                                            <p:cond delay="0"/>
+                                          </p:stCondLst>
+                                        </p:cTn>
+                                        <p:tgtEl>
+                                          <p:spTgt spid="12"/>
+                                        </p:tgtEl>
+                                        <p:attrNameLst>
+                                          <p:attrName>style.visibility</p:attrName>
+                                        </p:attrNameLst>
+                                      </p:cBhvr>
+                                      <p:to>
+                                        <p:strVal val="visible"/>
+                                      </p:to>
+                                    </p:set>
+                                  </p:childTnLst>
+                                </p:cTn>
+                              </p:par>
+                            </p:childTnLst>
+                          </p:cTn>
+                        </p:par>
+                      </p:childTnLst>
+                    </p:cTn>
+                  </p:par>
+                  <p:par>
+                    <p:cTn id="19" fill="hold">
+                      <p:stCondLst>
+                        <p:cond delay="indefinite"/>
+                      </p:stCondLst>
+                      <p:childTnLst>
+                        <p:par>
+                          <p:cTn id="20" fill="hold">
+                            <p:stCondLst>
+                              <p:cond delay="0"/>
+                            </p:stCondLst>
+                            <p:childTnLst>
+                              <p:par>
+                                <p:cTn id="21" presetID="1" presetClass="entr" presetSubtype="0" fill="hold" nodeType="clickEffect">
+                                  <p:stCondLst>
+                                    <p:cond delay="10"/>
+                                  </p:stCondLst>
+                                  <p:childTnLst>
+                                    <p:set>
+                                      <p:cBhvr>
+                                        <p:cTn id="22" dur="1" fill="hold">
+                                          <p:stCondLst>
+                                            <p:cond delay="0"/>
+                                          </p:stCondLst>
+                                        </p:cTn>
+                                        <p:tgtEl>
+                                          <p:spTgt spid="13"/>
+                                        </p:tgtEl>
+                                        <p:attrNameLst>
+                                          <p:attrName>style.visibility</p:attrName>
+                                        </p:attrNameLst>
+                                      </p:cBhvr>
+                                      <p:to>
+                                        <p:strVal val="visible"/>
+                                      </p:to>
+                                    </p:set>
+                                  </p:childTnLst>
+                                </p:cTn>
+                              </p:par>
+                            </p:childTnLst>
+                          </p:cTn>
+                        </p:par>
+                      </p:childTnLst>
+                    </p:cTn>
+                  </p:par>
+                </p:childTnLst>
+              </p:cTn>
+              <p:prevCondLst>
+                <p:cond evt="onPrev" delay="0">
+                  <p:tgtEl>
+                    <p:sldTgt/>
+                  </p:tgtEl>
+                </p:cond>
+              </p:prevCondLst>
+              <p:nextCondLst>
+                <p:cond evt="onNext" delay="0">
+                  <p:tgtEl>
+                    <p:sldTgt/>
+                  </p:tgtEl>
+                </p:cond>
+              </p:nextCondLst>
+            </p:seq>
+          </p:childTnLst>
+        </p:cTn>
       </p:par>
     </p:tnLst>
+    <p:bldLst>
+      <p:bldP spid="10" grpId="0" animBg="1"/>
+      <p:bldP spid="12" grpId="0" animBg="1"/>
+    </p:bldLst>
   </p:timing>
 </p:sld>
 </file>
@@ -6733,7 +8108,7 @@
           <a:p>
             <a:r>
               <a:rPr lang="en-US" dirty="0" smtClean="0"/>
-              <a:t>Slide 17</a:t>
+              <a:t>How does population relate to employment?</a:t>
             </a:r>
             <a:endParaRPr lang="en-US" dirty="0"/>
           </a:p>
@@ -6741,12 +8116,31 @@
       </p:sp>
       <p:sp>
         <p:nvSpPr>
-          <p:cNvPr id="3" name="Content Placeholder 2"/>
+          <p:cNvPr id="4" name="Content Placeholder 3"/>
           <p:cNvSpPr>
             <a:spLocks noGrp="1"/>
           </p:cNvSpPr>
           <p:nvPr>
-            <p:ph idx="1"/>
+            <p:ph sz="half" idx="1"/>
+          </p:nvPr>
+        </p:nvSpPr>
+        <p:spPr/>
+        <p:txBody>
+          <a:bodyPr/>
+          <a:lstStyle/>
+          <a:p>
+            <a:endParaRPr lang="en-US"/>
+          </a:p>
+        </p:txBody>
+      </p:sp>
+      <p:sp>
+        <p:nvSpPr>
+          <p:cNvPr id="5" name="Content Placeholder 4"/>
+          <p:cNvSpPr>
+            <a:spLocks noGrp="1"/>
+          </p:cNvSpPr>
+          <p:nvPr>
+            <p:ph sz="half" idx="2"/>
           </p:nvPr>
         </p:nvSpPr>
         <p:spPr/>
@@ -6820,7 +8214,7 @@
           <a:p>
             <a:r>
               <a:rPr lang="en-US" dirty="0" smtClean="0"/>
-              <a:t>What’s next? (in Part 2)</a:t>
+              <a:t>What have we learned so far?</a:t>
             </a:r>
             <a:endParaRPr lang="en-US" dirty="0"/>
           </a:p>
@@ -6838,63 +8232,12 @@
         </p:nvSpPr>
         <p:spPr/>
         <p:txBody>
-          <a:bodyPr/>
+          <a:bodyPr>
+            <a:normAutofit/>
+          </a:bodyPr>
           <a:lstStyle/>
           <a:p>
-            <a:r>
-              <a:rPr lang="en-US" dirty="0" smtClean="0"/>
-              <a:t>Add in additional data dimensions</a:t>
-            </a:r>
-          </a:p>
-          <a:p>
-            <a:pPr lvl="1"/>
-            <a:r>
-              <a:rPr lang="en-US" dirty="0" smtClean="0"/>
-              <a:t>Race, Ethnicity</a:t>
-            </a:r>
-          </a:p>
-          <a:p>
-            <a:pPr lvl="1"/>
-            <a:r>
-              <a:rPr lang="en-US" dirty="0" smtClean="0"/>
-              <a:t>Labor force characteristics: industries, sub-industries</a:t>
-            </a:r>
-          </a:p>
-          <a:p>
-            <a:r>
-              <a:rPr lang="en-US" dirty="0" smtClean="0"/>
-              <a:t>Provide an application like Brookings Metro Monitor</a:t>
-            </a:r>
-          </a:p>
-          <a:p>
-            <a:r>
-              <a:rPr lang="en-US" dirty="0" smtClean="0"/>
-              <a:t>Allow selection of “base” city</a:t>
-            </a:r>
-          </a:p>
-          <a:p>
-            <a:pPr lvl="1"/>
-            <a:r>
-              <a:rPr lang="en-US" dirty="0" smtClean="0"/>
-              <a:t>Choose “nearest neighbors”</a:t>
-            </a:r>
-          </a:p>
-          <a:p>
-            <a:pPr lvl="1"/>
-            <a:r>
-              <a:rPr lang="en-US" dirty="0" smtClean="0"/>
-              <a:t>Choose “closest in size”</a:t>
-            </a:r>
-          </a:p>
-          <a:p>
-            <a:pPr lvl="1"/>
-            <a:r>
-              <a:rPr lang="en-US" dirty="0" smtClean="0"/>
-              <a:t>Present visualizations</a:t>
-            </a:r>
-          </a:p>
-          <a:p>
-            <a:endParaRPr lang="en-US" dirty="0"/>
+            <a:endParaRPr lang="en-US" dirty="0" smtClean="0"/>
           </a:p>
         </p:txBody>
       </p:sp>
@@ -7353,7 +8696,7 @@
                               <p:par>
                                 <p:cTn id="5" presetID="1" presetClass="entr" presetSubtype="0" fill="hold" grpId="0" nodeType="clickEffect">
                                   <p:stCondLst>
-                                    <p:cond delay="10000"/>
+                                    <p:cond delay="8000"/>
                                   </p:stCondLst>
                                   <p:childTnLst>
                                     <p:set>
@@ -7620,8 +8963,8 @@
           <a:lstStyle/>
           <a:p>
             <a:r>
-              <a:rPr lang="en-US" dirty="0" smtClean="0"/>
-              <a:t>Thank you!</a:t>
+              <a:rPr lang="en-US" dirty="0"/>
+              <a:t>What’s next? (in Part 2)</a:t>
             </a:r>
             <a:endParaRPr lang="en-US" dirty="0"/>
           </a:p>
@@ -7640,132 +8983,106 @@
         <p:spPr/>
         <p:txBody>
           <a:bodyPr>
-            <a:normAutofit fontScale="92500" lnSpcReduction="10000"/>
+            <a:normAutofit fontScale="85000" lnSpcReduction="20000"/>
           </a:bodyPr>
           <a:lstStyle/>
           <a:p>
             <a:r>
-              <a:rPr lang="en-US" dirty="0" smtClean="0"/>
-              <a:t>References:</a:t>
+              <a:rPr lang="en-US" dirty="0"/>
+              <a:t>Add in additional data dimensions</a:t>
             </a:r>
           </a:p>
           <a:p>
             <a:pPr lvl="1"/>
             <a:r>
-              <a:rPr lang="en-US" dirty="0" smtClean="0"/>
-              <a:t>[</a:t>
-            </a:r>
-            <a:r>
-              <a:rPr lang="en-US" dirty="0" err="1" smtClean="0"/>
-              <a:t>ccd</a:t>
-            </a:r>
-            <a:r>
-              <a:rPr lang="en-US" dirty="0" smtClean="0"/>
-              <a:t>] </a:t>
+              <a:rPr lang="en-US" dirty="0"/>
+              <a:t>Race, Ethnicity</a:t>
             </a:r>
           </a:p>
           <a:p>
             <a:pPr lvl="1"/>
             <a:r>
-              <a:rPr lang="en-US" dirty="0" smtClean="0"/>
-              <a:t>[</a:t>
-            </a:r>
-            <a:r>
-              <a:rPr lang="en-US" dirty="0" err="1" smtClean="0"/>
-              <a:t>shrm</a:t>
-            </a:r>
-            <a:r>
-              <a:rPr lang="en-US" dirty="0" smtClean="0"/>
-              <a:t>] </a:t>
+              <a:rPr lang="en-US" dirty="0"/>
+              <a:t>Labor force characteristics: industries, sub-industries</a:t>
+            </a:r>
+          </a:p>
+          <a:p>
+            <a:r>
+              <a:rPr lang="en-US" dirty="0"/>
+              <a:t>Draw final conclusion… </a:t>
+            </a:r>
+            <a:r>
+              <a:rPr lang="en-US" i="1" dirty="0">
+                <a:latin typeface="Times New Roman" panose="02020603050405020304" pitchFamily="18" charset="0"/>
+                <a:cs typeface="Times New Roman" panose="02020603050405020304" pitchFamily="18" charset="0"/>
+              </a:rPr>
+              <a:t>is Philadelphia on the verge of something great?</a:t>
+            </a:r>
+          </a:p>
+          <a:p>
+            <a:r>
+              <a:rPr lang="en-US" dirty="0"/>
+              <a:t>Provide an application like Brookings Metro Monitor</a:t>
             </a:r>
           </a:p>
           <a:p>
             <a:pPr lvl="1"/>
             <a:r>
-              <a:rPr lang="en-US" dirty="0" smtClean="0"/>
-              <a:t>[</a:t>
-            </a:r>
-            <a:r>
-              <a:rPr lang="en-US" dirty="0" err="1" smtClean="0"/>
-              <a:t>brookings</a:t>
-            </a:r>
-            <a:r>
               <a:rPr lang="en-US" dirty="0"/>
-              <a:t>] Metro </a:t>
-            </a:r>
-            <a:r>
-              <a:rPr lang="en-US" dirty="0" smtClean="0"/>
-              <a:t>Monitor, 2017 https</a:t>
-            </a:r>
+              <a:t>Allow selection of “base” city for comparison</a:t>
+            </a:r>
+          </a:p>
+          <a:p>
+            <a:pPr lvl="2"/>
             <a:r>
               <a:rPr lang="en-US" dirty="0"/>
-              <a:t>://www.brookings.edu/research/metro-monitor-2017/</a:t>
-            </a:r>
-            <a:endParaRPr lang="en-US" dirty="0" smtClean="0"/>
+              <a:t>Choose “nearest neighbors”</a:t>
+            </a:r>
+          </a:p>
+          <a:p>
+            <a:pPr lvl="2"/>
+            <a:r>
+              <a:rPr lang="en-US" dirty="0"/>
+              <a:t>Choose “closest in size”</a:t>
+            </a:r>
+          </a:p>
+          <a:p>
+            <a:pPr lvl="2"/>
+            <a:r>
+              <a:rPr lang="en-US" dirty="0"/>
+              <a:t>Present visualizations</a:t>
+            </a:r>
+          </a:p>
+          <a:p>
+            <a:pPr lvl="2"/>
+            <a:endParaRPr lang="en-US" dirty="0"/>
+          </a:p>
+          <a:p>
+            <a:r>
+              <a:rPr lang="en-US" dirty="0"/>
+              <a:t>Photo/Image Credits, copyright or property of the following:</a:t>
+            </a:r>
           </a:p>
           <a:p>
             <a:pPr lvl="1"/>
             <a:r>
-              <a:rPr lang="en-US" dirty="0" smtClean="0"/>
-              <a:t>[</a:t>
-            </a:r>
-            <a:r>
-              <a:rPr lang="en-US" dirty="0" err="1" smtClean="0"/>
-              <a:t>bls</a:t>
-            </a:r>
-            <a:r>
-              <a:rPr lang="en-US" dirty="0" smtClean="0"/>
-              <a:t>] </a:t>
-            </a:r>
-          </a:p>
-          <a:p>
-            <a:pPr lvl="1"/>
-            <a:r>
-              <a:rPr lang="en-US" dirty="0" smtClean="0"/>
-              <a:t>[census] </a:t>
-            </a:r>
-          </a:p>
-          <a:p>
-            <a:pPr lvl="1"/>
-            <a:r>
-              <a:rPr lang="en-US" dirty="0" smtClean="0"/>
-              <a:t>[</a:t>
-            </a:r>
-            <a:r>
-              <a:rPr lang="en-US" dirty="0" err="1" smtClean="0"/>
-              <a:t>wickham</a:t>
-            </a:r>
-            <a:r>
-              <a:rPr lang="en-US" dirty="0" smtClean="0"/>
-              <a:t>] </a:t>
-            </a:r>
-          </a:p>
-          <a:p>
-            <a:r>
-              <a:rPr lang="en-US" dirty="0" smtClean="0"/>
-              <a:t>Photo/Image Credits, all copyright or property of the following:</a:t>
-            </a:r>
-          </a:p>
-          <a:p>
-            <a:pPr lvl="1"/>
-            <a:r>
-              <a:rPr lang="en-US" dirty="0" smtClean="0"/>
+              <a:rPr lang="en-US" dirty="0"/>
               <a:t>Wikimedia Foundation (Creative Commons), ushistory.org, </a:t>
             </a:r>
             <a:r>
-              <a:rPr lang="en-US" dirty="0" err="1" smtClean="0"/>
+              <a:rPr lang="en-US" dirty="0" err="1"/>
               <a:t>Fodors</a:t>
             </a:r>
             <a:r>
-              <a:rPr lang="en-US" dirty="0" smtClean="0"/>
+              <a:rPr lang="en-US" dirty="0"/>
               <a:t> Travel, Joseph </a:t>
             </a:r>
             <a:r>
-              <a:rPr lang="en-US" dirty="0" err="1" smtClean="0"/>
+              <a:rPr lang="en-US" dirty="0" err="1"/>
               <a:t>Duplessis</a:t>
             </a:r>
             <a:r>
-              <a:rPr lang="en-US" dirty="0" smtClean="0"/>
+              <a:rPr lang="en-US" dirty="0"/>
               <a:t>, U.S. Constitution Center, John Trumbull, Comcast Corporation, Aramark Companies, Tasty Baking Company, University of Pennsylvania, Temple University, Drexel University</a:t>
             </a:r>
           </a:p>
@@ -9151,16 +10468,15 @@
               <a:t>… of about the same size (</a:t>
             </a:r>
             <a:r>
-              <a:rPr lang="en-US" dirty="0" err="1"/>
-              <a:t>wrt</a:t>
+              <a:rPr lang="en-US" dirty="0" smtClean="0"/>
+              <a:t>w.r.t. </a:t>
             </a:r>
             <a:r>
               <a:rPr lang="en-US" dirty="0"/>
-              <a:t> population)</a:t>
-            </a:r>
-          </a:p>
-          <a:p>
-            <a:pPr lvl="1"/>
+              <a:t>population)</a:t>
+            </a:r>
+          </a:p>
+          <a:p>
             <a:r>
               <a:rPr lang="en-US" dirty="0"/>
               <a:t>Why?</a:t>
@@ -9177,11 +10493,11 @@
             <a:pPr lvl="2"/>
             <a:r>
               <a:rPr lang="en-US" dirty="0"/>
-              <a:t>(1) how is Philadelphia </a:t>
-            </a:r>
-            <a:r>
-              <a:rPr lang="en-US" dirty="0" smtClean="0"/>
-              <a:t>doing overall? </a:t>
+              <a:t>(1) how is </a:t>
+            </a:r>
+            <a:r>
+              <a:rPr lang="en-US" dirty="0" smtClean="0"/>
+              <a:t>Philadelphia doing overall, economically? </a:t>
             </a:r>
             <a:endParaRPr lang="en-US" dirty="0"/>
           </a:p>
@@ -9223,7 +10539,7 @@
             <a:pPr lvl="1"/>
             <a:r>
               <a:rPr lang="en-US" dirty="0" smtClean="0"/>
-              <a:t>And to determine if a “big boom” is </a:t>
+              <a:t>And try to determine if a “big boom” is in Philadelphia’s future!</a:t>
             </a:r>
           </a:p>
         </p:txBody>
@@ -9434,7 +10750,7 @@
         </p:blipFill>
         <p:spPr>
           <a:xfrm>
-            <a:off x="975950" y="4315980"/>
+            <a:off x="975950" y="4262190"/>
             <a:ext cx="4529111" cy="2346689"/>
           </a:xfrm>
           <a:prstGeom prst="rect">
@@ -12076,6 +13392,65 @@
           </a:graphicData>
         </a:graphic>
       </p:graphicFrame>
+      <p:sp>
+        <p:nvSpPr>
+          <p:cNvPr id="11" name="TextBox 10"/>
+          <p:cNvSpPr txBox="1"/>
+          <p:nvPr/>
+        </p:nvSpPr>
+        <p:spPr>
+          <a:xfrm>
+            <a:off x="0" y="6601157"/>
+            <a:ext cx="12192000" cy="246221"/>
+          </a:xfrm>
+          <a:prstGeom prst="rect">
+            <a:avLst/>
+          </a:prstGeom>
+          <a:noFill/>
+        </p:spPr>
+        <p:txBody>
+          <a:bodyPr wrap="square" rtlCol="0">
+            <a:spAutoFit/>
+          </a:bodyPr>
+          <a:lstStyle/>
+          <a:p>
+            <a:pPr algn="ctr"/>
+            <a:r>
+              <a:rPr lang="en-US" sz="1000" dirty="0" smtClean="0"/>
+              <a:t>* [</a:t>
+            </a:r>
+            <a:r>
+              <a:rPr lang="en-US" sz="1000" dirty="0" err="1" smtClean="0"/>
+              <a:t>wikipedia</a:t>
+            </a:r>
+            <a:r>
+              <a:rPr lang="en-US" sz="1000" dirty="0" smtClean="0"/>
+              <a:t>] List of United States cities </a:t>
+            </a:r>
+            <a:r>
+              <a:rPr lang="en-US" sz="1000" dirty="0"/>
+              <a:t>by population - </a:t>
+            </a:r>
+            <a:r>
+              <a:rPr lang="en-US" sz="1000" dirty="0">
+                <a:hlinkClick r:id="rId3"/>
+              </a:rPr>
+              <a:t>https://</a:t>
+            </a:r>
+            <a:r>
+              <a:rPr lang="en-US" sz="1000" dirty="0" smtClean="0">
+                <a:hlinkClick r:id="rId3"/>
+              </a:rPr>
+              <a:t>en.wikipedia.org/wiki/List_of_United_States_cities_by_population</a:t>
+            </a:r>
+            <a:r>
+              <a:rPr lang="en-US" sz="1000" dirty="0" smtClean="0"/>
+              <a:t> </a:t>
+            </a:r>
+            <a:endParaRPr lang="en-US" sz="1000" dirty="0"/>
+          </a:p>
+        </p:txBody>
+      </p:sp>
     </p:spTree>
     <p:extLst>
       <p:ext uri="{BB962C8B-B14F-4D97-AF65-F5344CB8AC3E}">
@@ -12288,6 +13663,115 @@
           </a:ln>
         </p:spPr>
       </p:pic>
+      <p:sp>
+        <p:nvSpPr>
+          <p:cNvPr id="13" name="TextBox 12"/>
+          <p:cNvSpPr txBox="1"/>
+          <p:nvPr/>
+        </p:nvSpPr>
+        <p:spPr>
+          <a:xfrm rot="19471725">
+            <a:off x="90989" y="378422"/>
+            <a:ext cx="1320170" cy="584775"/>
+          </a:xfrm>
+          <a:prstGeom prst="rect">
+            <a:avLst/>
+          </a:prstGeom>
+          <a:noFill/>
+        </p:spPr>
+        <p:txBody>
+          <a:bodyPr wrap="none" rtlCol="0">
+            <a:spAutoFit/>
+          </a:bodyPr>
+          <a:lstStyle/>
+          <a:p>
+            <a:pPr algn="ctr"/>
+            <a:r>
+              <a:rPr lang="en-US" sz="1600" dirty="0" smtClean="0">
+                <a:solidFill>
+                  <a:srgbClr val="FF0000"/>
+                </a:solidFill>
+              </a:rPr>
+              <a:t>Existing, </a:t>
+            </a:r>
+          </a:p>
+          <a:p>
+            <a:pPr algn="ctr"/>
+            <a:r>
+              <a:rPr lang="en-US" sz="1600" dirty="0" smtClean="0">
+                <a:solidFill>
+                  <a:srgbClr val="FF0000"/>
+                </a:solidFill>
+              </a:rPr>
+              <a:t>related works</a:t>
+            </a:r>
+            <a:endParaRPr lang="en-US" sz="1600" dirty="0">
+              <a:solidFill>
+                <a:srgbClr val="FF0000"/>
+              </a:solidFill>
+            </a:endParaRPr>
+          </a:p>
+        </p:txBody>
+      </p:sp>
+      <p:sp>
+        <p:nvSpPr>
+          <p:cNvPr id="14" name="TextBox 13"/>
+          <p:cNvSpPr txBox="1"/>
+          <p:nvPr/>
+        </p:nvSpPr>
+        <p:spPr>
+          <a:xfrm>
+            <a:off x="0" y="6601157"/>
+            <a:ext cx="12192000" cy="246221"/>
+          </a:xfrm>
+          <a:prstGeom prst="rect">
+            <a:avLst/>
+          </a:prstGeom>
+          <a:noFill/>
+        </p:spPr>
+        <p:txBody>
+          <a:bodyPr wrap="square" rtlCol="0">
+            <a:spAutoFit/>
+          </a:bodyPr>
+          <a:lstStyle/>
+          <a:p>
+            <a:pPr algn="ctr"/>
+            <a:r>
+              <a:rPr lang="en-US" sz="1000" dirty="0" smtClean="0"/>
+              <a:t>[</a:t>
+            </a:r>
+            <a:r>
+              <a:rPr lang="en-US" sz="1000" dirty="0" err="1" smtClean="0"/>
+              <a:t>ccd</a:t>
+            </a:r>
+            <a:r>
+              <a:rPr lang="en-US" sz="1000" dirty="0" smtClean="0"/>
+              <a:t>] Center City Reports, Philadelphia: An </a:t>
+            </a:r>
+            <a:r>
+              <a:rPr lang="en-US" sz="1000" dirty="0"/>
+              <a:t>Incomplete Revival - </a:t>
+            </a:r>
+            <a:r>
+              <a:rPr lang="en-US" sz="1000" dirty="0">
+                <a:hlinkClick r:id="rId5"/>
+              </a:rPr>
+              <a:t>https://</a:t>
+            </a:r>
+            <a:r>
+              <a:rPr lang="en-US" sz="1000" dirty="0" smtClean="0">
+                <a:hlinkClick r:id="rId5"/>
+              </a:rPr>
+              <a:t>www.centercityphila.org/research-reports/philadelphia-an-incomplete-revival</a:t>
+            </a:r>
+            <a:r>
+              <a:rPr lang="en-US" sz="1000" dirty="0" smtClean="0"/>
+              <a:t> </a:t>
+            </a:r>
+            <a:endParaRPr lang="en-US" sz="1000" dirty="0"/>
+          </a:p>
+        </p:txBody>
+      </p:sp>
     </p:spTree>
     <p:extLst>
       <p:ext uri="{BB962C8B-B14F-4D97-AF65-F5344CB8AC3E}">
@@ -12639,6 +14123,111 @@
           </a:prstGeom>
         </p:spPr>
       </p:pic>
+      <p:sp>
+        <p:nvSpPr>
+          <p:cNvPr id="9" name="TextBox 8"/>
+          <p:cNvSpPr txBox="1"/>
+          <p:nvPr/>
+        </p:nvSpPr>
+        <p:spPr>
+          <a:xfrm rot="19471725">
+            <a:off x="90989" y="378422"/>
+            <a:ext cx="1320170" cy="584775"/>
+          </a:xfrm>
+          <a:prstGeom prst="rect">
+            <a:avLst/>
+          </a:prstGeom>
+          <a:noFill/>
+        </p:spPr>
+        <p:txBody>
+          <a:bodyPr wrap="none" rtlCol="0">
+            <a:spAutoFit/>
+          </a:bodyPr>
+          <a:lstStyle/>
+          <a:p>
+            <a:pPr algn="ctr"/>
+            <a:r>
+              <a:rPr lang="en-US" sz="1600" dirty="0" smtClean="0">
+                <a:solidFill>
+                  <a:srgbClr val="FF0000"/>
+                </a:solidFill>
+              </a:rPr>
+              <a:t>Existing, </a:t>
+            </a:r>
+          </a:p>
+          <a:p>
+            <a:pPr algn="ctr"/>
+            <a:r>
+              <a:rPr lang="en-US" sz="1600" dirty="0" smtClean="0">
+                <a:solidFill>
+                  <a:srgbClr val="FF0000"/>
+                </a:solidFill>
+              </a:rPr>
+              <a:t>related works</a:t>
+            </a:r>
+            <a:endParaRPr lang="en-US" sz="1600" dirty="0">
+              <a:solidFill>
+                <a:srgbClr val="FF0000"/>
+              </a:solidFill>
+            </a:endParaRPr>
+          </a:p>
+        </p:txBody>
+      </p:sp>
+      <p:sp>
+        <p:nvSpPr>
+          <p:cNvPr id="11" name="TextBox 10"/>
+          <p:cNvSpPr txBox="1"/>
+          <p:nvPr/>
+        </p:nvSpPr>
+        <p:spPr>
+          <a:xfrm>
+            <a:off x="0" y="6601157"/>
+            <a:ext cx="12192000" cy="246221"/>
+          </a:xfrm>
+          <a:prstGeom prst="rect">
+            <a:avLst/>
+          </a:prstGeom>
+          <a:noFill/>
+        </p:spPr>
+        <p:txBody>
+          <a:bodyPr wrap="square" rtlCol="0">
+            <a:spAutoFit/>
+          </a:bodyPr>
+          <a:lstStyle/>
+          <a:p>
+            <a:pPr algn="ctr"/>
+            <a:r>
+              <a:rPr lang="en-US" sz="1000" dirty="0" smtClean="0"/>
+              <a:t>[</a:t>
+            </a:r>
+            <a:r>
+              <a:rPr lang="en-US" sz="1000" dirty="0" err="1" smtClean="0"/>
+              <a:t>brookings</a:t>
+            </a:r>
+            <a:r>
+              <a:rPr lang="en-US" sz="1000" dirty="0" smtClean="0"/>
+              <a:t>] Brookings Institute, Metro Monitor (2017) - </a:t>
+            </a:r>
+            <a:r>
+              <a:rPr lang="en-US" sz="1000" dirty="0">
+                <a:hlinkClick r:id="rId5"/>
+              </a:rPr>
+              <a:t>https://www.brookings.edu/research/metro-monitor-2017</a:t>
+            </a:r>
+            <a:r>
+              <a:rPr lang="en-US" sz="1000" dirty="0" smtClean="0">
+                <a:hlinkClick r:id="rId5"/>
+              </a:rPr>
+              <a:t>/</a:t>
+            </a:r>
+            <a:r>
+              <a:rPr lang="en-US" sz="1000" dirty="0" smtClean="0"/>
+              <a:t> </a:t>
+            </a:r>
+            <a:endParaRPr lang="en-US" sz="1000" dirty="0"/>
+          </a:p>
+        </p:txBody>
+      </p:sp>
     </p:spTree>
     <p:extLst>
       <p:ext uri="{BB962C8B-B14F-4D97-AF65-F5344CB8AC3E}">
@@ -12725,7 +14314,7 @@
                               <p:par>
                                 <p:cTn id="9" presetID="1" presetClass="entr" presetSubtype="0" fill="hold" nodeType="clickEffect">
                                   <p:stCondLst>
-                                    <p:cond delay="5000"/>
+                                    <p:cond delay="4000"/>
                                   </p:stCondLst>
                                   <p:childTnLst>
                                     <p:set>
@@ -12770,7 +14359,7 @@
                               <p:par>
                                 <p:cTn id="13" presetID="1" presetClass="entr" presetSubtype="0" fill="hold" nodeType="clickEffect">
                                   <p:stCondLst>
-                                    <p:cond delay="5000"/>
+                                    <p:cond delay="4000"/>
                                   </p:stCondLst>
                                   <p:childTnLst>
                                     <p:set>
@@ -12891,8 +14480,23 @@
             <a:pPr lvl="1"/>
             <a:r>
               <a:rPr lang="en-US" dirty="0"/>
-              <a:t>Population: U.S. Census</a:t>
-            </a:r>
+              <a:t>Population: U.S. </a:t>
+            </a:r>
+            <a:r>
+              <a:rPr lang="en-US" dirty="0" smtClean="0"/>
+              <a:t>Census Bureau			[census]  -  </a:t>
+            </a:r>
+            <a:r>
+              <a:rPr lang="en-US" dirty="0" smtClean="0">
+                <a:hlinkClick r:id="rId2"/>
+              </a:rPr>
+              <a:t>http://census.gov</a:t>
+            </a:r>
+            <a:r>
+              <a:rPr lang="en-US" dirty="0" smtClean="0"/>
+              <a:t> </a:t>
+            </a:r>
+            <a:endParaRPr lang="en-US" dirty="0"/>
           </a:p>
           <a:p>
             <a:pPr lvl="1"/>
@@ -12902,14 +14506,32 @@
             </a:r>
             <a:r>
               <a:rPr lang="en-US" dirty="0" smtClean="0"/>
-              <a:t>Statistics</a:t>
+              <a:t>Statistics	[</a:t>
+            </a:r>
+            <a:r>
+              <a:rPr lang="en-US" dirty="0" err="1" smtClean="0"/>
+              <a:t>bls</a:t>
+            </a:r>
+            <a:r>
+              <a:rPr lang="en-US" dirty="0" smtClean="0"/>
+              <a:t>]  -  </a:t>
+            </a:r>
+            <a:r>
+              <a:rPr lang="en-US" dirty="0" smtClean="0">
+                <a:hlinkClick r:id="rId3"/>
+              </a:rPr>
+              <a:t>http://www.bls.gov</a:t>
+            </a:r>
+            <a:r>
+              <a:rPr lang="en-US" dirty="0" smtClean="0"/>
+              <a:t> </a:t>
             </a:r>
           </a:p>
           <a:p>
             <a:pPr lvl="1"/>
             <a:r>
               <a:rPr lang="en-US" dirty="0" smtClean="0"/>
-              <a:t>Cities by Size: Wikipedia</a:t>
+              <a:t>City Demographics: Wikipedia (several pages)</a:t>
             </a:r>
             <a:endParaRPr lang="en-US" dirty="0"/>
           </a:p>
@@ -12939,14 +14561,14 @@
             <a:pPr lvl="1"/>
             <a:r>
               <a:rPr lang="en-US" dirty="0" smtClean="0"/>
-              <a:t>External tools</a:t>
+              <a:t>External tools*</a:t>
             </a:r>
           </a:p>
           <a:p>
             <a:pPr lvl="1"/>
             <a:r>
               <a:rPr lang="en-US" dirty="0" smtClean="0"/>
-              <a:t>Extract from HTML forms</a:t>
+              <a:t>Manually extracted from HTML forms</a:t>
             </a:r>
           </a:p>
           <a:p>
@@ -12972,6 +14594,53 @@
           </a:p>
           <a:p>
             <a:endParaRPr lang="en-US" dirty="0"/>
+          </a:p>
+        </p:txBody>
+      </p:sp>
+      <p:sp>
+        <p:nvSpPr>
+          <p:cNvPr id="4" name="TextBox 3"/>
+          <p:cNvSpPr txBox="1"/>
+          <p:nvPr/>
+        </p:nvSpPr>
+        <p:spPr>
+          <a:xfrm>
+            <a:off x="0" y="6601157"/>
+            <a:ext cx="12192000" cy="246221"/>
+          </a:xfrm>
+          <a:prstGeom prst="rect">
+            <a:avLst/>
+          </a:prstGeom>
+          <a:noFill/>
+        </p:spPr>
+        <p:txBody>
+          <a:bodyPr wrap="square" rtlCol="0">
+            <a:spAutoFit/>
+          </a:bodyPr>
+          <a:lstStyle/>
+          <a:p>
+            <a:pPr algn="ctr"/>
+            <a:r>
+              <a:rPr lang="en-US" sz="1000" dirty="0" smtClean="0"/>
+              <a:t>* [wikipedia2csv] </a:t>
+            </a:r>
+            <a:r>
+              <a:rPr lang="en-US" sz="1000" dirty="0"/>
+              <a:t>Convert Wikipedia Tables to CSV - </a:t>
+            </a:r>
+            <a:r>
+              <a:rPr lang="en-US" sz="1000" dirty="0">
+                <a:hlinkClick r:id="rId4"/>
+              </a:rPr>
+              <a:t>http://wikitable2csv.ggor.de</a:t>
+            </a:r>
+            <a:r>
+              <a:rPr lang="en-US" sz="1000" dirty="0" smtClean="0">
+                <a:hlinkClick r:id="rId4"/>
+              </a:rPr>
+              <a:t>/</a:t>
+            </a:r>
+            <a:endParaRPr lang="en-US" sz="1000" dirty="0"/>
           </a:p>
         </p:txBody>
       </p:sp>

</xml_diff>

<commit_message>
Mid-term presentation: labor force analysis and plots
</commit_message>
<xml_diff>
--- a/project/mid-term-presentation.pptx
+++ b/project/mid-term-presentation.pptx
@@ -1,6 +1,6 @@
 
 <file path=ppt/presentation.xml><?xml version="1.0" encoding="utf-8"?>
-<p:presentation xmlns:a="http://schemas.openxmlformats.org/drawingml/2006/main" xmlns:r="http://schemas.openxmlformats.org/officeDocument/2006/relationships" xmlns:p="http://schemas.openxmlformats.org/presentationml/2006/main" saveSubsetFonts="1">
+<p:presentation xmlns:a="http://schemas.openxmlformats.org/drawingml/2006/main" xmlns:r="http://schemas.openxmlformats.org/officeDocument/2006/relationships" xmlns:p="http://schemas.openxmlformats.org/presentationml/2006/main" saveSubsetFonts="1" bookmarkIdSeed="2">
   <p:sldMasterIdLst>
     <p:sldMasterId id="2147483845" r:id="rId1"/>
   </p:sldMasterIdLst>
@@ -8091,6 +8091,71 @@
           <a:chExt cx="0" cy="0"/>
         </a:xfrm>
       </p:grpSpPr>
+      <p:pic>
+        <p:nvPicPr>
+          <p:cNvPr id="6" name="Content Placeholder 5"/>
+          <p:cNvPicPr>
+            <a:picLocks noGrp="1" noChangeAspect="1"/>
+          </p:cNvPicPr>
+          <p:nvPr>
+            <p:ph sz="half" idx="2"/>
+          </p:nvPr>
+        </p:nvPicPr>
+        <p:blipFill>
+          <a:blip r:embed="rId2">
+            <a:extLst>
+              <a:ext uri="{28A0092B-C50C-407E-A947-70E740481C1C}">
+                <a14:useLocalDpi xmlns:a14="http://schemas.microsoft.com/office/drawing/2010/main" val="0"/>
+              </a:ext>
+            </a:extLst>
+          </a:blip>
+          <a:stretch>
+            <a:fillRect/>
+          </a:stretch>
+        </p:blipFill>
+        <p:spPr>
+          <a:xfrm>
+            <a:off x="6172200" y="2314544"/>
+            <a:ext cx="5181600" cy="3373500"/>
+          </a:xfrm>
+          <a:solidFill>
+            <a:schemeClr val="bg1"/>
+          </a:solidFill>
+        </p:spPr>
+      </p:pic>
+      <p:pic>
+        <p:nvPicPr>
+          <p:cNvPr id="7" name="Picture 6"/>
+          <p:cNvPicPr>
+            <a:picLocks noChangeAspect="1"/>
+          </p:cNvPicPr>
+          <p:nvPr/>
+        </p:nvPicPr>
+        <p:blipFill>
+          <a:blip r:embed="rId3">
+            <a:extLst>
+              <a:ext uri="{28A0092B-C50C-407E-A947-70E740481C1C}">
+                <a14:useLocalDpi xmlns:a14="http://schemas.microsoft.com/office/drawing/2010/main" val="0"/>
+              </a:ext>
+            </a:extLst>
+          </a:blip>
+          <a:stretch>
+            <a:fillRect/>
+          </a:stretch>
+        </p:blipFill>
+        <p:spPr>
+          <a:xfrm>
+            <a:off x="6019800" y="2357024"/>
+            <a:ext cx="6084686" cy="3531405"/>
+          </a:xfrm>
+          <a:prstGeom prst="rect">
+            <a:avLst/>
+          </a:prstGeom>
+          <a:solidFill>
+            <a:schemeClr val="bg1"/>
+          </a:solidFill>
+        </p:spPr>
+      </p:pic>
       <p:sp>
         <p:nvSpPr>
           <p:cNvPr id="2" name="Title 1"/>
@@ -8124,31 +8189,210 @@
             <p:ph sz="half" idx="1"/>
           </p:nvPr>
         </p:nvSpPr>
-        <p:spPr/>
+        <p:spPr>
+          <a:xfrm>
+            <a:off x="838200" y="1825625"/>
+            <a:ext cx="5181600" cy="4959384"/>
+          </a:xfrm>
+        </p:spPr>
         <p:txBody>
-          <a:bodyPr/>
+          <a:bodyPr>
+            <a:normAutofit fontScale="85000" lnSpcReduction="10000"/>
+          </a:bodyPr>
           <a:lstStyle/>
           <a:p>
-            <a:endParaRPr lang="en-US"/>
+            <a:r>
+              <a:rPr lang="en-US" dirty="0" smtClean="0"/>
+              <a:t>The Ratio of Labor Force to Population gives an indicator of how much of the population is participating in employment.</a:t>
+            </a:r>
+          </a:p>
+          <a:p>
+            <a:r>
+              <a:rPr lang="en-US" dirty="0" smtClean="0"/>
+              <a:t>For Philadelphia</a:t>
+            </a:r>
+          </a:p>
+          <a:p>
+            <a:pPr lvl="1"/>
+            <a:r>
+              <a:rPr lang="en-US" dirty="0" smtClean="0"/>
+              <a:t>In 2010: there is a drop in Population, and a corresponding spike in Labor Force.</a:t>
+            </a:r>
+          </a:p>
+          <a:p>
+            <a:pPr lvl="2"/>
+            <a:r>
+              <a:rPr lang="en-US" dirty="0" smtClean="0"/>
+              <a:t>Age of departing population</a:t>
+            </a:r>
+          </a:p>
+          <a:p>
+            <a:pPr lvl="2"/>
+            <a:r>
+              <a:rPr lang="en-US" dirty="0" smtClean="0"/>
+              <a:t>Population entering workforce</a:t>
+            </a:r>
+            <a:endParaRPr lang="en-US" dirty="0"/>
+          </a:p>
+          <a:p>
+            <a:pPr lvl="1"/>
+            <a:r>
+              <a:rPr lang="en-US" dirty="0" smtClean="0"/>
+              <a:t>In 2013-2014: the decrease in Labor Force is equal to the Population increase, yet  the Unemployment Rate dropped over 2%</a:t>
+            </a:r>
+          </a:p>
+          <a:p>
+            <a:pPr lvl="2"/>
+            <a:r>
+              <a:rPr lang="en-US" dirty="0" smtClean="0"/>
+              <a:t>More population demographic changes</a:t>
+            </a:r>
+          </a:p>
+          <a:p>
+            <a:pPr lvl="2"/>
+            <a:r>
+              <a:rPr lang="en-US" dirty="0" smtClean="0"/>
+              <a:t>Job relocations?</a:t>
+            </a:r>
+          </a:p>
+          <a:p>
+            <a:pPr lvl="1"/>
+            <a:r>
+              <a:rPr lang="en-US" dirty="0" smtClean="0"/>
+              <a:t>In 2015-2016: Labor Force growth outpaces population growth</a:t>
+            </a:r>
           </a:p>
         </p:txBody>
       </p:sp>
       <p:sp>
         <p:nvSpPr>
-          <p:cNvPr id="5" name="Content Placeholder 4"/>
-          <p:cNvSpPr>
-            <a:spLocks noGrp="1"/>
-          </p:cNvSpPr>
-          <p:nvPr>
-            <p:ph sz="half" idx="2"/>
-          </p:nvPr>
+          <p:cNvPr id="13" name="Rounded Rectangle 12"/>
+          <p:cNvSpPr/>
+          <p:nvPr/>
         </p:nvSpPr>
-        <p:spPr/>
+        <p:spPr>
+          <a:xfrm>
+            <a:off x="6058518" y="6311900"/>
+            <a:ext cx="6007249" cy="473109"/>
+          </a:xfrm>
+          <a:prstGeom prst="roundRect">
+            <a:avLst/>
+          </a:prstGeom>
+          <a:solidFill>
+            <a:schemeClr val="accent1">
+              <a:lumMod val="20000"/>
+              <a:lumOff val="80000"/>
+            </a:schemeClr>
+          </a:solidFill>
+        </p:spPr>
+        <p:style>
+          <a:lnRef idx="2">
+            <a:schemeClr val="accent1">
+              <a:shade val="50000"/>
+            </a:schemeClr>
+          </a:lnRef>
+          <a:fillRef idx="1">
+            <a:schemeClr val="accent1"/>
+          </a:fillRef>
+          <a:effectRef idx="0">
+            <a:schemeClr val="accent1"/>
+          </a:effectRef>
+          <a:fontRef idx="minor">
+            <a:schemeClr val="lt1"/>
+          </a:fontRef>
+        </p:style>
         <p:txBody>
-          <a:bodyPr/>
+          <a:bodyPr rtlCol="0" anchor="ctr"/>
           <a:lstStyle/>
           <a:p>
-            <a:endParaRPr lang="en-US"/>
+            <a:pPr lvl="0" eaLnBrk="0" fontAlgn="base" hangingPunct="0">
+              <a:spcBef>
+                <a:spcPct val="0"/>
+              </a:spcBef>
+              <a:spcAft>
+                <a:spcPct val="0"/>
+              </a:spcAft>
+            </a:pPr>
+            <a:r>
+              <a:rPr lang="en-US" altLang="en-US" sz="1000" b="1" dirty="0">
+                <a:solidFill>
+                  <a:srgbClr val="000000"/>
+                </a:solidFill>
+                <a:latin typeface="Tahoma" panose="020B0604030504040204" pitchFamily="34" charset="0"/>
+                <a:cs typeface="Tahoma" panose="020B0604030504040204" pitchFamily="34" charset="0"/>
+              </a:rPr>
+              <a:t>L</a:t>
+            </a:r>
+            <a:r>
+              <a:rPr lang="en-US" altLang="en-US" sz="1000" b="1" dirty="0" bmk="">
+                <a:solidFill>
+                  <a:srgbClr val="000000"/>
+                </a:solidFill>
+                <a:latin typeface="Tahoma" panose="020B0604030504040204" pitchFamily="34" charset="0"/>
+                <a:cs typeface="Tahoma" panose="020B0604030504040204" pitchFamily="34" charset="0"/>
+              </a:rPr>
+              <a:t>abor force (Current Population Survey</a:t>
+            </a:r>
+            <a:r>
+              <a:rPr lang="en-US" altLang="en-US" sz="1000" b="1" dirty="0" smtClean="0" bmk="">
+                <a:solidFill>
+                  <a:srgbClr val="000000"/>
+                </a:solidFill>
+                <a:latin typeface="Tahoma" panose="020B0604030504040204" pitchFamily="34" charset="0"/>
+                <a:cs typeface="Tahoma" panose="020B0604030504040204" pitchFamily="34" charset="0"/>
+              </a:rPr>
+              <a:t>)</a:t>
+            </a:r>
+          </a:p>
+          <a:p>
+            <a:pPr lvl="0" eaLnBrk="0" fontAlgn="base" hangingPunct="0">
+              <a:spcBef>
+                <a:spcPct val="0"/>
+              </a:spcBef>
+              <a:spcAft>
+                <a:spcPct val="0"/>
+              </a:spcAft>
+            </a:pPr>
+            <a:r>
+              <a:rPr lang="en-US" altLang="en-US" sz="1000" dirty="0" smtClean="0">
+                <a:solidFill>
+                  <a:srgbClr val="000000"/>
+                </a:solidFill>
+                <a:latin typeface="Tahoma" panose="020B0604030504040204" pitchFamily="34" charset="0"/>
+                <a:cs typeface="Tahoma" panose="020B0604030504040204" pitchFamily="34" charset="0"/>
+              </a:rPr>
+              <a:t>The </a:t>
+            </a:r>
+            <a:r>
+              <a:rPr lang="en-US" altLang="en-US" sz="1000" dirty="0">
+                <a:solidFill>
+                  <a:srgbClr val="000000"/>
+                </a:solidFill>
+                <a:latin typeface="Tahoma" panose="020B0604030504040204" pitchFamily="34" charset="0"/>
+                <a:cs typeface="Tahoma" panose="020B0604030504040204" pitchFamily="34" charset="0"/>
+              </a:rPr>
+              <a:t>labor force includes all persons classified as employed or unemployed in accordance with </a:t>
+            </a:r>
+            <a:r>
+              <a:rPr lang="en-US" altLang="en-US" sz="1000" dirty="0" smtClean="0">
+                <a:solidFill>
+                  <a:srgbClr val="000000"/>
+                </a:solidFill>
+                <a:latin typeface="Tahoma" panose="020B0604030504040204" pitchFamily="34" charset="0"/>
+                <a:cs typeface="Tahoma" panose="020B0604030504040204" pitchFamily="34" charset="0"/>
+              </a:rPr>
+              <a:t>the [Bureau of Labor Statistics] </a:t>
+            </a:r>
+            <a:r>
+              <a:rPr lang="en-US" altLang="en-US" sz="1000" dirty="0">
+                <a:solidFill>
+                  <a:srgbClr val="000000"/>
+                </a:solidFill>
+                <a:latin typeface="Tahoma" panose="020B0604030504040204" pitchFamily="34" charset="0"/>
+                <a:cs typeface="Tahoma" panose="020B0604030504040204" pitchFamily="34" charset="0"/>
+              </a:rPr>
+              <a:t>definitions</a:t>
+            </a:r>
           </a:p>
         </p:txBody>
       </p:sp>
@@ -8173,7 +8417,120 @@
   <p:timing>
     <p:tnLst>
       <p:par>
-        <p:cTn id="1" dur="indefinite" restart="never" nodeType="tmRoot"/>
+        <p:cTn id="1" dur="indefinite" restart="never" nodeType="tmRoot">
+          <p:childTnLst>
+            <p:seq concurrent="1" nextAc="seek">
+              <p:cTn id="2" dur="indefinite" nodeType="mainSeq">
+                <p:childTnLst>
+                  <p:par>
+                    <p:cTn id="3" fill="hold">
+                      <p:stCondLst>
+                        <p:cond delay="indefinite"/>
+                      </p:stCondLst>
+                      <p:childTnLst>
+                        <p:par>
+                          <p:cTn id="4" fill="hold">
+                            <p:stCondLst>
+                              <p:cond delay="0"/>
+                            </p:stCondLst>
+                            <p:childTnLst>
+                              <p:par>
+                                <p:cTn id="5" presetID="1" presetClass="entr" presetSubtype="0" fill="hold" nodeType="clickEffect">
+                                  <p:stCondLst>
+                                    <p:cond delay="1000"/>
+                                  </p:stCondLst>
+                                  <p:childTnLst>
+                                    <p:set>
+                                      <p:cBhvr>
+                                        <p:cTn id="6" dur="1" fill="hold">
+                                          <p:stCondLst>
+                                            <p:cond delay="0"/>
+                                          </p:stCondLst>
+                                        </p:cTn>
+                                        <p:tgtEl>
+                                          <p:spTgt spid="6"/>
+                                        </p:tgtEl>
+                                        <p:attrNameLst>
+                                          <p:attrName>style.visibility</p:attrName>
+                                        </p:attrNameLst>
+                                      </p:cBhvr>
+                                      <p:to>
+                                        <p:strVal val="visible"/>
+                                      </p:to>
+                                    </p:set>
+                                  </p:childTnLst>
+                                </p:cTn>
+                              </p:par>
+                            </p:childTnLst>
+                          </p:cTn>
+                        </p:par>
+                      </p:childTnLst>
+                    </p:cTn>
+                  </p:par>
+                  <p:par>
+                    <p:cTn id="7" fill="hold">
+                      <p:stCondLst>
+                        <p:cond delay="indefinite"/>
+                      </p:stCondLst>
+                      <p:childTnLst>
+                        <p:par>
+                          <p:cTn id="8" fill="hold">
+                            <p:stCondLst>
+                              <p:cond delay="0"/>
+                            </p:stCondLst>
+                            <p:childTnLst>
+                              <p:par>
+                                <p:cTn id="9" presetID="1" presetClass="entr" presetSubtype="0" fill="hold" nodeType="clickEffect">
+                                  <p:stCondLst>
+                                    <p:cond delay="3000"/>
+                                  </p:stCondLst>
+                                  <p:childTnLst>
+                                    <p:set>
+                                      <p:cBhvr>
+                                        <p:cTn id="10" dur="1" fill="hold">
+                                          <p:stCondLst>
+                                            <p:cond delay="0"/>
+                                          </p:stCondLst>
+                                        </p:cTn>
+                                        <p:tgtEl>
+                                          <p:spTgt spid="7"/>
+                                        </p:tgtEl>
+                                        <p:attrNameLst>
+                                          <p:attrName>style.visibility</p:attrName>
+                                        </p:attrNameLst>
+                                      </p:cBhvr>
+                                      <p:to>
+                                        <p:strVal val="visible"/>
+                                      </p:to>
+                                    </p:set>
+                                  </p:childTnLst>
+                                </p:cTn>
+                              </p:par>
+                            </p:childTnLst>
+                          </p:cTn>
+                        </p:par>
+                      </p:childTnLst>
+                    </p:cTn>
+                  </p:par>
+                </p:childTnLst>
+              </p:cTn>
+              <p:prevCondLst>
+                <p:cond evt="onPrev" delay="0">
+                  <p:tgtEl>
+                    <p:sldTgt/>
+                  </p:tgtEl>
+                </p:cond>
+              </p:prevCondLst>
+              <p:nextCondLst>
+                <p:cond evt="onNext" delay="0">
+                  <p:tgtEl>
+                    <p:sldTgt/>
+                  </p:tgtEl>
+                </p:cond>
+              </p:nextCondLst>
+            </p:seq>
+          </p:childTnLst>
+        </p:cTn>
       </p:par>
     </p:tnLst>
   </p:timing>
@@ -8237,7 +8594,87 @@
           </a:bodyPr>
           <a:lstStyle/>
           <a:p>
-            <a:endParaRPr lang="en-US" dirty="0" smtClean="0"/>
+            <a:r>
+              <a:rPr lang="en-US" dirty="0" smtClean="0"/>
+              <a:t>Philadelphia’s rebound from the Great Recession of 2008-2009</a:t>
+            </a:r>
+          </a:p>
+          <a:p>
+            <a:pPr lvl="1"/>
+            <a:r>
+              <a:rPr lang="en-US" dirty="0" smtClean="0"/>
+              <a:t>City population is up 1.8%, even after an exodus of almost 20,000 people in 2009-2010</a:t>
+            </a:r>
+          </a:p>
+          <a:p>
+            <a:pPr lvl="2"/>
+            <a:r>
+              <a:rPr lang="en-US" dirty="0" smtClean="0"/>
+              <a:t>However, the rate of population increase is lower compared to other cities in the same size spectrum</a:t>
+            </a:r>
+          </a:p>
+          <a:p>
+            <a:pPr lvl="1"/>
+            <a:r>
+              <a:rPr lang="en-US" dirty="0" smtClean="0"/>
+              <a:t>Unemployment is just 0.2% higher than the pre-recession level</a:t>
+            </a:r>
+          </a:p>
+          <a:p>
+            <a:pPr lvl="1"/>
+            <a:r>
+              <a:rPr lang="en-US" dirty="0" smtClean="0"/>
+              <a:t>The number of unemployed is 14.3% higher than pre-recession level</a:t>
+            </a:r>
+          </a:p>
+          <a:p>
+            <a:pPr lvl="2"/>
+            <a:r>
+              <a:rPr lang="en-US" dirty="0" smtClean="0"/>
+              <a:t>But the number has been steadily declining since 2012</a:t>
+            </a:r>
+            <a:endParaRPr lang="en-US" dirty="0"/>
+          </a:p>
+          <a:p>
+            <a:pPr lvl="1"/>
+            <a:r>
+              <a:rPr lang="en-US" dirty="0"/>
+              <a:t>The number of </a:t>
+            </a:r>
+            <a:r>
+              <a:rPr lang="en-US" dirty="0" smtClean="0"/>
+              <a:t>employed </a:t>
+            </a:r>
+            <a:r>
+              <a:rPr lang="en-US" dirty="0"/>
+              <a:t>is </a:t>
+            </a:r>
+            <a:r>
+              <a:rPr lang="en-US" dirty="0" smtClean="0"/>
+              <a:t>11.2</a:t>
+            </a:r>
+            <a:r>
+              <a:rPr lang="en-US" dirty="0"/>
+              <a:t>% higher than pre-recession </a:t>
+            </a:r>
+            <a:r>
+              <a:rPr lang="en-US" dirty="0" smtClean="0"/>
+              <a:t>level</a:t>
+            </a:r>
+          </a:p>
+          <a:p>
+            <a:pPr lvl="2"/>
+            <a:r>
+              <a:rPr lang="en-US" dirty="0" smtClean="0"/>
+              <a:t>Only in 2011 was there a dip in the number of employed</a:t>
+            </a:r>
+          </a:p>
+          <a:p>
+            <a:pPr lvl="1"/>
+            <a:r>
+              <a:rPr lang="en-US" dirty="0" smtClean="0"/>
+              <a:t>The job creation rate is outpacing population growth</a:t>
+            </a:r>
           </a:p>
         </p:txBody>
       </p:sp>
@@ -8980,17 +9417,27 @@
             <p:ph idx="1"/>
           </p:nvPr>
         </p:nvSpPr>
-        <p:spPr/>
+        <p:spPr>
+          <a:xfrm>
+            <a:off x="838200" y="1825624"/>
+            <a:ext cx="10515600" cy="4758055"/>
+          </a:xfrm>
+        </p:spPr>
         <p:txBody>
           <a:bodyPr>
-            <a:normAutofit fontScale="85000" lnSpcReduction="20000"/>
+            <a:normAutofit fontScale="77500" lnSpcReduction="20000"/>
           </a:bodyPr>
           <a:lstStyle/>
           <a:p>
             <a:r>
               <a:rPr lang="en-US" dirty="0"/>
-              <a:t>Add in additional data dimensions</a:t>
-            </a:r>
+              <a:t>Add in additional data </a:t>
+            </a:r>
+            <a:r>
+              <a:rPr lang="en-US" dirty="0" smtClean="0"/>
+              <a:t>dimensions, to get a broader perspective</a:t>
+            </a:r>
+            <a:endParaRPr lang="en-US" dirty="0"/>
           </a:p>
           <a:p>
             <a:pPr lvl="1"/>
@@ -9003,13 +9450,42 @@
             <a:pPr lvl="1"/>
             <a:r>
               <a:rPr lang="en-US" dirty="0"/>
-              <a:t>Labor force characteristics: industries, sub-industries</a:t>
-            </a:r>
-          </a:p>
-          <a:p>
+              <a:t>Labor force characteristics: industries, </a:t>
+            </a:r>
+            <a:r>
+              <a:rPr lang="en-US" dirty="0" smtClean="0"/>
+              <a:t>sub-industries</a:t>
+            </a:r>
+          </a:p>
+          <a:p>
+            <a:r>
+              <a:rPr lang="en-US" dirty="0" smtClean="0"/>
+              <a:t>Incorporate City revenue data (sources, % contributions)</a:t>
+            </a:r>
+          </a:p>
+          <a:p>
+            <a:pPr lvl="1"/>
+            <a:r>
+              <a:rPr lang="en-US" dirty="0" smtClean="0"/>
+              <a:t>The working hypothesis is that some cities are more business and consumer friendly because of their tax structures and revenue models [</a:t>
+            </a:r>
+            <a:r>
+              <a:rPr lang="en-US" dirty="0" err="1" smtClean="0"/>
+              <a:t>ccd</a:t>
+            </a:r>
+            <a:r>
+              <a:rPr lang="en-US" dirty="0" smtClean="0"/>
+              <a:t>].</a:t>
+            </a:r>
+          </a:p>
+          <a:p>
+            <a:r>
+              <a:rPr lang="en-US" dirty="0" smtClean="0"/>
+              <a:t>Draw </a:t>
+            </a:r>
             <a:r>
               <a:rPr lang="en-US" dirty="0"/>
-              <a:t>Draw final conclusion… </a:t>
+              <a:t>final conclusion… </a:t>
             </a:r>
             <a:r>
               <a:rPr lang="en-US" i="1" dirty="0">

</xml_diff>

<commit_message>
Mid-term presentation: added notes (which will be the audio portion)
</commit_message>
<xml_diff>
--- a/project/mid-term-presentation.pptx
+++ b/project/mid-term-presentation.pptx
@@ -4,6 +4,9 @@
   <p:sldMasterIdLst>
     <p:sldMasterId id="2147483845" r:id="rId1"/>
   </p:sldMasterIdLst>
+  <p:notesMasterIdLst>
+    <p:notesMasterId r:id="rId22"/>
+  </p:notesMasterIdLst>
   <p:sldIdLst>
     <p:sldId id="276" r:id="rId2"/>
     <p:sldId id="257" r:id="rId3"/>
@@ -131,6 +134,2306 @@
 </p:presentation>
 </file>
 
+<file path=ppt/notesMasters/notesMaster1.xml><?xml version="1.0" encoding="utf-8"?>
+<p:notesMaster xmlns:a="http://schemas.openxmlformats.org/drawingml/2006/main" xmlns:r="http://schemas.openxmlformats.org/officeDocument/2006/relationships" xmlns:p="http://schemas.openxmlformats.org/presentationml/2006/main">
+  <p:cSld>
+    <p:bg>
+      <p:bgRef idx="1001">
+        <a:schemeClr val="bg1"/>
+      </p:bgRef>
+    </p:bg>
+    <p:spTree>
+      <p:nvGrpSpPr>
+        <p:cNvPr id="1" name=""/>
+        <p:cNvGrpSpPr/>
+        <p:nvPr/>
+      </p:nvGrpSpPr>
+      <p:grpSpPr>
+        <a:xfrm>
+          <a:off x="0" y="0"/>
+          <a:ext cx="0" cy="0"/>
+          <a:chOff x="0" y="0"/>
+          <a:chExt cx="0" cy="0"/>
+        </a:xfrm>
+      </p:grpSpPr>
+      <p:sp>
+        <p:nvSpPr>
+          <p:cNvPr id="2" name="Header Placeholder 1"/>
+          <p:cNvSpPr>
+            <a:spLocks noGrp="1"/>
+          </p:cNvSpPr>
+          <p:nvPr>
+            <p:ph type="hdr" sz="quarter"/>
+          </p:nvPr>
+        </p:nvSpPr>
+        <p:spPr>
+          <a:xfrm>
+            <a:off x="0" y="0"/>
+            <a:ext cx="2971800" cy="458788"/>
+          </a:xfrm>
+          <a:prstGeom prst="rect">
+            <a:avLst/>
+          </a:prstGeom>
+        </p:spPr>
+        <p:txBody>
+          <a:bodyPr vert="horz" lIns="91440" tIns="45720" rIns="91440" bIns="45720" rtlCol="0"/>
+          <a:lstStyle>
+            <a:lvl1pPr algn="l">
+              <a:defRPr sz="1200"/>
+            </a:lvl1pPr>
+          </a:lstStyle>
+          <a:p>
+            <a:endParaRPr lang="en-US"/>
+          </a:p>
+        </p:txBody>
+      </p:sp>
+      <p:sp>
+        <p:nvSpPr>
+          <p:cNvPr id="3" name="Date Placeholder 2"/>
+          <p:cNvSpPr>
+            <a:spLocks noGrp="1"/>
+          </p:cNvSpPr>
+          <p:nvPr>
+            <p:ph type="dt" idx="1"/>
+          </p:nvPr>
+        </p:nvSpPr>
+        <p:spPr>
+          <a:xfrm>
+            <a:off x="3884613" y="0"/>
+            <a:ext cx="2971800" cy="458788"/>
+          </a:xfrm>
+          <a:prstGeom prst="rect">
+            <a:avLst/>
+          </a:prstGeom>
+        </p:spPr>
+        <p:txBody>
+          <a:bodyPr vert="horz" lIns="91440" tIns="45720" rIns="91440" bIns="45720" rtlCol="0"/>
+          <a:lstStyle>
+            <a:lvl1pPr algn="r">
+              <a:defRPr sz="1200"/>
+            </a:lvl1pPr>
+          </a:lstStyle>
+          <a:p>
+            <a:fld id="{9F6C0746-1A35-4814-8A4F-B86528007235}" type="datetimeFigureOut">
+              <a:rPr lang="en-US" smtClean="0"/>
+              <a:t>10/25/2017</a:t>
+            </a:fld>
+            <a:endParaRPr lang="en-US"/>
+          </a:p>
+        </p:txBody>
+      </p:sp>
+      <p:sp>
+        <p:nvSpPr>
+          <p:cNvPr id="4" name="Slide Image Placeholder 3"/>
+          <p:cNvSpPr>
+            <a:spLocks noGrp="1" noRot="1" noChangeAspect="1"/>
+          </p:cNvSpPr>
+          <p:nvPr>
+            <p:ph type="sldImg" idx="2"/>
+          </p:nvPr>
+        </p:nvSpPr>
+        <p:spPr>
+          <a:xfrm>
+            <a:off x="685800" y="1143000"/>
+            <a:ext cx="5486400" cy="3086100"/>
+          </a:xfrm>
+          <a:prstGeom prst="rect">
+            <a:avLst/>
+          </a:prstGeom>
+          <a:noFill/>
+          <a:ln w="12700">
+            <a:solidFill>
+              <a:prstClr val="black"/>
+            </a:solidFill>
+          </a:ln>
+        </p:spPr>
+        <p:txBody>
+          <a:bodyPr vert="horz" lIns="91440" tIns="45720" rIns="91440" bIns="45720" rtlCol="0" anchor="ctr"/>
+          <a:lstStyle/>
+          <a:p>
+            <a:endParaRPr lang="en-US"/>
+          </a:p>
+        </p:txBody>
+      </p:sp>
+      <p:sp>
+        <p:nvSpPr>
+          <p:cNvPr id="5" name="Notes Placeholder 4"/>
+          <p:cNvSpPr>
+            <a:spLocks noGrp="1"/>
+          </p:cNvSpPr>
+          <p:nvPr>
+            <p:ph type="body" sz="quarter" idx="3"/>
+          </p:nvPr>
+        </p:nvSpPr>
+        <p:spPr>
+          <a:xfrm>
+            <a:off x="685800" y="4400550"/>
+            <a:ext cx="5486400" cy="3600450"/>
+          </a:xfrm>
+          <a:prstGeom prst="rect">
+            <a:avLst/>
+          </a:prstGeom>
+        </p:spPr>
+        <p:txBody>
+          <a:bodyPr vert="horz" lIns="91440" tIns="45720" rIns="91440" bIns="45720" rtlCol="0"/>
+          <a:lstStyle/>
+          <a:p>
+            <a:pPr lvl="0"/>
+            <a:r>
+              <a:rPr lang="en-US" smtClean="0"/>
+              <a:t>Click to edit Master text styles</a:t>
+            </a:r>
+          </a:p>
+          <a:p>
+            <a:pPr lvl="1"/>
+            <a:r>
+              <a:rPr lang="en-US" smtClean="0"/>
+              <a:t>Second level</a:t>
+            </a:r>
+          </a:p>
+          <a:p>
+            <a:pPr lvl="2"/>
+            <a:r>
+              <a:rPr lang="en-US" smtClean="0"/>
+              <a:t>Third level</a:t>
+            </a:r>
+          </a:p>
+          <a:p>
+            <a:pPr lvl="3"/>
+            <a:r>
+              <a:rPr lang="en-US" smtClean="0"/>
+              <a:t>Fourth level</a:t>
+            </a:r>
+          </a:p>
+          <a:p>
+            <a:pPr lvl="4"/>
+            <a:r>
+              <a:rPr lang="en-US" smtClean="0"/>
+              <a:t>Fifth level</a:t>
+            </a:r>
+            <a:endParaRPr lang="en-US"/>
+          </a:p>
+        </p:txBody>
+      </p:sp>
+      <p:sp>
+        <p:nvSpPr>
+          <p:cNvPr id="6" name="Footer Placeholder 5"/>
+          <p:cNvSpPr>
+            <a:spLocks noGrp="1"/>
+          </p:cNvSpPr>
+          <p:nvPr>
+            <p:ph type="ftr" sz="quarter" idx="4"/>
+          </p:nvPr>
+        </p:nvSpPr>
+        <p:spPr>
+          <a:xfrm>
+            <a:off x="0" y="8685213"/>
+            <a:ext cx="2971800" cy="458787"/>
+          </a:xfrm>
+          <a:prstGeom prst="rect">
+            <a:avLst/>
+          </a:prstGeom>
+        </p:spPr>
+        <p:txBody>
+          <a:bodyPr vert="horz" lIns="91440" tIns="45720" rIns="91440" bIns="45720" rtlCol="0" anchor="b"/>
+          <a:lstStyle>
+            <a:lvl1pPr algn="l">
+              <a:defRPr sz="1200"/>
+            </a:lvl1pPr>
+          </a:lstStyle>
+          <a:p>
+            <a:endParaRPr lang="en-US"/>
+          </a:p>
+        </p:txBody>
+      </p:sp>
+      <p:sp>
+        <p:nvSpPr>
+          <p:cNvPr id="7" name="Slide Number Placeholder 6"/>
+          <p:cNvSpPr>
+            <a:spLocks noGrp="1"/>
+          </p:cNvSpPr>
+          <p:nvPr>
+            <p:ph type="sldNum" sz="quarter" idx="5"/>
+          </p:nvPr>
+        </p:nvSpPr>
+        <p:spPr>
+          <a:xfrm>
+            <a:off x="3884613" y="8685213"/>
+            <a:ext cx="2971800" cy="458787"/>
+          </a:xfrm>
+          <a:prstGeom prst="rect">
+            <a:avLst/>
+          </a:prstGeom>
+        </p:spPr>
+        <p:txBody>
+          <a:bodyPr vert="horz" lIns="91440" tIns="45720" rIns="91440" bIns="45720" rtlCol="0" anchor="b"/>
+          <a:lstStyle>
+            <a:lvl1pPr algn="r">
+              <a:defRPr sz="1200"/>
+            </a:lvl1pPr>
+          </a:lstStyle>
+          <a:p>
+            <a:fld id="{EBD02A08-20B8-4407-B006-19935AFCF3B2}" type="slidenum">
+              <a:rPr lang="en-US" smtClean="0"/>
+              <a:t>‹#›</a:t>
+            </a:fld>
+            <a:endParaRPr lang="en-US"/>
+          </a:p>
+        </p:txBody>
+      </p:sp>
+    </p:spTree>
+    <p:extLst>
+      <p:ext uri="{BB962C8B-B14F-4D97-AF65-F5344CB8AC3E}">
+        <p14:creationId xmlns:p14="http://schemas.microsoft.com/office/powerpoint/2010/main" val="4019681612"/>
+      </p:ext>
+    </p:extLst>
+  </p:cSld>
+  <p:clrMap bg1="lt1" tx1="dk1" bg2="lt2" tx2="dk2" accent1="accent1" accent2="accent2" accent3="accent3" accent4="accent4" accent5="accent5" accent6="accent6" hlink="hlink" folHlink="folHlink"/>
+  <p:notesStyle>
+    <a:lvl1pPr marL="0" algn="l" defTabSz="914400" rtl="0" eaLnBrk="1" latinLnBrk="0" hangingPunct="1">
+      <a:defRPr sz="1200" kern="1200">
+        <a:solidFill>
+          <a:schemeClr val="tx1"/>
+        </a:solidFill>
+        <a:latin typeface="+mn-lt"/>
+        <a:ea typeface="+mn-ea"/>
+        <a:cs typeface="+mn-cs"/>
+      </a:defRPr>
+    </a:lvl1pPr>
+    <a:lvl2pPr marL="457200" algn="l" defTabSz="914400" rtl="0" eaLnBrk="1" latinLnBrk="0" hangingPunct="1">
+      <a:defRPr sz="1200" kern="1200">
+        <a:solidFill>
+          <a:schemeClr val="tx1"/>
+        </a:solidFill>
+        <a:latin typeface="+mn-lt"/>
+        <a:ea typeface="+mn-ea"/>
+        <a:cs typeface="+mn-cs"/>
+      </a:defRPr>
+    </a:lvl2pPr>
+    <a:lvl3pPr marL="914400" algn="l" defTabSz="914400" rtl="0" eaLnBrk="1" latinLnBrk="0" hangingPunct="1">
+      <a:defRPr sz="1200" kern="1200">
+        <a:solidFill>
+          <a:schemeClr val="tx1"/>
+        </a:solidFill>
+        <a:latin typeface="+mn-lt"/>
+        <a:ea typeface="+mn-ea"/>
+        <a:cs typeface="+mn-cs"/>
+      </a:defRPr>
+    </a:lvl3pPr>
+    <a:lvl4pPr marL="1371600" algn="l" defTabSz="914400" rtl="0" eaLnBrk="1" latinLnBrk="0" hangingPunct="1">
+      <a:defRPr sz="1200" kern="1200">
+        <a:solidFill>
+          <a:schemeClr val="tx1"/>
+        </a:solidFill>
+        <a:latin typeface="+mn-lt"/>
+        <a:ea typeface="+mn-ea"/>
+        <a:cs typeface="+mn-cs"/>
+      </a:defRPr>
+    </a:lvl4pPr>
+    <a:lvl5pPr marL="1828800" algn="l" defTabSz="914400" rtl="0" eaLnBrk="1" latinLnBrk="0" hangingPunct="1">
+      <a:defRPr sz="1200" kern="1200">
+        <a:solidFill>
+          <a:schemeClr val="tx1"/>
+        </a:solidFill>
+        <a:latin typeface="+mn-lt"/>
+        <a:ea typeface="+mn-ea"/>
+        <a:cs typeface="+mn-cs"/>
+      </a:defRPr>
+    </a:lvl5pPr>
+    <a:lvl6pPr marL="2286000" algn="l" defTabSz="914400" rtl="0" eaLnBrk="1" latinLnBrk="0" hangingPunct="1">
+      <a:defRPr sz="1200" kern="1200">
+        <a:solidFill>
+          <a:schemeClr val="tx1"/>
+        </a:solidFill>
+        <a:latin typeface="+mn-lt"/>
+        <a:ea typeface="+mn-ea"/>
+        <a:cs typeface="+mn-cs"/>
+      </a:defRPr>
+    </a:lvl6pPr>
+    <a:lvl7pPr marL="2743200" algn="l" defTabSz="914400" rtl="0" eaLnBrk="1" latinLnBrk="0" hangingPunct="1">
+      <a:defRPr sz="1200" kern="1200">
+        <a:solidFill>
+          <a:schemeClr val="tx1"/>
+        </a:solidFill>
+        <a:latin typeface="+mn-lt"/>
+        <a:ea typeface="+mn-ea"/>
+        <a:cs typeface="+mn-cs"/>
+      </a:defRPr>
+    </a:lvl7pPr>
+    <a:lvl8pPr marL="3200400" algn="l" defTabSz="914400" rtl="0" eaLnBrk="1" latinLnBrk="0" hangingPunct="1">
+      <a:defRPr sz="1200" kern="1200">
+        <a:solidFill>
+          <a:schemeClr val="tx1"/>
+        </a:solidFill>
+        <a:latin typeface="+mn-lt"/>
+        <a:ea typeface="+mn-ea"/>
+        <a:cs typeface="+mn-cs"/>
+      </a:defRPr>
+    </a:lvl8pPr>
+    <a:lvl9pPr marL="3657600" algn="l" defTabSz="914400" rtl="0" eaLnBrk="1" latinLnBrk="0" hangingPunct="1">
+      <a:defRPr sz="1200" kern="1200">
+        <a:solidFill>
+          <a:schemeClr val="tx1"/>
+        </a:solidFill>
+        <a:latin typeface="+mn-lt"/>
+        <a:ea typeface="+mn-ea"/>
+        <a:cs typeface="+mn-cs"/>
+      </a:defRPr>
+    </a:lvl9pPr>
+  </p:notesStyle>
+</p:notesMaster>
+</file>
+
+<file path=ppt/notesSlides/notesSlide1.xml><?xml version="1.0" encoding="utf-8"?>
+<p:notes xmlns:a="http://schemas.openxmlformats.org/drawingml/2006/main" xmlns:r="http://schemas.openxmlformats.org/officeDocument/2006/relationships" xmlns:p="http://schemas.openxmlformats.org/presentationml/2006/main">
+  <p:cSld>
+    <p:spTree>
+      <p:nvGrpSpPr>
+        <p:cNvPr id="1" name=""/>
+        <p:cNvGrpSpPr/>
+        <p:nvPr/>
+      </p:nvGrpSpPr>
+      <p:grpSpPr>
+        <a:xfrm>
+          <a:off x="0" y="0"/>
+          <a:ext cx="0" cy="0"/>
+          <a:chOff x="0" y="0"/>
+          <a:chExt cx="0" cy="0"/>
+        </a:xfrm>
+      </p:grpSpPr>
+      <p:sp>
+        <p:nvSpPr>
+          <p:cNvPr id="2" name="Slide Image Placeholder 1"/>
+          <p:cNvSpPr>
+            <a:spLocks noGrp="1" noRot="1" noChangeAspect="1"/>
+          </p:cNvSpPr>
+          <p:nvPr>
+            <p:ph type="sldImg"/>
+          </p:nvPr>
+        </p:nvSpPr>
+        <p:spPr/>
+      </p:sp>
+      <p:sp>
+        <p:nvSpPr>
+          <p:cNvPr id="3" name="Notes Placeholder 2"/>
+          <p:cNvSpPr>
+            <a:spLocks noGrp="1"/>
+          </p:cNvSpPr>
+          <p:nvPr>
+            <p:ph type="body" idx="1"/>
+          </p:nvPr>
+        </p:nvSpPr>
+        <p:spPr/>
+        <p:txBody>
+          <a:bodyPr/>
+          <a:lstStyle/>
+          <a:p>
+            <a:r>
+              <a:rPr lang="en-US" baseline="0" dirty="0" smtClean="0"/>
+              <a:t>The Great Recession is almost 10 years behind us. We hear and read reports of economic growth and prosperity. </a:t>
+            </a:r>
+            <a:r>
+              <a:rPr lang="en-US" dirty="0" smtClean="0"/>
+              <a:t>The goal of this project is to evaluate and asses the economic outlook for Philadelphia by looking back into recent history and trying to look forward into the future.</a:t>
+            </a:r>
+            <a:endParaRPr lang="en-US" baseline="0" dirty="0" smtClean="0"/>
+          </a:p>
+        </p:txBody>
+      </p:sp>
+      <p:sp>
+        <p:nvSpPr>
+          <p:cNvPr id="4" name="Slide Number Placeholder 3"/>
+          <p:cNvSpPr>
+            <a:spLocks noGrp="1"/>
+          </p:cNvSpPr>
+          <p:nvPr>
+            <p:ph type="sldNum" sz="quarter" idx="10"/>
+          </p:nvPr>
+        </p:nvSpPr>
+        <p:spPr/>
+        <p:txBody>
+          <a:bodyPr/>
+          <a:lstStyle/>
+          <a:p>
+            <a:fld id="{EBD02A08-20B8-4407-B006-19935AFCF3B2}" type="slidenum">
+              <a:rPr lang="en-US" smtClean="0"/>
+              <a:t>1</a:t>
+            </a:fld>
+            <a:endParaRPr lang="en-US"/>
+          </a:p>
+        </p:txBody>
+      </p:sp>
+    </p:spTree>
+    <p:extLst>
+      <p:ext uri="{BB962C8B-B14F-4D97-AF65-F5344CB8AC3E}">
+        <p14:creationId xmlns:p14="http://schemas.microsoft.com/office/powerpoint/2010/main" val="1221682255"/>
+      </p:ext>
+    </p:extLst>
+  </p:cSld>
+  <p:clrMapOvr>
+    <a:masterClrMapping/>
+  </p:clrMapOvr>
+</p:notes>
+</file>
+
+<file path=ppt/notesSlides/notesSlide10.xml><?xml version="1.0" encoding="utf-8"?>
+<p:notes xmlns:a="http://schemas.openxmlformats.org/drawingml/2006/main" xmlns:r="http://schemas.openxmlformats.org/officeDocument/2006/relationships" xmlns:p="http://schemas.openxmlformats.org/presentationml/2006/main">
+  <p:cSld>
+    <p:spTree>
+      <p:nvGrpSpPr>
+        <p:cNvPr id="1" name=""/>
+        <p:cNvGrpSpPr/>
+        <p:nvPr/>
+      </p:nvGrpSpPr>
+      <p:grpSpPr>
+        <a:xfrm>
+          <a:off x="0" y="0"/>
+          <a:ext cx="0" cy="0"/>
+          <a:chOff x="0" y="0"/>
+          <a:chExt cx="0" cy="0"/>
+        </a:xfrm>
+      </p:grpSpPr>
+      <p:sp>
+        <p:nvSpPr>
+          <p:cNvPr id="2" name="Slide Image Placeholder 1"/>
+          <p:cNvSpPr>
+            <a:spLocks noGrp="1" noRot="1" noChangeAspect="1"/>
+          </p:cNvSpPr>
+          <p:nvPr>
+            <p:ph type="sldImg"/>
+          </p:nvPr>
+        </p:nvSpPr>
+        <p:spPr/>
+      </p:sp>
+      <p:sp>
+        <p:nvSpPr>
+          <p:cNvPr id="3" name="Notes Placeholder 2"/>
+          <p:cNvSpPr>
+            <a:spLocks noGrp="1"/>
+          </p:cNvSpPr>
+          <p:nvPr>
+            <p:ph type="body" idx="1"/>
+          </p:nvPr>
+        </p:nvSpPr>
+        <p:spPr/>
+        <p:txBody>
+          <a:bodyPr/>
+          <a:lstStyle/>
+          <a:p>
+            <a:r>
+              <a:rPr lang="en-US" dirty="0" smtClean="0"/>
+              <a:t>Economic</a:t>
+            </a:r>
+            <a:r>
+              <a:rPr lang="en-US" baseline="0" dirty="0" smtClean="0"/>
+              <a:t> and Population data are time-series. The best visual presentation for time-series is often a line chart because it shows the historical trend from which we can begin to make projections. We use bar charts for comparing summarized values across cities.</a:t>
+            </a:r>
+            <a:endParaRPr lang="en-US" dirty="0"/>
+          </a:p>
+        </p:txBody>
+      </p:sp>
+      <p:sp>
+        <p:nvSpPr>
+          <p:cNvPr id="4" name="Slide Number Placeholder 3"/>
+          <p:cNvSpPr>
+            <a:spLocks noGrp="1"/>
+          </p:cNvSpPr>
+          <p:nvPr>
+            <p:ph type="sldNum" sz="quarter" idx="10"/>
+          </p:nvPr>
+        </p:nvSpPr>
+        <p:spPr/>
+        <p:txBody>
+          <a:bodyPr/>
+          <a:lstStyle/>
+          <a:p>
+            <a:fld id="{EBD02A08-20B8-4407-B006-19935AFCF3B2}" type="slidenum">
+              <a:rPr lang="en-US" smtClean="0"/>
+              <a:t>10</a:t>
+            </a:fld>
+            <a:endParaRPr lang="en-US"/>
+          </a:p>
+        </p:txBody>
+      </p:sp>
+    </p:spTree>
+    <p:extLst>
+      <p:ext uri="{BB962C8B-B14F-4D97-AF65-F5344CB8AC3E}">
+        <p14:creationId xmlns:p14="http://schemas.microsoft.com/office/powerpoint/2010/main" val="3055637916"/>
+      </p:ext>
+    </p:extLst>
+  </p:cSld>
+  <p:clrMapOvr>
+    <a:masterClrMapping/>
+  </p:clrMapOvr>
+</p:notes>
+</file>
+
+<file path=ppt/notesSlides/notesSlide11.xml><?xml version="1.0" encoding="utf-8"?>
+<p:notes xmlns:a="http://schemas.openxmlformats.org/drawingml/2006/main" xmlns:r="http://schemas.openxmlformats.org/officeDocument/2006/relationships" xmlns:p="http://schemas.openxmlformats.org/presentationml/2006/main">
+  <p:cSld>
+    <p:spTree>
+      <p:nvGrpSpPr>
+        <p:cNvPr id="1" name=""/>
+        <p:cNvGrpSpPr/>
+        <p:nvPr/>
+      </p:nvGrpSpPr>
+      <p:grpSpPr>
+        <a:xfrm>
+          <a:off x="0" y="0"/>
+          <a:ext cx="0" cy="0"/>
+          <a:chOff x="0" y="0"/>
+          <a:chExt cx="0" cy="0"/>
+        </a:xfrm>
+      </p:grpSpPr>
+      <p:sp>
+        <p:nvSpPr>
+          <p:cNvPr id="2" name="Slide Image Placeholder 1"/>
+          <p:cNvSpPr>
+            <a:spLocks noGrp="1" noRot="1" noChangeAspect="1"/>
+          </p:cNvSpPr>
+          <p:nvPr>
+            <p:ph type="sldImg"/>
+          </p:nvPr>
+        </p:nvSpPr>
+        <p:spPr/>
+      </p:sp>
+      <p:sp>
+        <p:nvSpPr>
+          <p:cNvPr id="3" name="Notes Placeholder 2"/>
+          <p:cNvSpPr>
+            <a:spLocks noGrp="1"/>
+          </p:cNvSpPr>
+          <p:nvPr>
+            <p:ph type="body" idx="1"/>
+          </p:nvPr>
+        </p:nvSpPr>
+        <p:spPr/>
+        <p:txBody>
+          <a:bodyPr/>
+          <a:lstStyle/>
+          <a:p>
+            <a:r>
+              <a:rPr lang="en-US" dirty="0" smtClean="0"/>
+              <a:t>So far the data for this project has not been particularly messy, but it is definitely not tidy. We are aiming to adhere to the principles of Tidy Data as best</a:t>
+            </a:r>
+            <a:r>
+              <a:rPr lang="en-US" baseline="0" dirty="0" smtClean="0"/>
+              <a:t> as possible, and as such have employed transformations and twists, melts and merges in multiple places. </a:t>
+            </a:r>
+            <a:endParaRPr lang="en-US" dirty="0"/>
+          </a:p>
+        </p:txBody>
+      </p:sp>
+      <p:sp>
+        <p:nvSpPr>
+          <p:cNvPr id="4" name="Slide Number Placeholder 3"/>
+          <p:cNvSpPr>
+            <a:spLocks noGrp="1"/>
+          </p:cNvSpPr>
+          <p:nvPr>
+            <p:ph type="sldNum" sz="quarter" idx="10"/>
+          </p:nvPr>
+        </p:nvSpPr>
+        <p:spPr/>
+        <p:txBody>
+          <a:bodyPr/>
+          <a:lstStyle/>
+          <a:p>
+            <a:fld id="{EBD02A08-20B8-4407-B006-19935AFCF3B2}" type="slidenum">
+              <a:rPr lang="en-US" smtClean="0"/>
+              <a:t>11</a:t>
+            </a:fld>
+            <a:endParaRPr lang="en-US"/>
+          </a:p>
+        </p:txBody>
+      </p:sp>
+    </p:spTree>
+    <p:extLst>
+      <p:ext uri="{BB962C8B-B14F-4D97-AF65-F5344CB8AC3E}">
+        <p14:creationId xmlns:p14="http://schemas.microsoft.com/office/powerpoint/2010/main" val="4040434534"/>
+      </p:ext>
+    </p:extLst>
+  </p:cSld>
+  <p:clrMapOvr>
+    <a:masterClrMapping/>
+  </p:clrMapOvr>
+</p:notes>
+</file>
+
+<file path=ppt/notesSlides/notesSlide12.xml><?xml version="1.0" encoding="utf-8"?>
+<p:notes xmlns:a="http://schemas.openxmlformats.org/drawingml/2006/main" xmlns:r="http://schemas.openxmlformats.org/officeDocument/2006/relationships" xmlns:p="http://schemas.openxmlformats.org/presentationml/2006/main">
+  <p:cSld>
+    <p:spTree>
+      <p:nvGrpSpPr>
+        <p:cNvPr id="1" name=""/>
+        <p:cNvGrpSpPr/>
+        <p:nvPr/>
+      </p:nvGrpSpPr>
+      <p:grpSpPr>
+        <a:xfrm>
+          <a:off x="0" y="0"/>
+          <a:ext cx="0" cy="0"/>
+          <a:chOff x="0" y="0"/>
+          <a:chExt cx="0" cy="0"/>
+        </a:xfrm>
+      </p:grpSpPr>
+      <p:sp>
+        <p:nvSpPr>
+          <p:cNvPr id="2" name="Slide Image Placeholder 1"/>
+          <p:cNvSpPr>
+            <a:spLocks noGrp="1" noRot="1" noChangeAspect="1"/>
+          </p:cNvSpPr>
+          <p:nvPr>
+            <p:ph type="sldImg"/>
+          </p:nvPr>
+        </p:nvSpPr>
+        <p:spPr/>
+      </p:sp>
+      <p:sp>
+        <p:nvSpPr>
+          <p:cNvPr id="3" name="Notes Placeholder 2"/>
+          <p:cNvSpPr>
+            <a:spLocks noGrp="1"/>
+          </p:cNvSpPr>
+          <p:nvPr>
+            <p:ph type="body" idx="1"/>
+          </p:nvPr>
+        </p:nvSpPr>
+        <p:spPr/>
+        <p:txBody>
+          <a:bodyPr/>
+          <a:lstStyle/>
+          <a:p>
+            <a:r>
+              <a:rPr lang="en-US" dirty="0" smtClean="0"/>
+              <a:t>The Bureau of Labor Statistics </a:t>
+            </a:r>
+            <a:r>
+              <a:rPr lang="en-US" dirty="0" err="1" smtClean="0"/>
+              <a:t>SeriesID</a:t>
+            </a:r>
+            <a:r>
+              <a:rPr lang="en-US" baseline="0" dirty="0" smtClean="0"/>
+              <a:t> field is a classic case of </a:t>
+            </a:r>
+            <a:r>
+              <a:rPr lang="en-US" i="1" baseline="0" dirty="0" smtClean="0"/>
+              <a:t>Multiple Variables Stored in One Column</a:t>
+            </a:r>
+            <a:r>
+              <a:rPr lang="en-US" baseline="0" dirty="0" smtClean="0"/>
+              <a:t>. The sequence presented here shows how we took the raw JSON, extracted the observations, parsed and decoded the </a:t>
+            </a:r>
+            <a:r>
+              <a:rPr lang="en-US" baseline="0" dirty="0" err="1" smtClean="0"/>
+              <a:t>SeriesID</a:t>
+            </a:r>
+            <a:r>
+              <a:rPr lang="en-US" baseline="0" dirty="0" smtClean="0"/>
+              <a:t>, and transformed this mess into Tidy Data.</a:t>
+            </a:r>
+            <a:endParaRPr lang="en-US" dirty="0"/>
+          </a:p>
+        </p:txBody>
+      </p:sp>
+      <p:sp>
+        <p:nvSpPr>
+          <p:cNvPr id="4" name="Slide Number Placeholder 3"/>
+          <p:cNvSpPr>
+            <a:spLocks noGrp="1"/>
+          </p:cNvSpPr>
+          <p:nvPr>
+            <p:ph type="sldNum" sz="quarter" idx="10"/>
+          </p:nvPr>
+        </p:nvSpPr>
+        <p:spPr/>
+        <p:txBody>
+          <a:bodyPr/>
+          <a:lstStyle/>
+          <a:p>
+            <a:fld id="{EBD02A08-20B8-4407-B006-19935AFCF3B2}" type="slidenum">
+              <a:rPr lang="en-US" smtClean="0"/>
+              <a:t>12</a:t>
+            </a:fld>
+            <a:endParaRPr lang="en-US"/>
+          </a:p>
+        </p:txBody>
+      </p:sp>
+    </p:spTree>
+    <p:extLst>
+      <p:ext uri="{BB962C8B-B14F-4D97-AF65-F5344CB8AC3E}">
+        <p14:creationId xmlns:p14="http://schemas.microsoft.com/office/powerpoint/2010/main" val="562340595"/>
+      </p:ext>
+    </p:extLst>
+  </p:cSld>
+  <p:clrMapOvr>
+    <a:masterClrMapping/>
+  </p:clrMapOvr>
+</p:notes>
+</file>
+
+<file path=ppt/notesSlides/notesSlide13.xml><?xml version="1.0" encoding="utf-8"?>
+<p:notes xmlns:a="http://schemas.openxmlformats.org/drawingml/2006/main" xmlns:r="http://schemas.openxmlformats.org/officeDocument/2006/relationships" xmlns:p="http://schemas.openxmlformats.org/presentationml/2006/main">
+  <p:cSld>
+    <p:spTree>
+      <p:nvGrpSpPr>
+        <p:cNvPr id="1" name=""/>
+        <p:cNvGrpSpPr/>
+        <p:nvPr/>
+      </p:nvGrpSpPr>
+      <p:grpSpPr>
+        <a:xfrm>
+          <a:off x="0" y="0"/>
+          <a:ext cx="0" cy="0"/>
+          <a:chOff x="0" y="0"/>
+          <a:chExt cx="0" cy="0"/>
+        </a:xfrm>
+      </p:grpSpPr>
+      <p:sp>
+        <p:nvSpPr>
+          <p:cNvPr id="2" name="Slide Image Placeholder 1"/>
+          <p:cNvSpPr>
+            <a:spLocks noGrp="1" noRot="1" noChangeAspect="1"/>
+          </p:cNvSpPr>
+          <p:nvPr>
+            <p:ph type="sldImg"/>
+          </p:nvPr>
+        </p:nvSpPr>
+        <p:spPr/>
+      </p:sp>
+      <p:sp>
+        <p:nvSpPr>
+          <p:cNvPr id="3" name="Notes Placeholder 2"/>
+          <p:cNvSpPr>
+            <a:spLocks noGrp="1"/>
+          </p:cNvSpPr>
+          <p:nvPr>
+            <p:ph type="body" idx="1"/>
+          </p:nvPr>
+        </p:nvSpPr>
+        <p:spPr/>
+        <p:txBody>
+          <a:bodyPr/>
+          <a:lstStyle/>
+          <a:p>
+            <a:r>
+              <a:rPr lang="en-US" baseline="0" dirty="0" smtClean="0"/>
+              <a:t>The objective of line charts for time-series data is to gain perspective into the trends. Some of the charts look nice, and we can show some comparisons. But once we add a few too many time-series, it gets kind of messy. We need a better way to present time-series effectively in a group. </a:t>
+            </a:r>
+            <a:endParaRPr lang="en-US" dirty="0"/>
+          </a:p>
+        </p:txBody>
+      </p:sp>
+      <p:sp>
+        <p:nvSpPr>
+          <p:cNvPr id="4" name="Slide Number Placeholder 3"/>
+          <p:cNvSpPr>
+            <a:spLocks noGrp="1"/>
+          </p:cNvSpPr>
+          <p:nvPr>
+            <p:ph type="sldNum" sz="quarter" idx="10"/>
+          </p:nvPr>
+        </p:nvSpPr>
+        <p:spPr/>
+        <p:txBody>
+          <a:bodyPr/>
+          <a:lstStyle/>
+          <a:p>
+            <a:fld id="{EBD02A08-20B8-4407-B006-19935AFCF3B2}" type="slidenum">
+              <a:rPr lang="en-US" smtClean="0"/>
+              <a:t>13</a:t>
+            </a:fld>
+            <a:endParaRPr lang="en-US"/>
+          </a:p>
+        </p:txBody>
+      </p:sp>
+    </p:spTree>
+    <p:extLst>
+      <p:ext uri="{BB962C8B-B14F-4D97-AF65-F5344CB8AC3E}">
+        <p14:creationId xmlns:p14="http://schemas.microsoft.com/office/powerpoint/2010/main" val="1041923245"/>
+      </p:ext>
+    </p:extLst>
+  </p:cSld>
+  <p:clrMapOvr>
+    <a:masterClrMapping/>
+  </p:clrMapOvr>
+</p:notes>
+</file>
+
+<file path=ppt/notesSlides/notesSlide14.xml><?xml version="1.0" encoding="utf-8"?>
+<p:notes xmlns:a="http://schemas.openxmlformats.org/drawingml/2006/main" xmlns:r="http://schemas.openxmlformats.org/officeDocument/2006/relationships" xmlns:p="http://schemas.openxmlformats.org/presentationml/2006/main">
+  <p:cSld>
+    <p:spTree>
+      <p:nvGrpSpPr>
+        <p:cNvPr id="1" name=""/>
+        <p:cNvGrpSpPr/>
+        <p:nvPr/>
+      </p:nvGrpSpPr>
+      <p:grpSpPr>
+        <a:xfrm>
+          <a:off x="0" y="0"/>
+          <a:ext cx="0" cy="0"/>
+          <a:chOff x="0" y="0"/>
+          <a:chExt cx="0" cy="0"/>
+        </a:xfrm>
+      </p:grpSpPr>
+      <p:sp>
+        <p:nvSpPr>
+          <p:cNvPr id="2" name="Slide Image Placeholder 1"/>
+          <p:cNvSpPr>
+            <a:spLocks noGrp="1" noRot="1" noChangeAspect="1"/>
+          </p:cNvSpPr>
+          <p:nvPr>
+            <p:ph type="sldImg"/>
+          </p:nvPr>
+        </p:nvSpPr>
+        <p:spPr/>
+      </p:sp>
+      <p:sp>
+        <p:nvSpPr>
+          <p:cNvPr id="3" name="Notes Placeholder 2"/>
+          <p:cNvSpPr>
+            <a:spLocks noGrp="1"/>
+          </p:cNvSpPr>
+          <p:nvPr>
+            <p:ph type="body" idx="1"/>
+          </p:nvPr>
+        </p:nvSpPr>
+        <p:spPr/>
+        <p:txBody>
+          <a:bodyPr/>
+          <a:lstStyle/>
+          <a:p>
+            <a:r>
+              <a:rPr lang="en-US" dirty="0" smtClean="0"/>
+              <a:t>The “incomplete revival”</a:t>
+            </a:r>
+            <a:r>
+              <a:rPr lang="en-US" baseline="0" dirty="0" smtClean="0"/>
+              <a:t> positioned percent change in unemployment rate from before The Great Recession and now as an indicator of revival. I thought this was insightful and would be a good measure to include in this report, especially when comparing Philadelphia with other cities. </a:t>
+            </a:r>
+            <a:endParaRPr lang="en-US" dirty="0"/>
+          </a:p>
+        </p:txBody>
+      </p:sp>
+      <p:sp>
+        <p:nvSpPr>
+          <p:cNvPr id="4" name="Slide Number Placeholder 3"/>
+          <p:cNvSpPr>
+            <a:spLocks noGrp="1"/>
+          </p:cNvSpPr>
+          <p:nvPr>
+            <p:ph type="sldNum" sz="quarter" idx="10"/>
+          </p:nvPr>
+        </p:nvSpPr>
+        <p:spPr/>
+        <p:txBody>
+          <a:bodyPr/>
+          <a:lstStyle/>
+          <a:p>
+            <a:fld id="{EBD02A08-20B8-4407-B006-19935AFCF3B2}" type="slidenum">
+              <a:rPr lang="en-US" smtClean="0"/>
+              <a:t>14</a:t>
+            </a:fld>
+            <a:endParaRPr lang="en-US"/>
+          </a:p>
+        </p:txBody>
+      </p:sp>
+    </p:spTree>
+    <p:extLst>
+      <p:ext uri="{BB962C8B-B14F-4D97-AF65-F5344CB8AC3E}">
+        <p14:creationId xmlns:p14="http://schemas.microsoft.com/office/powerpoint/2010/main" val="3582004295"/>
+      </p:ext>
+    </p:extLst>
+  </p:cSld>
+  <p:clrMapOvr>
+    <a:masterClrMapping/>
+  </p:clrMapOvr>
+</p:notes>
+</file>
+
+<file path=ppt/notesSlides/notesSlide15.xml><?xml version="1.0" encoding="utf-8"?>
+<p:notes xmlns:a="http://schemas.openxmlformats.org/drawingml/2006/main" xmlns:r="http://schemas.openxmlformats.org/officeDocument/2006/relationships" xmlns:p="http://schemas.openxmlformats.org/presentationml/2006/main">
+  <p:cSld>
+    <p:spTree>
+      <p:nvGrpSpPr>
+        <p:cNvPr id="1" name=""/>
+        <p:cNvGrpSpPr/>
+        <p:nvPr/>
+      </p:nvGrpSpPr>
+      <p:grpSpPr>
+        <a:xfrm>
+          <a:off x="0" y="0"/>
+          <a:ext cx="0" cy="0"/>
+          <a:chOff x="0" y="0"/>
+          <a:chExt cx="0" cy="0"/>
+        </a:xfrm>
+      </p:grpSpPr>
+      <p:sp>
+        <p:nvSpPr>
+          <p:cNvPr id="2" name="Slide Image Placeholder 1"/>
+          <p:cNvSpPr>
+            <a:spLocks noGrp="1" noRot="1" noChangeAspect="1"/>
+          </p:cNvSpPr>
+          <p:nvPr>
+            <p:ph type="sldImg"/>
+          </p:nvPr>
+        </p:nvSpPr>
+        <p:spPr/>
+      </p:sp>
+      <p:sp>
+        <p:nvSpPr>
+          <p:cNvPr id="3" name="Notes Placeholder 2"/>
+          <p:cNvSpPr>
+            <a:spLocks noGrp="1"/>
+          </p:cNvSpPr>
+          <p:nvPr>
+            <p:ph type="body" idx="1"/>
+          </p:nvPr>
+        </p:nvSpPr>
+        <p:spPr/>
+        <p:txBody>
+          <a:bodyPr/>
+          <a:lstStyle/>
+          <a:p>
+            <a:r>
+              <a:rPr lang="en-US" dirty="0" smtClean="0"/>
+              <a:t>I like presenting </a:t>
+            </a:r>
+            <a:r>
+              <a:rPr lang="en-US" baseline="0" dirty="0" smtClean="0"/>
+              <a:t>unemployment rate </a:t>
+            </a:r>
+            <a:r>
+              <a:rPr lang="en-US" baseline="0" dirty="0" smtClean="0"/>
+              <a:t>in a line chart.</a:t>
+            </a:r>
+            <a:r>
+              <a:rPr lang="en-US" baseline="0" dirty="0" smtClean="0"/>
+              <a:t> But remember, the line chart with six of these time-series was really messy. Here with the </a:t>
+            </a:r>
+            <a:r>
+              <a:rPr lang="en-US" baseline="0" dirty="0" smtClean="0"/>
+              <a:t>percent change in unemployment </a:t>
+            </a:r>
+            <a:r>
+              <a:rPr lang="en-US" baseline="0" dirty="0" smtClean="0"/>
+              <a:t>bar chart we use small multiples for the time-series of unemployment rate of each city. </a:t>
+            </a:r>
+            <a:endParaRPr lang="en-US" dirty="0"/>
+          </a:p>
+        </p:txBody>
+      </p:sp>
+      <p:sp>
+        <p:nvSpPr>
+          <p:cNvPr id="4" name="Slide Number Placeholder 3"/>
+          <p:cNvSpPr>
+            <a:spLocks noGrp="1"/>
+          </p:cNvSpPr>
+          <p:nvPr>
+            <p:ph type="sldNum" sz="quarter" idx="10"/>
+          </p:nvPr>
+        </p:nvSpPr>
+        <p:spPr/>
+        <p:txBody>
+          <a:bodyPr/>
+          <a:lstStyle/>
+          <a:p>
+            <a:fld id="{EBD02A08-20B8-4407-B006-19935AFCF3B2}" type="slidenum">
+              <a:rPr lang="en-US" smtClean="0"/>
+              <a:t>15</a:t>
+            </a:fld>
+            <a:endParaRPr lang="en-US"/>
+          </a:p>
+        </p:txBody>
+      </p:sp>
+    </p:spTree>
+    <p:extLst>
+      <p:ext uri="{BB962C8B-B14F-4D97-AF65-F5344CB8AC3E}">
+        <p14:creationId xmlns:p14="http://schemas.microsoft.com/office/powerpoint/2010/main" val="2985748983"/>
+      </p:ext>
+    </p:extLst>
+  </p:cSld>
+  <p:clrMapOvr>
+    <a:masterClrMapping/>
+  </p:clrMapOvr>
+</p:notes>
+</file>
+
+<file path=ppt/notesSlides/notesSlide16.xml><?xml version="1.0" encoding="utf-8"?>
+<p:notes xmlns:a="http://schemas.openxmlformats.org/drawingml/2006/main" xmlns:r="http://schemas.openxmlformats.org/officeDocument/2006/relationships" xmlns:p="http://schemas.openxmlformats.org/presentationml/2006/main">
+  <p:cSld>
+    <p:spTree>
+      <p:nvGrpSpPr>
+        <p:cNvPr id="1" name=""/>
+        <p:cNvGrpSpPr/>
+        <p:nvPr/>
+      </p:nvGrpSpPr>
+      <p:grpSpPr>
+        <a:xfrm>
+          <a:off x="0" y="0"/>
+          <a:ext cx="0" cy="0"/>
+          <a:chOff x="0" y="0"/>
+          <a:chExt cx="0" cy="0"/>
+        </a:xfrm>
+      </p:grpSpPr>
+      <p:sp>
+        <p:nvSpPr>
+          <p:cNvPr id="2" name="Slide Image Placeholder 1"/>
+          <p:cNvSpPr>
+            <a:spLocks noGrp="1" noRot="1" noChangeAspect="1"/>
+          </p:cNvSpPr>
+          <p:nvPr>
+            <p:ph type="sldImg"/>
+          </p:nvPr>
+        </p:nvSpPr>
+        <p:spPr/>
+      </p:sp>
+      <p:sp>
+        <p:nvSpPr>
+          <p:cNvPr id="3" name="Notes Placeholder 2"/>
+          <p:cNvSpPr>
+            <a:spLocks noGrp="1"/>
+          </p:cNvSpPr>
+          <p:nvPr>
+            <p:ph type="body" idx="1"/>
+          </p:nvPr>
+        </p:nvSpPr>
+        <p:spPr/>
+        <p:txBody>
+          <a:bodyPr/>
+          <a:lstStyle/>
+          <a:p>
+            <a:pPr marL="0" marR="0" lvl="0" indent="0" algn="l" defTabSz="914400" rtl="0" eaLnBrk="1" fontAlgn="auto" latinLnBrk="0" hangingPunct="1">
+              <a:lnSpc>
+                <a:spcPct val="100000"/>
+              </a:lnSpc>
+              <a:spcBef>
+                <a:spcPts val="0"/>
+              </a:spcBef>
+              <a:spcAft>
+                <a:spcPts val="0"/>
+              </a:spcAft>
+              <a:buClrTx/>
+              <a:buSzTx/>
+              <a:buFontTx/>
+              <a:buNone/>
+              <a:tabLst/>
+              <a:defRPr/>
+            </a:pPr>
+            <a:r>
+              <a:rPr lang="en-US" baseline="0" dirty="0" smtClean="0"/>
+              <a:t>Plotting each time-series with the national rate serves two purposes: first, to compare each city with the national rate; and second, the inclusion of the common element provides a means to help compare across cities without having explicit plots. The national rate acts like an additional axis. </a:t>
+            </a:r>
+            <a:endParaRPr lang="en-US" dirty="0" smtClean="0"/>
+          </a:p>
+        </p:txBody>
+      </p:sp>
+      <p:sp>
+        <p:nvSpPr>
+          <p:cNvPr id="4" name="Slide Number Placeholder 3"/>
+          <p:cNvSpPr>
+            <a:spLocks noGrp="1"/>
+          </p:cNvSpPr>
+          <p:nvPr>
+            <p:ph type="sldNum" sz="quarter" idx="10"/>
+          </p:nvPr>
+        </p:nvSpPr>
+        <p:spPr/>
+        <p:txBody>
+          <a:bodyPr/>
+          <a:lstStyle/>
+          <a:p>
+            <a:fld id="{EBD02A08-20B8-4407-B006-19935AFCF3B2}" type="slidenum">
+              <a:rPr lang="en-US" smtClean="0"/>
+              <a:t>16</a:t>
+            </a:fld>
+            <a:endParaRPr lang="en-US"/>
+          </a:p>
+        </p:txBody>
+      </p:sp>
+    </p:spTree>
+    <p:extLst>
+      <p:ext uri="{BB962C8B-B14F-4D97-AF65-F5344CB8AC3E}">
+        <p14:creationId xmlns:p14="http://schemas.microsoft.com/office/powerpoint/2010/main" val="3121852682"/>
+      </p:ext>
+    </p:extLst>
+  </p:cSld>
+  <p:clrMapOvr>
+    <a:masterClrMapping/>
+  </p:clrMapOvr>
+</p:notes>
+</file>
+
+<file path=ppt/notesSlides/notesSlide17.xml><?xml version="1.0" encoding="utf-8"?>
+<p:notes xmlns:a="http://schemas.openxmlformats.org/drawingml/2006/main" xmlns:r="http://schemas.openxmlformats.org/officeDocument/2006/relationships" xmlns:p="http://schemas.openxmlformats.org/presentationml/2006/main">
+  <p:cSld>
+    <p:spTree>
+      <p:nvGrpSpPr>
+        <p:cNvPr id="1" name=""/>
+        <p:cNvGrpSpPr/>
+        <p:nvPr/>
+      </p:nvGrpSpPr>
+      <p:grpSpPr>
+        <a:xfrm>
+          <a:off x="0" y="0"/>
+          <a:ext cx="0" cy="0"/>
+          <a:chOff x="0" y="0"/>
+          <a:chExt cx="0" cy="0"/>
+        </a:xfrm>
+      </p:grpSpPr>
+      <p:sp>
+        <p:nvSpPr>
+          <p:cNvPr id="2" name="Slide Image Placeholder 1"/>
+          <p:cNvSpPr>
+            <a:spLocks noGrp="1" noRot="1" noChangeAspect="1"/>
+          </p:cNvSpPr>
+          <p:nvPr>
+            <p:ph type="sldImg"/>
+          </p:nvPr>
+        </p:nvSpPr>
+        <p:spPr/>
+      </p:sp>
+      <p:sp>
+        <p:nvSpPr>
+          <p:cNvPr id="3" name="Notes Placeholder 2"/>
+          <p:cNvSpPr>
+            <a:spLocks noGrp="1"/>
+          </p:cNvSpPr>
+          <p:nvPr>
+            <p:ph type="body" idx="1"/>
+          </p:nvPr>
+        </p:nvSpPr>
+        <p:spPr/>
+        <p:txBody>
+          <a:bodyPr/>
+          <a:lstStyle/>
+          <a:p>
+            <a:r>
+              <a:rPr lang="en-US" dirty="0" smtClean="0"/>
+              <a:t>Most cities follow the general</a:t>
+            </a:r>
+            <a:r>
+              <a:rPr lang="en-US" baseline="0" dirty="0" smtClean="0"/>
+              <a:t> population</a:t>
+            </a:r>
+            <a:r>
+              <a:rPr lang="en-US" dirty="0" smtClean="0"/>
+              <a:t> trend: up. However, the industrial cities</a:t>
+            </a:r>
+            <a:r>
+              <a:rPr lang="en-US" baseline="0" dirty="0" smtClean="0"/>
+              <a:t> saw a major dip in population as manufacturing jobs vanished. The “incomplete revival” report discusses this and other factors which shaped Philadelphia’s current economic landscape. </a:t>
+            </a:r>
+            <a:endParaRPr lang="en-US" dirty="0"/>
+          </a:p>
+        </p:txBody>
+      </p:sp>
+      <p:sp>
+        <p:nvSpPr>
+          <p:cNvPr id="4" name="Slide Number Placeholder 3"/>
+          <p:cNvSpPr>
+            <a:spLocks noGrp="1"/>
+          </p:cNvSpPr>
+          <p:nvPr>
+            <p:ph type="sldNum" sz="quarter" idx="10"/>
+          </p:nvPr>
+        </p:nvSpPr>
+        <p:spPr/>
+        <p:txBody>
+          <a:bodyPr/>
+          <a:lstStyle/>
+          <a:p>
+            <a:fld id="{EBD02A08-20B8-4407-B006-19935AFCF3B2}" type="slidenum">
+              <a:rPr lang="en-US" smtClean="0"/>
+              <a:t>17</a:t>
+            </a:fld>
+            <a:endParaRPr lang="en-US"/>
+          </a:p>
+        </p:txBody>
+      </p:sp>
+    </p:spTree>
+    <p:extLst>
+      <p:ext uri="{BB962C8B-B14F-4D97-AF65-F5344CB8AC3E}">
+        <p14:creationId xmlns:p14="http://schemas.microsoft.com/office/powerpoint/2010/main" val="4264110032"/>
+      </p:ext>
+    </p:extLst>
+  </p:cSld>
+  <p:clrMapOvr>
+    <a:masterClrMapping/>
+  </p:clrMapOvr>
+</p:notes>
+</file>
+
+<file path=ppt/notesSlides/notesSlide18.xml><?xml version="1.0" encoding="utf-8"?>
+<p:notes xmlns:a="http://schemas.openxmlformats.org/drawingml/2006/main" xmlns:r="http://schemas.openxmlformats.org/officeDocument/2006/relationships" xmlns:p="http://schemas.openxmlformats.org/presentationml/2006/main">
+  <p:cSld>
+    <p:spTree>
+      <p:nvGrpSpPr>
+        <p:cNvPr id="1" name=""/>
+        <p:cNvGrpSpPr/>
+        <p:nvPr/>
+      </p:nvGrpSpPr>
+      <p:grpSpPr>
+        <a:xfrm>
+          <a:off x="0" y="0"/>
+          <a:ext cx="0" cy="0"/>
+          <a:chOff x="0" y="0"/>
+          <a:chExt cx="0" cy="0"/>
+        </a:xfrm>
+      </p:grpSpPr>
+      <p:sp>
+        <p:nvSpPr>
+          <p:cNvPr id="2" name="Slide Image Placeholder 1"/>
+          <p:cNvSpPr>
+            <a:spLocks noGrp="1" noRot="1" noChangeAspect="1"/>
+          </p:cNvSpPr>
+          <p:nvPr>
+            <p:ph type="sldImg"/>
+          </p:nvPr>
+        </p:nvSpPr>
+        <p:spPr/>
+      </p:sp>
+      <p:sp>
+        <p:nvSpPr>
+          <p:cNvPr id="3" name="Notes Placeholder 2"/>
+          <p:cNvSpPr>
+            <a:spLocks noGrp="1"/>
+          </p:cNvSpPr>
+          <p:nvPr>
+            <p:ph type="body" idx="1"/>
+          </p:nvPr>
+        </p:nvSpPr>
+        <p:spPr/>
+        <p:txBody>
+          <a:bodyPr/>
+          <a:lstStyle/>
+          <a:p>
+            <a:r>
+              <a:rPr lang="en-US" dirty="0" smtClean="0"/>
+              <a:t>It seems logical to think that as the population shifts, the</a:t>
+            </a:r>
+            <a:r>
+              <a:rPr lang="en-US" baseline="0" dirty="0" smtClean="0"/>
+              <a:t> labor force would follow. However, there are less visible factors affecting the big picture. So, t</a:t>
+            </a:r>
+            <a:r>
+              <a:rPr lang="en-US" dirty="0" smtClean="0"/>
+              <a:t>his is an incomplete picture. We cannot draw too</a:t>
+            </a:r>
+            <a:r>
+              <a:rPr lang="en-US" baseline="0" dirty="0" smtClean="0"/>
+              <a:t> many conclusions from just population and employment alone. </a:t>
+            </a:r>
+            <a:endParaRPr lang="en-US" dirty="0"/>
+          </a:p>
+        </p:txBody>
+      </p:sp>
+      <p:sp>
+        <p:nvSpPr>
+          <p:cNvPr id="4" name="Slide Number Placeholder 3"/>
+          <p:cNvSpPr>
+            <a:spLocks noGrp="1"/>
+          </p:cNvSpPr>
+          <p:nvPr>
+            <p:ph type="sldNum" sz="quarter" idx="10"/>
+          </p:nvPr>
+        </p:nvSpPr>
+        <p:spPr/>
+        <p:txBody>
+          <a:bodyPr/>
+          <a:lstStyle/>
+          <a:p>
+            <a:fld id="{EBD02A08-20B8-4407-B006-19935AFCF3B2}" type="slidenum">
+              <a:rPr lang="en-US" smtClean="0"/>
+              <a:t>18</a:t>
+            </a:fld>
+            <a:endParaRPr lang="en-US"/>
+          </a:p>
+        </p:txBody>
+      </p:sp>
+    </p:spTree>
+    <p:extLst>
+      <p:ext uri="{BB962C8B-B14F-4D97-AF65-F5344CB8AC3E}">
+        <p14:creationId xmlns:p14="http://schemas.microsoft.com/office/powerpoint/2010/main" val="1063107719"/>
+      </p:ext>
+    </p:extLst>
+  </p:cSld>
+  <p:clrMapOvr>
+    <a:masterClrMapping/>
+  </p:clrMapOvr>
+</p:notes>
+</file>
+
+<file path=ppt/notesSlides/notesSlide19.xml><?xml version="1.0" encoding="utf-8"?>
+<p:notes xmlns:a="http://schemas.openxmlformats.org/drawingml/2006/main" xmlns:r="http://schemas.openxmlformats.org/officeDocument/2006/relationships" xmlns:p="http://schemas.openxmlformats.org/presentationml/2006/main">
+  <p:cSld>
+    <p:spTree>
+      <p:nvGrpSpPr>
+        <p:cNvPr id="1" name=""/>
+        <p:cNvGrpSpPr/>
+        <p:nvPr/>
+      </p:nvGrpSpPr>
+      <p:grpSpPr>
+        <a:xfrm>
+          <a:off x="0" y="0"/>
+          <a:ext cx="0" cy="0"/>
+          <a:chOff x="0" y="0"/>
+          <a:chExt cx="0" cy="0"/>
+        </a:xfrm>
+      </p:grpSpPr>
+      <p:sp>
+        <p:nvSpPr>
+          <p:cNvPr id="2" name="Slide Image Placeholder 1"/>
+          <p:cNvSpPr>
+            <a:spLocks noGrp="1" noRot="1" noChangeAspect="1"/>
+          </p:cNvSpPr>
+          <p:nvPr>
+            <p:ph type="sldImg"/>
+          </p:nvPr>
+        </p:nvSpPr>
+        <p:spPr/>
+      </p:sp>
+      <p:sp>
+        <p:nvSpPr>
+          <p:cNvPr id="3" name="Notes Placeholder 2"/>
+          <p:cNvSpPr>
+            <a:spLocks noGrp="1"/>
+          </p:cNvSpPr>
+          <p:nvPr>
+            <p:ph type="body" idx="1"/>
+          </p:nvPr>
+        </p:nvSpPr>
+        <p:spPr/>
+        <p:txBody>
+          <a:bodyPr/>
+          <a:lstStyle/>
+          <a:p>
+            <a:r>
+              <a:rPr lang="en-US" dirty="0" smtClean="0"/>
+              <a:t>Philadelphia has been through a lot of tough times. The post-industrial era has been a mixed bag of population changes, economic changes, and rebuilding starts and stops. The indication is that we have bounced back from the Great Recession,</a:t>
+            </a:r>
+            <a:r>
+              <a:rPr lang="en-US" baseline="0" dirty="0" smtClean="0"/>
+              <a:t> which is a good starting point for what’s next.</a:t>
+            </a:r>
+            <a:endParaRPr lang="en-US" dirty="0"/>
+          </a:p>
+        </p:txBody>
+      </p:sp>
+      <p:sp>
+        <p:nvSpPr>
+          <p:cNvPr id="4" name="Slide Number Placeholder 3"/>
+          <p:cNvSpPr>
+            <a:spLocks noGrp="1"/>
+          </p:cNvSpPr>
+          <p:nvPr>
+            <p:ph type="sldNum" sz="quarter" idx="10"/>
+          </p:nvPr>
+        </p:nvSpPr>
+        <p:spPr/>
+        <p:txBody>
+          <a:bodyPr/>
+          <a:lstStyle/>
+          <a:p>
+            <a:fld id="{EBD02A08-20B8-4407-B006-19935AFCF3B2}" type="slidenum">
+              <a:rPr lang="en-US" smtClean="0"/>
+              <a:t>19</a:t>
+            </a:fld>
+            <a:endParaRPr lang="en-US"/>
+          </a:p>
+        </p:txBody>
+      </p:sp>
+    </p:spTree>
+    <p:extLst>
+      <p:ext uri="{BB962C8B-B14F-4D97-AF65-F5344CB8AC3E}">
+        <p14:creationId xmlns:p14="http://schemas.microsoft.com/office/powerpoint/2010/main" val="3503453516"/>
+      </p:ext>
+    </p:extLst>
+  </p:cSld>
+  <p:clrMapOvr>
+    <a:masterClrMapping/>
+  </p:clrMapOvr>
+</p:notes>
+</file>
+
+<file path=ppt/notesSlides/notesSlide2.xml><?xml version="1.0" encoding="utf-8"?>
+<p:notes xmlns:a="http://schemas.openxmlformats.org/drawingml/2006/main" xmlns:r="http://schemas.openxmlformats.org/officeDocument/2006/relationships" xmlns:p="http://schemas.openxmlformats.org/presentationml/2006/main">
+  <p:cSld>
+    <p:spTree>
+      <p:nvGrpSpPr>
+        <p:cNvPr id="1" name=""/>
+        <p:cNvGrpSpPr/>
+        <p:nvPr/>
+      </p:nvGrpSpPr>
+      <p:grpSpPr>
+        <a:xfrm>
+          <a:off x="0" y="0"/>
+          <a:ext cx="0" cy="0"/>
+          <a:chOff x="0" y="0"/>
+          <a:chExt cx="0" cy="0"/>
+        </a:xfrm>
+      </p:grpSpPr>
+      <p:sp>
+        <p:nvSpPr>
+          <p:cNvPr id="2" name="Slide Image Placeholder 1"/>
+          <p:cNvSpPr>
+            <a:spLocks noGrp="1" noRot="1" noChangeAspect="1"/>
+          </p:cNvSpPr>
+          <p:nvPr>
+            <p:ph type="sldImg"/>
+          </p:nvPr>
+        </p:nvSpPr>
+        <p:spPr/>
+      </p:sp>
+      <p:sp>
+        <p:nvSpPr>
+          <p:cNvPr id="3" name="Notes Placeholder 2"/>
+          <p:cNvSpPr>
+            <a:spLocks noGrp="1"/>
+          </p:cNvSpPr>
+          <p:nvPr>
+            <p:ph type="body" idx="1"/>
+          </p:nvPr>
+        </p:nvSpPr>
+        <p:spPr/>
+        <p:txBody>
+          <a:bodyPr/>
+          <a:lstStyle/>
+          <a:p>
+            <a:r>
+              <a:rPr lang="en-US" dirty="0" smtClean="0"/>
+              <a:t>We will explore several data categories and layers of demographics, and provide a comparison with other cities. The goal is</a:t>
+            </a:r>
+            <a:r>
+              <a:rPr lang="en-US" baseline="0" dirty="0" smtClean="0"/>
+              <a:t> to d</a:t>
+            </a:r>
+            <a:r>
+              <a:rPr lang="en-US" dirty="0" smtClean="0"/>
+              <a:t>etermine if</a:t>
+            </a:r>
+            <a:r>
+              <a:rPr lang="en-US" baseline="0" dirty="0" smtClean="0"/>
+              <a:t> there is a big boom in Philadelphia’s future. </a:t>
+            </a:r>
+            <a:r>
+              <a:rPr lang="en-US" dirty="0" smtClean="0"/>
+              <a:t>This</a:t>
+            </a:r>
+            <a:r>
+              <a:rPr lang="en-US" baseline="0" dirty="0" smtClean="0"/>
+              <a:t> type of project </a:t>
+            </a:r>
+            <a:r>
+              <a:rPr lang="en-US" dirty="0" smtClean="0"/>
+              <a:t>turns out to be a rather big undertaking, so it</a:t>
+            </a:r>
+            <a:r>
+              <a:rPr lang="en-US" baseline="0" dirty="0" smtClean="0"/>
+              <a:t> will be submitted in two parts</a:t>
+            </a:r>
+            <a:r>
+              <a:rPr lang="en-US" dirty="0" smtClean="0"/>
+              <a:t>. </a:t>
+            </a:r>
+            <a:endParaRPr lang="en-US" dirty="0"/>
+          </a:p>
+        </p:txBody>
+      </p:sp>
+      <p:sp>
+        <p:nvSpPr>
+          <p:cNvPr id="4" name="Slide Number Placeholder 3"/>
+          <p:cNvSpPr>
+            <a:spLocks noGrp="1"/>
+          </p:cNvSpPr>
+          <p:nvPr>
+            <p:ph type="sldNum" sz="quarter" idx="10"/>
+          </p:nvPr>
+        </p:nvSpPr>
+        <p:spPr/>
+        <p:txBody>
+          <a:bodyPr/>
+          <a:lstStyle/>
+          <a:p>
+            <a:fld id="{EBD02A08-20B8-4407-B006-19935AFCF3B2}" type="slidenum">
+              <a:rPr lang="en-US" smtClean="0"/>
+              <a:t>2</a:t>
+            </a:fld>
+            <a:endParaRPr lang="en-US"/>
+          </a:p>
+        </p:txBody>
+      </p:sp>
+    </p:spTree>
+    <p:extLst>
+      <p:ext uri="{BB962C8B-B14F-4D97-AF65-F5344CB8AC3E}">
+        <p14:creationId xmlns:p14="http://schemas.microsoft.com/office/powerpoint/2010/main" val="1914295628"/>
+      </p:ext>
+    </p:extLst>
+  </p:cSld>
+  <p:clrMapOvr>
+    <a:masterClrMapping/>
+  </p:clrMapOvr>
+</p:notes>
+</file>
+
+<file path=ppt/notesSlides/notesSlide20.xml><?xml version="1.0" encoding="utf-8"?>
+<p:notes xmlns:a="http://schemas.openxmlformats.org/drawingml/2006/main" xmlns:r="http://schemas.openxmlformats.org/officeDocument/2006/relationships" xmlns:p="http://schemas.openxmlformats.org/presentationml/2006/main">
+  <p:cSld>
+    <p:spTree>
+      <p:nvGrpSpPr>
+        <p:cNvPr id="1" name=""/>
+        <p:cNvGrpSpPr/>
+        <p:nvPr/>
+      </p:nvGrpSpPr>
+      <p:grpSpPr>
+        <a:xfrm>
+          <a:off x="0" y="0"/>
+          <a:ext cx="0" cy="0"/>
+          <a:chOff x="0" y="0"/>
+          <a:chExt cx="0" cy="0"/>
+        </a:xfrm>
+      </p:grpSpPr>
+      <p:sp>
+        <p:nvSpPr>
+          <p:cNvPr id="2" name="Slide Image Placeholder 1"/>
+          <p:cNvSpPr>
+            <a:spLocks noGrp="1" noRot="1" noChangeAspect="1"/>
+          </p:cNvSpPr>
+          <p:nvPr>
+            <p:ph type="sldImg"/>
+          </p:nvPr>
+        </p:nvSpPr>
+        <p:spPr/>
+      </p:sp>
+      <p:sp>
+        <p:nvSpPr>
+          <p:cNvPr id="3" name="Notes Placeholder 2"/>
+          <p:cNvSpPr>
+            <a:spLocks noGrp="1"/>
+          </p:cNvSpPr>
+          <p:nvPr>
+            <p:ph type="body" idx="1"/>
+          </p:nvPr>
+        </p:nvSpPr>
+        <p:spPr/>
+        <p:txBody>
+          <a:bodyPr/>
+          <a:lstStyle/>
+          <a:p>
+            <a:pPr marL="0" marR="0" lvl="0" indent="0" algn="l" defTabSz="914400" rtl="0" eaLnBrk="1" fontAlgn="auto" latinLnBrk="0" hangingPunct="1">
+              <a:lnSpc>
+                <a:spcPct val="100000"/>
+              </a:lnSpc>
+              <a:spcBef>
+                <a:spcPts val="0"/>
+              </a:spcBef>
+              <a:spcAft>
+                <a:spcPts val="0"/>
+              </a:spcAft>
+              <a:buClrTx/>
+              <a:buSzTx/>
+              <a:buFontTx/>
+              <a:buNone/>
+              <a:tabLst/>
+              <a:defRPr/>
+            </a:pPr>
+            <a:r>
+              <a:rPr lang="en-US" baseline="0" dirty="0" smtClean="0"/>
+              <a:t>Additional dimensions of data need to be explored. We need to understand more of the underlying social picture, as well as labor force characteristics and government policy. The Brookings Metro Monitor dashboard is inspiration for this project’s ultimate submission.</a:t>
+            </a:r>
+            <a:endParaRPr lang="en-US" dirty="0" smtClean="0"/>
+          </a:p>
+        </p:txBody>
+      </p:sp>
+      <p:sp>
+        <p:nvSpPr>
+          <p:cNvPr id="4" name="Slide Number Placeholder 3"/>
+          <p:cNvSpPr>
+            <a:spLocks noGrp="1"/>
+          </p:cNvSpPr>
+          <p:nvPr>
+            <p:ph type="sldNum" sz="quarter" idx="10"/>
+          </p:nvPr>
+        </p:nvSpPr>
+        <p:spPr/>
+        <p:txBody>
+          <a:bodyPr/>
+          <a:lstStyle/>
+          <a:p>
+            <a:fld id="{EBD02A08-20B8-4407-B006-19935AFCF3B2}" type="slidenum">
+              <a:rPr lang="en-US" smtClean="0"/>
+              <a:t>20</a:t>
+            </a:fld>
+            <a:endParaRPr lang="en-US"/>
+          </a:p>
+        </p:txBody>
+      </p:sp>
+    </p:spTree>
+    <p:extLst>
+      <p:ext uri="{BB962C8B-B14F-4D97-AF65-F5344CB8AC3E}">
+        <p14:creationId xmlns:p14="http://schemas.microsoft.com/office/powerpoint/2010/main" val="3762119507"/>
+      </p:ext>
+    </p:extLst>
+  </p:cSld>
+  <p:clrMapOvr>
+    <a:masterClrMapping/>
+  </p:clrMapOvr>
+</p:notes>
+</file>
+
+<file path=ppt/notesSlides/notesSlide3.xml><?xml version="1.0" encoding="utf-8"?>
+<p:notes xmlns:a="http://schemas.openxmlformats.org/drawingml/2006/main" xmlns:r="http://schemas.openxmlformats.org/officeDocument/2006/relationships" xmlns:p="http://schemas.openxmlformats.org/presentationml/2006/main">
+  <p:cSld>
+    <p:spTree>
+      <p:nvGrpSpPr>
+        <p:cNvPr id="1" name=""/>
+        <p:cNvGrpSpPr/>
+        <p:nvPr/>
+      </p:nvGrpSpPr>
+      <p:grpSpPr>
+        <a:xfrm>
+          <a:off x="0" y="0"/>
+          <a:ext cx="0" cy="0"/>
+          <a:chOff x="0" y="0"/>
+          <a:chExt cx="0" cy="0"/>
+        </a:xfrm>
+      </p:grpSpPr>
+      <p:sp>
+        <p:nvSpPr>
+          <p:cNvPr id="2" name="Slide Image Placeholder 1"/>
+          <p:cNvSpPr>
+            <a:spLocks noGrp="1" noRot="1" noChangeAspect="1"/>
+          </p:cNvSpPr>
+          <p:nvPr>
+            <p:ph type="sldImg"/>
+          </p:nvPr>
+        </p:nvSpPr>
+        <p:spPr/>
+      </p:sp>
+      <p:sp>
+        <p:nvSpPr>
+          <p:cNvPr id="3" name="Notes Placeholder 2"/>
+          <p:cNvSpPr>
+            <a:spLocks noGrp="1"/>
+          </p:cNvSpPr>
+          <p:nvPr>
+            <p:ph type="body" idx="1"/>
+          </p:nvPr>
+        </p:nvSpPr>
+        <p:spPr/>
+        <p:txBody>
+          <a:bodyPr/>
+          <a:lstStyle/>
+          <a:p>
+            <a:r>
+              <a:rPr lang="en-US" dirty="0" smtClean="0"/>
+              <a:t>Philadelphia has a very rich history, from Colonial times</a:t>
+            </a:r>
+            <a:r>
+              <a:rPr lang="en-US" baseline="0" dirty="0" smtClean="0"/>
+              <a:t> to the current day. This city is the home of several large national corporations and world-class universities. There is a depth and breadth of talent and leadership here. The economic ground here appears fertile!</a:t>
+            </a:r>
+            <a:endParaRPr lang="en-US" dirty="0"/>
+          </a:p>
+        </p:txBody>
+      </p:sp>
+      <p:sp>
+        <p:nvSpPr>
+          <p:cNvPr id="4" name="Slide Number Placeholder 3"/>
+          <p:cNvSpPr>
+            <a:spLocks noGrp="1"/>
+          </p:cNvSpPr>
+          <p:nvPr>
+            <p:ph type="sldNum" sz="quarter" idx="10"/>
+          </p:nvPr>
+        </p:nvSpPr>
+        <p:spPr/>
+        <p:txBody>
+          <a:bodyPr/>
+          <a:lstStyle/>
+          <a:p>
+            <a:fld id="{EBD02A08-20B8-4407-B006-19935AFCF3B2}" type="slidenum">
+              <a:rPr lang="en-US" smtClean="0"/>
+              <a:t>3</a:t>
+            </a:fld>
+            <a:endParaRPr lang="en-US"/>
+          </a:p>
+        </p:txBody>
+      </p:sp>
+    </p:spTree>
+    <p:extLst>
+      <p:ext uri="{BB962C8B-B14F-4D97-AF65-F5344CB8AC3E}">
+        <p14:creationId xmlns:p14="http://schemas.microsoft.com/office/powerpoint/2010/main" val="2801553191"/>
+      </p:ext>
+    </p:extLst>
+  </p:cSld>
+  <p:clrMapOvr>
+    <a:masterClrMapping/>
+  </p:clrMapOvr>
+</p:notes>
+</file>
+
+<file path=ppt/notesSlides/notesSlide4.xml><?xml version="1.0" encoding="utf-8"?>
+<p:notes xmlns:a="http://schemas.openxmlformats.org/drawingml/2006/main" xmlns:r="http://schemas.openxmlformats.org/officeDocument/2006/relationships" xmlns:p="http://schemas.openxmlformats.org/presentationml/2006/main">
+  <p:cSld>
+    <p:spTree>
+      <p:nvGrpSpPr>
+        <p:cNvPr id="1" name=""/>
+        <p:cNvGrpSpPr/>
+        <p:nvPr/>
+      </p:nvGrpSpPr>
+      <p:grpSpPr>
+        <a:xfrm>
+          <a:off x="0" y="0"/>
+          <a:ext cx="0" cy="0"/>
+          <a:chOff x="0" y="0"/>
+          <a:chExt cx="0" cy="0"/>
+        </a:xfrm>
+      </p:grpSpPr>
+      <p:sp>
+        <p:nvSpPr>
+          <p:cNvPr id="2" name="Slide Image Placeholder 1"/>
+          <p:cNvSpPr>
+            <a:spLocks noGrp="1" noRot="1" noChangeAspect="1"/>
+          </p:cNvSpPr>
+          <p:nvPr>
+            <p:ph type="sldImg"/>
+          </p:nvPr>
+        </p:nvSpPr>
+        <p:spPr/>
+      </p:sp>
+      <p:sp>
+        <p:nvSpPr>
+          <p:cNvPr id="3" name="Notes Placeholder 2"/>
+          <p:cNvSpPr>
+            <a:spLocks noGrp="1"/>
+          </p:cNvSpPr>
+          <p:nvPr>
+            <p:ph type="body" idx="1"/>
+          </p:nvPr>
+        </p:nvSpPr>
+        <p:spPr/>
+        <p:txBody>
+          <a:bodyPr/>
+          <a:lstStyle/>
+          <a:p>
+            <a:r>
+              <a:rPr lang="en-US" dirty="0" smtClean="0"/>
+              <a:t>Philadelphia is one of the</a:t>
+            </a:r>
+            <a:r>
+              <a:rPr lang="en-US" baseline="0" dirty="0" smtClean="0"/>
+              <a:t> largest cities in the United States, with very busy sea port and rail yards. Like many large cities with a heavy industrial history, the twentieth century brought a lot of change – job loss, population decline, higher taxes, and widespread poverty.</a:t>
+            </a:r>
+            <a:endParaRPr lang="en-US" dirty="0"/>
+          </a:p>
+        </p:txBody>
+      </p:sp>
+      <p:sp>
+        <p:nvSpPr>
+          <p:cNvPr id="4" name="Slide Number Placeholder 3"/>
+          <p:cNvSpPr>
+            <a:spLocks noGrp="1"/>
+          </p:cNvSpPr>
+          <p:nvPr>
+            <p:ph type="sldNum" sz="quarter" idx="10"/>
+          </p:nvPr>
+        </p:nvSpPr>
+        <p:spPr/>
+        <p:txBody>
+          <a:bodyPr/>
+          <a:lstStyle/>
+          <a:p>
+            <a:fld id="{EBD02A08-20B8-4407-B006-19935AFCF3B2}" type="slidenum">
+              <a:rPr lang="en-US" smtClean="0"/>
+              <a:t>4</a:t>
+            </a:fld>
+            <a:endParaRPr lang="en-US"/>
+          </a:p>
+        </p:txBody>
+      </p:sp>
+    </p:spTree>
+    <p:extLst>
+      <p:ext uri="{BB962C8B-B14F-4D97-AF65-F5344CB8AC3E}">
+        <p14:creationId xmlns:p14="http://schemas.microsoft.com/office/powerpoint/2010/main" val="2441357998"/>
+      </p:ext>
+    </p:extLst>
+  </p:cSld>
+  <p:clrMapOvr>
+    <a:masterClrMapping/>
+  </p:clrMapOvr>
+</p:notes>
+</file>
+
+<file path=ppt/notesSlides/notesSlide5.xml><?xml version="1.0" encoding="utf-8"?>
+<p:notes xmlns:a="http://schemas.openxmlformats.org/drawingml/2006/main" xmlns:r="http://schemas.openxmlformats.org/officeDocument/2006/relationships" xmlns:p="http://schemas.openxmlformats.org/presentationml/2006/main">
+  <p:cSld>
+    <p:spTree>
+      <p:nvGrpSpPr>
+        <p:cNvPr id="1" name=""/>
+        <p:cNvGrpSpPr/>
+        <p:nvPr/>
+      </p:nvGrpSpPr>
+      <p:grpSpPr>
+        <a:xfrm>
+          <a:off x="0" y="0"/>
+          <a:ext cx="0" cy="0"/>
+          <a:chOff x="0" y="0"/>
+          <a:chExt cx="0" cy="0"/>
+        </a:xfrm>
+      </p:grpSpPr>
+      <p:sp>
+        <p:nvSpPr>
+          <p:cNvPr id="2" name="Slide Image Placeholder 1"/>
+          <p:cNvSpPr>
+            <a:spLocks noGrp="1" noRot="1" noChangeAspect="1"/>
+          </p:cNvSpPr>
+          <p:nvPr>
+            <p:ph type="sldImg"/>
+          </p:nvPr>
+        </p:nvSpPr>
+        <p:spPr/>
+      </p:sp>
+      <p:sp>
+        <p:nvSpPr>
+          <p:cNvPr id="3" name="Notes Placeholder 2"/>
+          <p:cNvSpPr>
+            <a:spLocks noGrp="1"/>
+          </p:cNvSpPr>
+          <p:nvPr>
+            <p:ph type="body" idx="1"/>
+          </p:nvPr>
+        </p:nvSpPr>
+        <p:spPr/>
+        <p:txBody>
+          <a:bodyPr/>
+          <a:lstStyle/>
+          <a:p>
+            <a:r>
+              <a:rPr lang="en-US" dirty="0" smtClean="0"/>
+              <a:t>The goal is</a:t>
+            </a:r>
+            <a:r>
+              <a:rPr lang="en-US" baseline="0" dirty="0" smtClean="0"/>
+              <a:t> to answer the question: is a big boom in Philadelphia’s future? There is no shortage of data, and there are many existing reports and regular news reports and articles. We aim to sift through much of this, and create some visualizations to help </a:t>
+            </a:r>
+            <a:r>
+              <a:rPr lang="en-US" baseline="0" dirty="0" smtClean="0"/>
+              <a:t>make our own prediction.</a:t>
+            </a:r>
+            <a:endParaRPr lang="en-US" dirty="0"/>
+          </a:p>
+        </p:txBody>
+      </p:sp>
+      <p:sp>
+        <p:nvSpPr>
+          <p:cNvPr id="4" name="Slide Number Placeholder 3"/>
+          <p:cNvSpPr>
+            <a:spLocks noGrp="1"/>
+          </p:cNvSpPr>
+          <p:nvPr>
+            <p:ph type="sldNum" sz="quarter" idx="10"/>
+          </p:nvPr>
+        </p:nvSpPr>
+        <p:spPr/>
+        <p:txBody>
+          <a:bodyPr/>
+          <a:lstStyle/>
+          <a:p>
+            <a:fld id="{EBD02A08-20B8-4407-B006-19935AFCF3B2}" type="slidenum">
+              <a:rPr lang="en-US" smtClean="0"/>
+              <a:t>5</a:t>
+            </a:fld>
+            <a:endParaRPr lang="en-US"/>
+          </a:p>
+        </p:txBody>
+      </p:sp>
+    </p:spTree>
+    <p:extLst>
+      <p:ext uri="{BB962C8B-B14F-4D97-AF65-F5344CB8AC3E}">
+        <p14:creationId xmlns:p14="http://schemas.microsoft.com/office/powerpoint/2010/main" val="2026622929"/>
+      </p:ext>
+    </p:extLst>
+  </p:cSld>
+  <p:clrMapOvr>
+    <a:masterClrMapping/>
+  </p:clrMapOvr>
+</p:notes>
+</file>
+
+<file path=ppt/notesSlides/notesSlide6.xml><?xml version="1.0" encoding="utf-8"?>
+<p:notes xmlns:a="http://schemas.openxmlformats.org/drawingml/2006/main" xmlns:r="http://schemas.openxmlformats.org/officeDocument/2006/relationships" xmlns:p="http://schemas.openxmlformats.org/presentationml/2006/main">
+  <p:cSld>
+    <p:spTree>
+      <p:nvGrpSpPr>
+        <p:cNvPr id="1" name=""/>
+        <p:cNvGrpSpPr/>
+        <p:nvPr/>
+      </p:nvGrpSpPr>
+      <p:grpSpPr>
+        <a:xfrm>
+          <a:off x="0" y="0"/>
+          <a:ext cx="0" cy="0"/>
+          <a:chOff x="0" y="0"/>
+          <a:chExt cx="0" cy="0"/>
+        </a:xfrm>
+      </p:grpSpPr>
+      <p:sp>
+        <p:nvSpPr>
+          <p:cNvPr id="2" name="Slide Image Placeholder 1"/>
+          <p:cNvSpPr>
+            <a:spLocks noGrp="1" noRot="1" noChangeAspect="1"/>
+          </p:cNvSpPr>
+          <p:nvPr>
+            <p:ph type="sldImg"/>
+          </p:nvPr>
+        </p:nvSpPr>
+        <p:spPr/>
+      </p:sp>
+      <p:sp>
+        <p:nvSpPr>
+          <p:cNvPr id="3" name="Notes Placeholder 2"/>
+          <p:cNvSpPr>
+            <a:spLocks noGrp="1"/>
+          </p:cNvSpPr>
+          <p:nvPr>
+            <p:ph type="body" idx="1"/>
+          </p:nvPr>
+        </p:nvSpPr>
+        <p:spPr/>
+        <p:txBody>
+          <a:bodyPr/>
+          <a:lstStyle/>
+          <a:p>
+            <a:r>
+              <a:rPr lang="en-US" dirty="0" smtClean="0"/>
+              <a:t>We will compare Philadelphia</a:t>
+            </a:r>
+            <a:r>
+              <a:rPr lang="en-US" baseline="0" dirty="0" smtClean="0"/>
+              <a:t> with cities that are in its neighborhood. And we will compare Philadelphia with cities of roughly the same population size. </a:t>
+            </a:r>
+            <a:r>
+              <a:rPr lang="en-US" baseline="0" dirty="0" smtClean="0"/>
+              <a:t>This creates two rather diverse groups considering: population, location, industry, demographics, and personality.</a:t>
+            </a:r>
+            <a:endParaRPr lang="en-US" dirty="0"/>
+          </a:p>
+        </p:txBody>
+      </p:sp>
+      <p:sp>
+        <p:nvSpPr>
+          <p:cNvPr id="4" name="Slide Number Placeholder 3"/>
+          <p:cNvSpPr>
+            <a:spLocks noGrp="1"/>
+          </p:cNvSpPr>
+          <p:nvPr>
+            <p:ph type="sldNum" sz="quarter" idx="10"/>
+          </p:nvPr>
+        </p:nvSpPr>
+        <p:spPr/>
+        <p:txBody>
+          <a:bodyPr/>
+          <a:lstStyle/>
+          <a:p>
+            <a:fld id="{EBD02A08-20B8-4407-B006-19935AFCF3B2}" type="slidenum">
+              <a:rPr lang="en-US" smtClean="0"/>
+              <a:t>6</a:t>
+            </a:fld>
+            <a:endParaRPr lang="en-US"/>
+          </a:p>
+        </p:txBody>
+      </p:sp>
+    </p:spTree>
+    <p:extLst>
+      <p:ext uri="{BB962C8B-B14F-4D97-AF65-F5344CB8AC3E}">
+        <p14:creationId xmlns:p14="http://schemas.microsoft.com/office/powerpoint/2010/main" val="3190206310"/>
+      </p:ext>
+    </p:extLst>
+  </p:cSld>
+  <p:clrMapOvr>
+    <a:masterClrMapping/>
+  </p:clrMapOvr>
+</p:notes>
+</file>
+
+<file path=ppt/notesSlides/notesSlide7.xml><?xml version="1.0" encoding="utf-8"?>
+<p:notes xmlns:a="http://schemas.openxmlformats.org/drawingml/2006/main" xmlns:r="http://schemas.openxmlformats.org/officeDocument/2006/relationships" xmlns:p="http://schemas.openxmlformats.org/presentationml/2006/main">
+  <p:cSld>
+    <p:spTree>
+      <p:nvGrpSpPr>
+        <p:cNvPr id="1" name=""/>
+        <p:cNvGrpSpPr/>
+        <p:nvPr/>
+      </p:nvGrpSpPr>
+      <p:grpSpPr>
+        <a:xfrm>
+          <a:off x="0" y="0"/>
+          <a:ext cx="0" cy="0"/>
+          <a:chOff x="0" y="0"/>
+          <a:chExt cx="0" cy="0"/>
+        </a:xfrm>
+      </p:grpSpPr>
+      <p:sp>
+        <p:nvSpPr>
+          <p:cNvPr id="2" name="Slide Image Placeholder 1"/>
+          <p:cNvSpPr>
+            <a:spLocks noGrp="1" noRot="1" noChangeAspect="1"/>
+          </p:cNvSpPr>
+          <p:nvPr>
+            <p:ph type="sldImg"/>
+          </p:nvPr>
+        </p:nvSpPr>
+        <p:spPr/>
+      </p:sp>
+      <p:sp>
+        <p:nvSpPr>
+          <p:cNvPr id="3" name="Notes Placeholder 2"/>
+          <p:cNvSpPr>
+            <a:spLocks noGrp="1"/>
+          </p:cNvSpPr>
+          <p:nvPr>
+            <p:ph type="body" idx="1"/>
+          </p:nvPr>
+        </p:nvSpPr>
+        <p:spPr/>
+        <p:txBody>
+          <a:bodyPr/>
+          <a:lstStyle/>
+          <a:p>
+            <a:r>
+              <a:rPr lang="en-US" dirty="0" smtClean="0"/>
+              <a:t>I drew</a:t>
+            </a:r>
+            <a:r>
+              <a:rPr lang="en-US" baseline="0" dirty="0" smtClean="0"/>
+              <a:t> inspiration from Philadelphia: An Incomplete Revival. It provides a lot of background and economic history. The report paints a bleak picture, but hints at a bright sun rising over the horizon. I like how this line chart compares employment over a 45 year span. </a:t>
+            </a:r>
+            <a:endParaRPr lang="en-US" dirty="0"/>
+          </a:p>
+        </p:txBody>
+      </p:sp>
+      <p:sp>
+        <p:nvSpPr>
+          <p:cNvPr id="4" name="Slide Number Placeholder 3"/>
+          <p:cNvSpPr>
+            <a:spLocks noGrp="1"/>
+          </p:cNvSpPr>
+          <p:nvPr>
+            <p:ph type="sldNum" sz="quarter" idx="10"/>
+          </p:nvPr>
+        </p:nvSpPr>
+        <p:spPr/>
+        <p:txBody>
+          <a:bodyPr/>
+          <a:lstStyle/>
+          <a:p>
+            <a:fld id="{EBD02A08-20B8-4407-B006-19935AFCF3B2}" type="slidenum">
+              <a:rPr lang="en-US" smtClean="0"/>
+              <a:t>7</a:t>
+            </a:fld>
+            <a:endParaRPr lang="en-US"/>
+          </a:p>
+        </p:txBody>
+      </p:sp>
+    </p:spTree>
+    <p:extLst>
+      <p:ext uri="{BB962C8B-B14F-4D97-AF65-F5344CB8AC3E}">
+        <p14:creationId xmlns:p14="http://schemas.microsoft.com/office/powerpoint/2010/main" val="3173964966"/>
+      </p:ext>
+    </p:extLst>
+  </p:cSld>
+  <p:clrMapOvr>
+    <a:masterClrMapping/>
+  </p:clrMapOvr>
+</p:notes>
+</file>
+
+<file path=ppt/notesSlides/notesSlide8.xml><?xml version="1.0" encoding="utf-8"?>
+<p:notes xmlns:a="http://schemas.openxmlformats.org/drawingml/2006/main" xmlns:r="http://schemas.openxmlformats.org/officeDocument/2006/relationships" xmlns:p="http://schemas.openxmlformats.org/presentationml/2006/main">
+  <p:cSld>
+    <p:spTree>
+      <p:nvGrpSpPr>
+        <p:cNvPr id="1" name=""/>
+        <p:cNvGrpSpPr/>
+        <p:nvPr/>
+      </p:nvGrpSpPr>
+      <p:grpSpPr>
+        <a:xfrm>
+          <a:off x="0" y="0"/>
+          <a:ext cx="0" cy="0"/>
+          <a:chOff x="0" y="0"/>
+          <a:chExt cx="0" cy="0"/>
+        </a:xfrm>
+      </p:grpSpPr>
+      <p:sp>
+        <p:nvSpPr>
+          <p:cNvPr id="2" name="Slide Image Placeholder 1"/>
+          <p:cNvSpPr>
+            <a:spLocks noGrp="1" noRot="1" noChangeAspect="1"/>
+          </p:cNvSpPr>
+          <p:nvPr>
+            <p:ph type="sldImg"/>
+          </p:nvPr>
+        </p:nvSpPr>
+        <p:spPr/>
+      </p:sp>
+      <p:sp>
+        <p:nvSpPr>
+          <p:cNvPr id="3" name="Notes Placeholder 2"/>
+          <p:cNvSpPr>
+            <a:spLocks noGrp="1"/>
+          </p:cNvSpPr>
+          <p:nvPr>
+            <p:ph type="body" idx="1"/>
+          </p:nvPr>
+        </p:nvSpPr>
+        <p:spPr/>
+        <p:txBody>
+          <a:bodyPr/>
+          <a:lstStyle/>
+          <a:p>
+            <a:r>
+              <a:rPr lang="en-US" dirty="0" smtClean="0"/>
+              <a:t>The Brookings Institute</a:t>
+            </a:r>
+            <a:r>
+              <a:rPr lang="en-US" baseline="0" dirty="0" smtClean="0"/>
+              <a:t> is well known for their economic and political reporting. I found these stacked line charts interesting, especially their use of a shared x-axis. The map is cool, but clicking on the circles did not reveal any additional detail. </a:t>
+            </a:r>
+            <a:endParaRPr lang="en-US" dirty="0"/>
+          </a:p>
+        </p:txBody>
+      </p:sp>
+      <p:sp>
+        <p:nvSpPr>
+          <p:cNvPr id="4" name="Slide Number Placeholder 3"/>
+          <p:cNvSpPr>
+            <a:spLocks noGrp="1"/>
+          </p:cNvSpPr>
+          <p:nvPr>
+            <p:ph type="sldNum" sz="quarter" idx="10"/>
+          </p:nvPr>
+        </p:nvSpPr>
+        <p:spPr/>
+        <p:txBody>
+          <a:bodyPr/>
+          <a:lstStyle/>
+          <a:p>
+            <a:fld id="{EBD02A08-20B8-4407-B006-19935AFCF3B2}" type="slidenum">
+              <a:rPr lang="en-US" smtClean="0"/>
+              <a:t>8</a:t>
+            </a:fld>
+            <a:endParaRPr lang="en-US"/>
+          </a:p>
+        </p:txBody>
+      </p:sp>
+    </p:spTree>
+    <p:extLst>
+      <p:ext uri="{BB962C8B-B14F-4D97-AF65-F5344CB8AC3E}">
+        <p14:creationId xmlns:p14="http://schemas.microsoft.com/office/powerpoint/2010/main" val="2914036742"/>
+      </p:ext>
+    </p:extLst>
+  </p:cSld>
+  <p:clrMapOvr>
+    <a:masterClrMapping/>
+  </p:clrMapOvr>
+</p:notes>
+</file>
+
+<file path=ppt/notesSlides/notesSlide9.xml><?xml version="1.0" encoding="utf-8"?>
+<p:notes xmlns:a="http://schemas.openxmlformats.org/drawingml/2006/main" xmlns:r="http://schemas.openxmlformats.org/officeDocument/2006/relationships" xmlns:p="http://schemas.openxmlformats.org/presentationml/2006/main">
+  <p:cSld>
+    <p:spTree>
+      <p:nvGrpSpPr>
+        <p:cNvPr id="1" name=""/>
+        <p:cNvGrpSpPr/>
+        <p:nvPr/>
+      </p:nvGrpSpPr>
+      <p:grpSpPr>
+        <a:xfrm>
+          <a:off x="0" y="0"/>
+          <a:ext cx="0" cy="0"/>
+          <a:chOff x="0" y="0"/>
+          <a:chExt cx="0" cy="0"/>
+        </a:xfrm>
+      </p:grpSpPr>
+      <p:sp>
+        <p:nvSpPr>
+          <p:cNvPr id="2" name="Slide Image Placeholder 1"/>
+          <p:cNvSpPr>
+            <a:spLocks noGrp="1" noRot="1" noChangeAspect="1"/>
+          </p:cNvSpPr>
+          <p:nvPr>
+            <p:ph type="sldImg"/>
+          </p:nvPr>
+        </p:nvSpPr>
+        <p:spPr/>
+      </p:sp>
+      <p:sp>
+        <p:nvSpPr>
+          <p:cNvPr id="3" name="Notes Placeholder 2"/>
+          <p:cNvSpPr>
+            <a:spLocks noGrp="1"/>
+          </p:cNvSpPr>
+          <p:nvPr>
+            <p:ph type="body" idx="1"/>
+          </p:nvPr>
+        </p:nvSpPr>
+        <p:spPr/>
+        <p:txBody>
+          <a:bodyPr/>
+          <a:lstStyle/>
+          <a:p>
+            <a:r>
+              <a:rPr lang="en-US" dirty="0" smtClean="0"/>
+              <a:t>The major sources of data are </a:t>
+            </a:r>
+            <a:r>
+              <a:rPr lang="en-US" baseline="0" dirty="0" smtClean="0"/>
+              <a:t>government agencies. The data came in different formats, and multiple ways. The API approach is really nice because it allows for tailoring queries to get exactly what is needed. This was helpful when exploring and scaling out from concept to project. </a:t>
+            </a:r>
+            <a:endParaRPr lang="en-US" dirty="0"/>
+          </a:p>
+        </p:txBody>
+      </p:sp>
+      <p:sp>
+        <p:nvSpPr>
+          <p:cNvPr id="4" name="Slide Number Placeholder 3"/>
+          <p:cNvSpPr>
+            <a:spLocks noGrp="1"/>
+          </p:cNvSpPr>
+          <p:nvPr>
+            <p:ph type="sldNum" sz="quarter" idx="10"/>
+          </p:nvPr>
+        </p:nvSpPr>
+        <p:spPr/>
+        <p:txBody>
+          <a:bodyPr/>
+          <a:lstStyle/>
+          <a:p>
+            <a:fld id="{EBD02A08-20B8-4407-B006-19935AFCF3B2}" type="slidenum">
+              <a:rPr lang="en-US" smtClean="0"/>
+              <a:t>9</a:t>
+            </a:fld>
+            <a:endParaRPr lang="en-US"/>
+          </a:p>
+        </p:txBody>
+      </p:sp>
+    </p:spTree>
+    <p:extLst>
+      <p:ext uri="{BB962C8B-B14F-4D97-AF65-F5344CB8AC3E}">
+        <p14:creationId xmlns:p14="http://schemas.microsoft.com/office/powerpoint/2010/main" val="1615170661"/>
+      </p:ext>
+    </p:extLst>
+  </p:cSld>
+  <p:clrMapOvr>
+    <a:masterClrMapping/>
+  </p:clrMapOvr>
+</p:notes>
+</file>
+
 <file path=ppt/slideLayouts/slideLayout1.xml><?xml version="1.0" encoding="utf-8"?>
 <p:sldLayout xmlns:a="http://schemas.openxmlformats.org/drawingml/2006/main" xmlns:r="http://schemas.openxmlformats.org/officeDocument/2006/relationships" xmlns:p="http://schemas.openxmlformats.org/presentationml/2006/main" type="title" preserve="1">
   <p:cSld name="Title Slide">
@@ -262,7 +2565,7 @@
           <a:p>
             <a:fld id="{C40ACEE9-C2D0-4F50-A069-FD7DDEA3AAE9}" type="datetimeFigureOut">
               <a:rPr lang="en-US" smtClean="0"/>
-              <a:t>10/22/2017</a:t>
+              <a:t>10/25/2017</a:t>
             </a:fld>
             <a:endParaRPr lang="en-US"/>
           </a:p>
@@ -440,7 +2743,7 @@
           <a:p>
             <a:fld id="{C40ACEE9-C2D0-4F50-A069-FD7DDEA3AAE9}" type="datetimeFigureOut">
               <a:rPr lang="en-US" smtClean="0"/>
-              <a:t>10/22/2017</a:t>
+              <a:t>10/25/2017</a:t>
             </a:fld>
             <a:endParaRPr lang="en-US"/>
           </a:p>
@@ -628,7 +2931,7 @@
           <a:p>
             <a:fld id="{C40ACEE9-C2D0-4F50-A069-FD7DDEA3AAE9}" type="datetimeFigureOut">
               <a:rPr lang="en-US" smtClean="0"/>
-              <a:t>10/22/2017</a:t>
+              <a:t>10/25/2017</a:t>
             </a:fld>
             <a:endParaRPr lang="en-US"/>
           </a:p>
@@ -806,7 +3109,7 @@
           <a:p>
             <a:fld id="{C40ACEE9-C2D0-4F50-A069-FD7DDEA3AAE9}" type="datetimeFigureOut">
               <a:rPr lang="en-US" smtClean="0"/>
-              <a:t>10/22/2017</a:t>
+              <a:t>10/25/2017</a:t>
             </a:fld>
             <a:endParaRPr lang="en-US"/>
           </a:p>
@@ -1060,7 +3363,7 @@
           <a:p>
             <a:fld id="{C40ACEE9-C2D0-4F50-A069-FD7DDEA3AAE9}" type="datetimeFigureOut">
               <a:rPr lang="en-US" smtClean="0"/>
-              <a:t>10/22/2017</a:t>
+              <a:t>10/25/2017</a:t>
             </a:fld>
             <a:endParaRPr lang="en-US"/>
           </a:p>
@@ -1300,7 +3603,7 @@
           <a:p>
             <a:fld id="{C40ACEE9-C2D0-4F50-A069-FD7DDEA3AAE9}" type="datetimeFigureOut">
               <a:rPr lang="en-US" smtClean="0"/>
-              <a:t>10/22/2017</a:t>
+              <a:t>10/25/2017</a:t>
             </a:fld>
             <a:endParaRPr lang="en-US"/>
           </a:p>
@@ -1680,7 +3983,7 @@
           <a:p>
             <a:fld id="{C40ACEE9-C2D0-4F50-A069-FD7DDEA3AAE9}" type="datetimeFigureOut">
               <a:rPr lang="en-US" smtClean="0"/>
-              <a:t>10/22/2017</a:t>
+              <a:t>10/25/2017</a:t>
             </a:fld>
             <a:endParaRPr lang="en-US"/>
           </a:p>
@@ -1811,7 +4114,7 @@
           <a:p>
             <a:fld id="{C40ACEE9-C2D0-4F50-A069-FD7DDEA3AAE9}" type="datetimeFigureOut">
               <a:rPr lang="en-US" smtClean="0"/>
-              <a:t>10/22/2017</a:t>
+              <a:t>10/25/2017</a:t>
             </a:fld>
             <a:endParaRPr lang="en-US"/>
           </a:p>
@@ -1914,7 +4217,7 @@
           <a:p>
             <a:fld id="{C40ACEE9-C2D0-4F50-A069-FD7DDEA3AAE9}" type="datetimeFigureOut">
               <a:rPr lang="en-US" smtClean="0"/>
-              <a:t>10/22/2017</a:t>
+              <a:t>10/25/2017</a:t>
             </a:fld>
             <a:endParaRPr lang="en-US"/>
           </a:p>
@@ -2199,7 +4502,7 @@
           <a:p>
             <a:fld id="{C40ACEE9-C2D0-4F50-A069-FD7DDEA3AAE9}" type="datetimeFigureOut">
               <a:rPr lang="en-US" smtClean="0"/>
-              <a:t>10/22/2017</a:t>
+              <a:t>10/25/2017</a:t>
             </a:fld>
             <a:endParaRPr lang="en-US"/>
           </a:p>
@@ -2465,7 +4768,7 @@
           <a:p>
             <a:fld id="{C40ACEE9-C2D0-4F50-A069-FD7DDEA3AAE9}" type="datetimeFigureOut">
               <a:rPr lang="en-US" smtClean="0"/>
-              <a:t>10/22/2017</a:t>
+              <a:t>10/25/2017</a:t>
             </a:fld>
             <a:endParaRPr lang="en-US"/>
           </a:p>
@@ -2686,7 +4989,7 @@
           <a:p>
             <a:fld id="{C40ACEE9-C2D0-4F50-A069-FD7DDEA3AAE9}" type="datetimeFigureOut">
               <a:rPr lang="en-US" smtClean="0"/>
-              <a:t>10/22/2017</a:t>
+              <a:t>10/25/2017</a:t>
             </a:fld>
             <a:endParaRPr lang="en-US"/>
           </a:p>
@@ -3119,7 +5422,7 @@
             <a:avLst/>
           </a:prstGeom>
           <a:blipFill dpi="0" rotWithShape="1">
-            <a:blip r:embed="rId2">
+            <a:blip r:embed="rId3">
               <a:alphaModFix amt="30000"/>
             </a:blip>
             <a:srcRect/>
@@ -4095,14 +6398,14 @@
   <p:clrMapOvr>
     <a:masterClrMapping/>
   </p:clrMapOvr>
-  <mc:AlternateContent xmlns:mc="http://schemas.openxmlformats.org/markup-compatibility/2006" xmlns:p14="http://schemas.microsoft.com/office/powerpoint/2010/main">
-    <mc:Choice Requires="p14">
-      <p:transition spd="slow" p14:dur="1200" advTm="15000">
+  <mc:AlternateContent xmlns:mc="http://schemas.openxmlformats.org/markup-compatibility/2006">
+    <mc:Choice xmlns:p14="http://schemas.microsoft.com/office/powerpoint/2010/main" Requires="p14">
+      <p:transition spd="slow" p14:dur="1200" advClick="0" advTm="12000">
         <p:dissolve/>
       </p:transition>
     </mc:Choice>
-    <mc:Fallback xmlns="">
-      <p:transition spd="slow" advTm="15000">
+    <mc:Fallback>
+      <p:transition spd="slow" advClick="0" advTm="12000">
         <p:dissolve/>
       </p:transition>
     </mc:Fallback>
@@ -4175,7 +6478,7 @@
         </p:spPr>
         <p:txBody>
           <a:bodyPr>
-            <a:normAutofit fontScale="92500"/>
+            <a:normAutofit fontScale="92500" lnSpcReduction="10000"/>
           </a:bodyPr>
           <a:lstStyle/>
           <a:p>
@@ -4187,8 +6490,21 @@
           <a:p>
             <a:r>
               <a:rPr lang="en-US" dirty="0" smtClean="0"/>
-              <a:t>They represent a measured observation at particular times</a:t>
-            </a:r>
+              <a:t>They </a:t>
+            </a:r>
+            <a:r>
+              <a:rPr lang="en-US" dirty="0" smtClean="0"/>
+              <a:t>typically represent </a:t>
+            </a:r>
+            <a:r>
+              <a:rPr lang="en-US" dirty="0" smtClean="0"/>
+              <a:t>a measured observation at </a:t>
+            </a:r>
+            <a:r>
+              <a:rPr lang="en-US" dirty="0" smtClean="0"/>
+              <a:t>specific times</a:t>
+            </a:r>
+            <a:endParaRPr lang="en-US" dirty="0" smtClean="0"/>
           </a:p>
         </p:txBody>
       </p:sp>
@@ -4205,7 +6521,7 @@
         <p:spPr/>
         <p:txBody>
           <a:bodyPr>
-            <a:normAutofit fontScale="92500"/>
+            <a:normAutofit fontScale="92500" lnSpcReduction="10000"/>
           </a:bodyPr>
           <a:lstStyle/>
           <a:p>
@@ -4266,7 +6582,18 @@
             <a:pPr lvl="1"/>
             <a:r>
               <a:rPr lang="en-US" dirty="0" smtClean="0"/>
-              <a:t>… by location (city, state)</a:t>
+              <a:t>… by location (city, state</a:t>
+            </a:r>
+            <a:r>
+              <a:rPr lang="en-US" dirty="0" smtClean="0"/>
+              <a:t>)</a:t>
+            </a:r>
+          </a:p>
+          <a:p>
+            <a:pPr lvl="1"/>
+            <a:r>
+              <a:rPr lang="en-US" dirty="0" smtClean="0"/>
+              <a:t>Demographics (gender, race)</a:t>
             </a:r>
             <a:endParaRPr lang="en-US" dirty="0"/>
           </a:p>
@@ -4282,7 +6609,7 @@
         </p:nvSpPr>
         <p:spPr>
           <a:xfrm>
-            <a:off x="838200" y="3135086"/>
+            <a:off x="838200" y="3233701"/>
             <a:ext cx="5181600" cy="3452326"/>
           </a:xfrm>
           <a:prstGeom prst="rect">
@@ -4496,12 +6823,12 @@
   <p:clrMapOvr>
     <a:masterClrMapping/>
   </p:clrMapOvr>
-  <mc:AlternateContent xmlns:mc="http://schemas.openxmlformats.org/markup-compatibility/2006" xmlns:p14="http://schemas.microsoft.com/office/powerpoint/2010/main">
-    <mc:Choice Requires="p14">
-      <p:transition spd="slow" p14:dur="2000" advTm="15000"/>
+  <mc:AlternateContent xmlns:mc="http://schemas.openxmlformats.org/markup-compatibility/2006">
+    <mc:Choice xmlns:p14="http://schemas.microsoft.com/office/powerpoint/2010/main" Requires="p14">
+      <p:transition spd="slow" p14:dur="2000" advClick="0" advTm="15000"/>
     </mc:Choice>
-    <mc:Fallback xmlns="">
-      <p:transition spd="slow" advTm="15000"/>
+    <mc:Fallback>
+      <p:transition spd="slow" advClick="0" advTm="15000"/>
     </mc:Fallback>
   </mc:AlternateContent>
   <p:timing>
@@ -4607,7 +6934,7 @@
                               <p:par>
                                 <p:cTn id="11" presetID="1" presetClass="entr" presetSubtype="0" fill="hold" grpId="0" nodeType="clickEffect">
                                   <p:stCondLst>
-                                    <p:cond delay="2000"/>
+                                    <p:cond delay="1000"/>
                                   </p:stCondLst>
                                   <p:childTnLst>
                                     <p:set>
@@ -4883,6 +7210,37 @@
                                   </p:childTnLst>
                                 </p:cTn>
                               </p:par>
+                              <p:par>
+                                <p:cTn id="29" presetID="1" presetClass="entr" presetSubtype="0" fill="hold" grpId="0" nodeType="withEffect">
+                                  <p:stCondLst>
+                                    <p:cond delay="3000"/>
+                                  </p:stCondLst>
+                                  <p:childTnLst>
+                                    <p:set>
+                                      <p:cBhvr>
+                                        <p:cTn id="30" dur="1" fill="hold">
+                                          <p:stCondLst>
+                                            <p:cond delay="0"/>
+                                          </p:stCondLst>
+                                        </p:cTn>
+                                        <p:tgtEl>
+                                          <p:spTgt spid="4">
+                                            <p:txEl>
+                                              <p:pRg st="9" end="9"/>
+                                            </p:txEl>
+                                          </p:spTgt>
+                                        </p:tgtEl>
+                                        <p:attrNameLst>
+                                          <p:attrName>style.visibility</p:attrName>
+                                        </p:attrNameLst>
+                                      </p:cBhvr>
+                                      <p:to>
+                                        <p:strVal val="visible"/>
+                                      </p:to>
+                                    </p:set>
+                                  </p:childTnLst>
+                                </p:cTn>
+                              </p:par>
                             </p:childTnLst>
                           </p:cTn>
                         </p:par>
@@ -4890,26 +7248,26 @@
                     </p:cTn>
                   </p:par>
                   <p:par>
-                    <p:cTn id="29" fill="hold">
+                    <p:cTn id="31" fill="hold">
                       <p:stCondLst>
                         <p:cond delay="indefinite"/>
                       </p:stCondLst>
                       <p:childTnLst>
                         <p:par>
-                          <p:cTn id="30" fill="hold">
+                          <p:cTn id="32" fill="hold">
                             <p:stCondLst>
                               <p:cond delay="0"/>
                             </p:stCondLst>
                             <p:childTnLst>
                               <p:par>
-                                <p:cTn id="31" presetID="1" presetClass="entr" presetSubtype="0" fill="hold" grpId="0" nodeType="clickEffect">
+                                <p:cTn id="33" presetID="1" presetClass="entr" presetSubtype="0" fill="hold" grpId="0" nodeType="clickEffect">
                                   <p:stCondLst>
-                                    <p:cond delay="2000"/>
+                                    <p:cond delay="1000"/>
                                   </p:stCondLst>
                                   <p:childTnLst>
                                     <p:set>
                                       <p:cBhvr>
-                                        <p:cTn id="32" dur="1" fill="hold">
+                                        <p:cTn id="34" dur="1" fill="hold">
                                           <p:stCondLst>
                                             <p:cond delay="0"/>
                                           </p:stCondLst>
@@ -5179,12 +7537,12 @@
   <p:clrMapOvr>
     <a:masterClrMapping/>
   </p:clrMapOvr>
-  <mc:AlternateContent xmlns:mc="http://schemas.openxmlformats.org/markup-compatibility/2006" xmlns:p14="http://schemas.microsoft.com/office/powerpoint/2010/main">
-    <mc:Choice Requires="p14">
-      <p:transition spd="slow" p14:dur="2000" advTm="15000"/>
+  <mc:AlternateContent xmlns:mc="http://schemas.openxmlformats.org/markup-compatibility/2006">
+    <mc:Choice xmlns:p14="http://schemas.microsoft.com/office/powerpoint/2010/main" Requires="p14">
+      <p:transition spd="slow" p14:dur="2000" advClick="0" advTm="15000"/>
     </mc:Choice>
-    <mc:Fallback xmlns="">
-      <p:transition spd="slow" advTm="15000"/>
+    <mc:Fallback>
+      <p:transition spd="slow" advClick="0" advTm="15000"/>
     </mc:Fallback>
   </mc:AlternateContent>
   <p:timing>
@@ -5224,7 +7582,7 @@
         </p:nvSpPr>
         <p:spPr bwMode="auto">
           <a:xfrm>
-            <a:off x="7716748" y="2169204"/>
+            <a:off x="7716748" y="2456083"/>
             <a:ext cx="2349432" cy="2154436"/>
           </a:xfrm>
           <a:prstGeom prst="rect">
@@ -5754,36 +8112,6 @@
           <p:nvPr/>
         </p:nvPicPr>
         <p:blipFill>
-          <a:blip r:embed="rId2">
-            <a:extLst>
-              <a:ext uri="{28A0092B-C50C-407E-A947-70E740481C1C}">
-                <a14:useLocalDpi xmlns:a14="http://schemas.microsoft.com/office/drawing/2010/main" val="0"/>
-              </a:ext>
-            </a:extLst>
-          </a:blip>
-          <a:stretch>
-            <a:fillRect/>
-          </a:stretch>
-        </p:blipFill>
-        <p:spPr>
-          <a:xfrm>
-            <a:off x="6643972" y="2865422"/>
-            <a:ext cx="4286250" cy="762000"/>
-          </a:xfrm>
-          <a:prstGeom prst="rect">
-            <a:avLst/>
-          </a:prstGeom>
-        </p:spPr>
-      </p:pic>
-      <p:pic>
-        <p:nvPicPr>
-          <p:cNvPr id="9" name="Picture 8"/>
-          <p:cNvPicPr>
-            <a:picLocks noChangeAspect="1"/>
-          </p:cNvPicPr>
-          <p:nvPr/>
-        </p:nvPicPr>
-        <p:blipFill>
           <a:blip r:embed="rId3">
             <a:extLst>
               <a:ext uri="{28A0092B-C50C-407E-A947-70E740481C1C}">
@@ -5797,149 +8125,17 @@
         </p:blipFill>
         <p:spPr>
           <a:xfrm>
-            <a:off x="6268537" y="2220354"/>
-            <a:ext cx="5245854" cy="2052135"/>
+            <a:off x="6643972" y="3152301"/>
+            <a:ext cx="4286250" cy="762000"/>
           </a:xfrm>
           <a:prstGeom prst="rect">
             <a:avLst/>
           </a:prstGeom>
         </p:spPr>
       </p:pic>
-      <p:sp>
-        <p:nvSpPr>
-          <p:cNvPr id="2" name="Title 1"/>
-          <p:cNvSpPr>
-            <a:spLocks noGrp="1"/>
-          </p:cNvSpPr>
-          <p:nvPr>
-            <p:ph type="title"/>
-          </p:nvPr>
-        </p:nvSpPr>
-        <p:spPr/>
-        <p:txBody>
-          <a:bodyPr/>
-          <a:lstStyle/>
-          <a:p>
-            <a:r>
-              <a:rPr lang="en-US" dirty="0" smtClean="0"/>
-              <a:t>A Tidy Data exercise</a:t>
-            </a:r>
-            <a:endParaRPr lang="en-US" dirty="0"/>
-          </a:p>
-        </p:txBody>
-      </p:sp>
-      <p:sp>
-        <p:nvSpPr>
-          <p:cNvPr id="3" name="Content Placeholder 2"/>
-          <p:cNvSpPr>
-            <a:spLocks noGrp="1"/>
-          </p:cNvSpPr>
-          <p:nvPr>
-            <p:ph sz="half" idx="1"/>
-          </p:nvPr>
-        </p:nvSpPr>
-        <p:spPr/>
-        <p:txBody>
-          <a:bodyPr>
-            <a:normAutofit fontScale="77500" lnSpcReduction="20000"/>
-          </a:bodyPr>
-          <a:lstStyle/>
-          <a:p>
-            <a:r>
-              <a:rPr lang="en-US" dirty="0" smtClean="0"/>
-              <a:t>Bureau of Labor Statistics (BLS) dat</a:t>
-            </a:r>
-            <a:r>
-              <a:rPr lang="en-US" dirty="0" smtClean="0"/>
-              <a:t>a</a:t>
-            </a:r>
-          </a:p>
-          <a:p>
-            <a:r>
-              <a:rPr lang="en-US" dirty="0" smtClean="0"/>
-              <a:t>Obtained by API, provided in JSON format</a:t>
-            </a:r>
-          </a:p>
-          <a:p>
-            <a:r>
-              <a:rPr lang="en-US" dirty="0" smtClean="0"/>
-              <a:t>Problems:</a:t>
-            </a:r>
-          </a:p>
-          <a:p>
-            <a:pPr lvl="1"/>
-            <a:r>
-              <a:rPr lang="en-US" dirty="0"/>
-              <a:t>Multiple variables are stored in one column.</a:t>
-            </a:r>
-          </a:p>
-          <a:p>
-            <a:pPr lvl="1"/>
-            <a:r>
-              <a:rPr lang="en-US" i="1" dirty="0" smtClean="0"/>
-              <a:t>Single variable is stored in multiple columns.</a:t>
-            </a:r>
-          </a:p>
-          <a:p>
-            <a:r>
-              <a:rPr lang="en-US" dirty="0" smtClean="0"/>
-              <a:t>The BLS </a:t>
-            </a:r>
-            <a:r>
-              <a:rPr lang="en-US" dirty="0" err="1" smtClean="0"/>
-              <a:t>SeriesID</a:t>
-            </a:r>
-            <a:r>
-              <a:rPr lang="en-US" dirty="0" smtClean="0"/>
-              <a:t> encodes many data items</a:t>
-            </a:r>
-          </a:p>
-          <a:p>
-            <a:pPr lvl="1"/>
-            <a:r>
-              <a:rPr lang="en-US" dirty="0" smtClean="0"/>
-              <a:t>The data set type/name</a:t>
-            </a:r>
-          </a:p>
-          <a:p>
-            <a:pPr lvl="1"/>
-            <a:r>
-              <a:rPr lang="en-US" dirty="0" smtClean="0"/>
-              <a:t>Some data attributes</a:t>
-            </a:r>
-          </a:p>
-          <a:p>
-            <a:pPr lvl="1"/>
-            <a:r>
-              <a:rPr lang="en-US" dirty="0" smtClean="0"/>
-              <a:t>The location (for geo based data)</a:t>
-            </a:r>
-          </a:p>
-          <a:p>
-            <a:pPr lvl="1"/>
-            <a:r>
-              <a:rPr lang="en-US" dirty="0" smtClean="0"/>
-              <a:t>The Measured value (metric name)</a:t>
-            </a:r>
-          </a:p>
-          <a:p>
-            <a:r>
-              <a:rPr lang="en-US" dirty="0" smtClean="0"/>
-              <a:t>Created lookup tables to map encoded</a:t>
-            </a:r>
-            <a:br>
-              <a:rPr lang="en-US" dirty="0" smtClean="0"/>
-            </a:br>
-            <a:r>
-              <a:rPr lang="en-US" dirty="0" smtClean="0"/>
-              <a:t>values</a:t>
-            </a:r>
-          </a:p>
-        </p:txBody>
-      </p:sp>
       <p:pic>
         <p:nvPicPr>
-          <p:cNvPr id="12" name="Picture 11"/>
+          <p:cNvPr id="9" name="Picture 8"/>
           <p:cNvPicPr>
             <a:picLocks noChangeAspect="1"/>
           </p:cNvPicPr>
@@ -5959,7 +8155,165 @@
         </p:blipFill>
         <p:spPr>
           <a:xfrm>
-            <a:off x="5505554" y="2201479"/>
+            <a:off x="6268537" y="2507233"/>
+            <a:ext cx="5245854" cy="2052135"/>
+          </a:xfrm>
+          <a:prstGeom prst="rect">
+            <a:avLst/>
+          </a:prstGeom>
+        </p:spPr>
+      </p:pic>
+      <p:sp>
+        <p:nvSpPr>
+          <p:cNvPr id="2" name="Title 1"/>
+          <p:cNvSpPr>
+            <a:spLocks noGrp="1"/>
+          </p:cNvSpPr>
+          <p:nvPr>
+            <p:ph type="title"/>
+          </p:nvPr>
+        </p:nvSpPr>
+        <p:spPr/>
+        <p:txBody>
+          <a:bodyPr/>
+          <a:lstStyle/>
+          <a:p>
+            <a:r>
+              <a:rPr lang="en-US" dirty="0" smtClean="0"/>
+              <a:t>A Tidy Data exercise</a:t>
+            </a:r>
+            <a:endParaRPr lang="en-US" dirty="0"/>
+          </a:p>
+        </p:txBody>
+      </p:sp>
+      <p:sp>
+        <p:nvSpPr>
+          <p:cNvPr id="3" name="Content Placeholder 2"/>
+          <p:cNvSpPr>
+            <a:spLocks noGrp="1"/>
+          </p:cNvSpPr>
+          <p:nvPr>
+            <p:ph sz="half" idx="1"/>
+          </p:nvPr>
+        </p:nvSpPr>
+        <p:spPr/>
+        <p:txBody>
+          <a:bodyPr>
+            <a:normAutofit fontScale="77500" lnSpcReduction="20000"/>
+          </a:bodyPr>
+          <a:lstStyle/>
+          <a:p>
+            <a:r>
+              <a:rPr lang="en-US" dirty="0" smtClean="0"/>
+              <a:t>Bureau of Labor Statistics (BLS) data</a:t>
+            </a:r>
+          </a:p>
+          <a:p>
+            <a:r>
+              <a:rPr lang="en-US" dirty="0" smtClean="0"/>
+              <a:t>Obtained by API, provided in JSON format</a:t>
+            </a:r>
+          </a:p>
+          <a:p>
+            <a:r>
+              <a:rPr lang="en-US" dirty="0" smtClean="0"/>
+              <a:t>Problems:</a:t>
+            </a:r>
+          </a:p>
+          <a:p>
+            <a:pPr lvl="1"/>
+            <a:r>
+              <a:rPr lang="en-US" dirty="0"/>
+              <a:t>Multiple variables are stored in one column.</a:t>
+            </a:r>
+          </a:p>
+          <a:p>
+            <a:pPr lvl="1"/>
+            <a:r>
+              <a:rPr lang="en-US" i="1" dirty="0" smtClean="0"/>
+              <a:t>Single variable is stored in multiple columns.</a:t>
+            </a:r>
+          </a:p>
+          <a:p>
+            <a:r>
+              <a:rPr lang="en-US" dirty="0" smtClean="0"/>
+              <a:t>The BLS </a:t>
+            </a:r>
+            <a:r>
+              <a:rPr lang="en-US" dirty="0" err="1" smtClean="0"/>
+              <a:t>SeriesID</a:t>
+            </a:r>
+            <a:r>
+              <a:rPr lang="en-US" dirty="0" smtClean="0"/>
+              <a:t> encodes many data items</a:t>
+            </a:r>
+          </a:p>
+          <a:p>
+            <a:pPr lvl="1"/>
+            <a:r>
+              <a:rPr lang="en-US" dirty="0" smtClean="0"/>
+              <a:t>The data set type/name</a:t>
+            </a:r>
+          </a:p>
+          <a:p>
+            <a:pPr lvl="1"/>
+            <a:r>
+              <a:rPr lang="en-US" dirty="0" smtClean="0"/>
+              <a:t>Some data attributes</a:t>
+            </a:r>
+          </a:p>
+          <a:p>
+            <a:pPr lvl="1"/>
+            <a:r>
+              <a:rPr lang="en-US" dirty="0" smtClean="0"/>
+              <a:t>The location (for geo based data)</a:t>
+            </a:r>
+          </a:p>
+          <a:p>
+            <a:pPr lvl="1"/>
+            <a:r>
+              <a:rPr lang="en-US" dirty="0" smtClean="0"/>
+              <a:t>The Measured value (metric name)</a:t>
+            </a:r>
+          </a:p>
+          <a:p>
+            <a:r>
+              <a:rPr lang="en-US" dirty="0" smtClean="0"/>
+              <a:t>Created lookup tables to map encoded</a:t>
+            </a:r>
+            <a:br>
+              <a:rPr lang="en-US" dirty="0" smtClean="0"/>
+            </a:br>
+            <a:r>
+              <a:rPr lang="en-US" dirty="0" smtClean="0"/>
+              <a:t>values</a:t>
+            </a:r>
+          </a:p>
+        </p:txBody>
+      </p:sp>
+      <p:pic>
+        <p:nvPicPr>
+          <p:cNvPr id="12" name="Picture 11"/>
+          <p:cNvPicPr>
+            <a:picLocks noChangeAspect="1"/>
+          </p:cNvPicPr>
+          <p:nvPr/>
+        </p:nvPicPr>
+        <p:blipFill>
+          <a:blip r:embed="rId5">
+            <a:extLst>
+              <a:ext uri="{28A0092B-C50C-407E-A947-70E740481C1C}">
+                <a14:useLocalDpi xmlns:a14="http://schemas.microsoft.com/office/drawing/2010/main" val="0"/>
+              </a:ext>
+            </a:extLst>
+          </a:blip>
+          <a:stretch>
+            <a:fillRect/>
+          </a:stretch>
+        </p:blipFill>
+        <p:spPr>
+          <a:xfrm>
+            <a:off x="5505554" y="2488358"/>
             <a:ext cx="6686445" cy="2154436"/>
           </a:xfrm>
           <a:prstGeom prst="rect">
@@ -5977,12 +8331,12 @@
   <p:clrMapOvr>
     <a:masterClrMapping/>
   </p:clrMapOvr>
-  <mc:AlternateContent xmlns:mc="http://schemas.openxmlformats.org/markup-compatibility/2006" xmlns:p14="http://schemas.microsoft.com/office/powerpoint/2010/main">
-    <mc:Choice Requires="p14">
-      <p:transition spd="slow" p14:dur="2000" advTm="15000"/>
+  <mc:AlternateContent xmlns:mc="http://schemas.openxmlformats.org/markup-compatibility/2006">
+    <mc:Choice xmlns:p14="http://schemas.microsoft.com/office/powerpoint/2010/main" Requires="p14">
+      <p:transition spd="slow" p14:dur="2000" advClick="0" advTm="15000"/>
     </mc:Choice>
-    <mc:Fallback xmlns="">
-      <p:transition spd="slow" advTm="15000"/>
+    <mc:Fallback>
+      <p:transition spd="slow" advClick="0" advTm="15000"/>
     </mc:Fallback>
   </mc:AlternateContent>
   <p:timing>
@@ -6218,6 +8572,38 @@
           <a:chExt cx="0" cy="0"/>
         </a:xfrm>
       </p:grpSpPr>
+      <p:sp>
+        <p:nvSpPr>
+          <p:cNvPr id="6" name="TextBox 5"/>
+          <p:cNvSpPr txBox="1"/>
+          <p:nvPr/>
+        </p:nvSpPr>
+        <p:spPr>
+          <a:xfrm>
+            <a:off x="7959681" y="4105443"/>
+            <a:ext cx="4216599" cy="369332"/>
+          </a:xfrm>
+          <a:prstGeom prst="rect">
+            <a:avLst/>
+          </a:prstGeom>
+          <a:solidFill>
+            <a:schemeClr val="bg1"/>
+          </a:solidFill>
+        </p:spPr>
+        <p:txBody>
+          <a:bodyPr wrap="square" rtlCol="0">
+            <a:spAutoFit/>
+          </a:bodyPr>
+          <a:lstStyle/>
+          <a:p>
+            <a:r>
+              <a:rPr lang="en-US" dirty="0" smtClean="0"/>
+              <a:t>National numbers, looks OK</a:t>
+            </a:r>
+            <a:endParaRPr lang="en-US" dirty="0"/>
+          </a:p>
+        </p:txBody>
+      </p:sp>
       <p:pic>
         <p:nvPicPr>
           <p:cNvPr id="5" name="Picture 4"/>
@@ -6227,7 +8613,7 @@
           <p:nvPr/>
         </p:nvPicPr>
         <p:blipFill>
-          <a:blip r:embed="rId2">
+          <a:blip r:embed="rId3">
             <a:extLst>
               <a:ext uri="{28A0092B-C50C-407E-A947-70E740481C1C}">
                 <a14:useLocalDpi xmlns:a14="http://schemas.microsoft.com/office/drawing/2010/main" val="0"/>
@@ -6240,7 +8626,7 @@
         </p:blipFill>
         <p:spPr>
           <a:xfrm>
-            <a:off x="903517" y="2870200"/>
+            <a:off x="1042665" y="2772587"/>
             <a:ext cx="4903317" cy="3404376"/>
           </a:xfrm>
           <a:prstGeom prst="rect">
@@ -6265,7 +8651,7 @@
           <p:nvPr/>
         </p:nvPicPr>
         <p:blipFill>
-          <a:blip r:embed="rId3">
+          <a:blip r:embed="rId4">
             <a:extLst>
               <a:ext uri="{28A0092B-C50C-407E-A947-70E740481C1C}">
                 <a14:useLocalDpi xmlns:a14="http://schemas.microsoft.com/office/drawing/2010/main" val="0"/>
@@ -6278,7 +8664,7 @@
         </p:blipFill>
         <p:spPr>
           <a:xfrm>
-            <a:off x="906837" y="2877726"/>
+            <a:off x="1040283" y="2772587"/>
             <a:ext cx="4903317" cy="3404376"/>
           </a:xfrm>
           <a:prstGeom prst="rect">
@@ -6303,7 +8689,7 @@
           <p:nvPr/>
         </p:nvPicPr>
         <p:blipFill>
-          <a:blip r:embed="rId4">
+          <a:blip r:embed="rId5">
             <a:extLst>
               <a:ext uri="{28A0092B-C50C-407E-A947-70E740481C1C}">
                 <a14:useLocalDpi xmlns:a14="http://schemas.microsoft.com/office/drawing/2010/main" val="0"/>
@@ -6316,7 +8702,7 @@
         </p:blipFill>
         <p:spPr>
           <a:xfrm>
-            <a:off x="906837" y="2871618"/>
+            <a:off x="1040283" y="2772587"/>
             <a:ext cx="4903317" cy="3404376"/>
           </a:xfrm>
           <a:prstGeom prst="rect">
@@ -6332,6 +8718,52 @@
           </a:ln>
         </p:spPr>
       </p:pic>
+      <p:sp>
+        <p:nvSpPr>
+          <p:cNvPr id="2" name="Title 1"/>
+          <p:cNvSpPr>
+            <a:spLocks noGrp="1"/>
+          </p:cNvSpPr>
+          <p:nvPr>
+            <p:ph type="title"/>
+          </p:nvPr>
+        </p:nvSpPr>
+        <p:spPr/>
+        <p:txBody>
+          <a:bodyPr/>
+          <a:lstStyle/>
+          <a:p>
+            <a:r>
+              <a:rPr lang="en-US" dirty="0" smtClean="0"/>
+              <a:t>Unemployment Rate % time-series</a:t>
+            </a:r>
+            <a:endParaRPr lang="en-US" dirty="0"/>
+          </a:p>
+        </p:txBody>
+      </p:sp>
+      <p:sp>
+        <p:nvSpPr>
+          <p:cNvPr id="3" name="Content Placeholder 2"/>
+          <p:cNvSpPr>
+            <a:spLocks noGrp="1"/>
+          </p:cNvSpPr>
+          <p:nvPr>
+            <p:ph idx="1"/>
+          </p:nvPr>
+        </p:nvSpPr>
+        <p:spPr/>
+        <p:txBody>
+          <a:bodyPr/>
+          <a:lstStyle/>
+          <a:p>
+            <a:r>
+              <a:rPr lang="en-US" dirty="0" smtClean="0"/>
+              <a:t>We can plot unemployment percentage over time to get some perspective on how the nation and cities are doing</a:t>
+            </a:r>
+            <a:endParaRPr lang="en-US" dirty="0"/>
+          </a:p>
+        </p:txBody>
+      </p:sp>
       <p:pic>
         <p:nvPicPr>
           <p:cNvPr id="11" name="Picture 10"/>
@@ -6341,7 +8773,7 @@
           <p:nvPr/>
         </p:nvPicPr>
         <p:blipFill>
-          <a:blip r:embed="rId5">
+          <a:blip r:embed="rId6">
             <a:extLst>
               <a:ext uri="{28A0092B-C50C-407E-A947-70E740481C1C}">
                 <a14:useLocalDpi xmlns:a14="http://schemas.microsoft.com/office/drawing/2010/main" val="0"/>
@@ -6354,7 +8786,7 @@
         </p:blipFill>
         <p:spPr>
           <a:xfrm>
-            <a:off x="906837" y="2872005"/>
+            <a:off x="1029193" y="2772587"/>
             <a:ext cx="6757940" cy="3404376"/>
           </a:xfrm>
           <a:prstGeom prst="rect">
@@ -6372,59 +8804,13 @@
       </p:pic>
       <p:sp>
         <p:nvSpPr>
-          <p:cNvPr id="2" name="Title 1"/>
-          <p:cNvSpPr>
-            <a:spLocks noGrp="1"/>
-          </p:cNvSpPr>
-          <p:nvPr>
-            <p:ph type="title"/>
-          </p:nvPr>
-        </p:nvSpPr>
-        <p:spPr/>
-        <p:txBody>
-          <a:bodyPr/>
-          <a:lstStyle/>
-          <a:p>
-            <a:r>
-              <a:rPr lang="en-US" dirty="0" smtClean="0"/>
-              <a:t>Unemployment Rate % time-series</a:t>
-            </a:r>
-            <a:endParaRPr lang="en-US" dirty="0"/>
-          </a:p>
-        </p:txBody>
-      </p:sp>
-      <p:sp>
-        <p:nvSpPr>
-          <p:cNvPr id="3" name="Content Placeholder 2"/>
-          <p:cNvSpPr>
-            <a:spLocks noGrp="1"/>
-          </p:cNvSpPr>
-          <p:nvPr>
-            <p:ph idx="1"/>
-          </p:nvPr>
-        </p:nvSpPr>
-        <p:spPr/>
-        <p:txBody>
-          <a:bodyPr/>
-          <a:lstStyle/>
-          <a:p>
-            <a:r>
-              <a:rPr lang="en-US" dirty="0" smtClean="0"/>
-              <a:t>We can plot unemployment percentage over time to get some perspective on how the nation and cities are doing</a:t>
-            </a:r>
-            <a:endParaRPr lang="en-US" dirty="0"/>
-          </a:p>
-        </p:txBody>
-      </p:sp>
-      <p:sp>
-        <p:nvSpPr>
-          <p:cNvPr id="6" name="TextBox 5"/>
+          <p:cNvPr id="12" name="TextBox 11"/>
           <p:cNvSpPr txBox="1"/>
           <p:nvPr/>
         </p:nvSpPr>
         <p:spPr>
           <a:xfrm>
-            <a:off x="7975401" y="3928520"/>
+            <a:off x="7959680" y="4105443"/>
             <a:ext cx="4216599" cy="369332"/>
           </a:xfrm>
           <a:prstGeom prst="rect">
@@ -6442,38 +8828,6 @@
           <a:p>
             <a:r>
               <a:rPr lang="en-US" dirty="0" smtClean="0"/>
-              <a:t>National numbers, looks OK</a:t>
-            </a:r>
-            <a:endParaRPr lang="en-US" dirty="0"/>
-          </a:p>
-        </p:txBody>
-      </p:sp>
-      <p:sp>
-        <p:nvSpPr>
-          <p:cNvPr id="12" name="TextBox 11"/>
-          <p:cNvSpPr txBox="1"/>
-          <p:nvPr/>
-        </p:nvSpPr>
-        <p:spPr>
-          <a:xfrm>
-            <a:off x="7975401" y="3913508"/>
-            <a:ext cx="4216599" cy="369332"/>
-          </a:xfrm>
-          <a:prstGeom prst="rect">
-            <a:avLst/>
-          </a:prstGeom>
-          <a:solidFill>
-            <a:schemeClr val="bg1"/>
-          </a:solidFill>
-        </p:spPr>
-        <p:txBody>
-          <a:bodyPr wrap="square" rtlCol="0">
-            <a:spAutoFit/>
-          </a:bodyPr>
-          <a:lstStyle/>
-          <a:p>
-            <a:r>
-              <a:rPr lang="en-US" dirty="0" smtClean="0"/>
               <a:t>Philadelphia numbers, also looks OK</a:t>
             </a:r>
             <a:endParaRPr lang="en-US" dirty="0"/>
@@ -6488,7 +8842,7 @@
         </p:nvSpPr>
         <p:spPr>
           <a:xfrm>
-            <a:off x="7975397" y="3928520"/>
+            <a:off x="7959678" y="4125692"/>
             <a:ext cx="4216601" cy="369332"/>
           </a:xfrm>
           <a:prstGeom prst="rect">
@@ -6520,7 +8874,7 @@
         </p:nvSpPr>
         <p:spPr>
           <a:xfrm>
-            <a:off x="7975401" y="3894520"/>
+            <a:off x="7959677" y="4145941"/>
             <a:ext cx="4216599" cy="369332"/>
           </a:xfrm>
           <a:prstGeom prst="rect">
@@ -6566,12 +8920,12 @@
   <p:clrMapOvr>
     <a:masterClrMapping/>
   </p:clrMapOvr>
-  <mc:AlternateContent xmlns:mc="http://schemas.openxmlformats.org/markup-compatibility/2006" xmlns:p14="http://schemas.microsoft.com/office/powerpoint/2010/main">
-    <mc:Choice Requires="p14">
-      <p:transition spd="slow" p14:dur="2000" advTm="15000"/>
+  <mc:AlternateContent xmlns:mc="http://schemas.openxmlformats.org/markup-compatibility/2006">
+    <mc:Choice xmlns:p14="http://schemas.microsoft.com/office/powerpoint/2010/main" Requires="p14">
+      <p:transition spd="slow" p14:dur="2000" advClick="0" advTm="15000"/>
     </mc:Choice>
-    <mc:Fallback xmlns="">
-      <p:transition spd="slow" advTm="15000"/>
+    <mc:Fallback>
+      <p:transition spd="slow" advClick="0" advTm="15000"/>
     </mc:Fallback>
   </mc:AlternateContent>
   <p:timing>
@@ -6597,7 +8951,7 @@
                               <p:par>
                                 <p:cTn id="5" presetID="1" presetClass="entr" presetSubtype="0" fill="hold" nodeType="clickEffect">
                                   <p:stCondLst>
-                                    <p:cond delay="2000"/>
+                                    <p:cond delay="1000"/>
                                   </p:stCondLst>
                                   <p:childTnLst>
                                     <p:set>
@@ -6624,7 +8978,7 @@
                               <p:par>
                                 <p:cTn id="7" presetID="1" presetClass="entr" presetSubtype="0" fill="hold" grpId="0" nodeType="withEffect">
                                   <p:stCondLst>
-                                    <p:cond delay="2000"/>
+                                    <p:cond delay="1000"/>
                                   </p:stCondLst>
                                   <p:childTnLst>
                                     <p:set>
@@ -6669,7 +9023,7 @@
                               <p:par>
                                 <p:cTn id="11" presetID="1" presetClass="entr" presetSubtype="0" fill="hold" nodeType="clickEffect">
                                   <p:stCondLst>
-                                    <p:cond delay="2000"/>
+                                    <p:cond delay="1000"/>
                                   </p:stCondLst>
                                   <p:childTnLst>
                                     <p:set>
@@ -6696,7 +9050,7 @@
                               <p:par>
                                 <p:cTn id="13" presetID="1" presetClass="entr" presetSubtype="0" fill="hold" grpId="0" nodeType="withEffect">
                                   <p:stCondLst>
-                                    <p:cond delay="2000"/>
+                                    <p:cond delay="1000"/>
                                   </p:stCondLst>
                                   <p:childTnLst>
                                     <p:set>
@@ -6739,9 +9093,9 @@
                             </p:stCondLst>
                             <p:childTnLst>
                               <p:par>
-                                <p:cTn id="17" presetID="1" presetClass="entr" presetSubtype="0" fill="hold" grpId="0" nodeType="clickEffect">
+                                <p:cTn id="17" presetID="1" presetClass="entr" presetSubtype="0" fill="hold" nodeType="clickEffect">
                                   <p:stCondLst>
-                                    <p:cond delay="2000"/>
+                                    <p:cond delay="1000"/>
                                   </p:stCondLst>
                                   <p:childTnLst>
                                     <p:set>
@@ -6752,7 +9106,7 @@
                                           </p:stCondLst>
                                         </p:cTn>
                                         <p:tgtEl>
-                                          <p:spTgt spid="8"/>
+                                          <p:spTgt spid="9"/>
                                         </p:tgtEl>
                                         <p:attrNameLst>
                                           <p:attrName>style.visibility</p:attrName>
@@ -6766,9 +9120,9 @@
                                 </p:cTn>
                               </p:par>
                               <p:par>
-                                <p:cTn id="19" presetID="1" presetClass="entr" presetSubtype="0" fill="hold" nodeType="withEffect">
+                                <p:cTn id="19" presetID="1" presetClass="entr" presetSubtype="0" fill="hold" grpId="0" nodeType="withEffect">
                                   <p:stCondLst>
-                                    <p:cond delay="2000"/>
+                                    <p:cond delay="1000"/>
                                   </p:stCondLst>
                                   <p:childTnLst>
                                     <p:set>
@@ -6779,7 +9133,7 @@
                                           </p:stCondLst>
                                         </p:cTn>
                                         <p:tgtEl>
-                                          <p:spTgt spid="9"/>
+                                          <p:spTgt spid="8"/>
                                         </p:tgtEl>
                                         <p:attrNameLst>
                                           <p:attrName>style.visibility</p:attrName>
@@ -6811,9 +9165,9 @@
                             </p:stCondLst>
                             <p:childTnLst>
                               <p:par>
-                                <p:cTn id="23" presetID="1" presetClass="entr" presetSubtype="0" fill="hold" grpId="0" nodeType="clickEffect">
+                                <p:cTn id="23" presetID="1" presetClass="entr" presetSubtype="0" fill="hold" nodeType="clickEffect">
                                   <p:stCondLst>
-                                    <p:cond delay="2000"/>
+                                    <p:cond delay="1000"/>
                                   </p:stCondLst>
                                   <p:childTnLst>
                                     <p:set>
@@ -6824,7 +9178,7 @@
                                           </p:stCondLst>
                                         </p:cTn>
                                         <p:tgtEl>
-                                          <p:spTgt spid="10"/>
+                                          <p:spTgt spid="11"/>
                                         </p:tgtEl>
                                         <p:attrNameLst>
                                           <p:attrName>style.visibility</p:attrName>
@@ -6838,9 +9192,9 @@
                                 </p:cTn>
                               </p:par>
                               <p:par>
-                                <p:cTn id="25" presetID="1" presetClass="entr" presetSubtype="0" fill="hold" nodeType="withEffect">
+                                <p:cTn id="25" presetID="1" presetClass="entr" presetSubtype="0" fill="hold" grpId="0" nodeType="withEffect">
                                   <p:stCondLst>
-                                    <p:cond delay="2000"/>
+                                    <p:cond delay="1000"/>
                                   </p:stCondLst>
                                   <p:childTnLst>
                                     <p:set>
@@ -6851,7 +9205,7 @@
                                           </p:stCondLst>
                                         </p:cTn>
                                         <p:tgtEl>
-                                          <p:spTgt spid="11"/>
+                                          <p:spTgt spid="10"/>
                                         </p:tgtEl>
                                         <p:attrNameLst>
                                           <p:attrName>style.visibility</p:attrName>
@@ -6958,8 +9312,13 @@
           <a:p>
             <a:r>
               <a:rPr lang="en-US" dirty="0" smtClean="0"/>
-              <a:t>We want to see how well cities have bounced back from the Great Recession of 2008-2009, so we compare the unemployment % values before and after (i.e., now)</a:t>
-            </a:r>
+              <a:t>We want to see how well cities have bounced back from the Great Recession of 2008-2009, so we compare the unemployment % values before and after </a:t>
+            </a:r>
+            <a:r>
+              <a:rPr lang="en-US" dirty="0" smtClean="0"/>
+              <a:t>(i.e., now)</a:t>
+            </a:r>
+            <a:endParaRPr lang="en-US" dirty="0" smtClean="0"/>
           </a:p>
           <a:p>
             <a:r>
@@ -6987,7 +9346,7 @@
           </p:nvPr>
         </p:nvPicPr>
         <p:blipFill>
-          <a:blip r:embed="rId2">
+          <a:blip r:embed="rId3">
             <a:extLst>
               <a:ext uri="{28A0092B-C50C-407E-A947-70E740481C1C}">
                 <a14:useLocalDpi xmlns:a14="http://schemas.microsoft.com/office/drawing/2010/main" val="0"/>
@@ -7015,12 +9374,12 @@
   <p:clrMapOvr>
     <a:masterClrMapping/>
   </p:clrMapOvr>
-  <mc:AlternateContent xmlns:mc="http://schemas.openxmlformats.org/markup-compatibility/2006" xmlns:p14="http://schemas.microsoft.com/office/powerpoint/2010/main">
-    <mc:Choice Requires="p14">
-      <p:transition spd="slow" p14:dur="2000" advTm="15000"/>
+  <mc:AlternateContent xmlns:mc="http://schemas.openxmlformats.org/markup-compatibility/2006">
+    <mc:Choice xmlns:p14="http://schemas.microsoft.com/office/powerpoint/2010/main" Requires="p14">
+      <p:transition spd="slow" p14:dur="2000" advClick="0" advTm="15000"/>
     </mc:Choice>
-    <mc:Fallback xmlns="">
-      <p:transition spd="slow" advTm="15000"/>
+    <mc:Fallback>
+      <p:transition spd="slow" advClick="0" advTm="15000"/>
     </mc:Fallback>
   </mc:AlternateContent>
   <p:timing>
@@ -7193,7 +9552,7 @@
           </p:nvPr>
         </p:nvPicPr>
         <p:blipFill>
-          <a:blip r:embed="rId2">
+          <a:blip r:embed="rId3">
             <a:extLst>
               <a:ext uri="{28A0092B-C50C-407E-A947-70E740481C1C}">
                 <a14:useLocalDpi xmlns:a14="http://schemas.microsoft.com/office/drawing/2010/main" val="0"/>
@@ -7269,12 +9628,12 @@
   <p:clrMapOvr>
     <a:masterClrMapping/>
   </p:clrMapOvr>
-  <mc:AlternateContent xmlns:mc="http://schemas.openxmlformats.org/markup-compatibility/2006" xmlns:p14="http://schemas.microsoft.com/office/powerpoint/2010/main">
-    <mc:Choice Requires="p14">
-      <p:transition spd="slow" p14:dur="2000" advTm="15000"/>
+  <mc:AlternateContent xmlns:mc="http://schemas.openxmlformats.org/markup-compatibility/2006">
+    <mc:Choice xmlns:p14="http://schemas.microsoft.com/office/powerpoint/2010/main" Requires="p14">
+      <p:transition spd="slow" p14:dur="2000" advClick="0" advTm="15000"/>
     </mc:Choice>
-    <mc:Fallback xmlns="">
-      <p:transition spd="slow" advTm="15000"/>
+    <mc:Fallback>
+      <p:transition spd="slow" advClick="0" advTm="15000"/>
     </mc:Fallback>
   </mc:AlternateContent>
   <p:timing>
@@ -7410,7 +9769,7 @@
           </p:nvPr>
         </p:nvPicPr>
         <p:blipFill>
-          <a:blip r:embed="rId2">
+          <a:blip r:embed="rId3">
             <a:extLst>
               <a:ext uri="{28A0092B-C50C-407E-A947-70E740481C1C}">
                 <a14:useLocalDpi xmlns:a14="http://schemas.microsoft.com/office/drawing/2010/main" val="0"/>
@@ -7486,12 +9845,12 @@
   <p:clrMapOvr>
     <a:masterClrMapping/>
   </p:clrMapOvr>
-  <mc:AlternateContent xmlns:mc="http://schemas.openxmlformats.org/markup-compatibility/2006" xmlns:p14="http://schemas.microsoft.com/office/powerpoint/2010/main">
-    <mc:Choice Requires="p14">
-      <p:transition spd="slow" p14:dur="2000" advTm="15000"/>
+  <mc:AlternateContent xmlns:mc="http://schemas.openxmlformats.org/markup-compatibility/2006">
+    <mc:Choice xmlns:p14="http://schemas.microsoft.com/office/powerpoint/2010/main" Requires="p14">
+      <p:transition spd="slow" p14:dur="2000" advClick="0" advTm="15000"/>
     </mc:Choice>
-    <mc:Fallback xmlns="">
-      <p:transition spd="slow" advTm="15000"/>
+    <mc:Fallback>
+      <p:transition spd="slow" advClick="0" advTm="15000"/>
     </mc:Fallback>
   </mc:AlternateContent>
   <p:timing>
@@ -7532,7 +9891,7 @@
           </p:nvPr>
         </p:nvPicPr>
         <p:blipFill>
-          <a:blip r:embed="rId2">
+          <a:blip r:embed="rId3">
             <a:extLst>
               <a:ext uri="{28A0092B-C50C-407E-A947-70E740481C1C}">
                 <a14:useLocalDpi xmlns:a14="http://schemas.microsoft.com/office/drawing/2010/main" val="0"/>
@@ -7600,25 +9959,45 @@
           </a:xfrm>
         </p:spPr>
         <p:txBody>
-          <a:bodyPr/>
+          <a:bodyPr>
+            <a:normAutofit fontScale="92500" lnSpcReduction="10000"/>
+          </a:bodyPr>
           <a:lstStyle/>
           <a:p>
             <a:r>
               <a:rPr lang="en-US" dirty="0" smtClean="0"/>
-              <a:t>CCD notes on Philadelphia population changes</a:t>
-            </a:r>
-          </a:p>
-          <a:p>
-            <a:r>
-              <a:rPr lang="en-US" dirty="0" smtClean="0"/>
-              <a:t>National Population, 2000-2016</a:t>
-            </a:r>
-          </a:p>
-          <a:p>
-            <a:r>
-              <a:rPr lang="en-US" dirty="0" smtClean="0"/>
-              <a:t>City populations, 2000-2016</a:t>
-            </a:r>
+              <a:t>CCD “incomplete revival” </a:t>
+            </a:r>
+            <a:r>
+              <a:rPr lang="en-US" dirty="0" smtClean="0"/>
+              <a:t>notes </a:t>
+            </a:r>
+            <a:r>
+              <a:rPr lang="en-US" dirty="0" smtClean="0"/>
+              <a:t>patterns and trends in Philadelphia’s </a:t>
+            </a:r>
+            <a:r>
+              <a:rPr lang="en-US" dirty="0" smtClean="0"/>
+              <a:t>population changes</a:t>
+            </a:r>
+          </a:p>
+          <a:p>
+            <a:r>
+              <a:rPr lang="en-US" dirty="0" smtClean="0"/>
+              <a:t>The National Population is always trending up and up!</a:t>
+            </a:r>
+            <a:endParaRPr lang="en-US" dirty="0" smtClean="0"/>
+          </a:p>
+          <a:p>
+            <a:r>
+              <a:rPr lang="en-US" dirty="0" smtClean="0"/>
+              <a:t>City </a:t>
+            </a:r>
+            <a:r>
+              <a:rPr lang="en-US" dirty="0" smtClean="0"/>
+              <a:t>populations fluctuate</a:t>
+            </a:r>
+            <a:endParaRPr lang="en-US" dirty="0" smtClean="0"/>
           </a:p>
           <a:p>
             <a:pPr lvl="1"/>
@@ -7694,7 +10073,7 @@
           <p:nvPr/>
         </p:nvPicPr>
         <p:blipFill>
-          <a:blip r:embed="rId3">
+          <a:blip r:embed="rId4">
             <a:extLst>
               <a:ext uri="{28A0092B-C50C-407E-A947-70E740481C1C}">
                 <a14:useLocalDpi xmlns:a14="http://schemas.microsoft.com/office/drawing/2010/main" val="0"/>
@@ -7773,7 +10152,7 @@
           <p:nvPr/>
         </p:nvPicPr>
         <p:blipFill>
-          <a:blip r:embed="rId4">
+          <a:blip r:embed="rId5">
             <a:extLst>
               <a:ext uri="{28A0092B-C50C-407E-A947-70E740481C1C}">
                 <a14:useLocalDpi xmlns:a14="http://schemas.microsoft.com/office/drawing/2010/main" val="0"/>
@@ -7804,12 +10183,12 @@
   <p:clrMapOvr>
     <a:masterClrMapping/>
   </p:clrMapOvr>
-  <mc:AlternateContent xmlns:mc="http://schemas.openxmlformats.org/markup-compatibility/2006" xmlns:p14="http://schemas.microsoft.com/office/powerpoint/2010/main">
-    <mc:Choice Requires="p14">
-      <p:transition spd="slow" p14:dur="2000" advTm="15000"/>
+  <mc:AlternateContent xmlns:mc="http://schemas.openxmlformats.org/markup-compatibility/2006">
+    <mc:Choice xmlns:p14="http://schemas.microsoft.com/office/powerpoint/2010/main" Requires="p14">
+      <p:transition spd="slow" p14:dur="2000" advClick="0" advTm="15000"/>
     </mc:Choice>
-    <mc:Fallback xmlns="">
-      <p:transition spd="slow" advTm="15000"/>
+    <mc:Fallback>
+      <p:transition spd="slow" advClick="0" advTm="15000"/>
     </mc:Fallback>
   </mc:AlternateContent>
   <p:timing>
@@ -8102,7 +10481,7 @@
           </p:nvPr>
         </p:nvPicPr>
         <p:blipFill>
-          <a:blip r:embed="rId2">
+          <a:blip r:embed="rId3">
             <a:extLst>
               <a:ext uri="{28A0092B-C50C-407E-A947-70E740481C1C}">
                 <a14:useLocalDpi xmlns:a14="http://schemas.microsoft.com/office/drawing/2010/main" val="0"/>
@@ -8132,7 +10511,7 @@
           <p:nvPr/>
         </p:nvPicPr>
         <p:blipFill>
-          <a:blip r:embed="rId3">
+          <a:blip r:embed="rId4">
             <a:extLst>
               <a:ext uri="{28A0092B-C50C-407E-A947-70E740481C1C}">
                 <a14:useLocalDpi xmlns:a14="http://schemas.microsoft.com/office/drawing/2010/main" val="0"/>
@@ -8406,12 +10785,12 @@
   <p:clrMapOvr>
     <a:masterClrMapping/>
   </p:clrMapOvr>
-  <mc:AlternateContent xmlns:mc="http://schemas.openxmlformats.org/markup-compatibility/2006" xmlns:p14="http://schemas.microsoft.com/office/powerpoint/2010/main">
-    <mc:Choice Requires="p14">
-      <p:transition spd="slow" p14:dur="2000" advTm="15000"/>
+  <mc:AlternateContent xmlns:mc="http://schemas.openxmlformats.org/markup-compatibility/2006">
+    <mc:Choice xmlns:p14="http://schemas.microsoft.com/office/powerpoint/2010/main" Requires="p14">
+      <p:transition spd="slow" p14:dur="2000" advClick="0" advTm="15000"/>
     </mc:Choice>
-    <mc:Fallback xmlns="">
-      <p:transition spd="slow" advTm="15000"/>
+    <mc:Fallback>
+      <p:transition spd="slow" advClick="0" advTm="15000"/>
     </mc:Fallback>
   </mc:AlternateContent>
   <p:timing>
@@ -8688,12 +11067,12 @@
   <p:clrMapOvr>
     <a:masterClrMapping/>
   </p:clrMapOvr>
-  <mc:AlternateContent xmlns:mc="http://schemas.openxmlformats.org/markup-compatibility/2006" xmlns:p14="http://schemas.microsoft.com/office/powerpoint/2010/main">
-    <mc:Choice Requires="p14">
-      <p:transition spd="slow" p14:dur="2000" advTm="15000"/>
+  <mc:AlternateContent xmlns:mc="http://schemas.openxmlformats.org/markup-compatibility/2006">
+    <mc:Choice xmlns:p14="http://schemas.microsoft.com/office/powerpoint/2010/main" Requires="p14">
+      <p:transition spd="slow" p14:dur="2000" advClick="0" advTm="15000"/>
     </mc:Choice>
-    <mc:Fallback xmlns="">
-      <p:transition spd="slow" advTm="15000"/>
+    <mc:Fallback>
+      <p:transition spd="slow" advClick="0" advTm="15000"/>
     </mc:Fallback>
   </mc:AlternateContent>
   <p:timing>
@@ -8756,7 +11135,12 @@
             <p:ph idx="1"/>
           </p:nvPr>
         </p:nvSpPr>
-        <p:spPr/>
+        <p:spPr>
+          <a:xfrm>
+            <a:off x="838200" y="1825624"/>
+            <a:ext cx="10515600" cy="4619999"/>
+          </a:xfrm>
+        </p:spPr>
         <p:txBody>
           <a:bodyPr>
             <a:normAutofit fontScale="92500" lnSpcReduction="20000"/>
@@ -8835,7 +11219,18 @@
             <a:pPr lvl="1"/>
             <a:r>
               <a:rPr lang="en-US" dirty="0" smtClean="0"/>
-              <a:t>… is Philadelphia on the verge of an economic boom?</a:t>
+              <a:t>… is Philadelphia on the verge of an economic boom</a:t>
+            </a:r>
+            <a:r>
+              <a:rPr lang="en-US" dirty="0" smtClean="0"/>
+              <a:t>?</a:t>
+            </a:r>
+          </a:p>
+          <a:p>
+            <a:pPr lvl="1"/>
+            <a:r>
+              <a:rPr lang="en-US" dirty="0" smtClean="0"/>
+              <a:t>… are all population groups benefiting?</a:t>
             </a:r>
             <a:endParaRPr lang="en-US" dirty="0"/>
           </a:p>
@@ -9102,12 +11497,12 @@
   <p:clrMapOvr>
     <a:masterClrMapping/>
   </p:clrMapOvr>
-  <mc:AlternateContent xmlns:mc="http://schemas.openxmlformats.org/markup-compatibility/2006" xmlns:p14="http://schemas.microsoft.com/office/powerpoint/2010/main">
-    <mc:Choice Requires="p14">
-      <p:transition spd="slow" p14:dur="2000" advTm="15000"/>
+  <mc:AlternateContent xmlns:mc="http://schemas.openxmlformats.org/markup-compatibility/2006">
+    <mc:Choice xmlns:p14="http://schemas.microsoft.com/office/powerpoint/2010/main" Requires="p14">
+      <p:transition spd="slow" p14:dur="2000" advClick="0" advTm="15000"/>
     </mc:Choice>
-    <mc:Fallback xmlns="">
-      <p:transition spd="slow" advTm="15000"/>
+    <mc:Fallback>
+      <p:transition spd="slow" advClick="0" advTm="15000"/>
     </mc:Fallback>
   </mc:AlternateContent>
   <p:timing>
@@ -9403,7 +11798,6 @@
               <a:rPr lang="en-US" dirty="0"/>
               <a:t>What’s next? (in Part 2)</a:t>
             </a:r>
-            <a:endParaRPr lang="en-US" dirty="0"/>
           </a:p>
         </p:txBody>
       </p:sp>
@@ -9574,12 +11968,12 @@
   <p:clrMapOvr>
     <a:masterClrMapping/>
   </p:clrMapOvr>
-  <mc:AlternateContent xmlns:mc="http://schemas.openxmlformats.org/markup-compatibility/2006" xmlns:p14="http://schemas.microsoft.com/office/powerpoint/2010/main">
-    <mc:Choice Requires="p14">
-      <p:transition spd="slow" p14:dur="2000" advTm="15000"/>
+  <mc:AlternateContent xmlns:mc="http://schemas.openxmlformats.org/markup-compatibility/2006">
+    <mc:Choice xmlns:p14="http://schemas.microsoft.com/office/powerpoint/2010/main" Requires="p14">
+      <p:transition spd="slow" p14:dur="2000" advClick="0" advTm="15000"/>
     </mc:Choice>
-    <mc:Fallback xmlns="">
-      <p:transition spd="slow" advTm="15000"/>
+    <mc:Fallback>
+      <p:transition spd="slow" advClick="0" advTm="15000"/>
     </mc:Fallback>
   </mc:AlternateContent>
   <p:timing>
@@ -9618,7 +12012,7 @@
           <p:nvPr/>
         </p:nvPicPr>
         <p:blipFill>
-          <a:blip r:embed="rId2">
+          <a:blip r:embed="rId3">
             <a:extLst>
               <a:ext uri="{28A0092B-C50C-407E-A947-70E740481C1C}">
                 <a14:useLocalDpi xmlns:a14="http://schemas.microsoft.com/office/drawing/2010/main" val="0"/>
@@ -9671,7 +12065,7 @@
           <p:nvPr/>
         </p:nvPicPr>
         <p:blipFill>
-          <a:blip r:embed="rId3">
+          <a:blip r:embed="rId4">
             <a:extLst>
               <a:ext uri="{28A0092B-C50C-407E-A947-70E740481C1C}">
                 <a14:useLocalDpi xmlns:a14="http://schemas.microsoft.com/office/drawing/2010/main" val="0"/>
@@ -9701,7 +12095,7 @@
           <p:nvPr/>
         </p:nvPicPr>
         <p:blipFill>
-          <a:blip r:embed="rId4" cstate="print">
+          <a:blip r:embed="rId5" cstate="print">
             <a:extLst>
               <a:ext uri="{28A0092B-C50C-407E-A947-70E740481C1C}">
                 <a14:useLocalDpi xmlns:a14="http://schemas.microsoft.com/office/drawing/2010/main" val="0"/>
@@ -9731,7 +12125,7 @@
           <p:nvPr/>
         </p:nvPicPr>
         <p:blipFill>
-          <a:blip r:embed="rId5" cstate="print">
+          <a:blip r:embed="rId6" cstate="print">
             <a:extLst>
               <a:ext uri="{28A0092B-C50C-407E-A947-70E740481C1C}">
                 <a14:useLocalDpi xmlns:a14="http://schemas.microsoft.com/office/drawing/2010/main" val="0"/>
@@ -9763,7 +12157,7 @@
           </p:nvPr>
         </p:nvPicPr>
         <p:blipFill>
-          <a:blip r:embed="rId6" cstate="print">
+          <a:blip r:embed="rId7" cstate="print">
             <a:extLst>
               <a:ext uri="{28A0092B-C50C-407E-A947-70E740481C1C}">
                 <a14:useLocalDpi xmlns:a14="http://schemas.microsoft.com/office/drawing/2010/main" val="0"/>
@@ -9790,7 +12184,7 @@
           <p:nvPr/>
         </p:nvPicPr>
         <p:blipFill>
-          <a:blip r:embed="rId7">
+          <a:blip r:embed="rId8">
             <a:extLst>
               <a:ext uri="{28A0092B-C50C-407E-A947-70E740481C1C}">
                 <a14:useLocalDpi xmlns:a14="http://schemas.microsoft.com/office/drawing/2010/main" val="0"/>
@@ -9820,7 +12214,7 @@
           <p:nvPr/>
         </p:nvPicPr>
         <p:blipFill>
-          <a:blip r:embed="rId8" cstate="print">
+          <a:blip r:embed="rId9" cstate="print">
             <a:extLst>
               <a:ext uri="{28A0092B-C50C-407E-A947-70E740481C1C}">
                 <a14:useLocalDpi xmlns:a14="http://schemas.microsoft.com/office/drawing/2010/main" val="0"/>
@@ -9850,7 +12244,7 @@
           <p:nvPr/>
         </p:nvPicPr>
         <p:blipFill>
-          <a:blip r:embed="rId9">
+          <a:blip r:embed="rId10">
             <a:extLst>
               <a:ext uri="{28A0092B-C50C-407E-A947-70E740481C1C}">
                 <a14:useLocalDpi xmlns:a14="http://schemas.microsoft.com/office/drawing/2010/main" val="0"/>
@@ -9880,7 +12274,7 @@
           <p:nvPr/>
         </p:nvPicPr>
         <p:blipFill>
-          <a:blip r:embed="rId10">
+          <a:blip r:embed="rId11">
             <a:extLst>
               <a:ext uri="{28A0092B-C50C-407E-A947-70E740481C1C}">
                 <a14:useLocalDpi xmlns:a14="http://schemas.microsoft.com/office/drawing/2010/main" val="0"/>
@@ -9910,7 +12304,7 @@
           <p:nvPr/>
         </p:nvPicPr>
         <p:blipFill>
-          <a:blip r:embed="rId11">
+          <a:blip r:embed="rId12">
             <a:extLst>
               <a:ext uri="{28A0092B-C50C-407E-A947-70E740481C1C}">
                 <a14:useLocalDpi xmlns:a14="http://schemas.microsoft.com/office/drawing/2010/main" val="0"/>
@@ -9940,7 +12334,7 @@
           <p:nvPr/>
         </p:nvPicPr>
         <p:blipFill>
-          <a:blip r:embed="rId12" cstate="print">
+          <a:blip r:embed="rId13" cstate="print">
             <a:extLst>
               <a:ext uri="{28A0092B-C50C-407E-A947-70E740481C1C}">
                 <a14:useLocalDpi xmlns:a14="http://schemas.microsoft.com/office/drawing/2010/main" val="0"/>
@@ -9970,7 +12364,7 @@
           <p:nvPr/>
         </p:nvPicPr>
         <p:blipFill>
-          <a:blip r:embed="rId13" cstate="print">
+          <a:blip r:embed="rId14" cstate="print">
             <a:extLst>
               <a:ext uri="{28A0092B-C50C-407E-A947-70E740481C1C}">
                 <a14:useLocalDpi xmlns:a14="http://schemas.microsoft.com/office/drawing/2010/main" val="0"/>
@@ -10001,12 +12395,12 @@
   <p:clrMapOvr>
     <a:masterClrMapping/>
   </p:clrMapOvr>
-  <mc:AlternateContent xmlns:mc="http://schemas.openxmlformats.org/markup-compatibility/2006" xmlns:p14="http://schemas.microsoft.com/office/powerpoint/2010/main">
-    <mc:Choice Requires="p14">
-      <p:transition spd="slow" p14:dur="2000" advTm="15000"/>
+  <mc:AlternateContent xmlns:mc="http://schemas.openxmlformats.org/markup-compatibility/2006">
+    <mc:Choice xmlns:p14="http://schemas.microsoft.com/office/powerpoint/2010/main" Requires="p14">
+      <p:transition spd="slow" p14:dur="2000" advClick="0" advTm="15000"/>
     </mc:Choice>
-    <mc:Fallback xmlns="">
-      <p:transition spd="slow" advTm="15000"/>
+    <mc:Fallback>
+      <p:transition spd="slow" advClick="0" advTm="15000"/>
     </mc:Fallback>
   </mc:AlternateContent>
   <p:timing>
@@ -10608,7 +13002,7 @@
           <p:nvPr/>
         </p:nvPicPr>
         <p:blipFill>
-          <a:blip r:embed="rId2">
+          <a:blip r:embed="rId3" cstate="print">
             <a:extLst>
               <a:ext uri="{28A0092B-C50C-407E-A947-70E740481C1C}">
                 <a14:useLocalDpi xmlns:a14="http://schemas.microsoft.com/office/drawing/2010/main" val="0"/>
@@ -10812,12 +13206,12 @@
   <p:clrMapOvr>
     <a:masterClrMapping/>
   </p:clrMapOvr>
-  <mc:AlternateContent xmlns:mc="http://schemas.openxmlformats.org/markup-compatibility/2006" xmlns:p14="http://schemas.microsoft.com/office/powerpoint/2010/main">
-    <mc:Choice Requires="p14">
-      <p:transition spd="slow" p14:dur="2000" advTm="15000"/>
+  <mc:AlternateContent xmlns:mc="http://schemas.openxmlformats.org/markup-compatibility/2006">
+    <mc:Choice xmlns:p14="http://schemas.microsoft.com/office/powerpoint/2010/main" Requires="p14">
+      <p:transition spd="slow" p14:dur="2000" advClick="0" advTm="15000"/>
     </mc:Choice>
-    <mc:Fallback xmlns="">
-      <p:transition spd="slow" advTm="15000"/>
+    <mc:Fallback>
+      <p:transition spd="slow" advClick="0" advTm="15000"/>
     </mc:Fallback>
   </mc:AlternateContent>
   <p:timing>
@@ -10874,7 +13268,6 @@
               <a:rPr lang="en-US" dirty="0"/>
               <a:t>indicators</a:t>
             </a:r>
-            <a:endParaRPr lang="en-US" dirty="0"/>
           </a:p>
         </p:txBody>
       </p:sp>
@@ -10891,7 +13284,7 @@
         <p:spPr/>
         <p:txBody>
           <a:bodyPr>
-            <a:normAutofit lnSpcReduction="10000"/>
+            <a:normAutofit fontScale="92500" lnSpcReduction="10000"/>
           </a:bodyPr>
           <a:lstStyle/>
           <a:p>
@@ -10904,7 +13297,15 @@
             <a:pPr lvl="1"/>
             <a:r>
               <a:rPr lang="en-US" dirty="0" smtClean="0"/>
-              <a:t>Use employment figures across </a:t>
+              <a:t>Use employment </a:t>
+            </a:r>
+            <a:r>
+              <a:rPr lang="en-US" dirty="0" smtClean="0"/>
+              <a:t>and population figures </a:t>
+            </a:r>
+            <a:r>
+              <a:rPr lang="en-US" dirty="0" smtClean="0"/>
+              <a:t>across </a:t>
             </a:r>
             <a:r>
               <a:rPr lang="en-US" dirty="0"/>
@@ -10912,7 +13313,11 @@
             </a:r>
             <a:r>
               <a:rPr lang="en-US" dirty="0" smtClean="0"/>
-              <a:t>time as an indicator of </a:t>
+              <a:t>time as </a:t>
+            </a:r>
+            <a:r>
+              <a:rPr lang="en-US" dirty="0" smtClean="0"/>
+              <a:t>indicators/predictors of growth</a:t>
             </a:r>
             <a:endParaRPr lang="en-US" dirty="0"/>
           </a:p>
@@ -11030,12 +13435,12 @@
   <p:clrMapOvr>
     <a:masterClrMapping/>
   </p:clrMapOvr>
-  <mc:AlternateContent xmlns:mc="http://schemas.openxmlformats.org/markup-compatibility/2006" xmlns:p14="http://schemas.microsoft.com/office/powerpoint/2010/main">
-    <mc:Choice Requires="p14">
-      <p:transition spd="slow" p14:dur="2000" advTm="15000"/>
+  <mc:AlternateContent xmlns:mc="http://schemas.openxmlformats.org/markup-compatibility/2006">
+    <mc:Choice xmlns:p14="http://schemas.microsoft.com/office/powerpoint/2010/main" Requires="p14">
+      <p:transition spd="slow" p14:dur="2000" advClick="0" advTm="15000"/>
     </mc:Choice>
-    <mc:Fallback xmlns="">
-      <p:transition spd="slow" advTm="15000"/>
+    <mc:Fallback>
+      <p:transition spd="slow" advClick="0" advTm="15000"/>
     </mc:Fallback>
   </mc:AlternateContent>
   <p:timing>
@@ -11082,7 +13487,15 @@
           <a:p>
             <a:r>
               <a:rPr lang="en-US" dirty="0" smtClean="0"/>
-              <a:t>Compared to…</a:t>
+              <a:t>Compared to</a:t>
+            </a:r>
+            <a:r>
+              <a:rPr lang="en-US" dirty="0" smtClean="0"/>
+              <a:t>… two different </a:t>
+            </a:r>
+            <a:r>
+              <a:rPr lang="en-US" dirty="0" err="1" smtClean="0"/>
+              <a:t>goups</a:t>
             </a:r>
             <a:endParaRPr lang="en-US" dirty="0"/>
           </a:p>
@@ -11213,7 +13626,7 @@
           <p:nvPr/>
         </p:nvPicPr>
         <p:blipFill>
-          <a:blip r:embed="rId2">
+          <a:blip r:embed="rId3">
             <a:extLst>
               <a:ext uri="{28A0092B-C50C-407E-A947-70E740481C1C}">
                 <a14:useLocalDpi xmlns:a14="http://schemas.microsoft.com/office/drawing/2010/main" val="0"/>
@@ -13909,13 +16322,13 @@
             </a:r>
             <a:r>
               <a:rPr lang="en-US" sz="1000" dirty="0">
-                <a:hlinkClick r:id="rId3"/>
+                <a:hlinkClick r:id="rId4"/>
               </a:rPr>
               <a:t>https://</a:t>
             </a:r>
             <a:r>
               <a:rPr lang="en-US" sz="1000" dirty="0" smtClean="0">
-                <a:hlinkClick r:id="rId3"/>
+                <a:hlinkClick r:id="rId4"/>
               </a:rPr>
               <a:t>en.wikipedia.org/wiki/List_of_United_States_cities_by_population</a:t>
             </a:r>
@@ -13937,12 +16350,12 @@
   <p:clrMapOvr>
     <a:masterClrMapping/>
   </p:clrMapOvr>
-  <mc:AlternateContent xmlns:mc="http://schemas.openxmlformats.org/markup-compatibility/2006" xmlns:p14="http://schemas.microsoft.com/office/powerpoint/2010/main">
-    <mc:Choice Requires="p14">
-      <p:transition spd="slow" p14:dur="2000" advTm="15000"/>
+  <mc:AlternateContent xmlns:mc="http://schemas.openxmlformats.org/markup-compatibility/2006">
+    <mc:Choice xmlns:p14="http://schemas.microsoft.com/office/powerpoint/2010/main" Requires="p14">
+      <p:transition spd="slow" p14:dur="2000" advClick="0" advTm="15000"/>
     </mc:Choice>
-    <mc:Fallback xmlns="">
-      <p:transition spd="slow" advTm="15000"/>
+    <mc:Fallback>
+      <p:transition spd="slow" advClick="0" advTm="15000"/>
     </mc:Fallback>
   </mc:AlternateContent>
   <p:timing>
@@ -13989,11 +16402,7 @@
           <a:p>
             <a:r>
               <a:rPr lang="en-US" dirty="0" smtClean="0"/>
-              <a:t>Center City </a:t>
-            </a:r>
-            <a:r>
-              <a:rPr lang="en-US" dirty="0" smtClean="0"/>
-              <a:t>Reports</a:t>
+              <a:t>Center City Reports</a:t>
             </a:r>
             <a:endParaRPr lang="en-US" dirty="0"/>
           </a:p>
@@ -14010,7 +16419,7 @@
           </p:nvPr>
         </p:nvPicPr>
         <p:blipFill>
-          <a:blip r:embed="rId2">
+          <a:blip r:embed="rId3">
             <a:extLst>
               <a:ext uri="{28A0092B-C50C-407E-A947-70E740481C1C}">
                 <a14:useLocalDpi xmlns:a14="http://schemas.microsoft.com/office/drawing/2010/main" val="0"/>
@@ -14078,7 +16487,7 @@
           <p:nvPr/>
         </p:nvPicPr>
         <p:blipFill>
-          <a:blip r:embed="rId3">
+          <a:blip r:embed="rId4">
             <a:extLst>
               <a:ext uri="{28A0092B-C50C-407E-A947-70E740481C1C}">
                 <a14:useLocalDpi xmlns:a14="http://schemas.microsoft.com/office/drawing/2010/main" val="0"/>
@@ -14113,7 +16522,7 @@
           <p:nvPr/>
         </p:nvPicPr>
         <p:blipFill>
-          <a:blip r:embed="rId4">
+          <a:blip r:embed="rId5">
             <a:extLst>
               <a:ext uri="{28A0092B-C50C-407E-A947-70E740481C1C}">
                 <a14:useLocalDpi xmlns:a14="http://schemas.microsoft.com/office/drawing/2010/main" val="0"/>
@@ -14230,13 +16639,13 @@
             </a:r>
             <a:r>
               <a:rPr lang="en-US" sz="1000" dirty="0">
-                <a:hlinkClick r:id="rId5"/>
+                <a:hlinkClick r:id="rId6"/>
               </a:rPr>
               <a:t>https://</a:t>
             </a:r>
             <a:r>
               <a:rPr lang="en-US" sz="1000" dirty="0" smtClean="0">
-                <a:hlinkClick r:id="rId5"/>
+                <a:hlinkClick r:id="rId6"/>
               </a:rPr>
               <a:t>www.centercityphila.org/research-reports/philadelphia-an-incomplete-revival</a:t>
             </a:r>
@@ -14258,12 +16667,12 @@
   <p:clrMapOvr>
     <a:masterClrMapping/>
   </p:clrMapOvr>
-  <mc:AlternateContent xmlns:mc="http://schemas.openxmlformats.org/markup-compatibility/2006" xmlns:p14="http://schemas.microsoft.com/office/powerpoint/2010/main">
-    <mc:Choice Requires="p14">
-      <p:transition spd="slow" p14:dur="2000" advTm="15000"/>
+  <mc:AlternateContent xmlns:mc="http://schemas.openxmlformats.org/markup-compatibility/2006">
+    <mc:Choice xmlns:p14="http://schemas.microsoft.com/office/powerpoint/2010/main" Requires="p14">
+      <p:transition spd="slow" p14:dur="2000" advClick="0" advTm="15000"/>
     </mc:Choice>
-    <mc:Fallback xmlns="">
-      <p:transition spd="slow" advTm="15000"/>
+    <mc:Fallback>
+      <p:transition spd="slow" advClick="0" advTm="15000"/>
     </mc:Fallback>
   </mc:AlternateContent>
   <p:timing>
@@ -14334,7 +16743,7 @@
                               <p:par>
                                 <p:cTn id="9" presetID="1" presetClass="entr" presetSubtype="0" fill="hold" nodeType="clickEffect">
                                   <p:stCondLst>
-                                    <p:cond delay="5000"/>
+                                    <p:cond delay="4000"/>
                                   </p:stCondLst>
                                   <p:childTnLst>
                                     <p:set>
@@ -14379,7 +16788,7 @@
                               <p:par>
                                 <p:cTn id="13" presetID="1" presetClass="entr" presetSubtype="0" fill="hold" nodeType="clickEffect">
                                   <p:stCondLst>
-                                    <p:cond delay="5000"/>
+                                    <p:cond delay="4000"/>
                                   </p:stCondLst>
                                   <p:childTnLst>
                                     <p:set>
@@ -14485,7 +16894,7 @@
           </p:nvPr>
         </p:nvPicPr>
         <p:blipFill>
-          <a:blip r:embed="rId2">
+          <a:blip r:embed="rId3">
             <a:extLst>
               <a:ext uri="{28A0092B-C50C-407E-A947-70E740481C1C}">
                 <a14:useLocalDpi xmlns:a14="http://schemas.microsoft.com/office/drawing/2010/main" val="0"/>
@@ -14548,7 +16957,7 @@
           <p:nvPr/>
         </p:nvPicPr>
         <p:blipFill>
-          <a:blip r:embed="rId3">
+          <a:blip r:embed="rId4">
             <a:extLst>
               <a:ext uri="{28A0092B-C50C-407E-A947-70E740481C1C}">
                 <a14:useLocalDpi xmlns:a14="http://schemas.microsoft.com/office/drawing/2010/main" val="0"/>
@@ -14578,7 +16987,7 @@
           <p:nvPr/>
         </p:nvPicPr>
         <p:blipFill>
-          <a:blip r:embed="rId4">
+          <a:blip r:embed="rId5">
             <a:extLst>
               <a:ext uri="{28A0092B-C50C-407E-A947-70E740481C1C}">
                 <a14:useLocalDpi xmlns:a14="http://schemas.microsoft.com/office/drawing/2010/main" val="0"/>
@@ -14686,13 +17095,13 @@
             </a:r>
             <a:r>
               <a:rPr lang="en-US" sz="1000" dirty="0">
-                <a:hlinkClick r:id="rId5"/>
+                <a:hlinkClick r:id="rId6"/>
               </a:rPr>
               <a:t>https://www.brookings.edu/research/metro-monitor-2017</a:t>
             </a:r>
             <a:r>
               <a:rPr lang="en-US" sz="1000" dirty="0" smtClean="0">
-                <a:hlinkClick r:id="rId5"/>
+                <a:hlinkClick r:id="rId6"/>
               </a:rPr>
               <a:t>/</a:t>
             </a:r>
@@ -14714,12 +17123,12 @@
   <p:clrMapOvr>
     <a:masterClrMapping/>
   </p:clrMapOvr>
-  <mc:AlternateContent xmlns:mc="http://schemas.openxmlformats.org/markup-compatibility/2006" xmlns:p14="http://schemas.microsoft.com/office/powerpoint/2010/main">
-    <mc:Choice Requires="p14">
-      <p:transition spd="slow" p14:dur="2000" advTm="15000"/>
+  <mc:AlternateContent xmlns:mc="http://schemas.openxmlformats.org/markup-compatibility/2006">
+    <mc:Choice xmlns:p14="http://schemas.microsoft.com/office/powerpoint/2010/main" Requires="p14">
+      <p:transition spd="slow" p14:dur="2000" advClick="0" advTm="15000"/>
     </mc:Choice>
-    <mc:Fallback xmlns="">
-      <p:transition spd="slow" advTm="15000"/>
+    <mc:Fallback>
+      <p:transition spd="slow" advClick="0" advTm="15000"/>
     </mc:Fallback>
   </mc:AlternateContent>
   <p:timing>
@@ -14964,7 +17373,7 @@
             </a:r>
             <a:r>
               <a:rPr lang="en-US" dirty="0" smtClean="0">
-                <a:hlinkClick r:id="rId2"/>
+                <a:hlinkClick r:id="rId3"/>
               </a:rPr>
               <a:t>http://census.gov</a:t>
             </a:r>
@@ -14994,7 +17403,7 @@
             </a:r>
             <a:r>
               <a:rPr lang="en-US" dirty="0" smtClean="0">
-                <a:hlinkClick r:id="rId3"/>
+                <a:hlinkClick r:id="rId4"/>
               </a:rPr>
               <a:t>http://www.bls.gov</a:t>
             </a:r>
@@ -15106,13 +17515,13 @@
             </a:r>
             <a:r>
               <a:rPr lang="en-US" sz="1000" dirty="0">
-                <a:hlinkClick r:id="rId4"/>
+                <a:hlinkClick r:id="rId5"/>
               </a:rPr>
               <a:t>http://wikitable2csv.ggor.de</a:t>
             </a:r>
             <a:r>
               <a:rPr lang="en-US" sz="1000" dirty="0" smtClean="0">
-                <a:hlinkClick r:id="rId4"/>
+                <a:hlinkClick r:id="rId5"/>
               </a:rPr>
               <a:t>/</a:t>
             </a:r>
@@ -15130,12 +17539,12 @@
   <p:clrMapOvr>
     <a:masterClrMapping/>
   </p:clrMapOvr>
-  <mc:AlternateContent xmlns:mc="http://schemas.openxmlformats.org/markup-compatibility/2006" xmlns:p14="http://schemas.microsoft.com/office/powerpoint/2010/main">
-    <mc:Choice Requires="p14">
-      <p:transition spd="slow" p14:dur="2000" advTm="15000"/>
+  <mc:AlternateContent xmlns:mc="http://schemas.openxmlformats.org/markup-compatibility/2006">
+    <mc:Choice xmlns:p14="http://schemas.microsoft.com/office/powerpoint/2010/main" Requires="p14">
+      <p:transition spd="slow" p14:dur="2000" advClick="0" advTm="15000"/>
     </mc:Choice>
-    <mc:Fallback xmlns="">
-      <p:transition spd="slow" advTm="15000"/>
+    <mc:Fallback>
+      <p:transition spd="slow" advClick="0" advTm="15000"/>
     </mc:Fallback>
   </mc:AlternateContent>
   <p:timing>
@@ -15407,4 +17816,265 @@
     </a:ext>
   </a:extLst>
 </a:theme>
+</file>
+
+<file path=ppt/theme/theme2.xml><?xml version="1.0" encoding="utf-8"?>
+<a:theme xmlns:a="http://schemas.openxmlformats.org/drawingml/2006/main" name="Office Theme">
+  <a:themeElements>
+    <a:clrScheme name="Office">
+      <a:dk1>
+        <a:sysClr val="windowText" lastClr="000000"/>
+      </a:dk1>
+      <a:lt1>
+        <a:sysClr val="window" lastClr="FFFFFF"/>
+      </a:lt1>
+      <a:dk2>
+        <a:srgbClr val="44546A"/>
+      </a:dk2>
+      <a:lt2>
+        <a:srgbClr val="E7E6E6"/>
+      </a:lt2>
+      <a:accent1>
+        <a:srgbClr val="5B9BD5"/>
+      </a:accent1>
+      <a:accent2>
+        <a:srgbClr val="ED7D31"/>
+      </a:accent2>
+      <a:accent3>
+        <a:srgbClr val="A5A5A5"/>
+      </a:accent3>
+      <a:accent4>
+        <a:srgbClr val="FFC000"/>
+      </a:accent4>
+      <a:accent5>
+        <a:srgbClr val="4472C4"/>
+      </a:accent5>
+      <a:accent6>
+        <a:srgbClr val="70AD47"/>
+      </a:accent6>
+      <a:hlink>
+        <a:srgbClr val="0563C1"/>
+      </a:hlink>
+      <a:folHlink>
+        <a:srgbClr val="954F72"/>
+      </a:folHlink>
+    </a:clrScheme>
+    <a:fontScheme name="Office">
+      <a:majorFont>
+        <a:latin typeface="Calibri Light" panose="020F0302020204030204"/>
+        <a:ea typeface=""/>
+        <a:cs typeface=""/>
+        <a:font script="Jpan" typeface="ＭＳ Ｐゴシック"/>
+        <a:font script="Hang" typeface="맑은 고딕"/>
+        <a:font script="Hans" typeface="宋体"/>
+        <a:font script="Hant" typeface="新細明體"/>
+        <a:font script="Arab" typeface="Times New Roman"/>
+        <a:font script="Hebr" typeface="Times New Roman"/>
+        <a:font script="Thai" typeface="Angsana New"/>
+        <a:font script="Ethi" typeface="Nyala"/>
+        <a:font script="Beng" typeface="Vrinda"/>
+        <a:font script="Gujr" typeface="Shruti"/>
+        <a:font script="Khmr" typeface="MoolBoran"/>
+        <a:font script="Knda" typeface="Tunga"/>
+        <a:font script="Guru" typeface="Raavi"/>
+        <a:font script="Cans" typeface="Euphemia"/>
+        <a:font script="Cher" typeface="Plantagenet Cherokee"/>
+        <a:font script="Yiii" typeface="Microsoft Yi Baiti"/>
+        <a:font script="Tibt" typeface="Microsoft Himalaya"/>
+        <a:font script="Thaa" typeface="MV Boli"/>
+        <a:font script="Deva" typeface="Mangal"/>
+        <a:font script="Telu" typeface="Gautami"/>
+        <a:font script="Taml" typeface="Latha"/>
+        <a:font script="Syrc" typeface="Estrangelo Edessa"/>
+        <a:font script="Orya" typeface="Kalinga"/>
+        <a:font script="Mlym" typeface="Kartika"/>
+        <a:font script="Laoo" typeface="DokChampa"/>
+        <a:font script="Sinh" typeface="Iskoola Pota"/>
+        <a:font script="Mong" typeface="Mongolian Baiti"/>
+        <a:font script="Viet" typeface="Times New Roman"/>
+        <a:font script="Uigh" typeface="Microsoft Uighur"/>
+        <a:font script="Geor" typeface="Sylfaen"/>
+      </a:majorFont>
+      <a:minorFont>
+        <a:latin typeface="Calibri" panose="020F0502020204030204"/>
+        <a:ea typeface=""/>
+        <a:cs typeface=""/>
+        <a:font script="Jpan" typeface="ＭＳ Ｐゴシック"/>
+        <a:font script="Hang" typeface="맑은 고딕"/>
+        <a:font script="Hans" typeface="宋体"/>
+        <a:font script="Hant" typeface="新細明體"/>
+        <a:font script="Arab" typeface="Arial"/>
+        <a:font script="Hebr" typeface="Arial"/>
+        <a:font script="Thai" typeface="Cordia New"/>
+        <a:font script="Ethi" typeface="Nyala"/>
+        <a:font script="Beng" typeface="Vrinda"/>
+        <a:font script="Gujr" typeface="Shruti"/>
+        <a:font script="Khmr" typeface="DaunPenh"/>
+        <a:font script="Knda" typeface="Tunga"/>
+        <a:font script="Guru" typeface="Raavi"/>
+        <a:font script="Cans" typeface="Euphemia"/>
+        <a:font script="Cher" typeface="Plantagenet Cherokee"/>
+        <a:font script="Yiii" typeface="Microsoft Yi Baiti"/>
+        <a:font script="Tibt" typeface="Microsoft Himalaya"/>
+        <a:font script="Thaa" typeface="MV Boli"/>
+        <a:font script="Deva" typeface="Mangal"/>
+        <a:font script="Telu" typeface="Gautami"/>
+        <a:font script="Taml" typeface="Latha"/>
+        <a:font script="Syrc" typeface="Estrangelo Edessa"/>
+        <a:font script="Orya" typeface="Kalinga"/>
+        <a:font script="Mlym" typeface="Kartika"/>
+        <a:font script="Laoo" typeface="DokChampa"/>
+        <a:font script="Sinh" typeface="Iskoola Pota"/>
+        <a:font script="Mong" typeface="Mongolian Baiti"/>
+        <a:font script="Viet" typeface="Arial"/>
+        <a:font script="Uigh" typeface="Microsoft Uighur"/>
+        <a:font script="Geor" typeface="Sylfaen"/>
+      </a:minorFont>
+    </a:fontScheme>
+    <a:fmtScheme name="Office">
+      <a:fillStyleLst>
+        <a:solidFill>
+          <a:schemeClr val="phClr"/>
+        </a:solidFill>
+        <a:gradFill rotWithShape="1">
+          <a:gsLst>
+            <a:gs pos="0">
+              <a:schemeClr val="phClr">
+                <a:lumMod val="110000"/>
+                <a:satMod val="105000"/>
+                <a:tint val="67000"/>
+              </a:schemeClr>
+            </a:gs>
+            <a:gs pos="50000">
+              <a:schemeClr val="phClr">
+                <a:lumMod val="105000"/>
+                <a:satMod val="103000"/>
+                <a:tint val="73000"/>
+              </a:schemeClr>
+            </a:gs>
+            <a:gs pos="100000">
+              <a:schemeClr val="phClr">
+                <a:lumMod val="105000"/>
+                <a:satMod val="109000"/>
+                <a:tint val="81000"/>
+              </a:schemeClr>
+            </a:gs>
+          </a:gsLst>
+          <a:lin ang="5400000" scaled="0"/>
+        </a:gradFill>
+        <a:gradFill rotWithShape="1">
+          <a:gsLst>
+            <a:gs pos="0">
+              <a:schemeClr val="phClr">
+                <a:satMod val="103000"/>
+                <a:lumMod val="102000"/>
+                <a:tint val="94000"/>
+              </a:schemeClr>
+            </a:gs>
+            <a:gs pos="50000">
+              <a:schemeClr val="phClr">
+                <a:satMod val="110000"/>
+                <a:lumMod val="100000"/>
+                <a:shade val="100000"/>
+              </a:schemeClr>
+            </a:gs>
+            <a:gs pos="100000">
+              <a:schemeClr val="phClr">
+                <a:lumMod val="99000"/>
+                <a:satMod val="120000"/>
+                <a:shade val="78000"/>
+              </a:schemeClr>
+            </a:gs>
+          </a:gsLst>
+          <a:lin ang="5400000" scaled="0"/>
+        </a:gradFill>
+      </a:fillStyleLst>
+      <a:lnStyleLst>
+        <a:ln w="6350" cap="flat" cmpd="sng" algn="ctr">
+          <a:solidFill>
+            <a:schemeClr val="phClr"/>
+          </a:solidFill>
+          <a:prstDash val="solid"/>
+          <a:miter lim="800000"/>
+        </a:ln>
+        <a:ln w="12700" cap="flat" cmpd="sng" algn="ctr">
+          <a:solidFill>
+            <a:schemeClr val="phClr"/>
+          </a:solidFill>
+          <a:prstDash val="solid"/>
+          <a:miter lim="800000"/>
+        </a:ln>
+        <a:ln w="19050" cap="flat" cmpd="sng" algn="ctr">
+          <a:solidFill>
+            <a:schemeClr val="phClr"/>
+          </a:solidFill>
+          <a:prstDash val="solid"/>
+          <a:miter lim="800000"/>
+        </a:ln>
+      </a:lnStyleLst>
+      <a:effectStyleLst>
+        <a:effectStyle>
+          <a:effectLst/>
+        </a:effectStyle>
+        <a:effectStyle>
+          <a:effectLst/>
+        </a:effectStyle>
+        <a:effectStyle>
+          <a:effectLst>
+            <a:outerShdw blurRad="57150" dist="19050" dir="5400000" algn="ctr" rotWithShape="0">
+              <a:srgbClr val="000000">
+                <a:alpha val="63000"/>
+              </a:srgbClr>
+            </a:outerShdw>
+          </a:effectLst>
+        </a:effectStyle>
+      </a:effectStyleLst>
+      <a:bgFillStyleLst>
+        <a:solidFill>
+          <a:schemeClr val="phClr"/>
+        </a:solidFill>
+        <a:solidFill>
+          <a:schemeClr val="phClr">
+            <a:tint val="95000"/>
+            <a:satMod val="170000"/>
+          </a:schemeClr>
+        </a:solidFill>
+        <a:gradFill rotWithShape="1">
+          <a:gsLst>
+            <a:gs pos="0">
+              <a:schemeClr val="phClr">
+                <a:tint val="93000"/>
+                <a:satMod val="150000"/>
+                <a:shade val="98000"/>
+                <a:lumMod val="102000"/>
+              </a:schemeClr>
+            </a:gs>
+            <a:gs pos="50000">
+              <a:schemeClr val="phClr">
+                <a:tint val="98000"/>
+                <a:satMod val="130000"/>
+                <a:shade val="90000"/>
+                <a:lumMod val="103000"/>
+              </a:schemeClr>
+            </a:gs>
+            <a:gs pos="100000">
+              <a:schemeClr val="phClr">
+                <a:shade val="63000"/>
+                <a:satMod val="120000"/>
+              </a:schemeClr>
+            </a:gs>
+          </a:gsLst>
+          <a:lin ang="5400000" scaled="0"/>
+        </a:gradFill>
+      </a:bgFillStyleLst>
+    </a:fmtScheme>
+  </a:themeElements>
+  <a:objectDefaults/>
+  <a:extraClrSchemeLst/>
+  <a:extLst>
+    <a:ext uri="{05A4C25C-085E-4340-85A3-A5531E510DB2}">
+      <thm15:themeFamily xmlns:thm15="http://schemas.microsoft.com/office/thememl/2012/main" name="Office Theme" id="{62F939B6-93AF-4DB8-9C6B-D6C7DFDC589F}" vid="{4A3C46E8-61CC-4603-A589-7422A47A8E4A}"/>
+    </a:ext>
+  </a:extLst>
+</a:theme>
 </file>
</xml_diff>

<commit_message>
Mid-term presentation: edit to notes (audio portion)
</commit_message>
<xml_diff>
--- a/project/mid-term-presentation.pptx
+++ b/project/mid-term-presentation.pptx
@@ -530,11 +530,11 @@
           <a:p>
             <a:r>
               <a:rPr lang="en-US" baseline="0" dirty="0" smtClean="0"/>
-              <a:t>The Great Recession is almost 10 years behind us. We hear and read reports of economic growth and prosperity. </a:t>
-            </a:r>
-            <a:r>
-              <a:rPr lang="en-US" dirty="0" smtClean="0"/>
-              <a:t>The goal of this project is to evaluate and asses the economic outlook for Philadelphia by looking back into recent history and trying to look forward into the future.</a:t>
+              <a:t>The Great Recession is almost 10 years behind us. We see reports of economic growth and prosperity. </a:t>
+            </a:r>
+            <a:r>
+              <a:rPr lang="en-US" dirty="0" smtClean="0"/>
+              <a:t>The goal of this project is to provide an economic outlook for Philadelphia by looking back into history and looking forward into the future.</a:t>
             </a:r>
             <a:endParaRPr lang="en-US" baseline="0" dirty="0" smtClean="0"/>
           </a:p>
@@ -718,7 +718,7 @@
             </a:r>
             <a:r>
               <a:rPr lang="en-US" baseline="0" dirty="0" smtClean="0"/>
-              <a:t> as possible, and as such have employed transformations and twists, melts and merges in multiple places. </a:t>
+              <a:t> as possible. As such we have employed transformations and twists, melts and merges in multiple places. </a:t>
             </a:r>
             <a:endParaRPr lang="en-US" dirty="0"/>
           </a:p>
@@ -805,16 +805,12 @@
           <a:lstStyle/>
           <a:p>
             <a:r>
-              <a:rPr lang="en-US" dirty="0" smtClean="0"/>
-              <a:t>The Bureau of Labor Statistics </a:t>
-            </a:r>
-            <a:r>
               <a:rPr lang="en-US" dirty="0" err="1" smtClean="0"/>
               <a:t>SeriesID</a:t>
             </a:r>
             <a:r>
               <a:rPr lang="en-US" baseline="0" dirty="0" smtClean="0"/>
-              <a:t> field is a classic case of </a:t>
+              <a:t> is a classic case of </a:t>
             </a:r>
             <a:r>
               <a:rPr lang="en-US" i="1" baseline="0" dirty="0" smtClean="0"/>
@@ -918,7 +914,7 @@
           <a:p>
             <a:r>
               <a:rPr lang="en-US" baseline="0" dirty="0" smtClean="0"/>
-              <a:t>The objective of line charts for time-series data is to gain perspective into the trends. Some of the charts look nice, and we can show some comparisons. But once we add a few too many time-series, it gets kind of messy. We need a better way to present time-series effectively in a group. </a:t>
+              <a:t>The objective of line charts for time-series data is to gain perspective into the trends. Some of the charts look nice, and we can show some comparisons. But once we add a few too many, it gets kind of messy. We need a better way to present time-series effectively in a group. </a:t>
             </a:r>
             <a:endParaRPr lang="en-US" dirty="0"/>
           </a:p>
@@ -1006,11 +1002,11 @@
           <a:p>
             <a:r>
               <a:rPr lang="en-US" dirty="0" smtClean="0"/>
-              <a:t>The “incomplete revival”</a:t>
+              <a:t>The IR</a:t>
             </a:r>
             <a:r>
               <a:rPr lang="en-US" baseline="0" dirty="0" smtClean="0"/>
-              <a:t> positioned percent change in unemployment rate from before The Great Recession and now as an indicator of revival. I thought this was insightful and would be a good measure to include in this report, especially when comparing Philadelphia with other cities. </a:t>
+              <a:t> report positioned the percent change of unemployment rate from before The Great Recession and now as an indicator of revival. I thought this was insightful and would be a good measure to include in this report, especially when comparing Philadelphia with other cities. </a:t>
             </a:r>
             <a:endParaRPr lang="en-US" dirty="0"/>
           </a:p>
@@ -1110,7 +1106,7 @@
             </a:r>
             <a:r>
               <a:rPr lang="en-US" baseline="0" dirty="0" smtClean="0"/>
-              <a:t> But remember, the line chart with six of these time-series was really messy. Here with the </a:t>
+              <a:t> But remember, the line chart with six of these was really messy. Here with the </a:t>
             </a:r>
             <a:r>
               <a:rPr lang="en-US" baseline="0" dirty="0" smtClean="0"/>
@@ -1118,7 +1114,7 @@
             </a:r>
             <a:r>
               <a:rPr lang="en-US" baseline="0" dirty="0" smtClean="0"/>
-              <a:t>bar chart we use small multiples for the time-series of unemployment rate of each city. </a:t>
+              <a:t>bar chart we use small multiples for the time-series of unemployment rate of each city being compared. </a:t>
             </a:r>
             <a:endParaRPr lang="en-US" dirty="0"/>
           </a:p>
@@ -1223,7 +1219,7 @@
             </a:pPr>
             <a:r>
               <a:rPr lang="en-US" baseline="0" dirty="0" smtClean="0"/>
-              <a:t>Plotting each time-series with the national rate serves two purposes: first, to compare each city with the national rate; and second, the inclusion of the common element provides a means to help compare across cities without having explicit plots. The national rate acts like an additional axis. </a:t>
+              <a:t>Plotting each time-series with the national rate serves two purposes: first, to compare the city with the national rate; and second, the inclusion of the common element provides a means to help compare across cities without having explicit or combined plots. The national rate acts like an additional axis. </a:t>
             </a:r>
             <a:endParaRPr lang="en-US" dirty="0" smtClean="0"/>
           </a:p>
@@ -1323,7 +1319,7 @@
             </a:r>
             <a:r>
               <a:rPr lang="en-US" baseline="0" dirty="0" smtClean="0"/>
-              <a:t> saw a major dip in population as manufacturing jobs vanished. The “incomplete revival” report discusses this and other factors which shaped Philadelphia’s current economic landscape. </a:t>
+              <a:t> saw a major dip in population as manufacturing jobs vanished. The IR report discusses this and other factors which shaped Philadelphia’s current business and labor landscape. </a:t>
             </a:r>
             <a:endParaRPr lang="en-US" dirty="0"/>
           </a:p>
@@ -1511,7 +1507,7 @@
           <a:p>
             <a:r>
               <a:rPr lang="en-US" dirty="0" smtClean="0"/>
-              <a:t>Philadelphia has been through a lot of tough times. The post-industrial era has been a mixed bag of population changes, economic changes, and rebuilding starts and stops. The indication is that we have bounced back from the Great Recession,</a:t>
+              <a:t>Philadelphia has seen a lot of tough times. The post-industrial era has been a mixed bag of population changes, economic changes, and rebuilding starts and stops. The indication is that we have bounced back from the Great Recession,</a:t>
             </a:r>
             <a:r>
               <a:rPr lang="en-US" baseline="0" dirty="0" smtClean="0"/>
@@ -2016,7 +2012,7 @@
             </a:r>
             <a:r>
               <a:rPr lang="en-US" baseline="0" dirty="0" smtClean="0"/>
-              <a:t> to answer the question: is a big boom in Philadelphia’s future? There is no shortage of data, and there are many existing reports and regular news reports and articles. We aim to sift through much of this, and create some visualizations to help </a:t>
+              <a:t> to answer: is a big boom in Philadelphia’s future? There is no shortage of data, and there are many existing reports. News media also have regular coverage of this topic. We aim to sift through much of this, and create some visualizations to help </a:t>
             </a:r>
             <a:r>
               <a:rPr lang="en-US" baseline="0" dirty="0" smtClean="0"/>
@@ -2116,7 +2112,7 @@
             </a:r>
             <a:r>
               <a:rPr lang="en-US" baseline="0" dirty="0" smtClean="0"/>
-              <a:t>This creates two rather diverse groups considering: population, location, industry, demographics, and personality.</a:t>
+              <a:t>This creates two rather diverse groups considering: population, location, industry, demographics, and urban personality.</a:t>
             </a:r>
             <a:endParaRPr lang="en-US" dirty="0"/>
           </a:p>
@@ -2204,11 +2200,19 @@
           <a:p>
             <a:r>
               <a:rPr lang="en-US" dirty="0" smtClean="0"/>
-              <a:t>I drew</a:t>
+              <a:t>Early </a:t>
             </a:r>
             <a:r>
               <a:rPr lang="en-US" baseline="0" dirty="0" smtClean="0"/>
-              <a:t> inspiration from Philadelphia: An Incomplete Revival. It provides a lot of background and economic history. The report paints a bleak picture, but hints at a bright sun rising over the horizon. I like how this line chart compares employment over a 45 year span. </a:t>
+              <a:t>inspiration came from </a:t>
+            </a:r>
+            <a:r>
+              <a:rPr lang="en-US" i="1" baseline="0" dirty="0" smtClean="0"/>
+              <a:t>Philadelphia: An Incomplete Revival</a:t>
+            </a:r>
+            <a:r>
+              <a:rPr lang="en-US" baseline="0" dirty="0" smtClean="0"/>
+              <a:t>. It provides a lot of background and history. This report paints a bleak picture. But it also hints at a bright future. I like how their charts show trends over long time periods. </a:t>
             </a:r>
             <a:endParaRPr lang="en-US" dirty="0"/>
           </a:p>
@@ -2296,11 +2300,11 @@
           <a:p>
             <a:r>
               <a:rPr lang="en-US" dirty="0" smtClean="0"/>
-              <a:t>The Brookings Institute</a:t>
+              <a:t>Brookings </a:t>
             </a:r>
             <a:r>
               <a:rPr lang="en-US" baseline="0" dirty="0" smtClean="0"/>
-              <a:t> is well known for their economic and political reporting. I found these stacked line charts interesting, especially their use of a shared x-axis. The map is cool, but clicking on the circles did not reveal any additional detail. </a:t>
+              <a:t>is well known for their economic and political analysis and reporting. I found these stacked line charts interesting, especially their use of a shared x-axis. The map is cool, but clicking on the circles does not reveal any additional detail. </a:t>
             </a:r>
             <a:endParaRPr lang="en-US" dirty="0"/>
           </a:p>
@@ -2388,11 +2392,11 @@
           <a:p>
             <a:r>
               <a:rPr lang="en-US" dirty="0" smtClean="0"/>
-              <a:t>The major sources of data are </a:t>
+              <a:t>The major sources of data are the </a:t>
             </a:r>
             <a:r>
               <a:rPr lang="en-US" baseline="0" dirty="0" smtClean="0"/>
-              <a:t>government agencies. The data came in different formats, and multiple ways. The API approach is really nice because it allows for tailoring queries to get exactly what is needed. This was helpful when exploring and scaling out from concept to project. </a:t>
+              <a:t>government. The data came in different formats, and by multiple ways. The API approach is really nice because it allows for tailoring queries to get exactly what’s needed. This was helpful when exploring and scaling out from concept to project. </a:t>
             </a:r>
             <a:endParaRPr lang="en-US" dirty="0"/>
           </a:p>
@@ -16657,6 +16661,44 @@
           </a:p>
         </p:txBody>
       </p:sp>
+      <p:sp>
+        <p:nvSpPr>
+          <p:cNvPr id="3" name="TextBox 2"/>
+          <p:cNvSpPr txBox="1"/>
+          <p:nvPr/>
+        </p:nvSpPr>
+        <p:spPr>
+          <a:xfrm>
+            <a:off x="10543338" y="172726"/>
+            <a:ext cx="1648978" cy="369332"/>
+          </a:xfrm>
+          <a:prstGeom prst="rect">
+            <a:avLst/>
+          </a:prstGeom>
+          <a:noFill/>
+        </p:spPr>
+        <p:txBody>
+          <a:bodyPr wrap="none" rtlCol="0">
+            <a:spAutoFit/>
+          </a:bodyPr>
+          <a:lstStyle/>
+          <a:p>
+            <a:r>
+              <a:rPr lang="en-US" dirty="0" smtClean="0">
+                <a:solidFill>
+                  <a:srgbClr val="00B050"/>
+                </a:solidFill>
+              </a:rPr>
+              <a:t>The “IR Report”</a:t>
+            </a:r>
+            <a:endParaRPr lang="en-US" dirty="0">
+              <a:solidFill>
+                <a:srgbClr val="00B050"/>
+              </a:solidFill>
+            </a:endParaRPr>
+          </a:p>
+        </p:txBody>
+      </p:sp>
     </p:spTree>
     <p:extLst>
       <p:ext uri="{BB962C8B-B14F-4D97-AF65-F5344CB8AC3E}">
@@ -16743,7 +16785,7 @@
                               <p:par>
                                 <p:cTn id="9" presetID="1" presetClass="entr" presetSubtype="0" fill="hold" nodeType="clickEffect">
                                   <p:stCondLst>
-                                    <p:cond delay="4000"/>
+                                    <p:cond delay="3000"/>
                                   </p:stCondLst>
                                   <p:childTnLst>
                                     <p:set>
@@ -16788,7 +16830,7 @@
                               <p:par>
                                 <p:cTn id="13" presetID="1" presetClass="entr" presetSubtype="0" fill="hold" nodeType="clickEffect">
                                   <p:stCondLst>
-                                    <p:cond delay="4000"/>
+                                    <p:cond delay="3000"/>
                                   </p:stCondLst>
                                   <p:childTnLst>
                                     <p:set>
@@ -17110,6 +17152,44 @@
               <a:t> </a:t>
             </a:r>
             <a:endParaRPr lang="en-US" sz="1000" dirty="0"/>
+          </a:p>
+        </p:txBody>
+      </p:sp>
+      <p:sp>
+        <p:nvSpPr>
+          <p:cNvPr id="10" name="TextBox 9"/>
+          <p:cNvSpPr txBox="1"/>
+          <p:nvPr/>
+        </p:nvSpPr>
+        <p:spPr>
+          <a:xfrm>
+            <a:off x="9790295" y="172726"/>
+            <a:ext cx="2400272" cy="369332"/>
+          </a:xfrm>
+          <a:prstGeom prst="rect">
+            <a:avLst/>
+          </a:prstGeom>
+          <a:noFill/>
+        </p:spPr>
+        <p:txBody>
+          <a:bodyPr wrap="none" rtlCol="0">
+            <a:spAutoFit/>
+          </a:bodyPr>
+          <a:lstStyle/>
+          <a:p>
+            <a:r>
+              <a:rPr lang="en-US" dirty="0" smtClean="0">
+                <a:solidFill>
+                  <a:srgbClr val="00B050"/>
+                </a:solidFill>
+              </a:rPr>
+              <a:t>The “Brookings Report”</a:t>
+            </a:r>
+            <a:endParaRPr lang="en-US" dirty="0">
+              <a:solidFill>
+                <a:srgbClr val="00B050"/>
+              </a:solidFill>
+            </a:endParaRPr>
           </a:p>
         </p:txBody>
       </p:sp>

</xml_diff>